<commit_message>
added background info on git and github
</commit_message>
<xml_diff>
--- a/Do You Git It Now.pptx
+++ b/Do You Git It Now.pptx
@@ -5,10 +5,10 @@
     <p:sldMasterId id="2147483930" r:id="rId1"/>
   </p:sldMasterIdLst>
   <p:notesMasterIdLst>
-    <p:notesMasterId r:id="rId16"/>
+    <p:notesMasterId r:id="rId19"/>
   </p:notesMasterIdLst>
   <p:handoutMasterIdLst>
-    <p:handoutMasterId r:id="rId17"/>
+    <p:handoutMasterId r:id="rId20"/>
   </p:handoutMasterIdLst>
   <p:sldIdLst>
     <p:sldId id="608" r:id="rId2"/>
@@ -20,11 +20,14 @@
     <p:sldId id="625" r:id="rId8"/>
     <p:sldId id="607" r:id="rId9"/>
     <p:sldId id="610" r:id="rId10"/>
-    <p:sldId id="619" r:id="rId11"/>
-    <p:sldId id="620" r:id="rId12"/>
-    <p:sldId id="621" r:id="rId13"/>
-    <p:sldId id="622" r:id="rId14"/>
-    <p:sldId id="623" r:id="rId15"/>
+    <p:sldId id="631" r:id="rId11"/>
+    <p:sldId id="619" r:id="rId12"/>
+    <p:sldId id="629" r:id="rId13"/>
+    <p:sldId id="630" r:id="rId14"/>
+    <p:sldId id="620" r:id="rId15"/>
+    <p:sldId id="621" r:id="rId16"/>
+    <p:sldId id="622" r:id="rId17"/>
+    <p:sldId id="623" r:id="rId18"/>
   </p:sldIdLst>
   <p:sldSz cx="12192000" cy="6858000"/>
   <p:notesSz cx="7023100" cy="9309100"/>
@@ -963,7 +966,7 @@
                 </a:solidFill>
               </a:rPr>
               <a:pPr/>
-              <a:t>12</a:t>
+              <a:t>13</a:t>
             </a:fld>
             <a:endParaRPr lang="en-US" dirty="0">
               <a:solidFill>
@@ -976,7 +979,7 @@
     </p:spTree>
     <p:extLst>
       <p:ext uri="{BB962C8B-B14F-4D97-AF65-F5344CB8AC3E}">
-        <p14:creationId xmlns:p14="http://schemas.microsoft.com/office/powerpoint/2010/main" val="2170127835"/>
+        <p14:creationId xmlns:p14="http://schemas.microsoft.com/office/powerpoint/2010/main" val="730513299"/>
       </p:ext>
     </p:extLst>
   </p:cSld>
@@ -1209,7 +1212,7 @@
                 </a:solidFill>
               </a:rPr>
               <a:pPr/>
-              <a:t>13</a:t>
+              <a:t>14</a:t>
             </a:fld>
             <a:endParaRPr lang="en-US" dirty="0">
               <a:solidFill>
@@ -1222,7 +1225,7 @@
     </p:spTree>
     <p:extLst>
       <p:ext uri="{BB962C8B-B14F-4D97-AF65-F5344CB8AC3E}">
-        <p14:creationId xmlns:p14="http://schemas.microsoft.com/office/powerpoint/2010/main" val="3832929062"/>
+        <p14:creationId xmlns:p14="http://schemas.microsoft.com/office/powerpoint/2010/main" val="498190681"/>
       </p:ext>
     </p:extLst>
   </p:cSld>
@@ -1455,7 +1458,499 @@
                 </a:solidFill>
               </a:rPr>
               <a:pPr/>
-              <a:t>14</a:t>
+              <a:t>15</a:t>
+            </a:fld>
+            <a:endParaRPr lang="en-US" dirty="0">
+              <a:solidFill>
+                <a:prstClr val="black"/>
+              </a:solidFill>
+            </a:endParaRPr>
+          </a:p>
+        </p:txBody>
+      </p:sp>
+    </p:spTree>
+    <p:extLst>
+      <p:ext uri="{BB962C8B-B14F-4D97-AF65-F5344CB8AC3E}">
+        <p14:creationId xmlns:p14="http://schemas.microsoft.com/office/powerpoint/2010/main" val="2170127835"/>
+      </p:ext>
+    </p:extLst>
+  </p:cSld>
+  <p:clrMapOvr>
+    <a:masterClrMapping/>
+  </p:clrMapOvr>
+</p:notes>
+</file>
+
+<file path=ppt/notesSlides/notesSlide13.xml><?xml version="1.0" encoding="utf-8"?>
+<p:notes xmlns:a="http://schemas.openxmlformats.org/drawingml/2006/main" xmlns:r="http://schemas.openxmlformats.org/officeDocument/2006/relationships" xmlns:p="http://schemas.openxmlformats.org/presentationml/2006/main">
+  <p:cSld>
+    <p:spTree>
+      <p:nvGrpSpPr>
+        <p:cNvPr id="1" name=""/>
+        <p:cNvGrpSpPr/>
+        <p:nvPr/>
+      </p:nvGrpSpPr>
+      <p:grpSpPr>
+        <a:xfrm>
+          <a:off x="0" y="0"/>
+          <a:ext cx="0" cy="0"/>
+          <a:chOff x="0" y="0"/>
+          <a:chExt cx="0" cy="0"/>
+        </a:xfrm>
+      </p:grpSpPr>
+      <p:sp>
+        <p:nvSpPr>
+          <p:cNvPr id="41986" name="Slide Image Placeholder 1"/>
+          <p:cNvSpPr>
+            <a:spLocks noGrp="1" noRot="1" noChangeAspect="1" noTextEdit="1"/>
+          </p:cNvSpPr>
+          <p:nvPr>
+            <p:ph type="sldImg"/>
+          </p:nvPr>
+        </p:nvSpPr>
+        <p:spPr>
+          <a:ln/>
+        </p:spPr>
+      </p:sp>
+      <p:sp>
+        <p:nvSpPr>
+          <p:cNvPr id="41987" name="Notes Placeholder 2"/>
+          <p:cNvSpPr>
+            <a:spLocks noGrp="1"/>
+          </p:cNvSpPr>
+          <p:nvPr>
+            <p:ph type="body" idx="1"/>
+          </p:nvPr>
+        </p:nvSpPr>
+        <p:spPr>
+          <a:noFill/>
+          <a:ln/>
+          <a:extLst>
+            <a:ext uri="{909E8E84-426E-40DD-AFC4-6F175D3DCCD1}">
+              <a14:hiddenFill xmlns:a14="http://schemas.microsoft.com/office/drawing/2010/main">
+                <a:solidFill>
+                  <a:srgbClr val="FFFFFF"/>
+                </a:solidFill>
+              </a14:hiddenFill>
+            </a:ext>
+            <a:ext uri="{91240B29-F687-4F45-9708-019B960494DF}">
+              <a14:hiddenLine xmlns:a14="http://schemas.microsoft.com/office/drawing/2010/main" w="9525">
+                <a:solidFill>
+                  <a:srgbClr val="000000"/>
+                </a:solidFill>
+                <a:miter lim="800000"/>
+                <a:headEnd/>
+                <a:tailEnd/>
+              </a14:hiddenLine>
+            </a:ext>
+          </a:extLst>
+        </p:spPr>
+        <p:txBody>
+          <a:bodyPr/>
+          <a:lstStyle/>
+          <a:p>
+            <a:pPr marL="102870" indent="0">
+              <a:spcBef>
+                <a:spcPts val="600"/>
+              </a:spcBef>
+              <a:buFont typeface="Arial" panose="020B0604020202020204" pitchFamily="34" charset="0"/>
+              <a:buNone/>
+            </a:pPr>
+            <a:endParaRPr lang="en-US" dirty="0"/>
+          </a:p>
+          <a:p>
+            <a:endParaRPr lang="en-US" dirty="0"/>
+          </a:p>
+        </p:txBody>
+      </p:sp>
+      <p:sp>
+        <p:nvSpPr>
+          <p:cNvPr id="41988" name="Slide Number Placeholder 3"/>
+          <p:cNvSpPr>
+            <a:spLocks noGrp="1"/>
+          </p:cNvSpPr>
+          <p:nvPr>
+            <p:ph type="sldNum" sz="quarter" idx="5"/>
+          </p:nvPr>
+        </p:nvSpPr>
+        <p:spPr>
+          <a:noFill/>
+          <a:ln/>
+          <a:extLst>
+            <a:ext uri="{909E8E84-426E-40DD-AFC4-6F175D3DCCD1}">
+              <a14:hiddenFill xmlns:a14="http://schemas.microsoft.com/office/drawing/2010/main">
+                <a:solidFill>
+                  <a:srgbClr val="FFFFFF"/>
+                </a:solidFill>
+              </a14:hiddenFill>
+            </a:ext>
+            <a:ext uri="{91240B29-F687-4F45-9708-019B960494DF}">
+              <a14:hiddenLine xmlns:a14="http://schemas.microsoft.com/office/drawing/2010/main" w="9525">
+                <a:solidFill>
+                  <a:srgbClr val="000000"/>
+                </a:solidFill>
+                <a:miter lim="800000"/>
+                <a:headEnd/>
+                <a:tailEnd/>
+              </a14:hiddenLine>
+            </a:ext>
+          </a:extLst>
+        </p:spPr>
+        <p:txBody>
+          <a:bodyPr/>
+          <a:lstStyle>
+            <a:lvl1pPr>
+              <a:defRPr>
+                <a:solidFill>
+                  <a:schemeClr val="tx1"/>
+                </a:solidFill>
+                <a:latin typeface="Arial" pitchFamily="34" charset="0"/>
+              </a:defRPr>
+            </a:lvl1pPr>
+            <a:lvl2pPr marL="752260" indent="-289331">
+              <a:defRPr>
+                <a:solidFill>
+                  <a:schemeClr val="tx1"/>
+                </a:solidFill>
+                <a:latin typeface="Arial" pitchFamily="34" charset="0"/>
+              </a:defRPr>
+            </a:lvl2pPr>
+            <a:lvl3pPr marL="1157324" indent="-231465">
+              <a:defRPr>
+                <a:solidFill>
+                  <a:schemeClr val="tx1"/>
+                </a:solidFill>
+                <a:latin typeface="Arial" pitchFamily="34" charset="0"/>
+              </a:defRPr>
+            </a:lvl3pPr>
+            <a:lvl4pPr marL="1620253" indent="-231465">
+              <a:defRPr>
+                <a:solidFill>
+                  <a:schemeClr val="tx1"/>
+                </a:solidFill>
+                <a:latin typeface="Arial" pitchFamily="34" charset="0"/>
+              </a:defRPr>
+            </a:lvl4pPr>
+            <a:lvl5pPr marL="2083181" indent="-231465">
+              <a:defRPr>
+                <a:solidFill>
+                  <a:schemeClr val="tx1"/>
+                </a:solidFill>
+                <a:latin typeface="Arial" pitchFamily="34" charset="0"/>
+              </a:defRPr>
+            </a:lvl5pPr>
+            <a:lvl6pPr marL="2546112" indent="-231465" eaLnBrk="0" fontAlgn="base" hangingPunct="0">
+              <a:spcBef>
+                <a:spcPct val="0"/>
+              </a:spcBef>
+              <a:spcAft>
+                <a:spcPct val="0"/>
+              </a:spcAft>
+              <a:defRPr>
+                <a:solidFill>
+                  <a:schemeClr val="tx1"/>
+                </a:solidFill>
+                <a:latin typeface="Arial" pitchFamily="34" charset="0"/>
+              </a:defRPr>
+            </a:lvl6pPr>
+            <a:lvl7pPr marL="3009041" indent="-231465" eaLnBrk="0" fontAlgn="base" hangingPunct="0">
+              <a:spcBef>
+                <a:spcPct val="0"/>
+              </a:spcBef>
+              <a:spcAft>
+                <a:spcPct val="0"/>
+              </a:spcAft>
+              <a:defRPr>
+                <a:solidFill>
+                  <a:schemeClr val="tx1"/>
+                </a:solidFill>
+                <a:latin typeface="Arial" pitchFamily="34" charset="0"/>
+              </a:defRPr>
+            </a:lvl7pPr>
+            <a:lvl8pPr marL="3471970" indent="-231465" eaLnBrk="0" fontAlgn="base" hangingPunct="0">
+              <a:spcBef>
+                <a:spcPct val="0"/>
+              </a:spcBef>
+              <a:spcAft>
+                <a:spcPct val="0"/>
+              </a:spcAft>
+              <a:defRPr>
+                <a:solidFill>
+                  <a:schemeClr val="tx1"/>
+                </a:solidFill>
+                <a:latin typeface="Arial" pitchFamily="34" charset="0"/>
+              </a:defRPr>
+            </a:lvl8pPr>
+            <a:lvl9pPr marL="3934900" indent="-231465" eaLnBrk="0" fontAlgn="base" hangingPunct="0">
+              <a:spcBef>
+                <a:spcPct val="0"/>
+              </a:spcBef>
+              <a:spcAft>
+                <a:spcPct val="0"/>
+              </a:spcAft>
+              <a:defRPr>
+                <a:solidFill>
+                  <a:schemeClr val="tx1"/>
+                </a:solidFill>
+                <a:latin typeface="Arial" pitchFamily="34" charset="0"/>
+              </a:defRPr>
+            </a:lvl9pPr>
+          </a:lstStyle>
+          <a:p>
+            <a:fld id="{7D442D87-3FDC-464D-86BA-B2B66F9DA685}" type="slidenum">
+              <a:rPr lang="en-US" smtClean="0">
+                <a:solidFill>
+                  <a:prstClr val="black"/>
+                </a:solidFill>
+              </a:rPr>
+              <a:pPr/>
+              <a:t>16</a:t>
+            </a:fld>
+            <a:endParaRPr lang="en-US" dirty="0">
+              <a:solidFill>
+                <a:prstClr val="black"/>
+              </a:solidFill>
+            </a:endParaRPr>
+          </a:p>
+        </p:txBody>
+      </p:sp>
+    </p:spTree>
+    <p:extLst>
+      <p:ext uri="{BB962C8B-B14F-4D97-AF65-F5344CB8AC3E}">
+        <p14:creationId xmlns:p14="http://schemas.microsoft.com/office/powerpoint/2010/main" val="3832929062"/>
+      </p:ext>
+    </p:extLst>
+  </p:cSld>
+  <p:clrMapOvr>
+    <a:masterClrMapping/>
+  </p:clrMapOvr>
+</p:notes>
+</file>
+
+<file path=ppt/notesSlides/notesSlide14.xml><?xml version="1.0" encoding="utf-8"?>
+<p:notes xmlns:a="http://schemas.openxmlformats.org/drawingml/2006/main" xmlns:r="http://schemas.openxmlformats.org/officeDocument/2006/relationships" xmlns:p="http://schemas.openxmlformats.org/presentationml/2006/main">
+  <p:cSld>
+    <p:spTree>
+      <p:nvGrpSpPr>
+        <p:cNvPr id="1" name=""/>
+        <p:cNvGrpSpPr/>
+        <p:nvPr/>
+      </p:nvGrpSpPr>
+      <p:grpSpPr>
+        <a:xfrm>
+          <a:off x="0" y="0"/>
+          <a:ext cx="0" cy="0"/>
+          <a:chOff x="0" y="0"/>
+          <a:chExt cx="0" cy="0"/>
+        </a:xfrm>
+      </p:grpSpPr>
+      <p:sp>
+        <p:nvSpPr>
+          <p:cNvPr id="41986" name="Slide Image Placeholder 1"/>
+          <p:cNvSpPr>
+            <a:spLocks noGrp="1" noRot="1" noChangeAspect="1" noTextEdit="1"/>
+          </p:cNvSpPr>
+          <p:nvPr>
+            <p:ph type="sldImg"/>
+          </p:nvPr>
+        </p:nvSpPr>
+        <p:spPr>
+          <a:ln/>
+        </p:spPr>
+      </p:sp>
+      <p:sp>
+        <p:nvSpPr>
+          <p:cNvPr id="41987" name="Notes Placeholder 2"/>
+          <p:cNvSpPr>
+            <a:spLocks noGrp="1"/>
+          </p:cNvSpPr>
+          <p:nvPr>
+            <p:ph type="body" idx="1"/>
+          </p:nvPr>
+        </p:nvSpPr>
+        <p:spPr>
+          <a:noFill/>
+          <a:ln/>
+          <a:extLst>
+            <a:ext uri="{909E8E84-426E-40DD-AFC4-6F175D3DCCD1}">
+              <a14:hiddenFill xmlns:a14="http://schemas.microsoft.com/office/drawing/2010/main">
+                <a:solidFill>
+                  <a:srgbClr val="FFFFFF"/>
+                </a:solidFill>
+              </a14:hiddenFill>
+            </a:ext>
+            <a:ext uri="{91240B29-F687-4F45-9708-019B960494DF}">
+              <a14:hiddenLine xmlns:a14="http://schemas.microsoft.com/office/drawing/2010/main" w="9525">
+                <a:solidFill>
+                  <a:srgbClr val="000000"/>
+                </a:solidFill>
+                <a:miter lim="800000"/>
+                <a:headEnd/>
+                <a:tailEnd/>
+              </a14:hiddenLine>
+            </a:ext>
+          </a:extLst>
+        </p:spPr>
+        <p:txBody>
+          <a:bodyPr/>
+          <a:lstStyle/>
+          <a:p>
+            <a:pPr marL="102870" indent="0">
+              <a:spcBef>
+                <a:spcPts val="600"/>
+              </a:spcBef>
+              <a:buFont typeface="Arial" panose="020B0604020202020204" pitchFamily="34" charset="0"/>
+              <a:buNone/>
+            </a:pPr>
+            <a:endParaRPr lang="en-US" dirty="0"/>
+          </a:p>
+          <a:p>
+            <a:endParaRPr lang="en-US" dirty="0"/>
+          </a:p>
+        </p:txBody>
+      </p:sp>
+      <p:sp>
+        <p:nvSpPr>
+          <p:cNvPr id="41988" name="Slide Number Placeholder 3"/>
+          <p:cNvSpPr>
+            <a:spLocks noGrp="1"/>
+          </p:cNvSpPr>
+          <p:nvPr>
+            <p:ph type="sldNum" sz="quarter" idx="5"/>
+          </p:nvPr>
+        </p:nvSpPr>
+        <p:spPr>
+          <a:noFill/>
+          <a:ln/>
+          <a:extLst>
+            <a:ext uri="{909E8E84-426E-40DD-AFC4-6F175D3DCCD1}">
+              <a14:hiddenFill xmlns:a14="http://schemas.microsoft.com/office/drawing/2010/main">
+                <a:solidFill>
+                  <a:srgbClr val="FFFFFF"/>
+                </a:solidFill>
+              </a14:hiddenFill>
+            </a:ext>
+            <a:ext uri="{91240B29-F687-4F45-9708-019B960494DF}">
+              <a14:hiddenLine xmlns:a14="http://schemas.microsoft.com/office/drawing/2010/main" w="9525">
+                <a:solidFill>
+                  <a:srgbClr val="000000"/>
+                </a:solidFill>
+                <a:miter lim="800000"/>
+                <a:headEnd/>
+                <a:tailEnd/>
+              </a14:hiddenLine>
+            </a:ext>
+          </a:extLst>
+        </p:spPr>
+        <p:txBody>
+          <a:bodyPr/>
+          <a:lstStyle>
+            <a:lvl1pPr>
+              <a:defRPr>
+                <a:solidFill>
+                  <a:schemeClr val="tx1"/>
+                </a:solidFill>
+                <a:latin typeface="Arial" pitchFamily="34" charset="0"/>
+              </a:defRPr>
+            </a:lvl1pPr>
+            <a:lvl2pPr marL="752260" indent="-289331">
+              <a:defRPr>
+                <a:solidFill>
+                  <a:schemeClr val="tx1"/>
+                </a:solidFill>
+                <a:latin typeface="Arial" pitchFamily="34" charset="0"/>
+              </a:defRPr>
+            </a:lvl2pPr>
+            <a:lvl3pPr marL="1157324" indent="-231465">
+              <a:defRPr>
+                <a:solidFill>
+                  <a:schemeClr val="tx1"/>
+                </a:solidFill>
+                <a:latin typeface="Arial" pitchFamily="34" charset="0"/>
+              </a:defRPr>
+            </a:lvl3pPr>
+            <a:lvl4pPr marL="1620253" indent="-231465">
+              <a:defRPr>
+                <a:solidFill>
+                  <a:schemeClr val="tx1"/>
+                </a:solidFill>
+                <a:latin typeface="Arial" pitchFamily="34" charset="0"/>
+              </a:defRPr>
+            </a:lvl4pPr>
+            <a:lvl5pPr marL="2083181" indent="-231465">
+              <a:defRPr>
+                <a:solidFill>
+                  <a:schemeClr val="tx1"/>
+                </a:solidFill>
+                <a:latin typeface="Arial" pitchFamily="34" charset="0"/>
+              </a:defRPr>
+            </a:lvl5pPr>
+            <a:lvl6pPr marL="2546112" indent="-231465" eaLnBrk="0" fontAlgn="base" hangingPunct="0">
+              <a:spcBef>
+                <a:spcPct val="0"/>
+              </a:spcBef>
+              <a:spcAft>
+                <a:spcPct val="0"/>
+              </a:spcAft>
+              <a:defRPr>
+                <a:solidFill>
+                  <a:schemeClr val="tx1"/>
+                </a:solidFill>
+                <a:latin typeface="Arial" pitchFamily="34" charset="0"/>
+              </a:defRPr>
+            </a:lvl6pPr>
+            <a:lvl7pPr marL="3009041" indent="-231465" eaLnBrk="0" fontAlgn="base" hangingPunct="0">
+              <a:spcBef>
+                <a:spcPct val="0"/>
+              </a:spcBef>
+              <a:spcAft>
+                <a:spcPct val="0"/>
+              </a:spcAft>
+              <a:defRPr>
+                <a:solidFill>
+                  <a:schemeClr val="tx1"/>
+                </a:solidFill>
+                <a:latin typeface="Arial" pitchFamily="34" charset="0"/>
+              </a:defRPr>
+            </a:lvl7pPr>
+            <a:lvl8pPr marL="3471970" indent="-231465" eaLnBrk="0" fontAlgn="base" hangingPunct="0">
+              <a:spcBef>
+                <a:spcPct val="0"/>
+              </a:spcBef>
+              <a:spcAft>
+                <a:spcPct val="0"/>
+              </a:spcAft>
+              <a:defRPr>
+                <a:solidFill>
+                  <a:schemeClr val="tx1"/>
+                </a:solidFill>
+                <a:latin typeface="Arial" pitchFamily="34" charset="0"/>
+              </a:defRPr>
+            </a:lvl8pPr>
+            <a:lvl9pPr marL="3934900" indent="-231465" eaLnBrk="0" fontAlgn="base" hangingPunct="0">
+              <a:spcBef>
+                <a:spcPct val="0"/>
+              </a:spcBef>
+              <a:spcAft>
+                <a:spcPct val="0"/>
+              </a:spcAft>
+              <a:defRPr>
+                <a:solidFill>
+                  <a:schemeClr val="tx1"/>
+                </a:solidFill>
+                <a:latin typeface="Arial" pitchFamily="34" charset="0"/>
+              </a:defRPr>
+            </a:lvl9pPr>
+          </a:lstStyle>
+          <a:p>
+            <a:fld id="{7D442D87-3FDC-464D-86BA-B2B66F9DA685}" type="slidenum">
+              <a:rPr lang="en-US" smtClean="0">
+                <a:solidFill>
+                  <a:prstClr val="black"/>
+                </a:solidFill>
+              </a:rPr>
+              <a:pPr/>
+              <a:t>17</a:t>
             </a:fld>
             <a:endParaRPr lang="en-US" dirty="0">
               <a:solidFill>
@@ -3015,7 +3510,7 @@
                 </a:solidFill>
               </a:rPr>
               <a:pPr/>
-              <a:t>10</a:t>
+              <a:t>11</a:t>
             </a:fld>
             <a:endParaRPr lang="en-US" dirty="0">
               <a:solidFill>
@@ -3261,7 +3756,7 @@
                 </a:solidFill>
               </a:rPr>
               <a:pPr/>
-              <a:t>11</a:t>
+              <a:t>12</a:t>
             </a:fld>
             <a:endParaRPr lang="en-US" dirty="0">
               <a:solidFill>
@@ -3274,7 +3769,7 @@
     </p:spTree>
     <p:extLst>
       <p:ext uri="{BB962C8B-B14F-4D97-AF65-F5344CB8AC3E}">
-        <p14:creationId xmlns:p14="http://schemas.microsoft.com/office/powerpoint/2010/main" val="498190681"/>
+        <p14:creationId xmlns:p14="http://schemas.microsoft.com/office/powerpoint/2010/main" val="658572615"/>
       </p:ext>
     </p:extLst>
   </p:cSld>
@@ -7403,134 +7898,84 @@
       </p:grpSpPr>
       <p:sp>
         <p:nvSpPr>
-          <p:cNvPr id="2" name="Content Placeholder 1">
+          <p:cNvPr id="7" name="Rectangle 6">
             <a:extLst>
               <a:ext uri="{FF2B5EF4-FFF2-40B4-BE49-F238E27FC236}">
-                <a16:creationId xmlns:a16="http://schemas.microsoft.com/office/drawing/2014/main" id="{27D0C661-EDC7-964F-9BD3-F8C1B1CD48B7}"/>
+                <a16:creationId xmlns:a16="http://schemas.microsoft.com/office/drawing/2014/main" id="{F3A4CABE-04BD-0D41-A976-9D9E8DE8B842}"/>
               </a:ext>
             </a:extLst>
           </p:cNvPr>
-          <p:cNvSpPr>
-            <a:spLocks noGrp="1"/>
-          </p:cNvSpPr>
-          <p:nvPr>
-            <p:ph idx="1"/>
-          </p:nvPr>
-        </p:nvSpPr>
-        <p:spPr/>
-        <p:txBody>
-          <a:bodyPr>
-            <a:normAutofit/>
-          </a:bodyPr>
-          <a:lstStyle/>
-          <a:p>
-            <a:pPr marL="0" indent="0">
-              <a:lnSpc>
-                <a:spcPct val="100000"/>
-              </a:lnSpc>
-              <a:spcBef>
-                <a:spcPts val="0"/>
-              </a:spcBef>
-              <a:spcAft>
-                <a:spcPts val="0"/>
-              </a:spcAft>
-            </a:pPr>
-            <a:r>
-              <a:rPr lang="en-US" sz="2800" dirty="0"/>
-              <a:t>Text </a:t>
-            </a:r>
-          </a:p>
-        </p:txBody>
-      </p:sp>
-      <p:sp>
-        <p:nvSpPr>
-          <p:cNvPr id="9" name="TextBox 8"/>
-          <p:cNvSpPr txBox="1"/>
+          <p:cNvSpPr/>
           <p:nvPr/>
         </p:nvSpPr>
         <p:spPr>
           <a:xfrm>
-            <a:off x="130629" y="6397228"/>
-            <a:ext cx="4911634" cy="338554"/>
+            <a:off x="1046922" y="3988904"/>
+            <a:ext cx="10243930" cy="742122"/>
           </a:xfrm>
           <a:prstGeom prst="rect">
             <a:avLst/>
           </a:prstGeom>
-          <a:noFill/>
-        </p:spPr>
-        <p:txBody>
-          <a:bodyPr wrap="square" rtlCol="0">
-            <a:spAutoFit/>
-          </a:bodyPr>
+          <a:solidFill>
+            <a:schemeClr val="bg1"/>
+          </a:solidFill>
+          <a:ln>
+            <a:noFill/>
+          </a:ln>
+        </p:spPr>
+        <p:style>
+          <a:lnRef idx="2">
+            <a:schemeClr val="accent1">
+              <a:shade val="50000"/>
+            </a:schemeClr>
+          </a:lnRef>
+          <a:fillRef idx="1">
+            <a:schemeClr val="accent1"/>
+          </a:fillRef>
+          <a:effectRef idx="0">
+            <a:schemeClr val="accent1"/>
+          </a:effectRef>
+          <a:fontRef idx="minor">
+            <a:schemeClr val="lt1"/>
+          </a:fontRef>
+        </p:style>
+        <p:txBody>
+          <a:bodyPr rtlCol="0" anchor="ctr"/>
           <a:lstStyle/>
           <a:p>
-            <a:r>
-              <a:rPr lang="en-US" sz="1600" i="1" dirty="0">
-                <a:solidFill>
-                  <a:schemeClr val="bg1"/>
-                </a:solidFill>
-              </a:rPr>
-              <a:t>Office of Institutional Research</a:t>
-            </a:r>
-          </a:p>
-        </p:txBody>
-      </p:sp>
-      <p:pic>
-        <p:nvPicPr>
-          <p:cNvPr id="7" name="Picture 6"/>
-          <p:cNvPicPr>
-            <a:picLocks noChangeAspect="1"/>
-          </p:cNvPicPr>
-          <p:nvPr/>
-        </p:nvPicPr>
-        <p:blipFill>
-          <a:blip r:embed="rId3" cstate="screen">
-            <a:extLst>
-              <a:ext uri="{28A0092B-C50C-407E-A947-70E740481C1C}">
-                <a14:useLocalDpi xmlns:a14="http://schemas.microsoft.com/office/drawing/2010/main"/>
-              </a:ext>
-            </a:extLst>
-          </a:blip>
-          <a:stretch>
-            <a:fillRect/>
-          </a:stretch>
-        </p:blipFill>
-        <p:spPr>
-          <a:xfrm>
-            <a:off x="8582526" y="216624"/>
-            <a:ext cx="3352800" cy="452628"/>
-          </a:xfrm>
-          <a:prstGeom prst="rect">
-            <a:avLst/>
-          </a:prstGeom>
-        </p:spPr>
-      </p:pic>
+            <a:pPr algn="ctr"/>
+            <a:endParaRPr lang="en-US"/>
+          </a:p>
+        </p:txBody>
+      </p:sp>
       <p:grpSp>
         <p:nvGrpSpPr>
-          <p:cNvPr id="12" name="Group 11">
+          <p:cNvPr id="4" name="Group 3">
             <a:extLst>
               <a:ext uri="{FF2B5EF4-FFF2-40B4-BE49-F238E27FC236}">
-                <a16:creationId xmlns:a16="http://schemas.microsoft.com/office/drawing/2014/main" id="{9190F049-BB52-C64B-8F7C-AE2AC887A283}"/>
+                <a16:creationId xmlns:a16="http://schemas.microsoft.com/office/drawing/2014/main" id="{509A8926-A408-2144-B3E7-BDBF8AEE3C51}"/>
               </a:ext>
             </a:extLst>
           </p:cNvPr>
-          <p:cNvGrpSpPr/>
+          <p:cNvGrpSpPr>
+            <a:grpSpLocks noChangeAspect="1"/>
+          </p:cNvGrpSpPr>
           <p:nvPr/>
         </p:nvGrpSpPr>
         <p:grpSpPr>
           <a:xfrm>
-            <a:off x="1036320" y="122218"/>
-            <a:ext cx="4782371" cy="1554480"/>
+            <a:off x="1876261" y="2057400"/>
+            <a:ext cx="8439479" cy="2743200"/>
             <a:chOff x="5476555" y="3384115"/>
             <a:chExt cx="4782371" cy="1554480"/>
           </a:xfrm>
         </p:grpSpPr>
         <p:pic>
           <p:nvPicPr>
-            <p:cNvPr id="4" name="Picture 3" descr="A close up of a sign&#10;&#10;Description automatically generated">
+            <p:cNvPr id="5" name="Picture 4" descr="A close up of a sign&#10;&#10;Description automatically generated">
               <a:extLst>
                 <a:ext uri="{FF2B5EF4-FFF2-40B4-BE49-F238E27FC236}">
-                  <a16:creationId xmlns:a16="http://schemas.microsoft.com/office/drawing/2014/main" id="{5C092799-E0BF-C949-B1FD-31B91D4EBA93}"/>
+                  <a16:creationId xmlns:a16="http://schemas.microsoft.com/office/drawing/2014/main" id="{AE50AEDB-92CF-9144-B04A-7C474454008E}"/>
                 </a:ext>
               </a:extLst>
             </p:cNvPr>
@@ -7540,7 +7985,7 @@
             <p:nvPr/>
           </p:nvPicPr>
           <p:blipFill>
-            <a:blip r:embed="rId4">
+            <a:blip r:embed="rId2">
               <a:extLst>
                 <a:ext uri="{28A0092B-C50C-407E-A947-70E740481C1C}">
                   <a14:useLocalDpi xmlns:a14="http://schemas.microsoft.com/office/drawing/2010/main" val="0"/>
@@ -7566,7 +8011,7 @@
             <p:cNvPr id="6" name="Picture 5">
               <a:extLst>
                 <a:ext uri="{FF2B5EF4-FFF2-40B4-BE49-F238E27FC236}">
-                  <a16:creationId xmlns:a16="http://schemas.microsoft.com/office/drawing/2014/main" id="{16DFF252-500A-B74D-86E2-B1EBF8CB4134}"/>
+                  <a16:creationId xmlns:a16="http://schemas.microsoft.com/office/drawing/2014/main" id="{8DCAB0D9-7655-5848-92ED-1F5B95A15CFA}"/>
                 </a:ext>
               </a:extLst>
             </p:cNvPr>
@@ -7576,7 +8021,7 @@
             <p:nvPr/>
           </p:nvPicPr>
           <p:blipFill>
-            <a:blip r:embed="rId5">
+            <a:blip r:embed="rId3">
               <a:extLst>
                 <a:ext uri="{28A0092B-C50C-407E-A947-70E740481C1C}">
                   <a14:useLocalDpi xmlns:a14="http://schemas.microsoft.com/office/drawing/2010/main" val="0"/>
@@ -7601,7 +8046,7 @@
     </p:spTree>
     <p:extLst>
       <p:ext uri="{BB962C8B-B14F-4D97-AF65-F5344CB8AC3E}">
-        <p14:creationId xmlns:p14="http://schemas.microsoft.com/office/powerpoint/2010/main" val="967005845"/>
+        <p14:creationId xmlns:p14="http://schemas.microsoft.com/office/powerpoint/2010/main" val="2390332249"/>
       </p:ext>
     </p:extLst>
   </p:cSld>
@@ -7630,7 +8075,13 @@
       </p:grpSpPr>
       <p:sp>
         <p:nvSpPr>
-          <p:cNvPr id="9218" name="Title 1"/>
+          <p:cNvPr id="13" name="Title 12">
+            <a:extLst>
+              <a:ext uri="{FF2B5EF4-FFF2-40B4-BE49-F238E27FC236}">
+                <a16:creationId xmlns:a16="http://schemas.microsoft.com/office/drawing/2014/main" id="{8F23838B-FDC7-5C47-8479-CCBB0B5EED79}"/>
+              </a:ext>
+            </a:extLst>
+          </p:cNvPr>
           <p:cNvSpPr>
             <a:spLocks noGrp="1"/>
           </p:cNvSpPr>
@@ -7640,19 +8091,12 @@
         </p:nvSpPr>
         <p:spPr/>
         <p:txBody>
-          <a:bodyPr anchor="b">
-            <a:noAutofit/>
-          </a:bodyPr>
+          <a:bodyPr/>
           <a:lstStyle/>
           <a:p>
             <a:r>
-              <a:rPr lang="en-US" sz="3200" b="1" dirty="0">
-                <a:solidFill>
-                  <a:schemeClr val="accent2"/>
-                </a:solidFill>
-                <a:latin typeface="+mn-lt"/>
-              </a:rPr>
-              <a:t>Title</a:t>
+              <a:rPr lang="en-US" dirty="0"/>
+              <a:t>GitHub</a:t>
             </a:r>
           </a:p>
         </p:txBody>
@@ -7688,12 +8132,49 @@
                 <a:spcPts val="0"/>
               </a:spcBef>
               <a:spcAft>
+                <a:spcPts val="1200"/>
+              </a:spcAft>
+              <a:buNone/>
+            </a:pPr>
+            <a:r>
+              <a:rPr lang="en-US" sz="2800" dirty="0"/>
+              <a:t>Free website</a:t>
+            </a:r>
+          </a:p>
+          <a:p>
+            <a:pPr marL="0" indent="0">
+              <a:lnSpc>
+                <a:spcPct val="100000"/>
+              </a:lnSpc>
+              <a:spcBef>
                 <a:spcPts val="0"/>
+              </a:spcBef>
+              <a:spcAft>
+                <a:spcPts val="1200"/>
               </a:spcAft>
+              <a:buNone/>
             </a:pPr>
             <a:r>
               <a:rPr lang="en-US" sz="2800" dirty="0"/>
-              <a:t>Text </a:t>
+              <a:t>Store code, documents, even some data</a:t>
+            </a:r>
+          </a:p>
+          <a:p>
+            <a:pPr marL="0" indent="0">
+              <a:lnSpc>
+                <a:spcPct val="100000"/>
+              </a:lnSpc>
+              <a:spcBef>
+                <a:spcPts val="0"/>
+              </a:spcBef>
+              <a:spcAft>
+                <a:spcPts val="1200"/>
+              </a:spcAft>
+              <a:buNone/>
+            </a:pPr>
+            <a:r>
+              <a:rPr lang="en-US" sz="2800" dirty="0"/>
+              <a:t>More than just cloud storage</a:t>
             </a:r>
           </a:p>
         </p:txBody>
@@ -7764,7 +8245,7 @@
     </p:spTree>
     <p:extLst>
       <p:ext uri="{BB962C8B-B14F-4D97-AF65-F5344CB8AC3E}">
-        <p14:creationId xmlns:p14="http://schemas.microsoft.com/office/powerpoint/2010/main" val="303614434"/>
+        <p14:creationId xmlns:p14="http://schemas.microsoft.com/office/powerpoint/2010/main" val="967005845"/>
       </p:ext>
     </p:extLst>
   </p:cSld>
@@ -7793,7 +8274,13 @@
       </p:grpSpPr>
       <p:sp>
         <p:nvSpPr>
-          <p:cNvPr id="9218" name="Title 1"/>
+          <p:cNvPr id="8" name="Title 7">
+            <a:extLst>
+              <a:ext uri="{FF2B5EF4-FFF2-40B4-BE49-F238E27FC236}">
+                <a16:creationId xmlns:a16="http://schemas.microsoft.com/office/drawing/2014/main" id="{42A1B7B0-F717-9544-B94F-1E225C4E754A}"/>
+              </a:ext>
+            </a:extLst>
+          </p:cNvPr>
           <p:cNvSpPr>
             <a:spLocks noGrp="1"/>
           </p:cNvSpPr>
@@ -7803,19 +8290,12 @@
         </p:nvSpPr>
         <p:spPr/>
         <p:txBody>
-          <a:bodyPr anchor="b">
-            <a:noAutofit/>
-          </a:bodyPr>
+          <a:bodyPr/>
           <a:lstStyle/>
           <a:p>
             <a:r>
-              <a:rPr lang="en-US" sz="3200" b="1" dirty="0">
-                <a:solidFill>
-                  <a:schemeClr val="accent2"/>
-                </a:solidFill>
-                <a:latin typeface="+mn-lt"/>
-              </a:rPr>
-              <a:t>Title</a:t>
+              <a:rPr lang="en-US" dirty="0"/>
+              <a:t>GitHub</a:t>
             </a:r>
           </a:p>
         </p:txBody>
@@ -7851,12 +8331,100 @@
                 <a:spcPts val="0"/>
               </a:spcBef>
               <a:spcAft>
+                <a:spcPts val="1200"/>
+              </a:spcAft>
+              <a:buNone/>
+            </a:pPr>
+            <a:r>
+              <a:rPr lang="en-US" sz="2800" dirty="0"/>
+              <a:t>Launched 2007</a:t>
+            </a:r>
+          </a:p>
+          <a:p>
+            <a:pPr marL="0" indent="0">
+              <a:lnSpc>
+                <a:spcPct val="100000"/>
+              </a:lnSpc>
+              <a:spcBef>
                 <a:spcPts val="0"/>
+              </a:spcBef>
+              <a:spcAft>
+                <a:spcPts val="1200"/>
               </a:spcAft>
+              <a:buNone/>
             </a:pPr>
             <a:r>
               <a:rPr lang="en-US" sz="2800" dirty="0"/>
-              <a:t>Text </a:t>
+              <a:t>Used by &gt;50 million people, host &gt;100 million project repositories</a:t>
+            </a:r>
+          </a:p>
+          <a:p>
+            <a:pPr marL="0" indent="0">
+              <a:lnSpc>
+                <a:spcPct val="100000"/>
+              </a:lnSpc>
+              <a:spcBef>
+                <a:spcPts val="0"/>
+              </a:spcBef>
+              <a:spcAft>
+                <a:spcPts val="1200"/>
+              </a:spcAft>
+              <a:buNone/>
+            </a:pPr>
+            <a:r>
+              <a:rPr lang="en-US" sz="2800" dirty="0"/>
+              <a:t>Major companies: Airbnb, Facebook, Netflix, reddit, Lyft </a:t>
+            </a:r>
+          </a:p>
+          <a:p>
+            <a:pPr marL="0" indent="0">
+              <a:lnSpc>
+                <a:spcPct val="100000"/>
+              </a:lnSpc>
+              <a:spcBef>
+                <a:spcPts val="0"/>
+              </a:spcBef>
+              <a:spcAft>
+                <a:spcPts val="1200"/>
+              </a:spcAft>
+              <a:buNone/>
+            </a:pPr>
+            <a:r>
+              <a:rPr lang="en-US" sz="2800" dirty="0"/>
+              <a:t>Major projects: </a:t>
+            </a:r>
+          </a:p>
+          <a:p>
+            <a:pPr marL="460375" indent="-230188">
+              <a:lnSpc>
+                <a:spcPct val="100000"/>
+              </a:lnSpc>
+              <a:spcBef>
+                <a:spcPts val="0"/>
+              </a:spcBef>
+              <a:spcAft>
+                <a:spcPts val="1200"/>
+              </a:spcAft>
+              <a:buFont typeface="Arial" panose="020B0604020202020204" pitchFamily="34" charset="0"/>
+              <a:buChar char="•"/>
+            </a:pPr>
+            <a:r>
+              <a:rPr lang="en-US" sz="2400" dirty="0"/>
+              <a:t>Linux operating system, Facebook’s react JavaScript library, </a:t>
+            </a:r>
+            <a:br>
+              <a:rPr lang="en-US" sz="2400" dirty="0"/>
+            </a:br>
+            <a:r>
+              <a:rPr lang="en-US" sz="2400" dirty="0"/>
+              <a:t>TensorFlow machine learning framework, Microsoft’s Visual Studio, </a:t>
+            </a:r>
+            <a:br>
+              <a:rPr lang="en-US" sz="2400" dirty="0"/>
+            </a:br>
+            <a:r>
+              <a:rPr lang="en-US" sz="2400" dirty="0"/>
+              <a:t>Window’s Terminal, and more </a:t>
             </a:r>
           </a:p>
         </p:txBody>
@@ -7924,10 +8492,124 @@
           </a:prstGeom>
         </p:spPr>
       </p:pic>
+      <p:sp>
+        <p:nvSpPr>
+          <p:cNvPr id="3" name="Rectangle 2">
+            <a:extLst>
+              <a:ext uri="{FF2B5EF4-FFF2-40B4-BE49-F238E27FC236}">
+                <a16:creationId xmlns:a16="http://schemas.microsoft.com/office/drawing/2014/main" id="{3C7AF7B0-CEA1-7F47-9E1D-8CED401710F1}"/>
+              </a:ext>
+            </a:extLst>
+          </p:cNvPr>
+          <p:cNvSpPr/>
+          <p:nvPr/>
+        </p:nvSpPr>
+        <p:spPr>
+          <a:xfrm>
+            <a:off x="10575804" y="5545928"/>
+            <a:ext cx="1705185" cy="738664"/>
+          </a:xfrm>
+          <a:prstGeom prst="rect">
+            <a:avLst/>
+          </a:prstGeom>
+        </p:spPr>
+        <p:txBody>
+          <a:bodyPr wrap="square">
+            <a:spAutoFit/>
+          </a:bodyPr>
+          <a:lstStyle/>
+          <a:p>
+            <a:r>
+              <a:rPr lang="en-US" sz="1400" b="1" dirty="0">
+                <a:latin typeface="Times New Roman" panose="02020603050405020304" pitchFamily="18" charset="0"/>
+                <a:ea typeface="Times New Roman" panose="02020603050405020304" pitchFamily="18" charset="0"/>
+              </a:rPr>
+              <a:t>Sources:</a:t>
+            </a:r>
+          </a:p>
+          <a:p>
+            <a:r>
+              <a:rPr lang="en-US" sz="1400" dirty="0" err="1">
+                <a:latin typeface="Times New Roman" panose="02020603050405020304" pitchFamily="18" charset="0"/>
+                <a:ea typeface="Times New Roman" panose="02020603050405020304" pitchFamily="18" charset="0"/>
+              </a:rPr>
+              <a:t>github.com</a:t>
+            </a:r>
+            <a:r>
+              <a:rPr lang="en-US" sz="1400" dirty="0">
+                <a:latin typeface="Times New Roman" panose="02020603050405020304" pitchFamily="18" charset="0"/>
+                <a:ea typeface="Times New Roman" panose="02020603050405020304" pitchFamily="18" charset="0"/>
+              </a:rPr>
+              <a:t>/about</a:t>
+            </a:r>
+          </a:p>
+          <a:p>
+            <a:r>
+              <a:rPr lang="en-US" sz="1400" dirty="0" err="1"/>
+              <a:t>stackshare.io</a:t>
+            </a:r>
+            <a:r>
+              <a:rPr lang="en-US" sz="1400" dirty="0"/>
+              <a:t>/</a:t>
+            </a:r>
+            <a:r>
+              <a:rPr lang="en-US" sz="1400" dirty="0" err="1"/>
+              <a:t>github</a:t>
+            </a:r>
+            <a:r>
+              <a:rPr lang="en-US" sz="1400" dirty="0"/>
+              <a:t>  </a:t>
+            </a:r>
+          </a:p>
+        </p:txBody>
+      </p:sp>
+      <p:sp>
+        <p:nvSpPr>
+          <p:cNvPr id="5" name="Rectangle 4">
+            <a:extLst>
+              <a:ext uri="{FF2B5EF4-FFF2-40B4-BE49-F238E27FC236}">
+                <a16:creationId xmlns:a16="http://schemas.microsoft.com/office/drawing/2014/main" id="{A8518700-982E-D641-96FB-25D1743B7022}"/>
+              </a:ext>
+            </a:extLst>
+          </p:cNvPr>
+          <p:cNvSpPr/>
+          <p:nvPr/>
+        </p:nvSpPr>
+        <p:spPr>
+          <a:xfrm>
+            <a:off x="2675282" y="5486830"/>
+            <a:ext cx="6841436" cy="707886"/>
+          </a:xfrm>
+          <a:prstGeom prst="rect">
+            <a:avLst/>
+          </a:prstGeom>
+        </p:spPr>
+        <p:txBody>
+          <a:bodyPr wrap="square">
+            <a:spAutoFit/>
+          </a:bodyPr>
+          <a:lstStyle/>
+          <a:p>
+            <a:pPr algn="ctr"/>
+            <a:r>
+              <a:rPr lang="en-US" sz="2000" dirty="0">
+                <a:solidFill>
+                  <a:prstClr val="black">
+                    <a:lumMod val="75000"/>
+                    <a:lumOff val="25000"/>
+                  </a:prstClr>
+                </a:solidFill>
+              </a:rPr>
+              <a:t>Fun fact: Git was created by the founder of Linux, Linus Torvalds, in 2005 to help manage the development of the Linux kernel </a:t>
+            </a:r>
+            <a:endParaRPr lang="en-US" sz="2000" dirty="0"/>
+          </a:p>
+        </p:txBody>
+      </p:sp>
     </p:spTree>
     <p:extLst>
       <p:ext uri="{BB962C8B-B14F-4D97-AF65-F5344CB8AC3E}">
-        <p14:creationId xmlns:p14="http://schemas.microsoft.com/office/powerpoint/2010/main" val="2321183003"/>
+        <p14:creationId xmlns:p14="http://schemas.microsoft.com/office/powerpoint/2010/main" val="2417847987"/>
       </p:ext>
     </p:extLst>
   </p:cSld>
@@ -7956,39 +8638,10 @@
       </p:grpSpPr>
       <p:sp>
         <p:nvSpPr>
-          <p:cNvPr id="9218" name="Title 1"/>
-          <p:cNvSpPr>
-            <a:spLocks noGrp="1"/>
-          </p:cNvSpPr>
-          <p:nvPr>
-            <p:ph type="title"/>
-          </p:nvPr>
-        </p:nvSpPr>
-        <p:spPr/>
-        <p:txBody>
-          <a:bodyPr anchor="b">
-            <a:noAutofit/>
-          </a:bodyPr>
-          <a:lstStyle/>
-          <a:p>
-            <a:r>
-              <a:rPr lang="en-US" sz="3200" b="1" dirty="0">
-                <a:solidFill>
-                  <a:schemeClr val="accent2"/>
-                </a:solidFill>
-                <a:latin typeface="+mn-lt"/>
-              </a:rPr>
-              <a:t>Title</a:t>
-            </a:r>
-          </a:p>
-        </p:txBody>
-      </p:sp>
-      <p:sp>
-        <p:nvSpPr>
-          <p:cNvPr id="2" name="Content Placeholder 1">
+          <p:cNvPr id="8" name="Title 7">
             <a:extLst>
               <a:ext uri="{FF2B5EF4-FFF2-40B4-BE49-F238E27FC236}">
-                <a16:creationId xmlns:a16="http://schemas.microsoft.com/office/drawing/2014/main" id="{27D0C661-EDC7-964F-9BD3-F8C1B1CD48B7}"/>
+                <a16:creationId xmlns:a16="http://schemas.microsoft.com/office/drawing/2014/main" id="{5DB88110-807E-9840-9591-18B55CCF94C5}"/>
               </a:ext>
             </a:extLst>
           </p:cNvPr>
@@ -7996,31 +8649,43 @@
             <a:spLocks noGrp="1"/>
           </p:cNvSpPr>
           <p:nvPr>
+            <p:ph type="title"/>
+          </p:nvPr>
+        </p:nvSpPr>
+        <p:spPr/>
+        <p:txBody>
+          <a:bodyPr/>
+          <a:lstStyle/>
+          <a:p>
+            <a:r>
+              <a:rPr lang="en-US" dirty="0"/>
+              <a:t>GitHub: Major Features</a:t>
+            </a:r>
+          </a:p>
+        </p:txBody>
+      </p:sp>
+      <p:sp>
+        <p:nvSpPr>
+          <p:cNvPr id="10" name="Content Placeholder 9">
+            <a:extLst>
+              <a:ext uri="{FF2B5EF4-FFF2-40B4-BE49-F238E27FC236}">
+                <a16:creationId xmlns:a16="http://schemas.microsoft.com/office/drawing/2014/main" id="{4F94A4B5-0B02-FF48-B64D-3FA99E456F86}"/>
+              </a:ext>
+            </a:extLst>
+          </p:cNvPr>
+          <p:cNvSpPr>
+            <a:spLocks noGrp="1"/>
+          </p:cNvSpPr>
+          <p:nvPr>
             <p:ph idx="1"/>
           </p:nvPr>
         </p:nvSpPr>
         <p:spPr/>
         <p:txBody>
-          <a:bodyPr>
-            <a:normAutofit/>
-          </a:bodyPr>
+          <a:bodyPr/>
           <a:lstStyle/>
           <a:p>
-            <a:pPr marL="0" indent="0">
-              <a:lnSpc>
-                <a:spcPct val="100000"/>
-              </a:lnSpc>
-              <a:spcBef>
-                <a:spcPts val="0"/>
-              </a:spcBef>
-              <a:spcAft>
-                <a:spcPts val="0"/>
-              </a:spcAft>
-            </a:pPr>
-            <a:r>
-              <a:rPr lang="en-US" sz="2800" dirty="0"/>
-              <a:t>Text </a:t>
-            </a:r>
+            <a:endParaRPr lang="en-US"/>
           </a:p>
         </p:txBody>
       </p:sp>
@@ -8090,6 +8755,495 @@
     </p:spTree>
     <p:extLst>
       <p:ext uri="{BB962C8B-B14F-4D97-AF65-F5344CB8AC3E}">
+        <p14:creationId xmlns:p14="http://schemas.microsoft.com/office/powerpoint/2010/main" val="913352823"/>
+      </p:ext>
+    </p:extLst>
+  </p:cSld>
+  <p:clrMapOvr>
+    <a:masterClrMapping/>
+  </p:clrMapOvr>
+</p:sld>
+</file>
+
+<file path=ppt/slides/slide14.xml><?xml version="1.0" encoding="utf-8"?>
+<p:sld xmlns:a="http://schemas.openxmlformats.org/drawingml/2006/main" xmlns:r="http://schemas.openxmlformats.org/officeDocument/2006/relationships" xmlns:p="http://schemas.openxmlformats.org/presentationml/2006/main">
+  <p:cSld>
+    <p:spTree>
+      <p:nvGrpSpPr>
+        <p:cNvPr id="1" name=""/>
+        <p:cNvGrpSpPr/>
+        <p:nvPr/>
+      </p:nvGrpSpPr>
+      <p:grpSpPr>
+        <a:xfrm>
+          <a:off x="0" y="0"/>
+          <a:ext cx="0" cy="0"/>
+          <a:chOff x="0" y="0"/>
+          <a:chExt cx="0" cy="0"/>
+        </a:xfrm>
+      </p:grpSpPr>
+      <p:sp>
+        <p:nvSpPr>
+          <p:cNvPr id="9218" name="Title 1"/>
+          <p:cNvSpPr>
+            <a:spLocks noGrp="1"/>
+          </p:cNvSpPr>
+          <p:nvPr>
+            <p:ph type="title"/>
+          </p:nvPr>
+        </p:nvSpPr>
+        <p:spPr/>
+        <p:txBody>
+          <a:bodyPr anchor="b">
+            <a:noAutofit/>
+          </a:bodyPr>
+          <a:lstStyle/>
+          <a:p>
+            <a:r>
+              <a:rPr lang="en-US" sz="3200" b="1" dirty="0">
+                <a:solidFill>
+                  <a:schemeClr val="accent2"/>
+                </a:solidFill>
+                <a:latin typeface="+mn-lt"/>
+              </a:rPr>
+              <a:t>Title</a:t>
+            </a:r>
+          </a:p>
+        </p:txBody>
+      </p:sp>
+      <p:sp>
+        <p:nvSpPr>
+          <p:cNvPr id="2" name="Content Placeholder 1">
+            <a:extLst>
+              <a:ext uri="{FF2B5EF4-FFF2-40B4-BE49-F238E27FC236}">
+                <a16:creationId xmlns:a16="http://schemas.microsoft.com/office/drawing/2014/main" id="{27D0C661-EDC7-964F-9BD3-F8C1B1CD48B7}"/>
+              </a:ext>
+            </a:extLst>
+          </p:cNvPr>
+          <p:cNvSpPr>
+            <a:spLocks noGrp="1"/>
+          </p:cNvSpPr>
+          <p:nvPr>
+            <p:ph idx="1"/>
+          </p:nvPr>
+        </p:nvSpPr>
+        <p:spPr/>
+        <p:txBody>
+          <a:bodyPr>
+            <a:normAutofit/>
+          </a:bodyPr>
+          <a:lstStyle/>
+          <a:p>
+            <a:pPr marL="0" indent="0">
+              <a:lnSpc>
+                <a:spcPct val="100000"/>
+              </a:lnSpc>
+              <a:spcBef>
+                <a:spcPts val="0"/>
+              </a:spcBef>
+              <a:spcAft>
+                <a:spcPts val="0"/>
+              </a:spcAft>
+            </a:pPr>
+            <a:r>
+              <a:rPr lang="en-US" sz="2800" dirty="0"/>
+              <a:t>Text </a:t>
+            </a:r>
+          </a:p>
+        </p:txBody>
+      </p:sp>
+      <p:sp>
+        <p:nvSpPr>
+          <p:cNvPr id="9" name="TextBox 8"/>
+          <p:cNvSpPr txBox="1"/>
+          <p:nvPr/>
+        </p:nvSpPr>
+        <p:spPr>
+          <a:xfrm>
+            <a:off x="130629" y="6397228"/>
+            <a:ext cx="4911634" cy="338554"/>
+          </a:xfrm>
+          <a:prstGeom prst="rect">
+            <a:avLst/>
+          </a:prstGeom>
+          <a:noFill/>
+        </p:spPr>
+        <p:txBody>
+          <a:bodyPr wrap="square" rtlCol="0">
+            <a:spAutoFit/>
+          </a:bodyPr>
+          <a:lstStyle/>
+          <a:p>
+            <a:r>
+              <a:rPr lang="en-US" sz="1600" i="1" dirty="0">
+                <a:solidFill>
+                  <a:schemeClr val="bg1"/>
+                </a:solidFill>
+              </a:rPr>
+              <a:t>Office of Institutional Research</a:t>
+            </a:r>
+          </a:p>
+        </p:txBody>
+      </p:sp>
+      <p:pic>
+        <p:nvPicPr>
+          <p:cNvPr id="7" name="Picture 6"/>
+          <p:cNvPicPr>
+            <a:picLocks noChangeAspect="1"/>
+          </p:cNvPicPr>
+          <p:nvPr/>
+        </p:nvPicPr>
+        <p:blipFill>
+          <a:blip r:embed="rId3" cstate="screen">
+            <a:extLst>
+              <a:ext uri="{28A0092B-C50C-407E-A947-70E740481C1C}">
+                <a14:useLocalDpi xmlns:a14="http://schemas.microsoft.com/office/drawing/2010/main"/>
+              </a:ext>
+            </a:extLst>
+          </a:blip>
+          <a:stretch>
+            <a:fillRect/>
+          </a:stretch>
+        </p:blipFill>
+        <p:spPr>
+          <a:xfrm>
+            <a:off x="8582526" y="216624"/>
+            <a:ext cx="3352800" cy="452628"/>
+          </a:xfrm>
+          <a:prstGeom prst="rect">
+            <a:avLst/>
+          </a:prstGeom>
+        </p:spPr>
+      </p:pic>
+    </p:spTree>
+    <p:extLst>
+      <p:ext uri="{BB962C8B-B14F-4D97-AF65-F5344CB8AC3E}">
+        <p14:creationId xmlns:p14="http://schemas.microsoft.com/office/powerpoint/2010/main" val="303614434"/>
+      </p:ext>
+    </p:extLst>
+  </p:cSld>
+  <p:clrMapOvr>
+    <a:masterClrMapping/>
+  </p:clrMapOvr>
+</p:sld>
+</file>
+
+<file path=ppt/slides/slide15.xml><?xml version="1.0" encoding="utf-8"?>
+<p:sld xmlns:a="http://schemas.openxmlformats.org/drawingml/2006/main" xmlns:r="http://schemas.openxmlformats.org/officeDocument/2006/relationships" xmlns:p="http://schemas.openxmlformats.org/presentationml/2006/main">
+  <p:cSld>
+    <p:spTree>
+      <p:nvGrpSpPr>
+        <p:cNvPr id="1" name=""/>
+        <p:cNvGrpSpPr/>
+        <p:nvPr/>
+      </p:nvGrpSpPr>
+      <p:grpSpPr>
+        <a:xfrm>
+          <a:off x="0" y="0"/>
+          <a:ext cx="0" cy="0"/>
+          <a:chOff x="0" y="0"/>
+          <a:chExt cx="0" cy="0"/>
+        </a:xfrm>
+      </p:grpSpPr>
+      <p:sp>
+        <p:nvSpPr>
+          <p:cNvPr id="9218" name="Title 1"/>
+          <p:cNvSpPr>
+            <a:spLocks noGrp="1"/>
+          </p:cNvSpPr>
+          <p:nvPr>
+            <p:ph type="title"/>
+          </p:nvPr>
+        </p:nvSpPr>
+        <p:spPr/>
+        <p:txBody>
+          <a:bodyPr anchor="b">
+            <a:noAutofit/>
+          </a:bodyPr>
+          <a:lstStyle/>
+          <a:p>
+            <a:r>
+              <a:rPr lang="en-US" sz="3200" b="1" dirty="0">
+                <a:solidFill>
+                  <a:schemeClr val="accent2"/>
+                </a:solidFill>
+                <a:latin typeface="+mn-lt"/>
+              </a:rPr>
+              <a:t>Title</a:t>
+            </a:r>
+          </a:p>
+        </p:txBody>
+      </p:sp>
+      <p:sp>
+        <p:nvSpPr>
+          <p:cNvPr id="2" name="Content Placeholder 1">
+            <a:extLst>
+              <a:ext uri="{FF2B5EF4-FFF2-40B4-BE49-F238E27FC236}">
+                <a16:creationId xmlns:a16="http://schemas.microsoft.com/office/drawing/2014/main" id="{27D0C661-EDC7-964F-9BD3-F8C1B1CD48B7}"/>
+              </a:ext>
+            </a:extLst>
+          </p:cNvPr>
+          <p:cNvSpPr>
+            <a:spLocks noGrp="1"/>
+          </p:cNvSpPr>
+          <p:nvPr>
+            <p:ph idx="1"/>
+          </p:nvPr>
+        </p:nvSpPr>
+        <p:spPr/>
+        <p:txBody>
+          <a:bodyPr>
+            <a:normAutofit/>
+          </a:bodyPr>
+          <a:lstStyle/>
+          <a:p>
+            <a:pPr marL="0" indent="0">
+              <a:lnSpc>
+                <a:spcPct val="100000"/>
+              </a:lnSpc>
+              <a:spcBef>
+                <a:spcPts val="0"/>
+              </a:spcBef>
+              <a:spcAft>
+                <a:spcPts val="0"/>
+              </a:spcAft>
+            </a:pPr>
+            <a:r>
+              <a:rPr lang="en-US" sz="2800" dirty="0"/>
+              <a:t>Text </a:t>
+            </a:r>
+          </a:p>
+        </p:txBody>
+      </p:sp>
+      <p:sp>
+        <p:nvSpPr>
+          <p:cNvPr id="9" name="TextBox 8"/>
+          <p:cNvSpPr txBox="1"/>
+          <p:nvPr/>
+        </p:nvSpPr>
+        <p:spPr>
+          <a:xfrm>
+            <a:off x="130629" y="6397228"/>
+            <a:ext cx="4911634" cy="338554"/>
+          </a:xfrm>
+          <a:prstGeom prst="rect">
+            <a:avLst/>
+          </a:prstGeom>
+          <a:noFill/>
+        </p:spPr>
+        <p:txBody>
+          <a:bodyPr wrap="square" rtlCol="0">
+            <a:spAutoFit/>
+          </a:bodyPr>
+          <a:lstStyle/>
+          <a:p>
+            <a:r>
+              <a:rPr lang="en-US" sz="1600" i="1" dirty="0">
+                <a:solidFill>
+                  <a:schemeClr val="bg1"/>
+                </a:solidFill>
+              </a:rPr>
+              <a:t>Office of Institutional Research</a:t>
+            </a:r>
+          </a:p>
+        </p:txBody>
+      </p:sp>
+      <p:pic>
+        <p:nvPicPr>
+          <p:cNvPr id="7" name="Picture 6"/>
+          <p:cNvPicPr>
+            <a:picLocks noChangeAspect="1"/>
+          </p:cNvPicPr>
+          <p:nvPr/>
+        </p:nvPicPr>
+        <p:blipFill>
+          <a:blip r:embed="rId3" cstate="screen">
+            <a:extLst>
+              <a:ext uri="{28A0092B-C50C-407E-A947-70E740481C1C}">
+                <a14:useLocalDpi xmlns:a14="http://schemas.microsoft.com/office/drawing/2010/main"/>
+              </a:ext>
+            </a:extLst>
+          </a:blip>
+          <a:stretch>
+            <a:fillRect/>
+          </a:stretch>
+        </p:blipFill>
+        <p:spPr>
+          <a:xfrm>
+            <a:off x="8582526" y="216624"/>
+            <a:ext cx="3352800" cy="452628"/>
+          </a:xfrm>
+          <a:prstGeom prst="rect">
+            <a:avLst/>
+          </a:prstGeom>
+        </p:spPr>
+      </p:pic>
+    </p:spTree>
+    <p:extLst>
+      <p:ext uri="{BB962C8B-B14F-4D97-AF65-F5344CB8AC3E}">
+        <p14:creationId xmlns:p14="http://schemas.microsoft.com/office/powerpoint/2010/main" val="2321183003"/>
+      </p:ext>
+    </p:extLst>
+  </p:cSld>
+  <p:clrMapOvr>
+    <a:masterClrMapping/>
+  </p:clrMapOvr>
+</p:sld>
+</file>
+
+<file path=ppt/slides/slide16.xml><?xml version="1.0" encoding="utf-8"?>
+<p:sld xmlns:a="http://schemas.openxmlformats.org/drawingml/2006/main" xmlns:r="http://schemas.openxmlformats.org/officeDocument/2006/relationships" xmlns:p="http://schemas.openxmlformats.org/presentationml/2006/main">
+  <p:cSld>
+    <p:spTree>
+      <p:nvGrpSpPr>
+        <p:cNvPr id="1" name=""/>
+        <p:cNvGrpSpPr/>
+        <p:nvPr/>
+      </p:nvGrpSpPr>
+      <p:grpSpPr>
+        <a:xfrm>
+          <a:off x="0" y="0"/>
+          <a:ext cx="0" cy="0"/>
+          <a:chOff x="0" y="0"/>
+          <a:chExt cx="0" cy="0"/>
+        </a:xfrm>
+      </p:grpSpPr>
+      <p:sp>
+        <p:nvSpPr>
+          <p:cNvPr id="9218" name="Title 1"/>
+          <p:cNvSpPr>
+            <a:spLocks noGrp="1"/>
+          </p:cNvSpPr>
+          <p:nvPr>
+            <p:ph type="title"/>
+          </p:nvPr>
+        </p:nvSpPr>
+        <p:spPr/>
+        <p:txBody>
+          <a:bodyPr anchor="b">
+            <a:noAutofit/>
+          </a:bodyPr>
+          <a:lstStyle/>
+          <a:p>
+            <a:r>
+              <a:rPr lang="en-US" sz="3200" b="1" dirty="0">
+                <a:solidFill>
+                  <a:schemeClr val="accent2"/>
+                </a:solidFill>
+                <a:latin typeface="+mn-lt"/>
+              </a:rPr>
+              <a:t>Title</a:t>
+            </a:r>
+          </a:p>
+        </p:txBody>
+      </p:sp>
+      <p:sp>
+        <p:nvSpPr>
+          <p:cNvPr id="2" name="Content Placeholder 1">
+            <a:extLst>
+              <a:ext uri="{FF2B5EF4-FFF2-40B4-BE49-F238E27FC236}">
+                <a16:creationId xmlns:a16="http://schemas.microsoft.com/office/drawing/2014/main" id="{27D0C661-EDC7-964F-9BD3-F8C1B1CD48B7}"/>
+              </a:ext>
+            </a:extLst>
+          </p:cNvPr>
+          <p:cNvSpPr>
+            <a:spLocks noGrp="1"/>
+          </p:cNvSpPr>
+          <p:nvPr>
+            <p:ph idx="1"/>
+          </p:nvPr>
+        </p:nvSpPr>
+        <p:spPr/>
+        <p:txBody>
+          <a:bodyPr>
+            <a:normAutofit/>
+          </a:bodyPr>
+          <a:lstStyle/>
+          <a:p>
+            <a:pPr marL="0" indent="0">
+              <a:lnSpc>
+                <a:spcPct val="100000"/>
+              </a:lnSpc>
+              <a:spcBef>
+                <a:spcPts val="0"/>
+              </a:spcBef>
+              <a:spcAft>
+                <a:spcPts val="0"/>
+              </a:spcAft>
+            </a:pPr>
+            <a:r>
+              <a:rPr lang="en-US" sz="2800" dirty="0"/>
+              <a:t>Text </a:t>
+            </a:r>
+          </a:p>
+        </p:txBody>
+      </p:sp>
+      <p:sp>
+        <p:nvSpPr>
+          <p:cNvPr id="9" name="TextBox 8"/>
+          <p:cNvSpPr txBox="1"/>
+          <p:nvPr/>
+        </p:nvSpPr>
+        <p:spPr>
+          <a:xfrm>
+            <a:off x="130629" y="6397228"/>
+            <a:ext cx="4911634" cy="338554"/>
+          </a:xfrm>
+          <a:prstGeom prst="rect">
+            <a:avLst/>
+          </a:prstGeom>
+          <a:noFill/>
+        </p:spPr>
+        <p:txBody>
+          <a:bodyPr wrap="square" rtlCol="0">
+            <a:spAutoFit/>
+          </a:bodyPr>
+          <a:lstStyle/>
+          <a:p>
+            <a:r>
+              <a:rPr lang="en-US" sz="1600" i="1" dirty="0">
+                <a:solidFill>
+                  <a:schemeClr val="bg1"/>
+                </a:solidFill>
+              </a:rPr>
+              <a:t>Office of Institutional Research</a:t>
+            </a:r>
+          </a:p>
+        </p:txBody>
+      </p:sp>
+      <p:pic>
+        <p:nvPicPr>
+          <p:cNvPr id="7" name="Picture 6"/>
+          <p:cNvPicPr>
+            <a:picLocks noChangeAspect="1"/>
+          </p:cNvPicPr>
+          <p:nvPr/>
+        </p:nvPicPr>
+        <p:blipFill>
+          <a:blip r:embed="rId3" cstate="screen">
+            <a:extLst>
+              <a:ext uri="{28A0092B-C50C-407E-A947-70E740481C1C}">
+                <a14:useLocalDpi xmlns:a14="http://schemas.microsoft.com/office/drawing/2010/main"/>
+              </a:ext>
+            </a:extLst>
+          </a:blip>
+          <a:stretch>
+            <a:fillRect/>
+          </a:stretch>
+        </p:blipFill>
+        <p:spPr>
+          <a:xfrm>
+            <a:off x="8582526" y="216624"/>
+            <a:ext cx="3352800" cy="452628"/>
+          </a:xfrm>
+          <a:prstGeom prst="rect">
+            <a:avLst/>
+          </a:prstGeom>
+        </p:spPr>
+      </p:pic>
+    </p:spTree>
+    <p:extLst>
+      <p:ext uri="{BB962C8B-B14F-4D97-AF65-F5344CB8AC3E}">
         <p14:creationId xmlns:p14="http://schemas.microsoft.com/office/powerpoint/2010/main" val="682292960"/>
       </p:ext>
     </p:extLst>
@@ -8100,7 +9254,7 @@
 </p:sld>
 </file>
 
-<file path=ppt/slides/slide14.xml><?xml version="1.0" encoding="utf-8"?>
+<file path=ppt/slides/slide17.xml><?xml version="1.0" encoding="utf-8"?>
 <p:sld xmlns:a="http://schemas.openxmlformats.org/drawingml/2006/main" xmlns:r="http://schemas.openxmlformats.org/officeDocument/2006/relationships" xmlns:p="http://schemas.openxmlformats.org/presentationml/2006/main">
   <p:cSld>
     <p:spTree>
@@ -9743,7 +10897,7 @@
                 <a:spcPts val="0"/>
               </a:spcBef>
               <a:spcAft>
-                <a:spcPts val="0"/>
+                <a:spcPts val="1200"/>
               </a:spcAft>
               <a:buNone/>
             </a:pPr>
@@ -9761,7 +10915,7 @@
                 <a:spcPts val="0"/>
               </a:spcBef>
               <a:spcAft>
-                <a:spcPts val="0"/>
+                <a:spcPts val="1200"/>
               </a:spcAft>
               <a:buNone/>
             </a:pPr>
@@ -9779,7 +10933,7 @@
                 <a:spcPts val="0"/>
               </a:spcBef>
               <a:spcAft>
-                <a:spcPts val="0"/>
+                <a:spcPts val="1200"/>
               </a:spcAft>
               <a:buNone/>
             </a:pPr>
@@ -9797,7 +10951,7 @@
                 <a:spcPts val="0"/>
               </a:spcBef>
               <a:spcAft>
-                <a:spcPts val="0"/>
+                <a:spcPts val="1200"/>
               </a:spcAft>
               <a:buNone/>
             </a:pPr>
@@ -9815,7 +10969,7 @@
                 <a:spcPts val="0"/>
               </a:spcBef>
               <a:spcAft>
-                <a:spcPts val="0"/>
+                <a:spcPts val="1200"/>
               </a:spcAft>
               <a:buNone/>
             </a:pPr>
@@ -9833,7 +10987,7 @@
                 <a:spcPts val="0"/>
               </a:spcBef>
               <a:spcAft>
-                <a:spcPts val="0"/>
+                <a:spcPts val="1200"/>
               </a:spcAft>
               <a:buNone/>
             </a:pPr>
@@ -9851,7 +11005,7 @@
                 <a:spcPts val="0"/>
               </a:spcBef>
               <a:spcAft>
-                <a:spcPts val="0"/>
+                <a:spcPts val="1200"/>
               </a:spcAft>
               <a:buFont typeface="Arial" panose="020B0604020202020204" pitchFamily="34" charset="0"/>
               <a:buChar char="•"/>
@@ -9860,36 +11014,6 @@
               <a:rPr lang="en-US" sz="2800" dirty="0"/>
               <a:t>Easy integration with GitHub </a:t>
             </a:r>
-          </a:p>
-          <a:p>
-            <a:pPr marL="0" indent="0">
-              <a:lnSpc>
-                <a:spcPct val="100000"/>
-              </a:lnSpc>
-              <a:spcBef>
-                <a:spcPts val="0"/>
-              </a:spcBef>
-              <a:spcAft>
-                <a:spcPts val="0"/>
-              </a:spcAft>
-              <a:buNone/>
-            </a:pPr>
-            <a:endParaRPr lang="en-US" sz="2800" dirty="0"/>
-          </a:p>
-          <a:p>
-            <a:pPr marL="0" indent="0">
-              <a:lnSpc>
-                <a:spcPct val="100000"/>
-              </a:lnSpc>
-              <a:spcBef>
-                <a:spcPts val="0"/>
-              </a:spcBef>
-              <a:spcAft>
-                <a:spcPts val="0"/>
-              </a:spcAft>
-              <a:buNone/>
-            </a:pPr>
-            <a:endParaRPr lang="en-US" sz="2800" dirty="0"/>
           </a:p>
         </p:txBody>
       </p:sp>

</xml_diff>

<commit_message>
add section on major GH features
</commit_message>
<xml_diff>
--- a/Do You Git It Now.pptx
+++ b/Do You Git It Now.pptx
@@ -24,10 +24,10 @@
     <p:sldId id="619" r:id="rId12"/>
     <p:sldId id="629" r:id="rId13"/>
     <p:sldId id="630" r:id="rId14"/>
-    <p:sldId id="620" r:id="rId15"/>
-    <p:sldId id="621" r:id="rId16"/>
-    <p:sldId id="622" r:id="rId17"/>
-    <p:sldId id="623" r:id="rId18"/>
+    <p:sldId id="621" r:id="rId15"/>
+    <p:sldId id="632" r:id="rId16"/>
+    <p:sldId id="633" r:id="rId17"/>
+    <p:sldId id="634" r:id="rId18"/>
   </p:sldIdLst>
   <p:sldSz cx="12192000" cy="6858000"/>
   <p:notesSz cx="7023100" cy="9309100"/>
@@ -1225,7 +1225,7 @@
     </p:spTree>
     <p:extLst>
       <p:ext uri="{BB962C8B-B14F-4D97-AF65-F5344CB8AC3E}">
-        <p14:creationId xmlns:p14="http://schemas.microsoft.com/office/powerpoint/2010/main" val="498190681"/>
+        <p14:creationId xmlns:p14="http://schemas.microsoft.com/office/powerpoint/2010/main" val="2170127835"/>
       </p:ext>
     </p:extLst>
   </p:cSld>
@@ -1471,7 +1471,7 @@
     </p:spTree>
     <p:extLst>
       <p:ext uri="{BB962C8B-B14F-4D97-AF65-F5344CB8AC3E}">
-        <p14:creationId xmlns:p14="http://schemas.microsoft.com/office/powerpoint/2010/main" val="2170127835"/>
+        <p14:creationId xmlns:p14="http://schemas.microsoft.com/office/powerpoint/2010/main" val="2051063365"/>
       </p:ext>
     </p:extLst>
   </p:cSld>
@@ -1717,7 +1717,7 @@
     </p:spTree>
     <p:extLst>
       <p:ext uri="{BB962C8B-B14F-4D97-AF65-F5344CB8AC3E}">
-        <p14:creationId xmlns:p14="http://schemas.microsoft.com/office/powerpoint/2010/main" val="3832929062"/>
+        <p14:creationId xmlns:p14="http://schemas.microsoft.com/office/powerpoint/2010/main" val="2307251723"/>
       </p:ext>
     </p:extLst>
   </p:cSld>
@@ -1963,7 +1963,7 @@
     </p:spTree>
     <p:extLst>
       <p:ext uri="{BB962C8B-B14F-4D97-AF65-F5344CB8AC3E}">
-        <p14:creationId xmlns:p14="http://schemas.microsoft.com/office/powerpoint/2010/main" val="1980714616"/>
+        <p14:creationId xmlns:p14="http://schemas.microsoft.com/office/powerpoint/2010/main" val="1748964935"/>
       </p:ext>
     </p:extLst>
   </p:cSld>
@@ -7985,10 +7985,10 @@
             <p:nvPr/>
           </p:nvPicPr>
           <p:blipFill>
-            <a:blip r:embed="rId2">
+            <a:blip r:embed="rId2" cstate="screen">
               <a:extLst>
                 <a:ext uri="{28A0092B-C50C-407E-A947-70E740481C1C}">
-                  <a14:useLocalDpi xmlns:a14="http://schemas.microsoft.com/office/drawing/2010/main" val="0"/>
+                  <a14:useLocalDpi xmlns:a14="http://schemas.microsoft.com/office/drawing/2010/main"/>
                 </a:ext>
               </a:extLst>
             </a:blip>
@@ -8021,10 +8021,10 @@
             <p:nvPr/>
           </p:nvPicPr>
           <p:blipFill>
-            <a:blip r:embed="rId3">
+            <a:blip r:embed="rId3" cstate="screen">
               <a:extLst>
                 <a:ext uri="{28A0092B-C50C-407E-A947-70E740481C1C}">
-                  <a14:useLocalDpi xmlns:a14="http://schemas.microsoft.com/office/drawing/2010/main" val="0"/>
+                  <a14:useLocalDpi xmlns:a14="http://schemas.microsoft.com/office/drawing/2010/main"/>
                 </a:ext>
               </a:extLst>
             </a:blip>
@@ -8095,9 +8095,15 @@
           <a:lstStyle/>
           <a:p>
             <a:r>
-              <a:rPr lang="en-US" dirty="0"/>
+              <a:rPr lang="en-US" sz="3200" b="1" dirty="0">
+                <a:solidFill>
+                  <a:srgbClr val="004265"/>
+                </a:solidFill>
+                <a:latin typeface="Calibri"/>
+              </a:rPr>
               <a:t>GitHub</a:t>
             </a:r>
+            <a:endParaRPr lang="en-US" dirty="0"/>
           </a:p>
         </p:txBody>
       </p:sp>
@@ -8294,9 +8300,15 @@
           <a:lstStyle/>
           <a:p>
             <a:r>
-              <a:rPr lang="en-US" dirty="0"/>
+              <a:rPr lang="en-US" sz="3200" b="1" dirty="0">
+                <a:solidFill>
+                  <a:srgbClr val="004265"/>
+                </a:solidFill>
+                <a:latin typeface="Calibri"/>
+              </a:rPr>
               <a:t>GitHub</a:t>
             </a:r>
+            <a:endParaRPr lang="en-US" dirty="0"/>
           </a:p>
         </p:txBody>
       </p:sp>
@@ -8658,7 +8670,12 @@
           <a:lstStyle/>
           <a:p>
             <a:r>
-              <a:rPr lang="en-US" dirty="0"/>
+              <a:rPr lang="en-US" sz="3200" b="1" dirty="0">
+                <a:solidFill>
+                  <a:srgbClr val="004265"/>
+                </a:solidFill>
+                <a:latin typeface="Calibri"/>
+              </a:rPr>
               <a:t>GitHub: Major Features</a:t>
             </a:r>
           </a:p>
@@ -8682,10 +8699,142 @@
         </p:nvSpPr>
         <p:spPr/>
         <p:txBody>
-          <a:bodyPr/>
+          <a:bodyPr>
+            <a:normAutofit/>
+          </a:bodyPr>
           <a:lstStyle/>
           <a:p>
-            <a:endParaRPr lang="en-US"/>
+            <a:pPr marL="0" indent="0">
+              <a:lnSpc>
+                <a:spcPct val="100000"/>
+              </a:lnSpc>
+              <a:spcBef>
+                <a:spcPts val="0"/>
+              </a:spcBef>
+              <a:spcAft>
+                <a:spcPts val="1200"/>
+              </a:spcAft>
+              <a:buNone/>
+            </a:pPr>
+            <a:r>
+              <a:rPr lang="en-US" sz="2800" b="1" dirty="0"/>
+              <a:t>Pull requests</a:t>
+            </a:r>
+            <a:r>
+              <a:rPr lang="en-US" sz="2800" dirty="0"/>
+              <a:t>: allow you to collaborate with other projects/repos</a:t>
+            </a:r>
+          </a:p>
+          <a:p>
+            <a:pPr marL="0" indent="0">
+              <a:lnSpc>
+                <a:spcPct val="100000"/>
+              </a:lnSpc>
+              <a:spcBef>
+                <a:spcPts val="0"/>
+              </a:spcBef>
+              <a:spcAft>
+                <a:spcPts val="1200"/>
+              </a:spcAft>
+              <a:buNone/>
+            </a:pPr>
+            <a:r>
+              <a:rPr lang="en-US" sz="2800" b="1" dirty="0"/>
+              <a:t>Issue tracking:</a:t>
+            </a:r>
+          </a:p>
+          <a:p>
+            <a:pPr marL="457200" indent="-222250">
+              <a:lnSpc>
+                <a:spcPct val="100000"/>
+              </a:lnSpc>
+              <a:spcBef>
+                <a:spcPts val="0"/>
+              </a:spcBef>
+              <a:spcAft>
+                <a:spcPts val="1200"/>
+              </a:spcAft>
+              <a:buFont typeface="Arial" panose="020B0604020202020204" pitchFamily="34" charset="0"/>
+              <a:buChar char="•"/>
+            </a:pPr>
+            <a:r>
+              <a:rPr lang="en-US" sz="2800" dirty="0"/>
+              <a:t>Mostly for long-term projects</a:t>
+            </a:r>
+          </a:p>
+          <a:p>
+            <a:pPr marL="457200" indent="-222250">
+              <a:lnSpc>
+                <a:spcPct val="100000"/>
+              </a:lnSpc>
+              <a:spcBef>
+                <a:spcPts val="0"/>
+              </a:spcBef>
+              <a:spcAft>
+                <a:spcPts val="1200"/>
+              </a:spcAft>
+              <a:buFont typeface="Arial" panose="020B0604020202020204" pitchFamily="34" charset="0"/>
+              <a:buChar char="•"/>
+            </a:pPr>
+            <a:r>
+              <a:rPr lang="en-US" sz="2800" dirty="0"/>
+              <a:t>Users (or others) can submit problems, suggestions</a:t>
+            </a:r>
+          </a:p>
+          <a:p>
+            <a:pPr marL="457200" indent="-222250">
+              <a:lnSpc>
+                <a:spcPct val="100000"/>
+              </a:lnSpc>
+              <a:spcBef>
+                <a:spcPts val="0"/>
+              </a:spcBef>
+              <a:spcAft>
+                <a:spcPts val="1200"/>
+              </a:spcAft>
+              <a:buFont typeface="Arial" panose="020B0604020202020204" pitchFamily="34" charset="0"/>
+              <a:buChar char="•"/>
+            </a:pPr>
+            <a:r>
+              <a:rPr lang="en-US" sz="2800" dirty="0"/>
+              <a:t>Owners can organize, track issues </a:t>
+            </a:r>
+          </a:p>
+          <a:p>
+            <a:pPr marL="0" indent="0">
+              <a:lnSpc>
+                <a:spcPct val="100000"/>
+              </a:lnSpc>
+              <a:spcBef>
+                <a:spcPts val="0"/>
+              </a:spcBef>
+              <a:spcAft>
+                <a:spcPts val="1200"/>
+              </a:spcAft>
+              <a:buNone/>
+            </a:pPr>
+            <a:r>
+              <a:rPr lang="en-US" sz="2800" b="1" dirty="0"/>
+              <a:t>Wikis</a:t>
+            </a:r>
+            <a:r>
+              <a:rPr lang="en-US" sz="2800" dirty="0"/>
+              <a:t>: documentation, usage guides </a:t>
+            </a:r>
+          </a:p>
+          <a:p>
+            <a:pPr marL="0" indent="0">
+              <a:lnSpc>
+                <a:spcPct val="100000"/>
+              </a:lnSpc>
+              <a:spcBef>
+                <a:spcPts val="0"/>
+              </a:spcBef>
+              <a:spcAft>
+                <a:spcPts val="1200"/>
+              </a:spcAft>
+            </a:pPr>
+            <a:endParaRPr lang="en-US" sz="2800" dirty="0"/>
           </a:p>
         </p:txBody>
       </p:sp>
@@ -8782,6 +8931,1803 @@
           <a:chExt cx="0" cy="0"/>
         </a:xfrm>
       </p:grpSpPr>
+      <p:grpSp>
+        <p:nvGrpSpPr>
+          <p:cNvPr id="43" name="Group 42">
+            <a:extLst>
+              <a:ext uri="{FF2B5EF4-FFF2-40B4-BE49-F238E27FC236}">
+                <a16:creationId xmlns:a16="http://schemas.microsoft.com/office/drawing/2014/main" id="{74F703E0-4EC8-5941-BDF9-DF65B5613A44}"/>
+              </a:ext>
+            </a:extLst>
+          </p:cNvPr>
+          <p:cNvGrpSpPr/>
+          <p:nvPr/>
+        </p:nvGrpSpPr>
+        <p:grpSpPr>
+          <a:xfrm>
+            <a:off x="8470731" y="2628118"/>
+            <a:ext cx="1933068" cy="1127997"/>
+            <a:chOff x="1711832" y="2565400"/>
+            <a:chExt cx="1933068" cy="1127997"/>
+          </a:xfrm>
+        </p:grpSpPr>
+        <p:sp>
+          <p:nvSpPr>
+            <p:cNvPr id="44" name="Cloud 43">
+              <a:extLst>
+                <a:ext uri="{FF2B5EF4-FFF2-40B4-BE49-F238E27FC236}">
+                  <a16:creationId xmlns:a16="http://schemas.microsoft.com/office/drawing/2014/main" id="{E8581F10-64F1-744F-8B2A-A7675A55F822}"/>
+                </a:ext>
+              </a:extLst>
+            </p:cNvPr>
+            <p:cNvSpPr/>
+            <p:nvPr/>
+          </p:nvSpPr>
+          <p:spPr>
+            <a:xfrm>
+              <a:off x="1711832" y="2565400"/>
+              <a:ext cx="1933068" cy="1127997"/>
+            </a:xfrm>
+            <a:prstGeom prst="cloud">
+              <a:avLst/>
+            </a:prstGeom>
+            <a:solidFill>
+              <a:schemeClr val="accent2">
+                <a:lumMod val="50000"/>
+                <a:lumOff val="50000"/>
+              </a:schemeClr>
+            </a:solidFill>
+          </p:spPr>
+          <p:style>
+            <a:lnRef idx="2">
+              <a:schemeClr val="accent6"/>
+            </a:lnRef>
+            <a:fillRef idx="1">
+              <a:schemeClr val="lt1"/>
+            </a:fillRef>
+            <a:effectRef idx="0">
+              <a:schemeClr val="accent6"/>
+            </a:effectRef>
+            <a:fontRef idx="minor">
+              <a:schemeClr val="dk1"/>
+            </a:fontRef>
+          </p:style>
+          <p:txBody>
+            <a:bodyPr rtlCol="0" anchor="ctr"/>
+            <a:lstStyle/>
+            <a:p>
+              <a:pPr algn="ctr"/>
+              <a:endParaRPr lang="en-US"/>
+            </a:p>
+          </p:txBody>
+        </p:sp>
+        <p:pic>
+          <p:nvPicPr>
+            <p:cNvPr id="45" name="Picture 44">
+              <a:extLst>
+                <a:ext uri="{FF2B5EF4-FFF2-40B4-BE49-F238E27FC236}">
+                  <a16:creationId xmlns:a16="http://schemas.microsoft.com/office/drawing/2014/main" id="{0FDC12B4-DAE6-C042-AC66-759F9C3C6B13}"/>
+                </a:ext>
+              </a:extLst>
+            </p:cNvPr>
+            <p:cNvPicPr>
+              <a:picLocks noChangeAspect="1"/>
+            </p:cNvPicPr>
+            <p:nvPr/>
+          </p:nvPicPr>
+          <p:blipFill>
+            <a:blip r:embed="rId3" cstate="screen">
+              <a:extLst>
+                <a:ext uri="{28A0092B-C50C-407E-A947-70E740481C1C}">
+                  <a14:useLocalDpi xmlns:a14="http://schemas.microsoft.com/office/drawing/2010/main"/>
+                </a:ext>
+              </a:extLst>
+            </a:blip>
+            <a:stretch>
+              <a:fillRect/>
+            </a:stretch>
+          </p:blipFill>
+          <p:spPr>
+            <a:xfrm>
+              <a:off x="2802196" y="2729676"/>
+              <a:ext cx="514596" cy="474241"/>
+            </a:xfrm>
+            <a:prstGeom prst="rect">
+              <a:avLst/>
+            </a:prstGeom>
+            <a:ln w="28575">
+              <a:solidFill>
+                <a:schemeClr val="tx1"/>
+              </a:solidFill>
+            </a:ln>
+          </p:spPr>
+        </p:pic>
+        <p:pic>
+          <p:nvPicPr>
+            <p:cNvPr id="46" name="Picture 45">
+              <a:extLst>
+                <a:ext uri="{FF2B5EF4-FFF2-40B4-BE49-F238E27FC236}">
+                  <a16:creationId xmlns:a16="http://schemas.microsoft.com/office/drawing/2014/main" id="{BAECF9FA-EE12-C34F-A12F-F77D67FB5641}"/>
+                </a:ext>
+              </a:extLst>
+            </p:cNvPr>
+            <p:cNvPicPr>
+              <a:picLocks noChangeAspect="1"/>
+            </p:cNvPicPr>
+            <p:nvPr/>
+          </p:nvPicPr>
+          <p:blipFill>
+            <a:blip r:embed="rId3" cstate="screen">
+              <a:extLst>
+                <a:ext uri="{28A0092B-C50C-407E-A947-70E740481C1C}">
+                  <a14:useLocalDpi xmlns:a14="http://schemas.microsoft.com/office/drawing/2010/main"/>
+                </a:ext>
+              </a:extLst>
+            </a:blip>
+            <a:stretch>
+              <a:fillRect/>
+            </a:stretch>
+          </p:blipFill>
+          <p:spPr>
+            <a:xfrm>
+              <a:off x="2402346" y="2885743"/>
+              <a:ext cx="514596" cy="474241"/>
+            </a:xfrm>
+            <a:prstGeom prst="rect">
+              <a:avLst/>
+            </a:prstGeom>
+            <a:ln w="28575">
+              <a:solidFill>
+                <a:schemeClr val="tx1"/>
+              </a:solidFill>
+            </a:ln>
+          </p:spPr>
+        </p:pic>
+      </p:grpSp>
+      <p:sp>
+        <p:nvSpPr>
+          <p:cNvPr id="9218" name="Title 1"/>
+          <p:cNvSpPr>
+            <a:spLocks noGrp="1"/>
+          </p:cNvSpPr>
+          <p:nvPr>
+            <p:ph type="title"/>
+          </p:nvPr>
+        </p:nvSpPr>
+        <p:spPr/>
+        <p:txBody>
+          <a:bodyPr anchor="b">
+            <a:noAutofit/>
+          </a:bodyPr>
+          <a:lstStyle/>
+          <a:p>
+            <a:r>
+              <a:rPr lang="en-US" sz="3200" b="1" dirty="0">
+                <a:solidFill>
+                  <a:schemeClr val="accent2"/>
+                </a:solidFill>
+                <a:latin typeface="+mn-lt"/>
+              </a:rPr>
+              <a:t>GitHub: Pull requests </a:t>
+            </a:r>
+          </a:p>
+        </p:txBody>
+      </p:sp>
+      <p:sp>
+        <p:nvSpPr>
+          <p:cNvPr id="9" name="TextBox 8"/>
+          <p:cNvSpPr txBox="1"/>
+          <p:nvPr/>
+        </p:nvSpPr>
+        <p:spPr>
+          <a:xfrm>
+            <a:off x="130629" y="6397228"/>
+            <a:ext cx="4911634" cy="338554"/>
+          </a:xfrm>
+          <a:prstGeom prst="rect">
+            <a:avLst/>
+          </a:prstGeom>
+          <a:noFill/>
+        </p:spPr>
+        <p:txBody>
+          <a:bodyPr wrap="square" rtlCol="0">
+            <a:spAutoFit/>
+          </a:bodyPr>
+          <a:lstStyle/>
+          <a:p>
+            <a:r>
+              <a:rPr lang="en-US" sz="1600" i="1" dirty="0">
+                <a:solidFill>
+                  <a:schemeClr val="bg1"/>
+                </a:solidFill>
+              </a:rPr>
+              <a:t>Office of Institutional Research</a:t>
+            </a:r>
+          </a:p>
+        </p:txBody>
+      </p:sp>
+      <p:pic>
+        <p:nvPicPr>
+          <p:cNvPr id="7" name="Picture 6"/>
+          <p:cNvPicPr>
+            <a:picLocks noChangeAspect="1"/>
+          </p:cNvPicPr>
+          <p:nvPr/>
+        </p:nvPicPr>
+        <p:blipFill>
+          <a:blip r:embed="rId4" cstate="screen">
+            <a:extLst>
+              <a:ext uri="{28A0092B-C50C-407E-A947-70E740481C1C}">
+                <a14:useLocalDpi xmlns:a14="http://schemas.microsoft.com/office/drawing/2010/main"/>
+              </a:ext>
+            </a:extLst>
+          </a:blip>
+          <a:stretch>
+            <a:fillRect/>
+          </a:stretch>
+        </p:blipFill>
+        <p:spPr>
+          <a:xfrm>
+            <a:off x="8582526" y="216624"/>
+            <a:ext cx="3352800" cy="452628"/>
+          </a:xfrm>
+          <a:prstGeom prst="rect">
+            <a:avLst/>
+          </a:prstGeom>
+        </p:spPr>
+      </p:pic>
+      <p:pic>
+        <p:nvPicPr>
+          <p:cNvPr id="4" name="Picture 3">
+            <a:extLst>
+              <a:ext uri="{FF2B5EF4-FFF2-40B4-BE49-F238E27FC236}">
+                <a16:creationId xmlns:a16="http://schemas.microsoft.com/office/drawing/2014/main" id="{BFA1DAA3-92E8-3041-B556-3CFCAB599F01}"/>
+              </a:ext>
+            </a:extLst>
+          </p:cNvPr>
+          <p:cNvPicPr>
+            <a:picLocks noChangeAspect="1"/>
+          </p:cNvPicPr>
+          <p:nvPr/>
+        </p:nvPicPr>
+        <p:blipFill rotWithShape="1">
+          <a:blip r:embed="rId5" cstate="screen">
+            <a:extLst>
+              <a:ext uri="{BEBA8EAE-BF5A-486C-A8C5-ECC9F3942E4B}">
+                <a14:imgProps xmlns:a14="http://schemas.microsoft.com/office/drawing/2010/main">
+                  <a14:imgLayer r:embed="rId6">
+                    <a14:imgEffect>
+                      <a14:backgroundRemoval t="1255" b="100000" l="6809" r="100000">
+                        <a14:foregroundMark x1="6809" y1="21967" x2="16537" y2="52301"/>
+                        <a14:foregroundMark x1="16537" y1="52301" x2="16537" y2="55021"/>
+                        <a14:foregroundMark x1="38327" y1="8996" x2="37549" y2="16527"/>
+                        <a14:foregroundMark x1="23152" y1="12343" x2="26265" y2="6485"/>
+                      </a14:backgroundRemoval>
+                    </a14:imgEffect>
+                  </a14:imgLayer>
+                </a14:imgProps>
+              </a:ext>
+              <a:ext uri="{28A0092B-C50C-407E-A947-70E740481C1C}">
+                <a14:useLocalDpi xmlns:a14="http://schemas.microsoft.com/office/drawing/2010/main"/>
+              </a:ext>
+            </a:extLst>
+          </a:blip>
+          <a:srcRect/>
+          <a:stretch/>
+        </p:blipFill>
+        <p:spPr>
+          <a:xfrm>
+            <a:off x="410082" y="3220114"/>
+            <a:ext cx="2362200" cy="2200164"/>
+          </a:xfrm>
+          <a:prstGeom prst="rect">
+            <a:avLst/>
+          </a:prstGeom>
+        </p:spPr>
+      </p:pic>
+      <p:grpSp>
+        <p:nvGrpSpPr>
+          <p:cNvPr id="21" name="Group 20">
+            <a:extLst>
+              <a:ext uri="{FF2B5EF4-FFF2-40B4-BE49-F238E27FC236}">
+                <a16:creationId xmlns:a16="http://schemas.microsoft.com/office/drawing/2014/main" id="{1D515CC7-86CA-F24D-AA3D-D6405A8720F0}"/>
+              </a:ext>
+            </a:extLst>
+          </p:cNvPr>
+          <p:cNvGrpSpPr/>
+          <p:nvPr/>
+        </p:nvGrpSpPr>
+        <p:grpSpPr>
+          <a:xfrm>
+            <a:off x="1711832" y="2565400"/>
+            <a:ext cx="1933068" cy="1127997"/>
+            <a:chOff x="1711832" y="2565400"/>
+            <a:chExt cx="1933068" cy="1127997"/>
+          </a:xfrm>
+        </p:grpSpPr>
+        <p:sp>
+          <p:nvSpPr>
+            <p:cNvPr id="6" name="Cloud 5">
+              <a:extLst>
+                <a:ext uri="{FF2B5EF4-FFF2-40B4-BE49-F238E27FC236}">
+                  <a16:creationId xmlns:a16="http://schemas.microsoft.com/office/drawing/2014/main" id="{D6F89623-738C-6742-A0CC-CC3252251BE7}"/>
+                </a:ext>
+              </a:extLst>
+            </p:cNvPr>
+            <p:cNvSpPr/>
+            <p:nvPr/>
+          </p:nvSpPr>
+          <p:spPr>
+            <a:xfrm>
+              <a:off x="1711832" y="2565400"/>
+              <a:ext cx="1933068" cy="1127997"/>
+            </a:xfrm>
+            <a:prstGeom prst="cloud">
+              <a:avLst/>
+            </a:prstGeom>
+          </p:spPr>
+          <p:style>
+            <a:lnRef idx="2">
+              <a:schemeClr val="accent6"/>
+            </a:lnRef>
+            <a:fillRef idx="1">
+              <a:schemeClr val="lt1"/>
+            </a:fillRef>
+            <a:effectRef idx="0">
+              <a:schemeClr val="accent6"/>
+            </a:effectRef>
+            <a:fontRef idx="minor">
+              <a:schemeClr val="dk1"/>
+            </a:fontRef>
+          </p:style>
+          <p:txBody>
+            <a:bodyPr rtlCol="0" anchor="ctr"/>
+            <a:lstStyle/>
+            <a:p>
+              <a:pPr algn="ctr"/>
+              <a:endParaRPr lang="en-US"/>
+            </a:p>
+          </p:txBody>
+        </p:sp>
+        <p:pic>
+          <p:nvPicPr>
+            <p:cNvPr id="11" name="Picture 10">
+              <a:extLst>
+                <a:ext uri="{FF2B5EF4-FFF2-40B4-BE49-F238E27FC236}">
+                  <a16:creationId xmlns:a16="http://schemas.microsoft.com/office/drawing/2014/main" id="{33343B63-1592-5A44-BD12-90025FBF6E2F}"/>
+                </a:ext>
+              </a:extLst>
+            </p:cNvPr>
+            <p:cNvPicPr>
+              <a:picLocks noChangeAspect="1"/>
+            </p:cNvPicPr>
+            <p:nvPr/>
+          </p:nvPicPr>
+          <p:blipFill>
+            <a:blip r:embed="rId3" cstate="screen">
+              <a:extLst>
+                <a:ext uri="{28A0092B-C50C-407E-A947-70E740481C1C}">
+                  <a14:useLocalDpi xmlns:a14="http://schemas.microsoft.com/office/drawing/2010/main"/>
+                </a:ext>
+              </a:extLst>
+            </a:blip>
+            <a:stretch>
+              <a:fillRect/>
+            </a:stretch>
+          </p:blipFill>
+          <p:spPr>
+            <a:xfrm>
+              <a:off x="2802196" y="2729676"/>
+              <a:ext cx="514596" cy="474241"/>
+            </a:xfrm>
+            <a:prstGeom prst="rect">
+              <a:avLst/>
+            </a:prstGeom>
+            <a:ln w="28575">
+              <a:solidFill>
+                <a:schemeClr val="tx1"/>
+              </a:solidFill>
+            </a:ln>
+          </p:spPr>
+        </p:pic>
+        <p:pic>
+          <p:nvPicPr>
+            <p:cNvPr id="10" name="Picture 9">
+              <a:extLst>
+                <a:ext uri="{FF2B5EF4-FFF2-40B4-BE49-F238E27FC236}">
+                  <a16:creationId xmlns:a16="http://schemas.microsoft.com/office/drawing/2014/main" id="{3DD8BE19-7228-1546-BC00-FC04150BAA83}"/>
+                </a:ext>
+              </a:extLst>
+            </p:cNvPr>
+            <p:cNvPicPr>
+              <a:picLocks noChangeAspect="1"/>
+            </p:cNvPicPr>
+            <p:nvPr/>
+          </p:nvPicPr>
+          <p:blipFill>
+            <a:blip r:embed="rId3" cstate="screen">
+              <a:extLst>
+                <a:ext uri="{28A0092B-C50C-407E-A947-70E740481C1C}">
+                  <a14:useLocalDpi xmlns:a14="http://schemas.microsoft.com/office/drawing/2010/main"/>
+                </a:ext>
+              </a:extLst>
+            </a:blip>
+            <a:stretch>
+              <a:fillRect/>
+            </a:stretch>
+          </p:blipFill>
+          <p:spPr>
+            <a:xfrm>
+              <a:off x="2402346" y="2885743"/>
+              <a:ext cx="514596" cy="474241"/>
+            </a:xfrm>
+            <a:prstGeom prst="rect">
+              <a:avLst/>
+            </a:prstGeom>
+            <a:ln w="28575">
+              <a:solidFill>
+                <a:schemeClr val="tx1"/>
+              </a:solidFill>
+            </a:ln>
+          </p:spPr>
+        </p:pic>
+      </p:grpSp>
+      <p:pic>
+        <p:nvPicPr>
+          <p:cNvPr id="13" name="Picture 12">
+            <a:extLst>
+              <a:ext uri="{FF2B5EF4-FFF2-40B4-BE49-F238E27FC236}">
+                <a16:creationId xmlns:a16="http://schemas.microsoft.com/office/drawing/2014/main" id="{6F9F216A-35BE-5A4F-87D6-EAB6F8FFB046}"/>
+              </a:ext>
+            </a:extLst>
+          </p:cNvPr>
+          <p:cNvPicPr>
+            <a:picLocks noChangeAspect="1"/>
+          </p:cNvPicPr>
+          <p:nvPr/>
+        </p:nvPicPr>
+        <p:blipFill rotWithShape="1">
+          <a:blip r:embed="rId7" cstate="screen">
+            <a:extLst>
+              <a:ext uri="{BEBA8EAE-BF5A-486C-A8C5-ECC9F3942E4B}">
+                <a14:imgProps xmlns:a14="http://schemas.microsoft.com/office/drawing/2010/main">
+                  <a14:imgLayer r:embed="rId8">
+                    <a14:imgEffect>
+                      <a14:backgroundRemoval t="4734" b="97436" l="9778" r="91111">
+                        <a14:foregroundMark x1="47111" y1="9862" x2="55556" y2="22091"/>
+                        <a14:foregroundMark x1="12000" y1="6903" x2="16889" y2="22288"/>
+                        <a14:foregroundMark x1="52889" y1="55030" x2="48444" y2="39250"/>
+                        <a14:foregroundMark x1="51556" y1="12623" x2="48444" y2="18738"/>
+                        <a14:foregroundMark x1="39556" y1="17160" x2="63111" y2="17357"/>
+                        <a14:foregroundMark x1="15556" y1="4734" x2="16000" y2="5128"/>
+                        <a14:foregroundMark x1="16000" y1="23866" x2="32000" y2="26627"/>
+                        <a14:foregroundMark x1="50667" y1="28797" x2="44444" y2="28797"/>
+                        <a14:foregroundMark x1="32000" y1="27613" x2="60889" y2="29191"/>
+                        <a14:foregroundMark x1="43111" y1="33728" x2="32444" y2="53452"/>
+                        <a14:foregroundMark x1="57333" y1="30769" x2="56444" y2="43195"/>
+                        <a14:foregroundMark x1="71556" y1="30966" x2="80889" y2="34320"/>
+                        <a14:foregroundMark x1="87111" y1="39053" x2="87556" y2="44379"/>
+                        <a14:foregroundMark x1="79556" y1="46154" x2="62222" y2="49901"/>
+                        <a14:foregroundMark x1="34222" y1="79487" x2="33333" y2="72387"/>
+                        <a14:foregroundMark x1="32000" y1="55030" x2="31111" y2="63116"/>
+                        <a14:foregroundMark x1="52000" y1="55030" x2="55556" y2="65878"/>
+                        <a14:foregroundMark x1="54667" y1="63905" x2="60889" y2="82446"/>
+                        <a14:foregroundMark x1="60889" y1="82249" x2="60889" y2="82249"/>
+                        <a14:foregroundMark x1="60000" y1="79882" x2="68889" y2="95069"/>
+                        <a14:foregroundMark x1="37333" y1="97041" x2="36889" y2="94083"/>
+                        <a14:foregroundMark x1="67556" y1="95661" x2="68000" y2="97436"/>
+                        <a14:foregroundMark x1="91556" y1="39448" x2="88889" y2="39448"/>
+                      </a14:backgroundRemoval>
+                    </a14:imgEffect>
+                  </a14:imgLayer>
+                </a14:imgProps>
+              </a:ext>
+              <a:ext uri="{28A0092B-C50C-407E-A947-70E740481C1C}">
+                <a14:useLocalDpi xmlns:a14="http://schemas.microsoft.com/office/drawing/2010/main"/>
+              </a:ext>
+            </a:extLst>
+          </a:blip>
+          <a:srcRect/>
+          <a:stretch/>
+        </p:blipFill>
+        <p:spPr>
+          <a:xfrm>
+            <a:off x="6506475" y="1699345"/>
+            <a:ext cx="1145512" cy="2588040"/>
+          </a:xfrm>
+          <a:prstGeom prst="rect">
+            <a:avLst/>
+          </a:prstGeom>
+        </p:spPr>
+      </p:pic>
+      <p:sp>
+        <p:nvSpPr>
+          <p:cNvPr id="14" name="TextBox 13">
+            <a:extLst>
+              <a:ext uri="{FF2B5EF4-FFF2-40B4-BE49-F238E27FC236}">
+                <a16:creationId xmlns:a16="http://schemas.microsoft.com/office/drawing/2014/main" id="{199D5947-8EF8-F347-985A-E172AFFA6ADB}"/>
+              </a:ext>
+            </a:extLst>
+          </p:cNvPr>
+          <p:cNvSpPr txBox="1"/>
+          <p:nvPr/>
+        </p:nvSpPr>
+        <p:spPr>
+          <a:xfrm>
+            <a:off x="2041911" y="2134852"/>
+            <a:ext cx="1214787" cy="369332"/>
+          </a:xfrm>
+          <a:prstGeom prst="rect">
+            <a:avLst/>
+          </a:prstGeom>
+          <a:noFill/>
+        </p:spPr>
+        <p:txBody>
+          <a:bodyPr wrap="square" rtlCol="0">
+            <a:spAutoFit/>
+          </a:bodyPr>
+          <a:lstStyle/>
+          <a:p>
+            <a:r>
+              <a:rPr lang="en-US" dirty="0"/>
+              <a:t>GH repo</a:t>
+            </a:r>
+          </a:p>
+        </p:txBody>
+      </p:sp>
+      <p:pic>
+        <p:nvPicPr>
+          <p:cNvPr id="20" name="Picture 19">
+            <a:extLst>
+              <a:ext uri="{FF2B5EF4-FFF2-40B4-BE49-F238E27FC236}">
+                <a16:creationId xmlns:a16="http://schemas.microsoft.com/office/drawing/2014/main" id="{40628DFE-AA55-1348-BB87-42F0585DBC5D}"/>
+              </a:ext>
+            </a:extLst>
+          </p:cNvPr>
+          <p:cNvPicPr>
+            <a:picLocks noChangeAspect="1"/>
+          </p:cNvPicPr>
+          <p:nvPr/>
+        </p:nvPicPr>
+        <p:blipFill>
+          <a:blip r:embed="rId9" cstate="screen">
+            <a:extLst>
+              <a:ext uri="{BEBA8EAE-BF5A-486C-A8C5-ECC9F3942E4B}">
+                <a14:imgProps xmlns:a14="http://schemas.microsoft.com/office/drawing/2010/main">
+                  <a14:imgLayer r:embed="rId10">
+                    <a14:imgEffect>
+                      <a14:backgroundRemoval t="9541" b="95230" l="1780" r="94337">
+                        <a14:foregroundMark x1="61974" y1="9717" x2="73948" y2="33039"/>
+                        <a14:foregroundMark x1="73948" y1="33039" x2="73948" y2="34982"/>
+                        <a14:foregroundMark x1="94660" y1="30919" x2="88835" y2="56007"/>
+                        <a14:foregroundMark x1="94337" y1="49823" x2="94660" y2="55477"/>
+                        <a14:foregroundMark x1="74919" y1="83569" x2="76214" y2="70318"/>
+                        <a14:foregroundMark x1="76214" y1="70318" x2="76375" y2="69788"/>
+                        <a14:foregroundMark x1="35599" y1="63251" x2="36731" y2="84276"/>
+                        <a14:foregroundMark x1="10356" y1="92933" x2="25405" y2="69788"/>
+                        <a14:foregroundMark x1="1942" y1="52827" x2="1780" y2="73675"/>
+                        <a14:foregroundMark x1="51942" y1="95230" x2="48544" y2="90813"/>
+                      </a14:backgroundRemoval>
+                    </a14:imgEffect>
+                  </a14:imgLayer>
+                </a14:imgProps>
+              </a:ext>
+              <a:ext uri="{28A0092B-C50C-407E-A947-70E740481C1C}">
+                <a14:useLocalDpi xmlns:a14="http://schemas.microsoft.com/office/drawing/2010/main"/>
+              </a:ext>
+            </a:extLst>
+          </a:blip>
+          <a:stretch>
+            <a:fillRect/>
+          </a:stretch>
+        </p:blipFill>
+        <p:spPr>
+          <a:xfrm>
+            <a:off x="9140857" y="3372294"/>
+            <a:ext cx="2236138" cy="2047984"/>
+          </a:xfrm>
+          <a:prstGeom prst="rect">
+            <a:avLst/>
+          </a:prstGeom>
+        </p:spPr>
+      </p:pic>
+      <p:sp>
+        <p:nvSpPr>
+          <p:cNvPr id="35" name="TextBox 34">
+            <a:extLst>
+              <a:ext uri="{FF2B5EF4-FFF2-40B4-BE49-F238E27FC236}">
+                <a16:creationId xmlns:a16="http://schemas.microsoft.com/office/drawing/2014/main" id="{9244B6A8-C5F1-9243-B3E6-824DDBDA0DA3}"/>
+              </a:ext>
+            </a:extLst>
+          </p:cNvPr>
+          <p:cNvSpPr txBox="1"/>
+          <p:nvPr/>
+        </p:nvSpPr>
+        <p:spPr>
+          <a:xfrm>
+            <a:off x="4747195" y="3070488"/>
+            <a:ext cx="1679786" cy="369332"/>
+          </a:xfrm>
+          <a:prstGeom prst="rect">
+            <a:avLst/>
+          </a:prstGeom>
+          <a:noFill/>
+        </p:spPr>
+        <p:txBody>
+          <a:bodyPr wrap="square" rtlCol="0">
+            <a:spAutoFit/>
+          </a:bodyPr>
+          <a:lstStyle/>
+          <a:p>
+            <a:r>
+              <a:rPr lang="en-US" dirty="0"/>
+              <a:t>Fork the repo</a:t>
+            </a:r>
+          </a:p>
+        </p:txBody>
+      </p:sp>
+      <p:sp>
+        <p:nvSpPr>
+          <p:cNvPr id="36" name="TextBox 35">
+            <a:extLst>
+              <a:ext uri="{FF2B5EF4-FFF2-40B4-BE49-F238E27FC236}">
+                <a16:creationId xmlns:a16="http://schemas.microsoft.com/office/drawing/2014/main" id="{EED23B73-DE07-7249-A432-F6338C2F11C8}"/>
+              </a:ext>
+            </a:extLst>
+          </p:cNvPr>
+          <p:cNvSpPr txBox="1"/>
+          <p:nvPr/>
+        </p:nvSpPr>
+        <p:spPr>
+          <a:xfrm>
+            <a:off x="10512214" y="3011938"/>
+            <a:ext cx="1679786" cy="369332"/>
+          </a:xfrm>
+          <a:prstGeom prst="rect">
+            <a:avLst/>
+          </a:prstGeom>
+          <a:noFill/>
+        </p:spPr>
+        <p:txBody>
+          <a:bodyPr wrap="square" rtlCol="0">
+            <a:spAutoFit/>
+          </a:bodyPr>
+          <a:lstStyle/>
+          <a:p>
+            <a:r>
+              <a:rPr lang="en-US" dirty="0"/>
+              <a:t>Make edits</a:t>
+            </a:r>
+          </a:p>
+        </p:txBody>
+      </p:sp>
+      <p:pic>
+        <p:nvPicPr>
+          <p:cNvPr id="26" name="Picture 25">
+            <a:extLst>
+              <a:ext uri="{FF2B5EF4-FFF2-40B4-BE49-F238E27FC236}">
+                <a16:creationId xmlns:a16="http://schemas.microsoft.com/office/drawing/2014/main" id="{C530D126-978C-134A-A7A0-8E3122E24015}"/>
+              </a:ext>
+            </a:extLst>
+          </p:cNvPr>
+          <p:cNvPicPr>
+            <a:picLocks noChangeAspect="1"/>
+          </p:cNvPicPr>
+          <p:nvPr/>
+        </p:nvPicPr>
+        <p:blipFill>
+          <a:blip r:embed="rId3" cstate="screen">
+            <a:extLst>
+              <a:ext uri="{28A0092B-C50C-407E-A947-70E740481C1C}">
+                <a14:useLocalDpi xmlns:a14="http://schemas.microsoft.com/office/drawing/2010/main"/>
+              </a:ext>
+            </a:extLst>
+          </a:blip>
+          <a:stretch>
+            <a:fillRect/>
+          </a:stretch>
+        </p:blipFill>
+        <p:spPr>
+          <a:xfrm>
+            <a:off x="8833137" y="3144149"/>
+            <a:ext cx="514596" cy="474241"/>
+          </a:xfrm>
+          <a:prstGeom prst="rect">
+            <a:avLst/>
+          </a:prstGeom>
+          <a:ln w="28575">
+            <a:solidFill>
+              <a:srgbClr val="FF0000"/>
+            </a:solidFill>
+          </a:ln>
+        </p:spPr>
+      </p:pic>
+      <p:grpSp>
+        <p:nvGrpSpPr>
+          <p:cNvPr id="39" name="Group 38">
+            <a:extLst>
+              <a:ext uri="{FF2B5EF4-FFF2-40B4-BE49-F238E27FC236}">
+                <a16:creationId xmlns:a16="http://schemas.microsoft.com/office/drawing/2014/main" id="{11D2B0BB-5EE6-9F4E-B2E3-DB89EE81AE5E}"/>
+              </a:ext>
+            </a:extLst>
+          </p:cNvPr>
+          <p:cNvGrpSpPr/>
+          <p:nvPr/>
+        </p:nvGrpSpPr>
+        <p:grpSpPr>
+          <a:xfrm>
+            <a:off x="4430492" y="1893427"/>
+            <a:ext cx="1933068" cy="1127997"/>
+            <a:chOff x="1711832" y="2565400"/>
+            <a:chExt cx="1933068" cy="1127997"/>
+          </a:xfrm>
+        </p:grpSpPr>
+        <p:sp>
+          <p:nvSpPr>
+            <p:cNvPr id="40" name="Cloud 39">
+              <a:extLst>
+                <a:ext uri="{FF2B5EF4-FFF2-40B4-BE49-F238E27FC236}">
+                  <a16:creationId xmlns:a16="http://schemas.microsoft.com/office/drawing/2014/main" id="{C62A2882-9275-CE43-A845-1089885A9137}"/>
+                </a:ext>
+              </a:extLst>
+            </p:cNvPr>
+            <p:cNvSpPr/>
+            <p:nvPr/>
+          </p:nvSpPr>
+          <p:spPr>
+            <a:xfrm>
+              <a:off x="1711832" y="2565400"/>
+              <a:ext cx="1933068" cy="1127997"/>
+            </a:xfrm>
+            <a:prstGeom prst="cloud">
+              <a:avLst/>
+            </a:prstGeom>
+            <a:solidFill>
+              <a:schemeClr val="accent2">
+                <a:lumMod val="50000"/>
+                <a:lumOff val="50000"/>
+              </a:schemeClr>
+            </a:solidFill>
+          </p:spPr>
+          <p:style>
+            <a:lnRef idx="2">
+              <a:schemeClr val="accent6"/>
+            </a:lnRef>
+            <a:fillRef idx="1">
+              <a:schemeClr val="lt1"/>
+            </a:fillRef>
+            <a:effectRef idx="0">
+              <a:schemeClr val="accent6"/>
+            </a:effectRef>
+            <a:fontRef idx="minor">
+              <a:schemeClr val="dk1"/>
+            </a:fontRef>
+          </p:style>
+          <p:txBody>
+            <a:bodyPr rtlCol="0" anchor="ctr"/>
+            <a:lstStyle/>
+            <a:p>
+              <a:pPr algn="ctr"/>
+              <a:endParaRPr lang="en-US"/>
+            </a:p>
+          </p:txBody>
+        </p:sp>
+        <p:pic>
+          <p:nvPicPr>
+            <p:cNvPr id="41" name="Picture 40">
+              <a:extLst>
+                <a:ext uri="{FF2B5EF4-FFF2-40B4-BE49-F238E27FC236}">
+                  <a16:creationId xmlns:a16="http://schemas.microsoft.com/office/drawing/2014/main" id="{741A71A2-B56B-1C4A-ABCF-5509833D294E}"/>
+                </a:ext>
+              </a:extLst>
+            </p:cNvPr>
+            <p:cNvPicPr>
+              <a:picLocks noChangeAspect="1"/>
+            </p:cNvPicPr>
+            <p:nvPr/>
+          </p:nvPicPr>
+          <p:blipFill>
+            <a:blip r:embed="rId3" cstate="screen">
+              <a:extLst>
+                <a:ext uri="{28A0092B-C50C-407E-A947-70E740481C1C}">
+                  <a14:useLocalDpi xmlns:a14="http://schemas.microsoft.com/office/drawing/2010/main"/>
+                </a:ext>
+              </a:extLst>
+            </a:blip>
+            <a:stretch>
+              <a:fillRect/>
+            </a:stretch>
+          </p:blipFill>
+          <p:spPr>
+            <a:xfrm>
+              <a:off x="2802196" y="2729676"/>
+              <a:ext cx="514596" cy="474241"/>
+            </a:xfrm>
+            <a:prstGeom prst="rect">
+              <a:avLst/>
+            </a:prstGeom>
+            <a:ln w="28575">
+              <a:solidFill>
+                <a:schemeClr val="tx1"/>
+              </a:solidFill>
+            </a:ln>
+          </p:spPr>
+        </p:pic>
+        <p:pic>
+          <p:nvPicPr>
+            <p:cNvPr id="42" name="Picture 41">
+              <a:extLst>
+                <a:ext uri="{FF2B5EF4-FFF2-40B4-BE49-F238E27FC236}">
+                  <a16:creationId xmlns:a16="http://schemas.microsoft.com/office/drawing/2014/main" id="{4B2D9C8F-2160-8D40-8593-8D6C3497803E}"/>
+                </a:ext>
+              </a:extLst>
+            </p:cNvPr>
+            <p:cNvPicPr>
+              <a:picLocks noChangeAspect="1"/>
+            </p:cNvPicPr>
+            <p:nvPr/>
+          </p:nvPicPr>
+          <p:blipFill>
+            <a:blip r:embed="rId3" cstate="screen">
+              <a:extLst>
+                <a:ext uri="{28A0092B-C50C-407E-A947-70E740481C1C}">
+                  <a14:useLocalDpi xmlns:a14="http://schemas.microsoft.com/office/drawing/2010/main"/>
+                </a:ext>
+              </a:extLst>
+            </a:blip>
+            <a:stretch>
+              <a:fillRect/>
+            </a:stretch>
+          </p:blipFill>
+          <p:spPr>
+            <a:xfrm>
+              <a:off x="2402346" y="2885743"/>
+              <a:ext cx="514596" cy="474241"/>
+            </a:xfrm>
+            <a:prstGeom prst="rect">
+              <a:avLst/>
+            </a:prstGeom>
+            <a:ln w="28575">
+              <a:solidFill>
+                <a:schemeClr val="tx1"/>
+              </a:solidFill>
+            </a:ln>
+          </p:spPr>
+        </p:pic>
+      </p:grpSp>
+      <p:sp>
+        <p:nvSpPr>
+          <p:cNvPr id="52" name="Cloud 51">
+            <a:extLst>
+              <a:ext uri="{FF2B5EF4-FFF2-40B4-BE49-F238E27FC236}">
+                <a16:creationId xmlns:a16="http://schemas.microsoft.com/office/drawing/2014/main" id="{6B4CB34F-AB56-6A4F-B332-3C06C2491FB7}"/>
+              </a:ext>
+            </a:extLst>
+          </p:cNvPr>
+          <p:cNvSpPr/>
+          <p:nvPr/>
+        </p:nvSpPr>
+        <p:spPr>
+          <a:xfrm>
+            <a:off x="4430492" y="5106628"/>
+            <a:ext cx="1933068" cy="1127997"/>
+          </a:xfrm>
+          <a:prstGeom prst="cloud">
+            <a:avLst/>
+          </a:prstGeom>
+          <a:solidFill>
+            <a:schemeClr val="accent2">
+              <a:lumMod val="50000"/>
+              <a:lumOff val="50000"/>
+            </a:schemeClr>
+          </a:solidFill>
+        </p:spPr>
+        <p:style>
+          <a:lnRef idx="2">
+            <a:schemeClr val="accent6"/>
+          </a:lnRef>
+          <a:fillRef idx="1">
+            <a:schemeClr val="lt1"/>
+          </a:fillRef>
+          <a:effectRef idx="0">
+            <a:schemeClr val="accent6"/>
+          </a:effectRef>
+          <a:fontRef idx="minor">
+            <a:schemeClr val="dk1"/>
+          </a:fontRef>
+        </p:style>
+        <p:txBody>
+          <a:bodyPr rtlCol="0" anchor="ctr"/>
+          <a:lstStyle/>
+          <a:p>
+            <a:pPr algn="ctr"/>
+            <a:endParaRPr lang="en-US"/>
+          </a:p>
+        </p:txBody>
+      </p:sp>
+      <p:pic>
+        <p:nvPicPr>
+          <p:cNvPr id="55" name="Picture 54">
+            <a:extLst>
+              <a:ext uri="{FF2B5EF4-FFF2-40B4-BE49-F238E27FC236}">
+                <a16:creationId xmlns:a16="http://schemas.microsoft.com/office/drawing/2014/main" id="{A4523EBC-EBB7-9B43-BABA-4C7116D52A36}"/>
+              </a:ext>
+            </a:extLst>
+          </p:cNvPr>
+          <p:cNvPicPr>
+            <a:picLocks noChangeAspect="1"/>
+          </p:cNvPicPr>
+          <p:nvPr/>
+        </p:nvPicPr>
+        <p:blipFill>
+          <a:blip r:embed="rId3" cstate="screen">
+            <a:extLst>
+              <a:ext uri="{28A0092B-C50C-407E-A947-70E740481C1C}">
+                <a14:useLocalDpi xmlns:a14="http://schemas.microsoft.com/office/drawing/2010/main"/>
+              </a:ext>
+            </a:extLst>
+          </a:blip>
+          <a:stretch>
+            <a:fillRect/>
+          </a:stretch>
+        </p:blipFill>
+        <p:spPr>
+          <a:xfrm>
+            <a:off x="4792898" y="5622659"/>
+            <a:ext cx="514596" cy="474241"/>
+          </a:xfrm>
+          <a:prstGeom prst="rect">
+            <a:avLst/>
+          </a:prstGeom>
+          <a:ln w="28575">
+            <a:solidFill>
+              <a:srgbClr val="FF0000"/>
+            </a:solidFill>
+          </a:ln>
+        </p:spPr>
+      </p:pic>
+      <p:sp>
+        <p:nvSpPr>
+          <p:cNvPr id="57" name="TextBox 56">
+            <a:extLst>
+              <a:ext uri="{FF2B5EF4-FFF2-40B4-BE49-F238E27FC236}">
+                <a16:creationId xmlns:a16="http://schemas.microsoft.com/office/drawing/2014/main" id="{01411423-1F6A-ED4E-80B0-032A11127630}"/>
+              </a:ext>
+            </a:extLst>
+          </p:cNvPr>
+          <p:cNvSpPr txBox="1"/>
+          <p:nvPr/>
+        </p:nvSpPr>
+        <p:spPr>
+          <a:xfrm>
+            <a:off x="6812094" y="5301295"/>
+            <a:ext cx="1289490" cy="369332"/>
+          </a:xfrm>
+          <a:prstGeom prst="rect">
+            <a:avLst/>
+          </a:prstGeom>
+          <a:noFill/>
+        </p:spPr>
+        <p:txBody>
+          <a:bodyPr wrap="square" rtlCol="0">
+            <a:spAutoFit/>
+          </a:bodyPr>
+          <a:lstStyle/>
+          <a:p>
+            <a:r>
+              <a:rPr lang="en-US" dirty="0"/>
+              <a:t>Pull request</a:t>
+            </a:r>
+          </a:p>
+        </p:txBody>
+      </p:sp>
+      <p:pic>
+        <p:nvPicPr>
+          <p:cNvPr id="58" name="Picture 57">
+            <a:extLst>
+              <a:ext uri="{FF2B5EF4-FFF2-40B4-BE49-F238E27FC236}">
+                <a16:creationId xmlns:a16="http://schemas.microsoft.com/office/drawing/2014/main" id="{4652972E-93D9-E444-BD7B-35280E671734}"/>
+              </a:ext>
+            </a:extLst>
+          </p:cNvPr>
+          <p:cNvPicPr>
+            <a:picLocks noChangeAspect="1"/>
+          </p:cNvPicPr>
+          <p:nvPr/>
+        </p:nvPicPr>
+        <p:blipFill>
+          <a:blip r:embed="rId3" cstate="screen">
+            <a:extLst>
+              <a:ext uri="{28A0092B-C50C-407E-A947-70E740481C1C}">
+                <a14:useLocalDpi xmlns:a14="http://schemas.microsoft.com/office/drawing/2010/main"/>
+              </a:ext>
+            </a:extLst>
+          </a:blip>
+          <a:stretch>
+            <a:fillRect/>
+          </a:stretch>
+        </p:blipFill>
+        <p:spPr>
+          <a:xfrm>
+            <a:off x="4792898" y="5622659"/>
+            <a:ext cx="514596" cy="474241"/>
+          </a:xfrm>
+          <a:prstGeom prst="rect">
+            <a:avLst/>
+          </a:prstGeom>
+          <a:ln w="28575">
+            <a:solidFill>
+              <a:srgbClr val="FF0000"/>
+            </a:solidFill>
+          </a:ln>
+        </p:spPr>
+      </p:pic>
+    </p:spTree>
+    <p:extLst>
+      <p:ext uri="{BB962C8B-B14F-4D97-AF65-F5344CB8AC3E}">
+        <p14:creationId xmlns:p14="http://schemas.microsoft.com/office/powerpoint/2010/main" val="2321183003"/>
+      </p:ext>
+    </p:extLst>
+  </p:cSld>
+  <p:clrMapOvr>
+    <a:masterClrMapping/>
+  </p:clrMapOvr>
+  <p:timing>
+    <p:tnLst>
+      <p:par>
+        <p:cTn id="1" dur="indefinite" restart="never" nodeType="tmRoot">
+          <p:childTnLst>
+            <p:seq concurrent="1" nextAc="seek">
+              <p:cTn id="2" dur="indefinite" nodeType="mainSeq">
+                <p:childTnLst>
+                  <p:par>
+                    <p:cTn id="3" fill="hold">
+                      <p:stCondLst>
+                        <p:cond delay="indefinite"/>
+                      </p:stCondLst>
+                      <p:childTnLst>
+                        <p:par>
+                          <p:cTn id="4" fill="hold">
+                            <p:stCondLst>
+                              <p:cond delay="0"/>
+                            </p:stCondLst>
+                            <p:childTnLst>
+                              <p:par>
+                                <p:cTn id="5" presetID="10" presetClass="entr" presetSubtype="0" fill="hold" nodeType="clickEffect">
+                                  <p:stCondLst>
+                                    <p:cond delay="0"/>
+                                  </p:stCondLst>
+                                  <p:childTnLst>
+                                    <p:set>
+                                      <p:cBhvr>
+                                        <p:cTn id="6" dur="1" fill="hold">
+                                          <p:stCondLst>
+                                            <p:cond delay="0"/>
+                                          </p:stCondLst>
+                                        </p:cTn>
+                                        <p:tgtEl>
+                                          <p:spTgt spid="4"/>
+                                        </p:tgtEl>
+                                        <p:attrNameLst>
+                                          <p:attrName>style.visibility</p:attrName>
+                                        </p:attrNameLst>
+                                      </p:cBhvr>
+                                      <p:to>
+                                        <p:strVal val="visible"/>
+                                      </p:to>
+                                    </p:set>
+                                    <p:animEffect transition="in" filter="fade">
+                                      <p:cBhvr>
+                                        <p:cTn id="7" dur="500"/>
+                                        <p:tgtEl>
+                                          <p:spTgt spid="4"/>
+                                        </p:tgtEl>
+                                      </p:cBhvr>
+                                    </p:animEffect>
+                                  </p:childTnLst>
+                                </p:cTn>
+                              </p:par>
+                              <p:par>
+                                <p:cTn id="8" presetID="10" presetClass="entr" presetSubtype="0" fill="hold" nodeType="withEffect">
+                                  <p:stCondLst>
+                                    <p:cond delay="0"/>
+                                  </p:stCondLst>
+                                  <p:childTnLst>
+                                    <p:set>
+                                      <p:cBhvr>
+                                        <p:cTn id="9" dur="1" fill="hold">
+                                          <p:stCondLst>
+                                            <p:cond delay="0"/>
+                                          </p:stCondLst>
+                                        </p:cTn>
+                                        <p:tgtEl>
+                                          <p:spTgt spid="21"/>
+                                        </p:tgtEl>
+                                        <p:attrNameLst>
+                                          <p:attrName>style.visibility</p:attrName>
+                                        </p:attrNameLst>
+                                      </p:cBhvr>
+                                      <p:to>
+                                        <p:strVal val="visible"/>
+                                      </p:to>
+                                    </p:set>
+                                    <p:animEffect transition="in" filter="fade">
+                                      <p:cBhvr>
+                                        <p:cTn id="10" dur="500"/>
+                                        <p:tgtEl>
+                                          <p:spTgt spid="21"/>
+                                        </p:tgtEl>
+                                      </p:cBhvr>
+                                    </p:animEffect>
+                                  </p:childTnLst>
+                                </p:cTn>
+                              </p:par>
+                              <p:par>
+                                <p:cTn id="11" presetID="10" presetClass="entr" presetSubtype="0" fill="hold" grpId="0" nodeType="withEffect">
+                                  <p:stCondLst>
+                                    <p:cond delay="0"/>
+                                  </p:stCondLst>
+                                  <p:childTnLst>
+                                    <p:set>
+                                      <p:cBhvr>
+                                        <p:cTn id="12" dur="1" fill="hold">
+                                          <p:stCondLst>
+                                            <p:cond delay="0"/>
+                                          </p:stCondLst>
+                                        </p:cTn>
+                                        <p:tgtEl>
+                                          <p:spTgt spid="14"/>
+                                        </p:tgtEl>
+                                        <p:attrNameLst>
+                                          <p:attrName>style.visibility</p:attrName>
+                                        </p:attrNameLst>
+                                      </p:cBhvr>
+                                      <p:to>
+                                        <p:strVal val="visible"/>
+                                      </p:to>
+                                    </p:set>
+                                    <p:animEffect transition="in" filter="fade">
+                                      <p:cBhvr>
+                                        <p:cTn id="13" dur="500"/>
+                                        <p:tgtEl>
+                                          <p:spTgt spid="14"/>
+                                        </p:tgtEl>
+                                      </p:cBhvr>
+                                    </p:animEffect>
+                                  </p:childTnLst>
+                                </p:cTn>
+                              </p:par>
+                            </p:childTnLst>
+                          </p:cTn>
+                        </p:par>
+                      </p:childTnLst>
+                    </p:cTn>
+                  </p:par>
+                  <p:par>
+                    <p:cTn id="14" fill="hold">
+                      <p:stCondLst>
+                        <p:cond delay="indefinite"/>
+                      </p:stCondLst>
+                      <p:childTnLst>
+                        <p:par>
+                          <p:cTn id="15" fill="hold">
+                            <p:stCondLst>
+                              <p:cond delay="0"/>
+                            </p:stCondLst>
+                            <p:childTnLst>
+                              <p:par>
+                                <p:cTn id="16" presetID="10" presetClass="entr" presetSubtype="0" fill="hold" nodeType="clickEffect">
+                                  <p:stCondLst>
+                                    <p:cond delay="0"/>
+                                  </p:stCondLst>
+                                  <p:childTnLst>
+                                    <p:set>
+                                      <p:cBhvr>
+                                        <p:cTn id="17" dur="1" fill="hold">
+                                          <p:stCondLst>
+                                            <p:cond delay="0"/>
+                                          </p:stCondLst>
+                                        </p:cTn>
+                                        <p:tgtEl>
+                                          <p:spTgt spid="13"/>
+                                        </p:tgtEl>
+                                        <p:attrNameLst>
+                                          <p:attrName>style.visibility</p:attrName>
+                                        </p:attrNameLst>
+                                      </p:cBhvr>
+                                      <p:to>
+                                        <p:strVal val="visible"/>
+                                      </p:to>
+                                    </p:set>
+                                    <p:animEffect transition="in" filter="fade">
+                                      <p:cBhvr>
+                                        <p:cTn id="18" dur="500"/>
+                                        <p:tgtEl>
+                                          <p:spTgt spid="13"/>
+                                        </p:tgtEl>
+                                      </p:cBhvr>
+                                    </p:animEffect>
+                                  </p:childTnLst>
+                                </p:cTn>
+                              </p:par>
+                            </p:childTnLst>
+                          </p:cTn>
+                        </p:par>
+                      </p:childTnLst>
+                    </p:cTn>
+                  </p:par>
+                  <p:par>
+                    <p:cTn id="19" fill="hold">
+                      <p:stCondLst>
+                        <p:cond delay="indefinite"/>
+                      </p:stCondLst>
+                      <p:childTnLst>
+                        <p:par>
+                          <p:cTn id="20" fill="hold">
+                            <p:stCondLst>
+                              <p:cond delay="0"/>
+                            </p:stCondLst>
+                            <p:childTnLst>
+                              <p:par>
+                                <p:cTn id="21" presetID="10" presetClass="entr" presetSubtype="0" fill="hold" nodeType="clickEffect">
+                                  <p:stCondLst>
+                                    <p:cond delay="0"/>
+                                  </p:stCondLst>
+                                  <p:childTnLst>
+                                    <p:set>
+                                      <p:cBhvr>
+                                        <p:cTn id="22" dur="1" fill="hold">
+                                          <p:stCondLst>
+                                            <p:cond delay="0"/>
+                                          </p:stCondLst>
+                                        </p:cTn>
+                                        <p:tgtEl>
+                                          <p:spTgt spid="39"/>
+                                        </p:tgtEl>
+                                        <p:attrNameLst>
+                                          <p:attrName>style.visibility</p:attrName>
+                                        </p:attrNameLst>
+                                      </p:cBhvr>
+                                      <p:to>
+                                        <p:strVal val="visible"/>
+                                      </p:to>
+                                    </p:set>
+                                    <p:animEffect transition="in" filter="fade">
+                                      <p:cBhvr>
+                                        <p:cTn id="23" dur="500"/>
+                                        <p:tgtEl>
+                                          <p:spTgt spid="39"/>
+                                        </p:tgtEl>
+                                      </p:cBhvr>
+                                    </p:animEffect>
+                                  </p:childTnLst>
+                                </p:cTn>
+                              </p:par>
+                              <p:par>
+                                <p:cTn id="24" presetID="0" presetClass="path" presetSubtype="0" accel="50000" decel="50000" fill="hold" nodeType="withEffect">
+                                  <p:stCondLst>
+                                    <p:cond delay="0"/>
+                                  </p:stCondLst>
+                                  <p:childTnLst>
+                                    <p:animMotion origin="layout" path="M -0.22331 0.09838 L -0.00156 -0.00092 " pathEditMode="relative" rAng="0" ptsTypes="AA">
+                                      <p:cBhvr>
+                                        <p:cTn id="25" dur="2000" fill="hold"/>
+                                        <p:tgtEl>
+                                          <p:spTgt spid="39"/>
+                                        </p:tgtEl>
+                                        <p:attrNameLst>
+                                          <p:attrName>ppt_x</p:attrName>
+                                          <p:attrName>ppt_y</p:attrName>
+                                        </p:attrNameLst>
+                                      </p:cBhvr>
+                                      <p:rCtr x="11081" y="-4977"/>
+                                    </p:animMotion>
+                                  </p:childTnLst>
+                                </p:cTn>
+                              </p:par>
+                              <p:par>
+                                <p:cTn id="26" presetID="10" presetClass="entr" presetSubtype="0" fill="hold" grpId="0" nodeType="withEffect">
+                                  <p:stCondLst>
+                                    <p:cond delay="0"/>
+                                  </p:stCondLst>
+                                  <p:childTnLst>
+                                    <p:set>
+                                      <p:cBhvr>
+                                        <p:cTn id="27" dur="1" fill="hold">
+                                          <p:stCondLst>
+                                            <p:cond delay="0"/>
+                                          </p:stCondLst>
+                                        </p:cTn>
+                                        <p:tgtEl>
+                                          <p:spTgt spid="35"/>
+                                        </p:tgtEl>
+                                        <p:attrNameLst>
+                                          <p:attrName>style.visibility</p:attrName>
+                                        </p:attrNameLst>
+                                      </p:cBhvr>
+                                      <p:to>
+                                        <p:strVal val="visible"/>
+                                      </p:to>
+                                    </p:set>
+                                    <p:animEffect transition="in" filter="fade">
+                                      <p:cBhvr>
+                                        <p:cTn id="28" dur="500"/>
+                                        <p:tgtEl>
+                                          <p:spTgt spid="35"/>
+                                        </p:tgtEl>
+                                      </p:cBhvr>
+                                    </p:animEffect>
+                                  </p:childTnLst>
+                                </p:cTn>
+                              </p:par>
+                            </p:childTnLst>
+                          </p:cTn>
+                        </p:par>
+                      </p:childTnLst>
+                    </p:cTn>
+                  </p:par>
+                  <p:par>
+                    <p:cTn id="29" fill="hold">
+                      <p:stCondLst>
+                        <p:cond delay="indefinite"/>
+                      </p:stCondLst>
+                      <p:childTnLst>
+                        <p:par>
+                          <p:cTn id="30" fill="hold">
+                            <p:stCondLst>
+                              <p:cond delay="0"/>
+                            </p:stCondLst>
+                            <p:childTnLst>
+                              <p:par>
+                                <p:cTn id="31" presetID="10" presetClass="entr" presetSubtype="0" fill="hold" nodeType="clickEffect">
+                                  <p:stCondLst>
+                                    <p:cond delay="0"/>
+                                  </p:stCondLst>
+                                  <p:childTnLst>
+                                    <p:set>
+                                      <p:cBhvr>
+                                        <p:cTn id="32" dur="1" fill="hold">
+                                          <p:stCondLst>
+                                            <p:cond delay="0"/>
+                                          </p:stCondLst>
+                                        </p:cTn>
+                                        <p:tgtEl>
+                                          <p:spTgt spid="43"/>
+                                        </p:tgtEl>
+                                        <p:attrNameLst>
+                                          <p:attrName>style.visibility</p:attrName>
+                                        </p:attrNameLst>
+                                      </p:cBhvr>
+                                      <p:to>
+                                        <p:strVal val="visible"/>
+                                      </p:to>
+                                    </p:set>
+                                    <p:animEffect transition="in" filter="fade">
+                                      <p:cBhvr>
+                                        <p:cTn id="33" dur="500"/>
+                                        <p:tgtEl>
+                                          <p:spTgt spid="43"/>
+                                        </p:tgtEl>
+                                      </p:cBhvr>
+                                    </p:animEffect>
+                                  </p:childTnLst>
+                                </p:cTn>
+                              </p:par>
+                              <p:par>
+                                <p:cTn id="34" presetID="10" presetClass="entr" presetSubtype="0" fill="hold" grpId="0" nodeType="withEffect">
+                                  <p:stCondLst>
+                                    <p:cond delay="0"/>
+                                  </p:stCondLst>
+                                  <p:childTnLst>
+                                    <p:set>
+                                      <p:cBhvr>
+                                        <p:cTn id="35" dur="1" fill="hold">
+                                          <p:stCondLst>
+                                            <p:cond delay="0"/>
+                                          </p:stCondLst>
+                                        </p:cTn>
+                                        <p:tgtEl>
+                                          <p:spTgt spid="36"/>
+                                        </p:tgtEl>
+                                        <p:attrNameLst>
+                                          <p:attrName>style.visibility</p:attrName>
+                                        </p:attrNameLst>
+                                      </p:cBhvr>
+                                      <p:to>
+                                        <p:strVal val="visible"/>
+                                      </p:to>
+                                    </p:set>
+                                    <p:animEffect transition="in" filter="fade">
+                                      <p:cBhvr>
+                                        <p:cTn id="36" dur="500"/>
+                                        <p:tgtEl>
+                                          <p:spTgt spid="36"/>
+                                        </p:tgtEl>
+                                      </p:cBhvr>
+                                    </p:animEffect>
+                                  </p:childTnLst>
+                                </p:cTn>
+                              </p:par>
+                              <p:par>
+                                <p:cTn id="37" presetID="10" presetClass="entr" presetSubtype="0" fill="hold" nodeType="withEffect">
+                                  <p:stCondLst>
+                                    <p:cond delay="0"/>
+                                  </p:stCondLst>
+                                  <p:childTnLst>
+                                    <p:set>
+                                      <p:cBhvr>
+                                        <p:cTn id="38" dur="1" fill="hold">
+                                          <p:stCondLst>
+                                            <p:cond delay="0"/>
+                                          </p:stCondLst>
+                                        </p:cTn>
+                                        <p:tgtEl>
+                                          <p:spTgt spid="20"/>
+                                        </p:tgtEl>
+                                        <p:attrNameLst>
+                                          <p:attrName>style.visibility</p:attrName>
+                                        </p:attrNameLst>
+                                      </p:cBhvr>
+                                      <p:to>
+                                        <p:strVal val="visible"/>
+                                      </p:to>
+                                    </p:set>
+                                    <p:animEffect transition="in" filter="fade">
+                                      <p:cBhvr>
+                                        <p:cTn id="39" dur="500"/>
+                                        <p:tgtEl>
+                                          <p:spTgt spid="20"/>
+                                        </p:tgtEl>
+                                      </p:cBhvr>
+                                    </p:animEffect>
+                                  </p:childTnLst>
+                                </p:cTn>
+                              </p:par>
+                            </p:childTnLst>
+                          </p:cTn>
+                        </p:par>
+                      </p:childTnLst>
+                    </p:cTn>
+                  </p:par>
+                  <p:par>
+                    <p:cTn id="40" fill="hold">
+                      <p:stCondLst>
+                        <p:cond delay="indefinite"/>
+                      </p:stCondLst>
+                      <p:childTnLst>
+                        <p:par>
+                          <p:cTn id="41" fill="hold">
+                            <p:stCondLst>
+                              <p:cond delay="0"/>
+                            </p:stCondLst>
+                            <p:childTnLst>
+                              <p:par>
+                                <p:cTn id="42" presetID="10" presetClass="entr" presetSubtype="0" fill="hold" nodeType="clickEffect">
+                                  <p:stCondLst>
+                                    <p:cond delay="0"/>
+                                  </p:stCondLst>
+                                  <p:childTnLst>
+                                    <p:set>
+                                      <p:cBhvr>
+                                        <p:cTn id="43" dur="1" fill="hold">
+                                          <p:stCondLst>
+                                            <p:cond delay="0"/>
+                                          </p:stCondLst>
+                                        </p:cTn>
+                                        <p:tgtEl>
+                                          <p:spTgt spid="26"/>
+                                        </p:tgtEl>
+                                        <p:attrNameLst>
+                                          <p:attrName>style.visibility</p:attrName>
+                                        </p:attrNameLst>
+                                      </p:cBhvr>
+                                      <p:to>
+                                        <p:strVal val="visible"/>
+                                      </p:to>
+                                    </p:set>
+                                    <p:animEffect transition="in" filter="fade">
+                                      <p:cBhvr>
+                                        <p:cTn id="44" dur="500"/>
+                                        <p:tgtEl>
+                                          <p:spTgt spid="26"/>
+                                        </p:tgtEl>
+                                      </p:cBhvr>
+                                    </p:animEffect>
+                                  </p:childTnLst>
+                                </p:cTn>
+                              </p:par>
+                              <p:par>
+                                <p:cTn id="45" presetID="0" presetClass="path" presetSubtype="0" accel="50000" decel="50000" fill="hold" nodeType="withEffect">
+                                  <p:stCondLst>
+                                    <p:cond delay="0"/>
+                                  </p:stCondLst>
+                                  <p:childTnLst>
+                                    <p:animMotion origin="layout" path="M 0.0875 0.12638 L 0.00417 4.44444E-6 " pathEditMode="relative" ptsTypes="AA">
+                                      <p:cBhvr>
+                                        <p:cTn id="46" dur="2000" fill="hold"/>
+                                        <p:tgtEl>
+                                          <p:spTgt spid="26"/>
+                                        </p:tgtEl>
+                                        <p:attrNameLst>
+                                          <p:attrName>ppt_x</p:attrName>
+                                          <p:attrName>ppt_y</p:attrName>
+                                        </p:attrNameLst>
+                                      </p:cBhvr>
+                                    </p:animMotion>
+                                  </p:childTnLst>
+                                </p:cTn>
+                              </p:par>
+                            </p:childTnLst>
+                          </p:cTn>
+                        </p:par>
+                      </p:childTnLst>
+                    </p:cTn>
+                  </p:par>
+                  <p:par>
+                    <p:cTn id="47" fill="hold">
+                      <p:stCondLst>
+                        <p:cond delay="indefinite"/>
+                      </p:stCondLst>
+                      <p:childTnLst>
+                        <p:par>
+                          <p:cTn id="48" fill="hold">
+                            <p:stCondLst>
+                              <p:cond delay="0"/>
+                            </p:stCondLst>
+                            <p:childTnLst>
+                              <p:par>
+                                <p:cTn id="49" presetID="10" presetClass="entr" presetSubtype="0" fill="hold" grpId="0" nodeType="clickEffect">
+                                  <p:stCondLst>
+                                    <p:cond delay="0"/>
+                                  </p:stCondLst>
+                                  <p:childTnLst>
+                                    <p:set>
+                                      <p:cBhvr>
+                                        <p:cTn id="50" dur="1" fill="hold">
+                                          <p:stCondLst>
+                                            <p:cond delay="0"/>
+                                          </p:stCondLst>
+                                        </p:cTn>
+                                        <p:tgtEl>
+                                          <p:spTgt spid="57"/>
+                                        </p:tgtEl>
+                                        <p:attrNameLst>
+                                          <p:attrName>style.visibility</p:attrName>
+                                        </p:attrNameLst>
+                                      </p:cBhvr>
+                                      <p:to>
+                                        <p:strVal val="visible"/>
+                                      </p:to>
+                                    </p:set>
+                                    <p:animEffect transition="in" filter="fade">
+                                      <p:cBhvr>
+                                        <p:cTn id="51" dur="500"/>
+                                        <p:tgtEl>
+                                          <p:spTgt spid="57"/>
+                                        </p:tgtEl>
+                                      </p:cBhvr>
+                                    </p:animEffect>
+                                  </p:childTnLst>
+                                </p:cTn>
+                              </p:par>
+                            </p:childTnLst>
+                          </p:cTn>
+                        </p:par>
+                      </p:childTnLst>
+                    </p:cTn>
+                  </p:par>
+                  <p:par>
+                    <p:cTn id="52" fill="hold">
+                      <p:stCondLst>
+                        <p:cond delay="indefinite"/>
+                      </p:stCondLst>
+                      <p:childTnLst>
+                        <p:par>
+                          <p:cTn id="53" fill="hold">
+                            <p:stCondLst>
+                              <p:cond delay="0"/>
+                            </p:stCondLst>
+                            <p:childTnLst>
+                              <p:par>
+                                <p:cTn id="54" presetID="10" presetClass="entr" presetSubtype="0" fill="hold" nodeType="clickEffect">
+                                  <p:stCondLst>
+                                    <p:cond delay="0"/>
+                                  </p:stCondLst>
+                                  <p:childTnLst>
+                                    <p:set>
+                                      <p:cBhvr>
+                                        <p:cTn id="55" dur="1" fill="hold">
+                                          <p:stCondLst>
+                                            <p:cond delay="0"/>
+                                          </p:stCondLst>
+                                        </p:cTn>
+                                        <p:tgtEl>
+                                          <p:spTgt spid="55"/>
+                                        </p:tgtEl>
+                                        <p:attrNameLst>
+                                          <p:attrName>style.visibility</p:attrName>
+                                        </p:attrNameLst>
+                                      </p:cBhvr>
+                                      <p:to>
+                                        <p:strVal val="visible"/>
+                                      </p:to>
+                                    </p:set>
+                                    <p:animEffect transition="in" filter="fade">
+                                      <p:cBhvr>
+                                        <p:cTn id="56" dur="500"/>
+                                        <p:tgtEl>
+                                          <p:spTgt spid="55"/>
+                                        </p:tgtEl>
+                                      </p:cBhvr>
+                                    </p:animEffect>
+                                  </p:childTnLst>
+                                </p:cTn>
+                              </p:par>
+                              <p:par>
+                                <p:cTn id="57" presetID="10" presetClass="entr" presetSubtype="0" fill="hold" grpId="0" nodeType="withEffect">
+                                  <p:stCondLst>
+                                    <p:cond delay="0"/>
+                                  </p:stCondLst>
+                                  <p:childTnLst>
+                                    <p:set>
+                                      <p:cBhvr>
+                                        <p:cTn id="58" dur="1" fill="hold">
+                                          <p:stCondLst>
+                                            <p:cond delay="0"/>
+                                          </p:stCondLst>
+                                        </p:cTn>
+                                        <p:tgtEl>
+                                          <p:spTgt spid="52"/>
+                                        </p:tgtEl>
+                                        <p:attrNameLst>
+                                          <p:attrName>style.visibility</p:attrName>
+                                        </p:attrNameLst>
+                                      </p:cBhvr>
+                                      <p:to>
+                                        <p:strVal val="visible"/>
+                                      </p:to>
+                                    </p:set>
+                                    <p:animEffect transition="in" filter="fade">
+                                      <p:cBhvr>
+                                        <p:cTn id="59" dur="500"/>
+                                        <p:tgtEl>
+                                          <p:spTgt spid="52"/>
+                                        </p:tgtEl>
+                                      </p:cBhvr>
+                                    </p:animEffect>
+                                  </p:childTnLst>
+                                </p:cTn>
+                              </p:par>
+                              <p:par>
+                                <p:cTn id="60" presetID="10" presetClass="entr" presetSubtype="0" fill="hold" nodeType="withEffect">
+                                  <p:stCondLst>
+                                    <p:cond delay="0"/>
+                                  </p:stCondLst>
+                                  <p:childTnLst>
+                                    <p:set>
+                                      <p:cBhvr>
+                                        <p:cTn id="61" dur="1" fill="hold">
+                                          <p:stCondLst>
+                                            <p:cond delay="0"/>
+                                          </p:stCondLst>
+                                        </p:cTn>
+                                        <p:tgtEl>
+                                          <p:spTgt spid="58"/>
+                                        </p:tgtEl>
+                                        <p:attrNameLst>
+                                          <p:attrName>style.visibility</p:attrName>
+                                        </p:attrNameLst>
+                                      </p:cBhvr>
+                                      <p:to>
+                                        <p:strVal val="visible"/>
+                                      </p:to>
+                                    </p:set>
+                                    <p:animEffect transition="in" filter="fade">
+                                      <p:cBhvr>
+                                        <p:cTn id="62" dur="500"/>
+                                        <p:tgtEl>
+                                          <p:spTgt spid="58"/>
+                                        </p:tgtEl>
+                                      </p:cBhvr>
+                                    </p:animEffect>
+                                  </p:childTnLst>
+                                </p:cTn>
+                              </p:par>
+                            </p:childTnLst>
+                          </p:cTn>
+                        </p:par>
+                      </p:childTnLst>
+                    </p:cTn>
+                  </p:par>
+                  <p:par>
+                    <p:cTn id="63" fill="hold">
+                      <p:stCondLst>
+                        <p:cond delay="indefinite"/>
+                      </p:stCondLst>
+                      <p:childTnLst>
+                        <p:par>
+                          <p:cTn id="64" fill="hold">
+                            <p:stCondLst>
+                              <p:cond delay="0"/>
+                            </p:stCondLst>
+                            <p:childTnLst>
+                              <p:par>
+                                <p:cTn id="65" presetID="0" presetClass="path" presetSubtype="0" accel="50000" decel="50000" fill="hold" nodeType="clickEffect">
+                                  <p:stCondLst>
+                                    <p:cond delay="0"/>
+                                  </p:stCondLst>
+                                  <p:childTnLst>
+                                    <p:animMotion origin="layout" path="M -0.00065 1.85185E-6 L -0.22734 -0.36852 " pathEditMode="relative" rAng="0" ptsTypes="AA">
+                                      <p:cBhvr>
+                                        <p:cTn id="66" dur="2000" fill="hold"/>
+                                        <p:tgtEl>
+                                          <p:spTgt spid="58"/>
+                                        </p:tgtEl>
+                                        <p:attrNameLst>
+                                          <p:attrName>ppt_x</p:attrName>
+                                          <p:attrName>ppt_y</p:attrName>
+                                        </p:attrNameLst>
+                                      </p:cBhvr>
+                                      <p:rCtr x="-11341" y="-18426"/>
+                                    </p:animMotion>
+                                  </p:childTnLst>
+                                </p:cTn>
+                              </p:par>
+                            </p:childTnLst>
+                          </p:cTn>
+                        </p:par>
+                      </p:childTnLst>
+                    </p:cTn>
+                  </p:par>
+                </p:childTnLst>
+              </p:cTn>
+              <p:prevCondLst>
+                <p:cond evt="onPrev" delay="0">
+                  <p:tgtEl>
+                    <p:sldTgt/>
+                  </p:tgtEl>
+                </p:cond>
+              </p:prevCondLst>
+              <p:nextCondLst>
+                <p:cond evt="onNext" delay="0">
+                  <p:tgtEl>
+                    <p:sldTgt/>
+                  </p:tgtEl>
+                </p:cond>
+              </p:nextCondLst>
+            </p:seq>
+          </p:childTnLst>
+        </p:cTn>
+      </p:par>
+    </p:tnLst>
+    <p:bldLst>
+      <p:bldP spid="14" grpId="0"/>
+      <p:bldP spid="35" grpId="0"/>
+      <p:bldP spid="36" grpId="0"/>
+      <p:bldP spid="52" grpId="0" animBg="1"/>
+      <p:bldP spid="57" grpId="0"/>
+    </p:bldLst>
+  </p:timing>
+</p:sld>
+</file>
+
+<file path=ppt/slides/slide15.xml><?xml version="1.0" encoding="utf-8"?>
+<p:sld xmlns:a="http://schemas.openxmlformats.org/drawingml/2006/main" xmlns:r="http://schemas.openxmlformats.org/officeDocument/2006/relationships" xmlns:p="http://schemas.openxmlformats.org/presentationml/2006/main">
+  <p:cSld>
+    <p:spTree>
+      <p:nvGrpSpPr>
+        <p:cNvPr id="1" name=""/>
+        <p:cNvGrpSpPr/>
+        <p:nvPr/>
+      </p:nvGrpSpPr>
+      <p:grpSpPr>
+        <a:xfrm>
+          <a:off x="0" y="0"/>
+          <a:ext cx="0" cy="0"/>
+          <a:chOff x="0" y="0"/>
+          <a:chExt cx="0" cy="0"/>
+        </a:xfrm>
+      </p:grpSpPr>
       <p:sp>
         <p:nvSpPr>
           <p:cNvPr id="9218" name="Title 1"/>
@@ -8842,12 +10788,32 @@
                 <a:spcPts val="0"/>
               </a:spcBef>
               <a:spcAft>
+                <a:spcPts val="1200"/>
+              </a:spcAft>
+              <a:buNone/>
+            </a:pPr>
+            <a:r>
+              <a:rPr lang="en-US" sz="2800" dirty="0"/>
+              <a:t>Text</a:t>
+            </a:r>
+          </a:p>
+          <a:p>
+            <a:pPr marL="457200" indent="-222250">
+              <a:lnSpc>
+                <a:spcPct val="100000"/>
+              </a:lnSpc>
+              <a:spcBef>
                 <a:spcPts val="0"/>
+              </a:spcBef>
+              <a:spcAft>
+                <a:spcPts val="1200"/>
               </a:spcAft>
+              <a:buFont typeface="Arial" panose="020B0604020202020204" pitchFamily="34" charset="0"/>
+              <a:buChar char="•"/>
             </a:pPr>
             <a:r>
               <a:rPr lang="en-US" sz="2800" dirty="0"/>
-              <a:t>Text </a:t>
+              <a:t>Bullet list </a:t>
             </a:r>
           </a:p>
         </p:txBody>
@@ -8918,170 +10884,7 @@
     </p:spTree>
     <p:extLst>
       <p:ext uri="{BB962C8B-B14F-4D97-AF65-F5344CB8AC3E}">
-        <p14:creationId xmlns:p14="http://schemas.microsoft.com/office/powerpoint/2010/main" val="303614434"/>
-      </p:ext>
-    </p:extLst>
-  </p:cSld>
-  <p:clrMapOvr>
-    <a:masterClrMapping/>
-  </p:clrMapOvr>
-</p:sld>
-</file>
-
-<file path=ppt/slides/slide15.xml><?xml version="1.0" encoding="utf-8"?>
-<p:sld xmlns:a="http://schemas.openxmlformats.org/drawingml/2006/main" xmlns:r="http://schemas.openxmlformats.org/officeDocument/2006/relationships" xmlns:p="http://schemas.openxmlformats.org/presentationml/2006/main">
-  <p:cSld>
-    <p:spTree>
-      <p:nvGrpSpPr>
-        <p:cNvPr id="1" name=""/>
-        <p:cNvGrpSpPr/>
-        <p:nvPr/>
-      </p:nvGrpSpPr>
-      <p:grpSpPr>
-        <a:xfrm>
-          <a:off x="0" y="0"/>
-          <a:ext cx="0" cy="0"/>
-          <a:chOff x="0" y="0"/>
-          <a:chExt cx="0" cy="0"/>
-        </a:xfrm>
-      </p:grpSpPr>
-      <p:sp>
-        <p:nvSpPr>
-          <p:cNvPr id="9218" name="Title 1"/>
-          <p:cNvSpPr>
-            <a:spLocks noGrp="1"/>
-          </p:cNvSpPr>
-          <p:nvPr>
-            <p:ph type="title"/>
-          </p:nvPr>
-        </p:nvSpPr>
-        <p:spPr/>
-        <p:txBody>
-          <a:bodyPr anchor="b">
-            <a:noAutofit/>
-          </a:bodyPr>
-          <a:lstStyle/>
-          <a:p>
-            <a:r>
-              <a:rPr lang="en-US" sz="3200" b="1" dirty="0">
-                <a:solidFill>
-                  <a:schemeClr val="accent2"/>
-                </a:solidFill>
-                <a:latin typeface="+mn-lt"/>
-              </a:rPr>
-              <a:t>Title</a:t>
-            </a:r>
-          </a:p>
-        </p:txBody>
-      </p:sp>
-      <p:sp>
-        <p:nvSpPr>
-          <p:cNvPr id="2" name="Content Placeholder 1">
-            <a:extLst>
-              <a:ext uri="{FF2B5EF4-FFF2-40B4-BE49-F238E27FC236}">
-                <a16:creationId xmlns:a16="http://schemas.microsoft.com/office/drawing/2014/main" id="{27D0C661-EDC7-964F-9BD3-F8C1B1CD48B7}"/>
-              </a:ext>
-            </a:extLst>
-          </p:cNvPr>
-          <p:cNvSpPr>
-            <a:spLocks noGrp="1"/>
-          </p:cNvSpPr>
-          <p:nvPr>
-            <p:ph idx="1"/>
-          </p:nvPr>
-        </p:nvSpPr>
-        <p:spPr/>
-        <p:txBody>
-          <a:bodyPr>
-            <a:normAutofit/>
-          </a:bodyPr>
-          <a:lstStyle/>
-          <a:p>
-            <a:pPr marL="0" indent="0">
-              <a:lnSpc>
-                <a:spcPct val="100000"/>
-              </a:lnSpc>
-              <a:spcBef>
-                <a:spcPts val="0"/>
-              </a:spcBef>
-              <a:spcAft>
-                <a:spcPts val="0"/>
-              </a:spcAft>
-            </a:pPr>
-            <a:r>
-              <a:rPr lang="en-US" sz="2800" dirty="0"/>
-              <a:t>Text </a:t>
-            </a:r>
-          </a:p>
-        </p:txBody>
-      </p:sp>
-      <p:sp>
-        <p:nvSpPr>
-          <p:cNvPr id="9" name="TextBox 8"/>
-          <p:cNvSpPr txBox="1"/>
-          <p:nvPr/>
-        </p:nvSpPr>
-        <p:spPr>
-          <a:xfrm>
-            <a:off x="130629" y="6397228"/>
-            <a:ext cx="4911634" cy="338554"/>
-          </a:xfrm>
-          <a:prstGeom prst="rect">
-            <a:avLst/>
-          </a:prstGeom>
-          <a:noFill/>
-        </p:spPr>
-        <p:txBody>
-          <a:bodyPr wrap="square" rtlCol="0">
-            <a:spAutoFit/>
-          </a:bodyPr>
-          <a:lstStyle/>
-          <a:p>
-            <a:r>
-              <a:rPr lang="en-US" sz="1600" i="1" dirty="0">
-                <a:solidFill>
-                  <a:schemeClr val="bg1"/>
-                </a:solidFill>
-              </a:rPr>
-              <a:t>Office of Institutional Research</a:t>
-            </a:r>
-          </a:p>
-        </p:txBody>
-      </p:sp>
-      <p:pic>
-        <p:nvPicPr>
-          <p:cNvPr id="7" name="Picture 6"/>
-          <p:cNvPicPr>
-            <a:picLocks noChangeAspect="1"/>
-          </p:cNvPicPr>
-          <p:nvPr/>
-        </p:nvPicPr>
-        <p:blipFill>
-          <a:blip r:embed="rId3" cstate="screen">
-            <a:extLst>
-              <a:ext uri="{28A0092B-C50C-407E-A947-70E740481C1C}">
-                <a14:useLocalDpi xmlns:a14="http://schemas.microsoft.com/office/drawing/2010/main"/>
-              </a:ext>
-            </a:extLst>
-          </a:blip>
-          <a:stretch>
-            <a:fillRect/>
-          </a:stretch>
-        </p:blipFill>
-        <p:spPr>
-          <a:xfrm>
-            <a:off x="8582526" y="216624"/>
-            <a:ext cx="3352800" cy="452628"/>
-          </a:xfrm>
-          <a:prstGeom prst="rect">
-            <a:avLst/>
-          </a:prstGeom>
-        </p:spPr>
-      </p:pic>
-    </p:spTree>
-    <p:extLst>
-      <p:ext uri="{BB962C8B-B14F-4D97-AF65-F5344CB8AC3E}">
-        <p14:creationId xmlns:p14="http://schemas.microsoft.com/office/powerpoint/2010/main" val="2321183003"/>
+        <p14:creationId xmlns:p14="http://schemas.microsoft.com/office/powerpoint/2010/main" val="791000851"/>
       </p:ext>
     </p:extLst>
   </p:cSld>
@@ -9168,12 +10971,32 @@
                 <a:spcPts val="0"/>
               </a:spcBef>
               <a:spcAft>
+                <a:spcPts val="1200"/>
+              </a:spcAft>
+              <a:buNone/>
+            </a:pPr>
+            <a:r>
+              <a:rPr lang="en-US" sz="2800" dirty="0"/>
+              <a:t>Text</a:t>
+            </a:r>
+          </a:p>
+          <a:p>
+            <a:pPr marL="457200" indent="-222250">
+              <a:lnSpc>
+                <a:spcPct val="100000"/>
+              </a:lnSpc>
+              <a:spcBef>
                 <a:spcPts val="0"/>
+              </a:spcBef>
+              <a:spcAft>
+                <a:spcPts val="1200"/>
               </a:spcAft>
+              <a:buFont typeface="Arial" panose="020B0604020202020204" pitchFamily="34" charset="0"/>
+              <a:buChar char="•"/>
             </a:pPr>
             <a:r>
               <a:rPr lang="en-US" sz="2800" dirty="0"/>
-              <a:t>Text </a:t>
+              <a:t>Bullet list </a:t>
             </a:r>
           </a:p>
         </p:txBody>
@@ -9244,7 +11067,7 @@
     </p:spTree>
     <p:extLst>
       <p:ext uri="{BB962C8B-B14F-4D97-AF65-F5344CB8AC3E}">
-        <p14:creationId xmlns:p14="http://schemas.microsoft.com/office/powerpoint/2010/main" val="682292960"/>
+        <p14:creationId xmlns:p14="http://schemas.microsoft.com/office/powerpoint/2010/main" val="785060902"/>
       </p:ext>
     </p:extLst>
   </p:cSld>
@@ -9331,12 +11154,32 @@
                 <a:spcPts val="0"/>
               </a:spcBef>
               <a:spcAft>
+                <a:spcPts val="1200"/>
+              </a:spcAft>
+              <a:buNone/>
+            </a:pPr>
+            <a:r>
+              <a:rPr lang="en-US" sz="2800" dirty="0"/>
+              <a:t>Text</a:t>
+            </a:r>
+          </a:p>
+          <a:p>
+            <a:pPr marL="457200" indent="-222250">
+              <a:lnSpc>
+                <a:spcPct val="100000"/>
+              </a:lnSpc>
+              <a:spcBef>
                 <a:spcPts val="0"/>
+              </a:spcBef>
+              <a:spcAft>
+                <a:spcPts val="1200"/>
               </a:spcAft>
+              <a:buFont typeface="Arial" panose="020B0604020202020204" pitchFamily="34" charset="0"/>
+              <a:buChar char="•"/>
             </a:pPr>
             <a:r>
               <a:rPr lang="en-US" sz="2800" dirty="0"/>
-              <a:t>Text </a:t>
+              <a:t>Bullet list </a:t>
             </a:r>
           </a:p>
         </p:txBody>
@@ -9407,7 +11250,7 @@
     </p:spTree>
     <p:extLst>
       <p:ext uri="{BB962C8B-B14F-4D97-AF65-F5344CB8AC3E}">
-        <p14:creationId xmlns:p14="http://schemas.microsoft.com/office/powerpoint/2010/main" val="1406990091"/>
+        <p14:creationId xmlns:p14="http://schemas.microsoft.com/office/powerpoint/2010/main" val="3186026219"/>
       </p:ext>
     </p:extLst>
   </p:cSld>
@@ -10106,14 +11949,14 @@
           <p:nvPr/>
         </p:nvPicPr>
         <p:blipFill rotWithShape="1">
-          <a:blip r:embed="rId2" r:link="rId3">
+          <a:blip r:embed="rId2" r:link="rId3" cstate="screen">
             <a:extLst>
               <a:ext uri="{28A0092B-C50C-407E-A947-70E740481C1C}">
-                <a14:useLocalDpi xmlns:a14="http://schemas.microsoft.com/office/drawing/2010/main" val="0"/>
+                <a14:useLocalDpi xmlns:a14="http://schemas.microsoft.com/office/drawing/2010/main"/>
               </a:ext>
             </a:extLst>
           </a:blip>
-          <a:srcRect l="22615"/>
+          <a:srcRect/>
           <a:stretch>
             <a:fillRect/>
           </a:stretch>
@@ -10191,8 +12034,14 @@
           <p:nvPr/>
         </p:nvPicPr>
         <p:blipFill rotWithShape="1">
-          <a:blip r:embed="rId2"/>
-          <a:srcRect r="2786"/>
+          <a:blip r:embed="rId2" cstate="screen">
+            <a:extLst>
+              <a:ext uri="{28A0092B-C50C-407E-A947-70E740481C1C}">
+                <a14:useLocalDpi xmlns:a14="http://schemas.microsoft.com/office/drawing/2010/main"/>
+              </a:ext>
+            </a:extLst>
+          </a:blip>
+          <a:srcRect/>
           <a:stretch/>
         </p:blipFill>
         <p:spPr>
@@ -11095,10 +12944,10 @@
           <p:nvPr/>
         </p:nvPicPr>
         <p:blipFill>
-          <a:blip r:embed="rId4">
+          <a:blip r:embed="rId4" cstate="screen">
             <a:extLst>
               <a:ext uri="{28A0092B-C50C-407E-A947-70E740481C1C}">
-                <a14:useLocalDpi xmlns:a14="http://schemas.microsoft.com/office/drawing/2010/main" val="0"/>
+                <a14:useLocalDpi xmlns:a14="http://schemas.microsoft.com/office/drawing/2010/main"/>
               </a:ext>
             </a:extLst>
           </a:blip>

</xml_diff>

<commit_message>
add install and config section
</commit_message>
<xml_diff>
--- a/Do You Git It Now.pptx
+++ b/Do You Git It Now.pptx
@@ -5,10 +5,10 @@
     <p:sldMasterId id="2147483930" r:id="rId1"/>
   </p:sldMasterIdLst>
   <p:notesMasterIdLst>
-    <p:notesMasterId r:id="rId19"/>
+    <p:notesMasterId r:id="rId27"/>
   </p:notesMasterIdLst>
   <p:handoutMasterIdLst>
-    <p:handoutMasterId r:id="rId20"/>
+    <p:handoutMasterId r:id="rId28"/>
   </p:handoutMasterIdLst>
   <p:sldIdLst>
     <p:sldId id="608" r:id="rId2"/>
@@ -25,9 +25,17 @@
     <p:sldId id="629" r:id="rId13"/>
     <p:sldId id="630" r:id="rId14"/>
     <p:sldId id="621" r:id="rId15"/>
-    <p:sldId id="632" r:id="rId16"/>
-    <p:sldId id="633" r:id="rId17"/>
-    <p:sldId id="634" r:id="rId18"/>
+    <p:sldId id="635" r:id="rId16"/>
+    <p:sldId id="632" r:id="rId17"/>
+    <p:sldId id="633" r:id="rId18"/>
+    <p:sldId id="641" r:id="rId19"/>
+    <p:sldId id="642" r:id="rId20"/>
+    <p:sldId id="634" r:id="rId21"/>
+    <p:sldId id="636" r:id="rId22"/>
+    <p:sldId id="637" r:id="rId23"/>
+    <p:sldId id="638" r:id="rId24"/>
+    <p:sldId id="639" r:id="rId25"/>
+    <p:sldId id="640" r:id="rId26"/>
   </p:sldIdLst>
   <p:sldSz cx="12192000" cy="6858000"/>
   <p:notesSz cx="7023100" cy="9309100"/>
@@ -1458,7 +1466,7 @@
                 </a:solidFill>
               </a:rPr>
               <a:pPr/>
-              <a:t>15</a:t>
+              <a:t>16</a:t>
             </a:fld>
             <a:endParaRPr lang="en-US" dirty="0">
               <a:solidFill>
@@ -1704,7 +1712,7 @@
                 </a:solidFill>
               </a:rPr>
               <a:pPr/>
-              <a:t>16</a:t>
+              <a:t>17</a:t>
             </a:fld>
             <a:endParaRPr lang="en-US" dirty="0">
               <a:solidFill>
@@ -1950,7 +1958,7 @@
                 </a:solidFill>
               </a:rPr>
               <a:pPr/>
-              <a:t>17</a:t>
+              <a:t>18</a:t>
             </a:fld>
             <a:endParaRPr lang="en-US" dirty="0">
               <a:solidFill>
@@ -1963,7 +1971,1237 @@
     </p:spTree>
     <p:extLst>
       <p:ext uri="{BB962C8B-B14F-4D97-AF65-F5344CB8AC3E}">
+        <p14:creationId xmlns:p14="http://schemas.microsoft.com/office/powerpoint/2010/main" val="2174633506"/>
+      </p:ext>
+    </p:extLst>
+  </p:cSld>
+  <p:clrMapOvr>
+    <a:masterClrMapping/>
+  </p:clrMapOvr>
+</p:notes>
+</file>
+
+<file path=ppt/notesSlides/notesSlide15.xml><?xml version="1.0" encoding="utf-8"?>
+<p:notes xmlns:a="http://schemas.openxmlformats.org/drawingml/2006/main" xmlns:r="http://schemas.openxmlformats.org/officeDocument/2006/relationships" xmlns:p="http://schemas.openxmlformats.org/presentationml/2006/main">
+  <p:cSld>
+    <p:spTree>
+      <p:nvGrpSpPr>
+        <p:cNvPr id="1" name=""/>
+        <p:cNvGrpSpPr/>
+        <p:nvPr/>
+      </p:nvGrpSpPr>
+      <p:grpSpPr>
+        <a:xfrm>
+          <a:off x="0" y="0"/>
+          <a:ext cx="0" cy="0"/>
+          <a:chOff x="0" y="0"/>
+          <a:chExt cx="0" cy="0"/>
+        </a:xfrm>
+      </p:grpSpPr>
+      <p:sp>
+        <p:nvSpPr>
+          <p:cNvPr id="41986" name="Slide Image Placeholder 1"/>
+          <p:cNvSpPr>
+            <a:spLocks noGrp="1" noRot="1" noChangeAspect="1" noTextEdit="1"/>
+          </p:cNvSpPr>
+          <p:nvPr>
+            <p:ph type="sldImg"/>
+          </p:nvPr>
+        </p:nvSpPr>
+        <p:spPr>
+          <a:ln/>
+        </p:spPr>
+      </p:sp>
+      <p:sp>
+        <p:nvSpPr>
+          <p:cNvPr id="41987" name="Notes Placeholder 2"/>
+          <p:cNvSpPr>
+            <a:spLocks noGrp="1"/>
+          </p:cNvSpPr>
+          <p:nvPr>
+            <p:ph type="body" idx="1"/>
+          </p:nvPr>
+        </p:nvSpPr>
+        <p:spPr>
+          <a:noFill/>
+          <a:ln/>
+          <a:extLst>
+            <a:ext uri="{909E8E84-426E-40DD-AFC4-6F175D3DCCD1}">
+              <a14:hiddenFill xmlns:a14="http://schemas.microsoft.com/office/drawing/2010/main">
+                <a:solidFill>
+                  <a:srgbClr val="FFFFFF"/>
+                </a:solidFill>
+              </a14:hiddenFill>
+            </a:ext>
+            <a:ext uri="{91240B29-F687-4F45-9708-019B960494DF}">
+              <a14:hiddenLine xmlns:a14="http://schemas.microsoft.com/office/drawing/2010/main" w="9525">
+                <a:solidFill>
+                  <a:srgbClr val="000000"/>
+                </a:solidFill>
+                <a:miter lim="800000"/>
+                <a:headEnd/>
+                <a:tailEnd/>
+              </a14:hiddenLine>
+            </a:ext>
+          </a:extLst>
+        </p:spPr>
+        <p:txBody>
+          <a:bodyPr/>
+          <a:lstStyle/>
+          <a:p>
+            <a:pPr marL="102870" indent="0">
+              <a:spcBef>
+                <a:spcPts val="600"/>
+              </a:spcBef>
+              <a:buFont typeface="Arial" panose="020B0604020202020204" pitchFamily="34" charset="0"/>
+              <a:buNone/>
+            </a:pPr>
+            <a:endParaRPr lang="en-US" dirty="0"/>
+          </a:p>
+          <a:p>
+            <a:endParaRPr lang="en-US" dirty="0"/>
+          </a:p>
+        </p:txBody>
+      </p:sp>
+      <p:sp>
+        <p:nvSpPr>
+          <p:cNvPr id="41988" name="Slide Number Placeholder 3"/>
+          <p:cNvSpPr>
+            <a:spLocks noGrp="1"/>
+          </p:cNvSpPr>
+          <p:nvPr>
+            <p:ph type="sldNum" sz="quarter" idx="5"/>
+          </p:nvPr>
+        </p:nvSpPr>
+        <p:spPr>
+          <a:noFill/>
+          <a:ln/>
+          <a:extLst>
+            <a:ext uri="{909E8E84-426E-40DD-AFC4-6F175D3DCCD1}">
+              <a14:hiddenFill xmlns:a14="http://schemas.microsoft.com/office/drawing/2010/main">
+                <a:solidFill>
+                  <a:srgbClr val="FFFFFF"/>
+                </a:solidFill>
+              </a14:hiddenFill>
+            </a:ext>
+            <a:ext uri="{91240B29-F687-4F45-9708-019B960494DF}">
+              <a14:hiddenLine xmlns:a14="http://schemas.microsoft.com/office/drawing/2010/main" w="9525">
+                <a:solidFill>
+                  <a:srgbClr val="000000"/>
+                </a:solidFill>
+                <a:miter lim="800000"/>
+                <a:headEnd/>
+                <a:tailEnd/>
+              </a14:hiddenLine>
+            </a:ext>
+          </a:extLst>
+        </p:spPr>
+        <p:txBody>
+          <a:bodyPr/>
+          <a:lstStyle>
+            <a:lvl1pPr>
+              <a:defRPr>
+                <a:solidFill>
+                  <a:schemeClr val="tx1"/>
+                </a:solidFill>
+                <a:latin typeface="Arial" pitchFamily="34" charset="0"/>
+              </a:defRPr>
+            </a:lvl1pPr>
+            <a:lvl2pPr marL="752260" indent="-289331">
+              <a:defRPr>
+                <a:solidFill>
+                  <a:schemeClr val="tx1"/>
+                </a:solidFill>
+                <a:latin typeface="Arial" pitchFamily="34" charset="0"/>
+              </a:defRPr>
+            </a:lvl2pPr>
+            <a:lvl3pPr marL="1157324" indent="-231465">
+              <a:defRPr>
+                <a:solidFill>
+                  <a:schemeClr val="tx1"/>
+                </a:solidFill>
+                <a:latin typeface="Arial" pitchFamily="34" charset="0"/>
+              </a:defRPr>
+            </a:lvl3pPr>
+            <a:lvl4pPr marL="1620253" indent="-231465">
+              <a:defRPr>
+                <a:solidFill>
+                  <a:schemeClr val="tx1"/>
+                </a:solidFill>
+                <a:latin typeface="Arial" pitchFamily="34" charset="0"/>
+              </a:defRPr>
+            </a:lvl4pPr>
+            <a:lvl5pPr marL="2083181" indent="-231465">
+              <a:defRPr>
+                <a:solidFill>
+                  <a:schemeClr val="tx1"/>
+                </a:solidFill>
+                <a:latin typeface="Arial" pitchFamily="34" charset="0"/>
+              </a:defRPr>
+            </a:lvl5pPr>
+            <a:lvl6pPr marL="2546112" indent="-231465" eaLnBrk="0" fontAlgn="base" hangingPunct="0">
+              <a:spcBef>
+                <a:spcPct val="0"/>
+              </a:spcBef>
+              <a:spcAft>
+                <a:spcPct val="0"/>
+              </a:spcAft>
+              <a:defRPr>
+                <a:solidFill>
+                  <a:schemeClr val="tx1"/>
+                </a:solidFill>
+                <a:latin typeface="Arial" pitchFamily="34" charset="0"/>
+              </a:defRPr>
+            </a:lvl6pPr>
+            <a:lvl7pPr marL="3009041" indent="-231465" eaLnBrk="0" fontAlgn="base" hangingPunct="0">
+              <a:spcBef>
+                <a:spcPct val="0"/>
+              </a:spcBef>
+              <a:spcAft>
+                <a:spcPct val="0"/>
+              </a:spcAft>
+              <a:defRPr>
+                <a:solidFill>
+                  <a:schemeClr val="tx1"/>
+                </a:solidFill>
+                <a:latin typeface="Arial" pitchFamily="34" charset="0"/>
+              </a:defRPr>
+            </a:lvl7pPr>
+            <a:lvl8pPr marL="3471970" indent="-231465" eaLnBrk="0" fontAlgn="base" hangingPunct="0">
+              <a:spcBef>
+                <a:spcPct val="0"/>
+              </a:spcBef>
+              <a:spcAft>
+                <a:spcPct val="0"/>
+              </a:spcAft>
+              <a:defRPr>
+                <a:solidFill>
+                  <a:schemeClr val="tx1"/>
+                </a:solidFill>
+                <a:latin typeface="Arial" pitchFamily="34" charset="0"/>
+              </a:defRPr>
+            </a:lvl8pPr>
+            <a:lvl9pPr marL="3934900" indent="-231465" eaLnBrk="0" fontAlgn="base" hangingPunct="0">
+              <a:spcBef>
+                <a:spcPct val="0"/>
+              </a:spcBef>
+              <a:spcAft>
+                <a:spcPct val="0"/>
+              </a:spcAft>
+              <a:defRPr>
+                <a:solidFill>
+                  <a:schemeClr val="tx1"/>
+                </a:solidFill>
+                <a:latin typeface="Arial" pitchFamily="34" charset="0"/>
+              </a:defRPr>
+            </a:lvl9pPr>
+          </a:lstStyle>
+          <a:p>
+            <a:fld id="{7D442D87-3FDC-464D-86BA-B2B66F9DA685}" type="slidenum">
+              <a:rPr lang="en-US" smtClean="0">
+                <a:solidFill>
+                  <a:prstClr val="black"/>
+                </a:solidFill>
+              </a:rPr>
+              <a:pPr/>
+              <a:t>19</a:t>
+            </a:fld>
+            <a:endParaRPr lang="en-US" dirty="0">
+              <a:solidFill>
+                <a:prstClr val="black"/>
+              </a:solidFill>
+            </a:endParaRPr>
+          </a:p>
+        </p:txBody>
+      </p:sp>
+    </p:spTree>
+    <p:extLst>
+      <p:ext uri="{BB962C8B-B14F-4D97-AF65-F5344CB8AC3E}">
+        <p14:creationId xmlns:p14="http://schemas.microsoft.com/office/powerpoint/2010/main" val="3236805135"/>
+      </p:ext>
+    </p:extLst>
+  </p:cSld>
+  <p:clrMapOvr>
+    <a:masterClrMapping/>
+  </p:clrMapOvr>
+</p:notes>
+</file>
+
+<file path=ppt/notesSlides/notesSlide16.xml><?xml version="1.0" encoding="utf-8"?>
+<p:notes xmlns:a="http://schemas.openxmlformats.org/drawingml/2006/main" xmlns:r="http://schemas.openxmlformats.org/officeDocument/2006/relationships" xmlns:p="http://schemas.openxmlformats.org/presentationml/2006/main">
+  <p:cSld>
+    <p:spTree>
+      <p:nvGrpSpPr>
+        <p:cNvPr id="1" name=""/>
+        <p:cNvGrpSpPr/>
+        <p:nvPr/>
+      </p:nvGrpSpPr>
+      <p:grpSpPr>
+        <a:xfrm>
+          <a:off x="0" y="0"/>
+          <a:ext cx="0" cy="0"/>
+          <a:chOff x="0" y="0"/>
+          <a:chExt cx="0" cy="0"/>
+        </a:xfrm>
+      </p:grpSpPr>
+      <p:sp>
+        <p:nvSpPr>
+          <p:cNvPr id="41986" name="Slide Image Placeholder 1"/>
+          <p:cNvSpPr>
+            <a:spLocks noGrp="1" noRot="1" noChangeAspect="1" noTextEdit="1"/>
+          </p:cNvSpPr>
+          <p:nvPr>
+            <p:ph type="sldImg"/>
+          </p:nvPr>
+        </p:nvSpPr>
+        <p:spPr>
+          <a:ln/>
+        </p:spPr>
+      </p:sp>
+      <p:sp>
+        <p:nvSpPr>
+          <p:cNvPr id="41987" name="Notes Placeholder 2"/>
+          <p:cNvSpPr>
+            <a:spLocks noGrp="1"/>
+          </p:cNvSpPr>
+          <p:nvPr>
+            <p:ph type="body" idx="1"/>
+          </p:nvPr>
+        </p:nvSpPr>
+        <p:spPr>
+          <a:noFill/>
+          <a:ln/>
+          <a:extLst>
+            <a:ext uri="{909E8E84-426E-40DD-AFC4-6F175D3DCCD1}">
+              <a14:hiddenFill xmlns:a14="http://schemas.microsoft.com/office/drawing/2010/main">
+                <a:solidFill>
+                  <a:srgbClr val="FFFFFF"/>
+                </a:solidFill>
+              </a14:hiddenFill>
+            </a:ext>
+            <a:ext uri="{91240B29-F687-4F45-9708-019B960494DF}">
+              <a14:hiddenLine xmlns:a14="http://schemas.microsoft.com/office/drawing/2010/main" w="9525">
+                <a:solidFill>
+                  <a:srgbClr val="000000"/>
+                </a:solidFill>
+                <a:miter lim="800000"/>
+                <a:headEnd/>
+                <a:tailEnd/>
+              </a14:hiddenLine>
+            </a:ext>
+          </a:extLst>
+        </p:spPr>
+        <p:txBody>
+          <a:bodyPr/>
+          <a:lstStyle/>
+          <a:p>
+            <a:pPr marL="102870" indent="0">
+              <a:spcBef>
+                <a:spcPts val="600"/>
+              </a:spcBef>
+              <a:buFont typeface="Arial" panose="020B0604020202020204" pitchFamily="34" charset="0"/>
+              <a:buNone/>
+            </a:pPr>
+            <a:endParaRPr lang="en-US" dirty="0"/>
+          </a:p>
+          <a:p>
+            <a:endParaRPr lang="en-US" dirty="0"/>
+          </a:p>
+        </p:txBody>
+      </p:sp>
+      <p:sp>
+        <p:nvSpPr>
+          <p:cNvPr id="41988" name="Slide Number Placeholder 3"/>
+          <p:cNvSpPr>
+            <a:spLocks noGrp="1"/>
+          </p:cNvSpPr>
+          <p:nvPr>
+            <p:ph type="sldNum" sz="quarter" idx="5"/>
+          </p:nvPr>
+        </p:nvSpPr>
+        <p:spPr>
+          <a:noFill/>
+          <a:ln/>
+          <a:extLst>
+            <a:ext uri="{909E8E84-426E-40DD-AFC4-6F175D3DCCD1}">
+              <a14:hiddenFill xmlns:a14="http://schemas.microsoft.com/office/drawing/2010/main">
+                <a:solidFill>
+                  <a:srgbClr val="FFFFFF"/>
+                </a:solidFill>
+              </a14:hiddenFill>
+            </a:ext>
+            <a:ext uri="{91240B29-F687-4F45-9708-019B960494DF}">
+              <a14:hiddenLine xmlns:a14="http://schemas.microsoft.com/office/drawing/2010/main" w="9525">
+                <a:solidFill>
+                  <a:srgbClr val="000000"/>
+                </a:solidFill>
+                <a:miter lim="800000"/>
+                <a:headEnd/>
+                <a:tailEnd/>
+              </a14:hiddenLine>
+            </a:ext>
+          </a:extLst>
+        </p:spPr>
+        <p:txBody>
+          <a:bodyPr/>
+          <a:lstStyle>
+            <a:lvl1pPr>
+              <a:defRPr>
+                <a:solidFill>
+                  <a:schemeClr val="tx1"/>
+                </a:solidFill>
+                <a:latin typeface="Arial" pitchFamily="34" charset="0"/>
+              </a:defRPr>
+            </a:lvl1pPr>
+            <a:lvl2pPr marL="752260" indent="-289331">
+              <a:defRPr>
+                <a:solidFill>
+                  <a:schemeClr val="tx1"/>
+                </a:solidFill>
+                <a:latin typeface="Arial" pitchFamily="34" charset="0"/>
+              </a:defRPr>
+            </a:lvl2pPr>
+            <a:lvl3pPr marL="1157324" indent="-231465">
+              <a:defRPr>
+                <a:solidFill>
+                  <a:schemeClr val="tx1"/>
+                </a:solidFill>
+                <a:latin typeface="Arial" pitchFamily="34" charset="0"/>
+              </a:defRPr>
+            </a:lvl3pPr>
+            <a:lvl4pPr marL="1620253" indent="-231465">
+              <a:defRPr>
+                <a:solidFill>
+                  <a:schemeClr val="tx1"/>
+                </a:solidFill>
+                <a:latin typeface="Arial" pitchFamily="34" charset="0"/>
+              </a:defRPr>
+            </a:lvl4pPr>
+            <a:lvl5pPr marL="2083181" indent="-231465">
+              <a:defRPr>
+                <a:solidFill>
+                  <a:schemeClr val="tx1"/>
+                </a:solidFill>
+                <a:latin typeface="Arial" pitchFamily="34" charset="0"/>
+              </a:defRPr>
+            </a:lvl5pPr>
+            <a:lvl6pPr marL="2546112" indent="-231465" eaLnBrk="0" fontAlgn="base" hangingPunct="0">
+              <a:spcBef>
+                <a:spcPct val="0"/>
+              </a:spcBef>
+              <a:spcAft>
+                <a:spcPct val="0"/>
+              </a:spcAft>
+              <a:defRPr>
+                <a:solidFill>
+                  <a:schemeClr val="tx1"/>
+                </a:solidFill>
+                <a:latin typeface="Arial" pitchFamily="34" charset="0"/>
+              </a:defRPr>
+            </a:lvl6pPr>
+            <a:lvl7pPr marL="3009041" indent="-231465" eaLnBrk="0" fontAlgn="base" hangingPunct="0">
+              <a:spcBef>
+                <a:spcPct val="0"/>
+              </a:spcBef>
+              <a:spcAft>
+                <a:spcPct val="0"/>
+              </a:spcAft>
+              <a:defRPr>
+                <a:solidFill>
+                  <a:schemeClr val="tx1"/>
+                </a:solidFill>
+                <a:latin typeface="Arial" pitchFamily="34" charset="0"/>
+              </a:defRPr>
+            </a:lvl7pPr>
+            <a:lvl8pPr marL="3471970" indent="-231465" eaLnBrk="0" fontAlgn="base" hangingPunct="0">
+              <a:spcBef>
+                <a:spcPct val="0"/>
+              </a:spcBef>
+              <a:spcAft>
+                <a:spcPct val="0"/>
+              </a:spcAft>
+              <a:defRPr>
+                <a:solidFill>
+                  <a:schemeClr val="tx1"/>
+                </a:solidFill>
+                <a:latin typeface="Arial" pitchFamily="34" charset="0"/>
+              </a:defRPr>
+            </a:lvl8pPr>
+            <a:lvl9pPr marL="3934900" indent="-231465" eaLnBrk="0" fontAlgn="base" hangingPunct="0">
+              <a:spcBef>
+                <a:spcPct val="0"/>
+              </a:spcBef>
+              <a:spcAft>
+                <a:spcPct val="0"/>
+              </a:spcAft>
+              <a:defRPr>
+                <a:solidFill>
+                  <a:schemeClr val="tx1"/>
+                </a:solidFill>
+                <a:latin typeface="Arial" pitchFamily="34" charset="0"/>
+              </a:defRPr>
+            </a:lvl9pPr>
+          </a:lstStyle>
+          <a:p>
+            <a:fld id="{7D442D87-3FDC-464D-86BA-B2B66F9DA685}" type="slidenum">
+              <a:rPr lang="en-US" smtClean="0">
+                <a:solidFill>
+                  <a:prstClr val="black"/>
+                </a:solidFill>
+              </a:rPr>
+              <a:pPr/>
+              <a:t>20</a:t>
+            </a:fld>
+            <a:endParaRPr lang="en-US" dirty="0">
+              <a:solidFill>
+                <a:prstClr val="black"/>
+              </a:solidFill>
+            </a:endParaRPr>
+          </a:p>
+        </p:txBody>
+      </p:sp>
+    </p:spTree>
+    <p:extLst>
+      <p:ext uri="{BB962C8B-B14F-4D97-AF65-F5344CB8AC3E}">
         <p14:creationId xmlns:p14="http://schemas.microsoft.com/office/powerpoint/2010/main" val="1748964935"/>
+      </p:ext>
+    </p:extLst>
+  </p:cSld>
+  <p:clrMapOvr>
+    <a:masterClrMapping/>
+  </p:clrMapOvr>
+</p:notes>
+</file>
+
+<file path=ppt/notesSlides/notesSlide17.xml><?xml version="1.0" encoding="utf-8"?>
+<p:notes xmlns:a="http://schemas.openxmlformats.org/drawingml/2006/main" xmlns:r="http://schemas.openxmlformats.org/officeDocument/2006/relationships" xmlns:p="http://schemas.openxmlformats.org/presentationml/2006/main">
+  <p:cSld>
+    <p:spTree>
+      <p:nvGrpSpPr>
+        <p:cNvPr id="1" name=""/>
+        <p:cNvGrpSpPr/>
+        <p:nvPr/>
+      </p:nvGrpSpPr>
+      <p:grpSpPr>
+        <a:xfrm>
+          <a:off x="0" y="0"/>
+          <a:ext cx="0" cy="0"/>
+          <a:chOff x="0" y="0"/>
+          <a:chExt cx="0" cy="0"/>
+        </a:xfrm>
+      </p:grpSpPr>
+      <p:sp>
+        <p:nvSpPr>
+          <p:cNvPr id="41986" name="Slide Image Placeholder 1"/>
+          <p:cNvSpPr>
+            <a:spLocks noGrp="1" noRot="1" noChangeAspect="1" noTextEdit="1"/>
+          </p:cNvSpPr>
+          <p:nvPr>
+            <p:ph type="sldImg"/>
+          </p:nvPr>
+        </p:nvSpPr>
+        <p:spPr>
+          <a:ln/>
+        </p:spPr>
+      </p:sp>
+      <p:sp>
+        <p:nvSpPr>
+          <p:cNvPr id="41987" name="Notes Placeholder 2"/>
+          <p:cNvSpPr>
+            <a:spLocks noGrp="1"/>
+          </p:cNvSpPr>
+          <p:nvPr>
+            <p:ph type="body" idx="1"/>
+          </p:nvPr>
+        </p:nvSpPr>
+        <p:spPr>
+          <a:noFill/>
+          <a:ln/>
+          <a:extLst>
+            <a:ext uri="{909E8E84-426E-40DD-AFC4-6F175D3DCCD1}">
+              <a14:hiddenFill xmlns:a14="http://schemas.microsoft.com/office/drawing/2010/main">
+                <a:solidFill>
+                  <a:srgbClr val="FFFFFF"/>
+                </a:solidFill>
+              </a14:hiddenFill>
+            </a:ext>
+            <a:ext uri="{91240B29-F687-4F45-9708-019B960494DF}">
+              <a14:hiddenLine xmlns:a14="http://schemas.microsoft.com/office/drawing/2010/main" w="9525">
+                <a:solidFill>
+                  <a:srgbClr val="000000"/>
+                </a:solidFill>
+                <a:miter lim="800000"/>
+                <a:headEnd/>
+                <a:tailEnd/>
+              </a14:hiddenLine>
+            </a:ext>
+          </a:extLst>
+        </p:spPr>
+        <p:txBody>
+          <a:bodyPr/>
+          <a:lstStyle/>
+          <a:p>
+            <a:pPr marL="102870" indent="0">
+              <a:spcBef>
+                <a:spcPts val="600"/>
+              </a:spcBef>
+              <a:buFont typeface="Arial" panose="020B0604020202020204" pitchFamily="34" charset="0"/>
+              <a:buNone/>
+            </a:pPr>
+            <a:endParaRPr lang="en-US" dirty="0"/>
+          </a:p>
+          <a:p>
+            <a:endParaRPr lang="en-US" dirty="0"/>
+          </a:p>
+        </p:txBody>
+      </p:sp>
+      <p:sp>
+        <p:nvSpPr>
+          <p:cNvPr id="41988" name="Slide Number Placeholder 3"/>
+          <p:cNvSpPr>
+            <a:spLocks noGrp="1"/>
+          </p:cNvSpPr>
+          <p:nvPr>
+            <p:ph type="sldNum" sz="quarter" idx="5"/>
+          </p:nvPr>
+        </p:nvSpPr>
+        <p:spPr>
+          <a:noFill/>
+          <a:ln/>
+          <a:extLst>
+            <a:ext uri="{909E8E84-426E-40DD-AFC4-6F175D3DCCD1}">
+              <a14:hiddenFill xmlns:a14="http://schemas.microsoft.com/office/drawing/2010/main">
+                <a:solidFill>
+                  <a:srgbClr val="FFFFFF"/>
+                </a:solidFill>
+              </a14:hiddenFill>
+            </a:ext>
+            <a:ext uri="{91240B29-F687-4F45-9708-019B960494DF}">
+              <a14:hiddenLine xmlns:a14="http://schemas.microsoft.com/office/drawing/2010/main" w="9525">
+                <a:solidFill>
+                  <a:srgbClr val="000000"/>
+                </a:solidFill>
+                <a:miter lim="800000"/>
+                <a:headEnd/>
+                <a:tailEnd/>
+              </a14:hiddenLine>
+            </a:ext>
+          </a:extLst>
+        </p:spPr>
+        <p:txBody>
+          <a:bodyPr/>
+          <a:lstStyle>
+            <a:lvl1pPr>
+              <a:defRPr>
+                <a:solidFill>
+                  <a:schemeClr val="tx1"/>
+                </a:solidFill>
+                <a:latin typeface="Arial" pitchFamily="34" charset="0"/>
+              </a:defRPr>
+            </a:lvl1pPr>
+            <a:lvl2pPr marL="752260" indent="-289331">
+              <a:defRPr>
+                <a:solidFill>
+                  <a:schemeClr val="tx1"/>
+                </a:solidFill>
+                <a:latin typeface="Arial" pitchFamily="34" charset="0"/>
+              </a:defRPr>
+            </a:lvl2pPr>
+            <a:lvl3pPr marL="1157324" indent="-231465">
+              <a:defRPr>
+                <a:solidFill>
+                  <a:schemeClr val="tx1"/>
+                </a:solidFill>
+                <a:latin typeface="Arial" pitchFamily="34" charset="0"/>
+              </a:defRPr>
+            </a:lvl3pPr>
+            <a:lvl4pPr marL="1620253" indent="-231465">
+              <a:defRPr>
+                <a:solidFill>
+                  <a:schemeClr val="tx1"/>
+                </a:solidFill>
+                <a:latin typeface="Arial" pitchFamily="34" charset="0"/>
+              </a:defRPr>
+            </a:lvl4pPr>
+            <a:lvl5pPr marL="2083181" indent="-231465">
+              <a:defRPr>
+                <a:solidFill>
+                  <a:schemeClr val="tx1"/>
+                </a:solidFill>
+                <a:latin typeface="Arial" pitchFamily="34" charset="0"/>
+              </a:defRPr>
+            </a:lvl5pPr>
+            <a:lvl6pPr marL="2546112" indent="-231465" eaLnBrk="0" fontAlgn="base" hangingPunct="0">
+              <a:spcBef>
+                <a:spcPct val="0"/>
+              </a:spcBef>
+              <a:spcAft>
+                <a:spcPct val="0"/>
+              </a:spcAft>
+              <a:defRPr>
+                <a:solidFill>
+                  <a:schemeClr val="tx1"/>
+                </a:solidFill>
+                <a:latin typeface="Arial" pitchFamily="34" charset="0"/>
+              </a:defRPr>
+            </a:lvl6pPr>
+            <a:lvl7pPr marL="3009041" indent="-231465" eaLnBrk="0" fontAlgn="base" hangingPunct="0">
+              <a:spcBef>
+                <a:spcPct val="0"/>
+              </a:spcBef>
+              <a:spcAft>
+                <a:spcPct val="0"/>
+              </a:spcAft>
+              <a:defRPr>
+                <a:solidFill>
+                  <a:schemeClr val="tx1"/>
+                </a:solidFill>
+                <a:latin typeface="Arial" pitchFamily="34" charset="0"/>
+              </a:defRPr>
+            </a:lvl7pPr>
+            <a:lvl8pPr marL="3471970" indent="-231465" eaLnBrk="0" fontAlgn="base" hangingPunct="0">
+              <a:spcBef>
+                <a:spcPct val="0"/>
+              </a:spcBef>
+              <a:spcAft>
+                <a:spcPct val="0"/>
+              </a:spcAft>
+              <a:defRPr>
+                <a:solidFill>
+                  <a:schemeClr val="tx1"/>
+                </a:solidFill>
+                <a:latin typeface="Arial" pitchFamily="34" charset="0"/>
+              </a:defRPr>
+            </a:lvl8pPr>
+            <a:lvl9pPr marL="3934900" indent="-231465" eaLnBrk="0" fontAlgn="base" hangingPunct="0">
+              <a:spcBef>
+                <a:spcPct val="0"/>
+              </a:spcBef>
+              <a:spcAft>
+                <a:spcPct val="0"/>
+              </a:spcAft>
+              <a:defRPr>
+                <a:solidFill>
+                  <a:schemeClr val="tx1"/>
+                </a:solidFill>
+                <a:latin typeface="Arial" pitchFamily="34" charset="0"/>
+              </a:defRPr>
+            </a:lvl9pPr>
+          </a:lstStyle>
+          <a:p>
+            <a:fld id="{7D442D87-3FDC-464D-86BA-B2B66F9DA685}" type="slidenum">
+              <a:rPr lang="en-US" smtClean="0">
+                <a:solidFill>
+                  <a:prstClr val="black"/>
+                </a:solidFill>
+              </a:rPr>
+              <a:pPr/>
+              <a:t>21</a:t>
+            </a:fld>
+            <a:endParaRPr lang="en-US" dirty="0">
+              <a:solidFill>
+                <a:prstClr val="black"/>
+              </a:solidFill>
+            </a:endParaRPr>
+          </a:p>
+        </p:txBody>
+      </p:sp>
+    </p:spTree>
+    <p:extLst>
+      <p:ext uri="{BB962C8B-B14F-4D97-AF65-F5344CB8AC3E}">
+        <p14:creationId xmlns:p14="http://schemas.microsoft.com/office/powerpoint/2010/main" val="3888642721"/>
+      </p:ext>
+    </p:extLst>
+  </p:cSld>
+  <p:clrMapOvr>
+    <a:masterClrMapping/>
+  </p:clrMapOvr>
+</p:notes>
+</file>
+
+<file path=ppt/notesSlides/notesSlide18.xml><?xml version="1.0" encoding="utf-8"?>
+<p:notes xmlns:a="http://schemas.openxmlformats.org/drawingml/2006/main" xmlns:r="http://schemas.openxmlformats.org/officeDocument/2006/relationships" xmlns:p="http://schemas.openxmlformats.org/presentationml/2006/main">
+  <p:cSld>
+    <p:spTree>
+      <p:nvGrpSpPr>
+        <p:cNvPr id="1" name=""/>
+        <p:cNvGrpSpPr/>
+        <p:nvPr/>
+      </p:nvGrpSpPr>
+      <p:grpSpPr>
+        <a:xfrm>
+          <a:off x="0" y="0"/>
+          <a:ext cx="0" cy="0"/>
+          <a:chOff x="0" y="0"/>
+          <a:chExt cx="0" cy="0"/>
+        </a:xfrm>
+      </p:grpSpPr>
+      <p:sp>
+        <p:nvSpPr>
+          <p:cNvPr id="41986" name="Slide Image Placeholder 1"/>
+          <p:cNvSpPr>
+            <a:spLocks noGrp="1" noRot="1" noChangeAspect="1" noTextEdit="1"/>
+          </p:cNvSpPr>
+          <p:nvPr>
+            <p:ph type="sldImg"/>
+          </p:nvPr>
+        </p:nvSpPr>
+        <p:spPr>
+          <a:ln/>
+        </p:spPr>
+      </p:sp>
+      <p:sp>
+        <p:nvSpPr>
+          <p:cNvPr id="41987" name="Notes Placeholder 2"/>
+          <p:cNvSpPr>
+            <a:spLocks noGrp="1"/>
+          </p:cNvSpPr>
+          <p:nvPr>
+            <p:ph type="body" idx="1"/>
+          </p:nvPr>
+        </p:nvSpPr>
+        <p:spPr>
+          <a:noFill/>
+          <a:ln/>
+          <a:extLst>
+            <a:ext uri="{909E8E84-426E-40DD-AFC4-6F175D3DCCD1}">
+              <a14:hiddenFill xmlns:a14="http://schemas.microsoft.com/office/drawing/2010/main">
+                <a:solidFill>
+                  <a:srgbClr val="FFFFFF"/>
+                </a:solidFill>
+              </a14:hiddenFill>
+            </a:ext>
+            <a:ext uri="{91240B29-F687-4F45-9708-019B960494DF}">
+              <a14:hiddenLine xmlns:a14="http://schemas.microsoft.com/office/drawing/2010/main" w="9525">
+                <a:solidFill>
+                  <a:srgbClr val="000000"/>
+                </a:solidFill>
+                <a:miter lim="800000"/>
+                <a:headEnd/>
+                <a:tailEnd/>
+              </a14:hiddenLine>
+            </a:ext>
+          </a:extLst>
+        </p:spPr>
+        <p:txBody>
+          <a:bodyPr/>
+          <a:lstStyle/>
+          <a:p>
+            <a:pPr marL="102870" indent="0">
+              <a:spcBef>
+                <a:spcPts val="600"/>
+              </a:spcBef>
+              <a:buFont typeface="Arial" panose="020B0604020202020204" pitchFamily="34" charset="0"/>
+              <a:buNone/>
+            </a:pPr>
+            <a:endParaRPr lang="en-US" dirty="0"/>
+          </a:p>
+          <a:p>
+            <a:endParaRPr lang="en-US" dirty="0"/>
+          </a:p>
+        </p:txBody>
+      </p:sp>
+      <p:sp>
+        <p:nvSpPr>
+          <p:cNvPr id="41988" name="Slide Number Placeholder 3"/>
+          <p:cNvSpPr>
+            <a:spLocks noGrp="1"/>
+          </p:cNvSpPr>
+          <p:nvPr>
+            <p:ph type="sldNum" sz="quarter" idx="5"/>
+          </p:nvPr>
+        </p:nvSpPr>
+        <p:spPr>
+          <a:noFill/>
+          <a:ln/>
+          <a:extLst>
+            <a:ext uri="{909E8E84-426E-40DD-AFC4-6F175D3DCCD1}">
+              <a14:hiddenFill xmlns:a14="http://schemas.microsoft.com/office/drawing/2010/main">
+                <a:solidFill>
+                  <a:srgbClr val="FFFFFF"/>
+                </a:solidFill>
+              </a14:hiddenFill>
+            </a:ext>
+            <a:ext uri="{91240B29-F687-4F45-9708-019B960494DF}">
+              <a14:hiddenLine xmlns:a14="http://schemas.microsoft.com/office/drawing/2010/main" w="9525">
+                <a:solidFill>
+                  <a:srgbClr val="000000"/>
+                </a:solidFill>
+                <a:miter lim="800000"/>
+                <a:headEnd/>
+                <a:tailEnd/>
+              </a14:hiddenLine>
+            </a:ext>
+          </a:extLst>
+        </p:spPr>
+        <p:txBody>
+          <a:bodyPr/>
+          <a:lstStyle>
+            <a:lvl1pPr>
+              <a:defRPr>
+                <a:solidFill>
+                  <a:schemeClr val="tx1"/>
+                </a:solidFill>
+                <a:latin typeface="Arial" pitchFamily="34" charset="0"/>
+              </a:defRPr>
+            </a:lvl1pPr>
+            <a:lvl2pPr marL="752260" indent="-289331">
+              <a:defRPr>
+                <a:solidFill>
+                  <a:schemeClr val="tx1"/>
+                </a:solidFill>
+                <a:latin typeface="Arial" pitchFamily="34" charset="0"/>
+              </a:defRPr>
+            </a:lvl2pPr>
+            <a:lvl3pPr marL="1157324" indent="-231465">
+              <a:defRPr>
+                <a:solidFill>
+                  <a:schemeClr val="tx1"/>
+                </a:solidFill>
+                <a:latin typeface="Arial" pitchFamily="34" charset="0"/>
+              </a:defRPr>
+            </a:lvl3pPr>
+            <a:lvl4pPr marL="1620253" indent="-231465">
+              <a:defRPr>
+                <a:solidFill>
+                  <a:schemeClr val="tx1"/>
+                </a:solidFill>
+                <a:latin typeface="Arial" pitchFamily="34" charset="0"/>
+              </a:defRPr>
+            </a:lvl4pPr>
+            <a:lvl5pPr marL="2083181" indent="-231465">
+              <a:defRPr>
+                <a:solidFill>
+                  <a:schemeClr val="tx1"/>
+                </a:solidFill>
+                <a:latin typeface="Arial" pitchFamily="34" charset="0"/>
+              </a:defRPr>
+            </a:lvl5pPr>
+            <a:lvl6pPr marL="2546112" indent="-231465" eaLnBrk="0" fontAlgn="base" hangingPunct="0">
+              <a:spcBef>
+                <a:spcPct val="0"/>
+              </a:spcBef>
+              <a:spcAft>
+                <a:spcPct val="0"/>
+              </a:spcAft>
+              <a:defRPr>
+                <a:solidFill>
+                  <a:schemeClr val="tx1"/>
+                </a:solidFill>
+                <a:latin typeface="Arial" pitchFamily="34" charset="0"/>
+              </a:defRPr>
+            </a:lvl6pPr>
+            <a:lvl7pPr marL="3009041" indent="-231465" eaLnBrk="0" fontAlgn="base" hangingPunct="0">
+              <a:spcBef>
+                <a:spcPct val="0"/>
+              </a:spcBef>
+              <a:spcAft>
+                <a:spcPct val="0"/>
+              </a:spcAft>
+              <a:defRPr>
+                <a:solidFill>
+                  <a:schemeClr val="tx1"/>
+                </a:solidFill>
+                <a:latin typeface="Arial" pitchFamily="34" charset="0"/>
+              </a:defRPr>
+            </a:lvl7pPr>
+            <a:lvl8pPr marL="3471970" indent="-231465" eaLnBrk="0" fontAlgn="base" hangingPunct="0">
+              <a:spcBef>
+                <a:spcPct val="0"/>
+              </a:spcBef>
+              <a:spcAft>
+                <a:spcPct val="0"/>
+              </a:spcAft>
+              <a:defRPr>
+                <a:solidFill>
+                  <a:schemeClr val="tx1"/>
+                </a:solidFill>
+                <a:latin typeface="Arial" pitchFamily="34" charset="0"/>
+              </a:defRPr>
+            </a:lvl8pPr>
+            <a:lvl9pPr marL="3934900" indent="-231465" eaLnBrk="0" fontAlgn="base" hangingPunct="0">
+              <a:spcBef>
+                <a:spcPct val="0"/>
+              </a:spcBef>
+              <a:spcAft>
+                <a:spcPct val="0"/>
+              </a:spcAft>
+              <a:defRPr>
+                <a:solidFill>
+                  <a:schemeClr val="tx1"/>
+                </a:solidFill>
+                <a:latin typeface="Arial" pitchFamily="34" charset="0"/>
+              </a:defRPr>
+            </a:lvl9pPr>
+          </a:lstStyle>
+          <a:p>
+            <a:fld id="{7D442D87-3FDC-464D-86BA-B2B66F9DA685}" type="slidenum">
+              <a:rPr lang="en-US" smtClean="0">
+                <a:solidFill>
+                  <a:prstClr val="black"/>
+                </a:solidFill>
+              </a:rPr>
+              <a:pPr/>
+              <a:t>22</a:t>
+            </a:fld>
+            <a:endParaRPr lang="en-US" dirty="0">
+              <a:solidFill>
+                <a:prstClr val="black"/>
+              </a:solidFill>
+            </a:endParaRPr>
+          </a:p>
+        </p:txBody>
+      </p:sp>
+    </p:spTree>
+    <p:extLst>
+      <p:ext uri="{BB962C8B-B14F-4D97-AF65-F5344CB8AC3E}">
+        <p14:creationId xmlns:p14="http://schemas.microsoft.com/office/powerpoint/2010/main" val="1347732777"/>
+      </p:ext>
+    </p:extLst>
+  </p:cSld>
+  <p:clrMapOvr>
+    <a:masterClrMapping/>
+  </p:clrMapOvr>
+</p:notes>
+</file>
+
+<file path=ppt/notesSlides/notesSlide19.xml><?xml version="1.0" encoding="utf-8"?>
+<p:notes xmlns:a="http://schemas.openxmlformats.org/drawingml/2006/main" xmlns:r="http://schemas.openxmlformats.org/officeDocument/2006/relationships" xmlns:p="http://schemas.openxmlformats.org/presentationml/2006/main">
+  <p:cSld>
+    <p:spTree>
+      <p:nvGrpSpPr>
+        <p:cNvPr id="1" name=""/>
+        <p:cNvGrpSpPr/>
+        <p:nvPr/>
+      </p:nvGrpSpPr>
+      <p:grpSpPr>
+        <a:xfrm>
+          <a:off x="0" y="0"/>
+          <a:ext cx="0" cy="0"/>
+          <a:chOff x="0" y="0"/>
+          <a:chExt cx="0" cy="0"/>
+        </a:xfrm>
+      </p:grpSpPr>
+      <p:sp>
+        <p:nvSpPr>
+          <p:cNvPr id="41986" name="Slide Image Placeholder 1"/>
+          <p:cNvSpPr>
+            <a:spLocks noGrp="1" noRot="1" noChangeAspect="1" noTextEdit="1"/>
+          </p:cNvSpPr>
+          <p:nvPr>
+            <p:ph type="sldImg"/>
+          </p:nvPr>
+        </p:nvSpPr>
+        <p:spPr>
+          <a:ln/>
+        </p:spPr>
+      </p:sp>
+      <p:sp>
+        <p:nvSpPr>
+          <p:cNvPr id="41987" name="Notes Placeholder 2"/>
+          <p:cNvSpPr>
+            <a:spLocks noGrp="1"/>
+          </p:cNvSpPr>
+          <p:nvPr>
+            <p:ph type="body" idx="1"/>
+          </p:nvPr>
+        </p:nvSpPr>
+        <p:spPr>
+          <a:noFill/>
+          <a:ln/>
+          <a:extLst>
+            <a:ext uri="{909E8E84-426E-40DD-AFC4-6F175D3DCCD1}">
+              <a14:hiddenFill xmlns:a14="http://schemas.microsoft.com/office/drawing/2010/main">
+                <a:solidFill>
+                  <a:srgbClr val="FFFFFF"/>
+                </a:solidFill>
+              </a14:hiddenFill>
+            </a:ext>
+            <a:ext uri="{91240B29-F687-4F45-9708-019B960494DF}">
+              <a14:hiddenLine xmlns:a14="http://schemas.microsoft.com/office/drawing/2010/main" w="9525">
+                <a:solidFill>
+                  <a:srgbClr val="000000"/>
+                </a:solidFill>
+                <a:miter lim="800000"/>
+                <a:headEnd/>
+                <a:tailEnd/>
+              </a14:hiddenLine>
+            </a:ext>
+          </a:extLst>
+        </p:spPr>
+        <p:txBody>
+          <a:bodyPr/>
+          <a:lstStyle/>
+          <a:p>
+            <a:pPr marL="102870" indent="0">
+              <a:spcBef>
+                <a:spcPts val="600"/>
+              </a:spcBef>
+              <a:buFont typeface="Arial" panose="020B0604020202020204" pitchFamily="34" charset="0"/>
+              <a:buNone/>
+            </a:pPr>
+            <a:endParaRPr lang="en-US" dirty="0"/>
+          </a:p>
+          <a:p>
+            <a:endParaRPr lang="en-US" dirty="0"/>
+          </a:p>
+        </p:txBody>
+      </p:sp>
+      <p:sp>
+        <p:nvSpPr>
+          <p:cNvPr id="41988" name="Slide Number Placeholder 3"/>
+          <p:cNvSpPr>
+            <a:spLocks noGrp="1"/>
+          </p:cNvSpPr>
+          <p:nvPr>
+            <p:ph type="sldNum" sz="quarter" idx="5"/>
+          </p:nvPr>
+        </p:nvSpPr>
+        <p:spPr>
+          <a:noFill/>
+          <a:ln/>
+          <a:extLst>
+            <a:ext uri="{909E8E84-426E-40DD-AFC4-6F175D3DCCD1}">
+              <a14:hiddenFill xmlns:a14="http://schemas.microsoft.com/office/drawing/2010/main">
+                <a:solidFill>
+                  <a:srgbClr val="FFFFFF"/>
+                </a:solidFill>
+              </a14:hiddenFill>
+            </a:ext>
+            <a:ext uri="{91240B29-F687-4F45-9708-019B960494DF}">
+              <a14:hiddenLine xmlns:a14="http://schemas.microsoft.com/office/drawing/2010/main" w="9525">
+                <a:solidFill>
+                  <a:srgbClr val="000000"/>
+                </a:solidFill>
+                <a:miter lim="800000"/>
+                <a:headEnd/>
+                <a:tailEnd/>
+              </a14:hiddenLine>
+            </a:ext>
+          </a:extLst>
+        </p:spPr>
+        <p:txBody>
+          <a:bodyPr/>
+          <a:lstStyle>
+            <a:lvl1pPr>
+              <a:defRPr>
+                <a:solidFill>
+                  <a:schemeClr val="tx1"/>
+                </a:solidFill>
+                <a:latin typeface="Arial" pitchFamily="34" charset="0"/>
+              </a:defRPr>
+            </a:lvl1pPr>
+            <a:lvl2pPr marL="752260" indent="-289331">
+              <a:defRPr>
+                <a:solidFill>
+                  <a:schemeClr val="tx1"/>
+                </a:solidFill>
+                <a:latin typeface="Arial" pitchFamily="34" charset="0"/>
+              </a:defRPr>
+            </a:lvl2pPr>
+            <a:lvl3pPr marL="1157324" indent="-231465">
+              <a:defRPr>
+                <a:solidFill>
+                  <a:schemeClr val="tx1"/>
+                </a:solidFill>
+                <a:latin typeface="Arial" pitchFamily="34" charset="0"/>
+              </a:defRPr>
+            </a:lvl3pPr>
+            <a:lvl4pPr marL="1620253" indent="-231465">
+              <a:defRPr>
+                <a:solidFill>
+                  <a:schemeClr val="tx1"/>
+                </a:solidFill>
+                <a:latin typeface="Arial" pitchFamily="34" charset="0"/>
+              </a:defRPr>
+            </a:lvl4pPr>
+            <a:lvl5pPr marL="2083181" indent="-231465">
+              <a:defRPr>
+                <a:solidFill>
+                  <a:schemeClr val="tx1"/>
+                </a:solidFill>
+                <a:latin typeface="Arial" pitchFamily="34" charset="0"/>
+              </a:defRPr>
+            </a:lvl5pPr>
+            <a:lvl6pPr marL="2546112" indent="-231465" eaLnBrk="0" fontAlgn="base" hangingPunct="0">
+              <a:spcBef>
+                <a:spcPct val="0"/>
+              </a:spcBef>
+              <a:spcAft>
+                <a:spcPct val="0"/>
+              </a:spcAft>
+              <a:defRPr>
+                <a:solidFill>
+                  <a:schemeClr val="tx1"/>
+                </a:solidFill>
+                <a:latin typeface="Arial" pitchFamily="34" charset="0"/>
+              </a:defRPr>
+            </a:lvl6pPr>
+            <a:lvl7pPr marL="3009041" indent="-231465" eaLnBrk="0" fontAlgn="base" hangingPunct="0">
+              <a:spcBef>
+                <a:spcPct val="0"/>
+              </a:spcBef>
+              <a:spcAft>
+                <a:spcPct val="0"/>
+              </a:spcAft>
+              <a:defRPr>
+                <a:solidFill>
+                  <a:schemeClr val="tx1"/>
+                </a:solidFill>
+                <a:latin typeface="Arial" pitchFamily="34" charset="0"/>
+              </a:defRPr>
+            </a:lvl7pPr>
+            <a:lvl8pPr marL="3471970" indent="-231465" eaLnBrk="0" fontAlgn="base" hangingPunct="0">
+              <a:spcBef>
+                <a:spcPct val="0"/>
+              </a:spcBef>
+              <a:spcAft>
+                <a:spcPct val="0"/>
+              </a:spcAft>
+              <a:defRPr>
+                <a:solidFill>
+                  <a:schemeClr val="tx1"/>
+                </a:solidFill>
+                <a:latin typeface="Arial" pitchFamily="34" charset="0"/>
+              </a:defRPr>
+            </a:lvl8pPr>
+            <a:lvl9pPr marL="3934900" indent="-231465" eaLnBrk="0" fontAlgn="base" hangingPunct="0">
+              <a:spcBef>
+                <a:spcPct val="0"/>
+              </a:spcBef>
+              <a:spcAft>
+                <a:spcPct val="0"/>
+              </a:spcAft>
+              <a:defRPr>
+                <a:solidFill>
+                  <a:schemeClr val="tx1"/>
+                </a:solidFill>
+                <a:latin typeface="Arial" pitchFamily="34" charset="0"/>
+              </a:defRPr>
+            </a:lvl9pPr>
+          </a:lstStyle>
+          <a:p>
+            <a:fld id="{7D442D87-3FDC-464D-86BA-B2B66F9DA685}" type="slidenum">
+              <a:rPr lang="en-US" smtClean="0">
+                <a:solidFill>
+                  <a:prstClr val="black"/>
+                </a:solidFill>
+              </a:rPr>
+              <a:pPr/>
+              <a:t>23</a:t>
+            </a:fld>
+            <a:endParaRPr lang="en-US" dirty="0">
+              <a:solidFill>
+                <a:prstClr val="black"/>
+              </a:solidFill>
+            </a:endParaRPr>
+          </a:p>
+        </p:txBody>
+      </p:sp>
+    </p:spTree>
+    <p:extLst>
+      <p:ext uri="{BB962C8B-B14F-4D97-AF65-F5344CB8AC3E}">
+        <p14:creationId xmlns:p14="http://schemas.microsoft.com/office/powerpoint/2010/main" val="3311058406"/>
       </p:ext>
     </p:extLst>
   </p:cSld>
@@ -2048,6 +3286,498 @@
     <p:extLst>
       <p:ext uri="{BB962C8B-B14F-4D97-AF65-F5344CB8AC3E}">
         <p14:creationId xmlns:p14="http://schemas.microsoft.com/office/powerpoint/2010/main" val="1038838164"/>
+      </p:ext>
+    </p:extLst>
+  </p:cSld>
+  <p:clrMapOvr>
+    <a:masterClrMapping/>
+  </p:clrMapOvr>
+</p:notes>
+</file>
+
+<file path=ppt/notesSlides/notesSlide20.xml><?xml version="1.0" encoding="utf-8"?>
+<p:notes xmlns:a="http://schemas.openxmlformats.org/drawingml/2006/main" xmlns:r="http://schemas.openxmlformats.org/officeDocument/2006/relationships" xmlns:p="http://schemas.openxmlformats.org/presentationml/2006/main">
+  <p:cSld>
+    <p:spTree>
+      <p:nvGrpSpPr>
+        <p:cNvPr id="1" name=""/>
+        <p:cNvGrpSpPr/>
+        <p:nvPr/>
+      </p:nvGrpSpPr>
+      <p:grpSpPr>
+        <a:xfrm>
+          <a:off x="0" y="0"/>
+          <a:ext cx="0" cy="0"/>
+          <a:chOff x="0" y="0"/>
+          <a:chExt cx="0" cy="0"/>
+        </a:xfrm>
+      </p:grpSpPr>
+      <p:sp>
+        <p:nvSpPr>
+          <p:cNvPr id="41986" name="Slide Image Placeholder 1"/>
+          <p:cNvSpPr>
+            <a:spLocks noGrp="1" noRot="1" noChangeAspect="1" noTextEdit="1"/>
+          </p:cNvSpPr>
+          <p:nvPr>
+            <p:ph type="sldImg"/>
+          </p:nvPr>
+        </p:nvSpPr>
+        <p:spPr>
+          <a:ln/>
+        </p:spPr>
+      </p:sp>
+      <p:sp>
+        <p:nvSpPr>
+          <p:cNvPr id="41987" name="Notes Placeholder 2"/>
+          <p:cNvSpPr>
+            <a:spLocks noGrp="1"/>
+          </p:cNvSpPr>
+          <p:nvPr>
+            <p:ph type="body" idx="1"/>
+          </p:nvPr>
+        </p:nvSpPr>
+        <p:spPr>
+          <a:noFill/>
+          <a:ln/>
+          <a:extLst>
+            <a:ext uri="{909E8E84-426E-40DD-AFC4-6F175D3DCCD1}">
+              <a14:hiddenFill xmlns:a14="http://schemas.microsoft.com/office/drawing/2010/main">
+                <a:solidFill>
+                  <a:srgbClr val="FFFFFF"/>
+                </a:solidFill>
+              </a14:hiddenFill>
+            </a:ext>
+            <a:ext uri="{91240B29-F687-4F45-9708-019B960494DF}">
+              <a14:hiddenLine xmlns:a14="http://schemas.microsoft.com/office/drawing/2010/main" w="9525">
+                <a:solidFill>
+                  <a:srgbClr val="000000"/>
+                </a:solidFill>
+                <a:miter lim="800000"/>
+                <a:headEnd/>
+                <a:tailEnd/>
+              </a14:hiddenLine>
+            </a:ext>
+          </a:extLst>
+        </p:spPr>
+        <p:txBody>
+          <a:bodyPr/>
+          <a:lstStyle/>
+          <a:p>
+            <a:pPr marL="102870" indent="0">
+              <a:spcBef>
+                <a:spcPts val="600"/>
+              </a:spcBef>
+              <a:buFont typeface="Arial" panose="020B0604020202020204" pitchFamily="34" charset="0"/>
+              <a:buNone/>
+            </a:pPr>
+            <a:endParaRPr lang="en-US" dirty="0"/>
+          </a:p>
+          <a:p>
+            <a:endParaRPr lang="en-US" dirty="0"/>
+          </a:p>
+        </p:txBody>
+      </p:sp>
+      <p:sp>
+        <p:nvSpPr>
+          <p:cNvPr id="41988" name="Slide Number Placeholder 3"/>
+          <p:cNvSpPr>
+            <a:spLocks noGrp="1"/>
+          </p:cNvSpPr>
+          <p:nvPr>
+            <p:ph type="sldNum" sz="quarter" idx="5"/>
+          </p:nvPr>
+        </p:nvSpPr>
+        <p:spPr>
+          <a:noFill/>
+          <a:ln/>
+          <a:extLst>
+            <a:ext uri="{909E8E84-426E-40DD-AFC4-6F175D3DCCD1}">
+              <a14:hiddenFill xmlns:a14="http://schemas.microsoft.com/office/drawing/2010/main">
+                <a:solidFill>
+                  <a:srgbClr val="FFFFFF"/>
+                </a:solidFill>
+              </a14:hiddenFill>
+            </a:ext>
+            <a:ext uri="{91240B29-F687-4F45-9708-019B960494DF}">
+              <a14:hiddenLine xmlns:a14="http://schemas.microsoft.com/office/drawing/2010/main" w="9525">
+                <a:solidFill>
+                  <a:srgbClr val="000000"/>
+                </a:solidFill>
+                <a:miter lim="800000"/>
+                <a:headEnd/>
+                <a:tailEnd/>
+              </a14:hiddenLine>
+            </a:ext>
+          </a:extLst>
+        </p:spPr>
+        <p:txBody>
+          <a:bodyPr/>
+          <a:lstStyle>
+            <a:lvl1pPr>
+              <a:defRPr>
+                <a:solidFill>
+                  <a:schemeClr val="tx1"/>
+                </a:solidFill>
+                <a:latin typeface="Arial" pitchFamily="34" charset="0"/>
+              </a:defRPr>
+            </a:lvl1pPr>
+            <a:lvl2pPr marL="752260" indent="-289331">
+              <a:defRPr>
+                <a:solidFill>
+                  <a:schemeClr val="tx1"/>
+                </a:solidFill>
+                <a:latin typeface="Arial" pitchFamily="34" charset="0"/>
+              </a:defRPr>
+            </a:lvl2pPr>
+            <a:lvl3pPr marL="1157324" indent="-231465">
+              <a:defRPr>
+                <a:solidFill>
+                  <a:schemeClr val="tx1"/>
+                </a:solidFill>
+                <a:latin typeface="Arial" pitchFamily="34" charset="0"/>
+              </a:defRPr>
+            </a:lvl3pPr>
+            <a:lvl4pPr marL="1620253" indent="-231465">
+              <a:defRPr>
+                <a:solidFill>
+                  <a:schemeClr val="tx1"/>
+                </a:solidFill>
+                <a:latin typeface="Arial" pitchFamily="34" charset="0"/>
+              </a:defRPr>
+            </a:lvl4pPr>
+            <a:lvl5pPr marL="2083181" indent="-231465">
+              <a:defRPr>
+                <a:solidFill>
+                  <a:schemeClr val="tx1"/>
+                </a:solidFill>
+                <a:latin typeface="Arial" pitchFamily="34" charset="0"/>
+              </a:defRPr>
+            </a:lvl5pPr>
+            <a:lvl6pPr marL="2546112" indent="-231465" eaLnBrk="0" fontAlgn="base" hangingPunct="0">
+              <a:spcBef>
+                <a:spcPct val="0"/>
+              </a:spcBef>
+              <a:spcAft>
+                <a:spcPct val="0"/>
+              </a:spcAft>
+              <a:defRPr>
+                <a:solidFill>
+                  <a:schemeClr val="tx1"/>
+                </a:solidFill>
+                <a:latin typeface="Arial" pitchFamily="34" charset="0"/>
+              </a:defRPr>
+            </a:lvl6pPr>
+            <a:lvl7pPr marL="3009041" indent="-231465" eaLnBrk="0" fontAlgn="base" hangingPunct="0">
+              <a:spcBef>
+                <a:spcPct val="0"/>
+              </a:spcBef>
+              <a:spcAft>
+                <a:spcPct val="0"/>
+              </a:spcAft>
+              <a:defRPr>
+                <a:solidFill>
+                  <a:schemeClr val="tx1"/>
+                </a:solidFill>
+                <a:latin typeface="Arial" pitchFamily="34" charset="0"/>
+              </a:defRPr>
+            </a:lvl7pPr>
+            <a:lvl8pPr marL="3471970" indent="-231465" eaLnBrk="0" fontAlgn="base" hangingPunct="0">
+              <a:spcBef>
+                <a:spcPct val="0"/>
+              </a:spcBef>
+              <a:spcAft>
+                <a:spcPct val="0"/>
+              </a:spcAft>
+              <a:defRPr>
+                <a:solidFill>
+                  <a:schemeClr val="tx1"/>
+                </a:solidFill>
+                <a:latin typeface="Arial" pitchFamily="34" charset="0"/>
+              </a:defRPr>
+            </a:lvl8pPr>
+            <a:lvl9pPr marL="3934900" indent="-231465" eaLnBrk="0" fontAlgn="base" hangingPunct="0">
+              <a:spcBef>
+                <a:spcPct val="0"/>
+              </a:spcBef>
+              <a:spcAft>
+                <a:spcPct val="0"/>
+              </a:spcAft>
+              <a:defRPr>
+                <a:solidFill>
+                  <a:schemeClr val="tx1"/>
+                </a:solidFill>
+                <a:latin typeface="Arial" pitchFamily="34" charset="0"/>
+              </a:defRPr>
+            </a:lvl9pPr>
+          </a:lstStyle>
+          <a:p>
+            <a:fld id="{7D442D87-3FDC-464D-86BA-B2B66F9DA685}" type="slidenum">
+              <a:rPr lang="en-US" smtClean="0">
+                <a:solidFill>
+                  <a:prstClr val="black"/>
+                </a:solidFill>
+              </a:rPr>
+              <a:pPr/>
+              <a:t>24</a:t>
+            </a:fld>
+            <a:endParaRPr lang="en-US" dirty="0">
+              <a:solidFill>
+                <a:prstClr val="black"/>
+              </a:solidFill>
+            </a:endParaRPr>
+          </a:p>
+        </p:txBody>
+      </p:sp>
+    </p:spTree>
+    <p:extLst>
+      <p:ext uri="{BB962C8B-B14F-4D97-AF65-F5344CB8AC3E}">
+        <p14:creationId xmlns:p14="http://schemas.microsoft.com/office/powerpoint/2010/main" val="252828385"/>
+      </p:ext>
+    </p:extLst>
+  </p:cSld>
+  <p:clrMapOvr>
+    <a:masterClrMapping/>
+  </p:clrMapOvr>
+</p:notes>
+</file>
+
+<file path=ppt/notesSlides/notesSlide21.xml><?xml version="1.0" encoding="utf-8"?>
+<p:notes xmlns:a="http://schemas.openxmlformats.org/drawingml/2006/main" xmlns:r="http://schemas.openxmlformats.org/officeDocument/2006/relationships" xmlns:p="http://schemas.openxmlformats.org/presentationml/2006/main">
+  <p:cSld>
+    <p:spTree>
+      <p:nvGrpSpPr>
+        <p:cNvPr id="1" name=""/>
+        <p:cNvGrpSpPr/>
+        <p:nvPr/>
+      </p:nvGrpSpPr>
+      <p:grpSpPr>
+        <a:xfrm>
+          <a:off x="0" y="0"/>
+          <a:ext cx="0" cy="0"/>
+          <a:chOff x="0" y="0"/>
+          <a:chExt cx="0" cy="0"/>
+        </a:xfrm>
+      </p:grpSpPr>
+      <p:sp>
+        <p:nvSpPr>
+          <p:cNvPr id="41986" name="Slide Image Placeholder 1"/>
+          <p:cNvSpPr>
+            <a:spLocks noGrp="1" noRot="1" noChangeAspect="1" noTextEdit="1"/>
+          </p:cNvSpPr>
+          <p:nvPr>
+            <p:ph type="sldImg"/>
+          </p:nvPr>
+        </p:nvSpPr>
+        <p:spPr>
+          <a:ln/>
+        </p:spPr>
+      </p:sp>
+      <p:sp>
+        <p:nvSpPr>
+          <p:cNvPr id="41987" name="Notes Placeholder 2"/>
+          <p:cNvSpPr>
+            <a:spLocks noGrp="1"/>
+          </p:cNvSpPr>
+          <p:nvPr>
+            <p:ph type="body" idx="1"/>
+          </p:nvPr>
+        </p:nvSpPr>
+        <p:spPr>
+          <a:noFill/>
+          <a:ln/>
+          <a:extLst>
+            <a:ext uri="{909E8E84-426E-40DD-AFC4-6F175D3DCCD1}">
+              <a14:hiddenFill xmlns:a14="http://schemas.microsoft.com/office/drawing/2010/main">
+                <a:solidFill>
+                  <a:srgbClr val="FFFFFF"/>
+                </a:solidFill>
+              </a14:hiddenFill>
+            </a:ext>
+            <a:ext uri="{91240B29-F687-4F45-9708-019B960494DF}">
+              <a14:hiddenLine xmlns:a14="http://schemas.microsoft.com/office/drawing/2010/main" w="9525">
+                <a:solidFill>
+                  <a:srgbClr val="000000"/>
+                </a:solidFill>
+                <a:miter lim="800000"/>
+                <a:headEnd/>
+                <a:tailEnd/>
+              </a14:hiddenLine>
+            </a:ext>
+          </a:extLst>
+        </p:spPr>
+        <p:txBody>
+          <a:bodyPr/>
+          <a:lstStyle/>
+          <a:p>
+            <a:pPr marL="102870" indent="0">
+              <a:spcBef>
+                <a:spcPts val="600"/>
+              </a:spcBef>
+              <a:buFont typeface="Arial" panose="020B0604020202020204" pitchFamily="34" charset="0"/>
+              <a:buNone/>
+            </a:pPr>
+            <a:endParaRPr lang="en-US" dirty="0"/>
+          </a:p>
+          <a:p>
+            <a:endParaRPr lang="en-US" dirty="0"/>
+          </a:p>
+        </p:txBody>
+      </p:sp>
+      <p:sp>
+        <p:nvSpPr>
+          <p:cNvPr id="41988" name="Slide Number Placeholder 3"/>
+          <p:cNvSpPr>
+            <a:spLocks noGrp="1"/>
+          </p:cNvSpPr>
+          <p:nvPr>
+            <p:ph type="sldNum" sz="quarter" idx="5"/>
+          </p:nvPr>
+        </p:nvSpPr>
+        <p:spPr>
+          <a:noFill/>
+          <a:ln/>
+          <a:extLst>
+            <a:ext uri="{909E8E84-426E-40DD-AFC4-6F175D3DCCD1}">
+              <a14:hiddenFill xmlns:a14="http://schemas.microsoft.com/office/drawing/2010/main">
+                <a:solidFill>
+                  <a:srgbClr val="FFFFFF"/>
+                </a:solidFill>
+              </a14:hiddenFill>
+            </a:ext>
+            <a:ext uri="{91240B29-F687-4F45-9708-019B960494DF}">
+              <a14:hiddenLine xmlns:a14="http://schemas.microsoft.com/office/drawing/2010/main" w="9525">
+                <a:solidFill>
+                  <a:srgbClr val="000000"/>
+                </a:solidFill>
+                <a:miter lim="800000"/>
+                <a:headEnd/>
+                <a:tailEnd/>
+              </a14:hiddenLine>
+            </a:ext>
+          </a:extLst>
+        </p:spPr>
+        <p:txBody>
+          <a:bodyPr/>
+          <a:lstStyle>
+            <a:lvl1pPr>
+              <a:defRPr>
+                <a:solidFill>
+                  <a:schemeClr val="tx1"/>
+                </a:solidFill>
+                <a:latin typeface="Arial" pitchFamily="34" charset="0"/>
+              </a:defRPr>
+            </a:lvl1pPr>
+            <a:lvl2pPr marL="752260" indent="-289331">
+              <a:defRPr>
+                <a:solidFill>
+                  <a:schemeClr val="tx1"/>
+                </a:solidFill>
+                <a:latin typeface="Arial" pitchFamily="34" charset="0"/>
+              </a:defRPr>
+            </a:lvl2pPr>
+            <a:lvl3pPr marL="1157324" indent="-231465">
+              <a:defRPr>
+                <a:solidFill>
+                  <a:schemeClr val="tx1"/>
+                </a:solidFill>
+                <a:latin typeface="Arial" pitchFamily="34" charset="0"/>
+              </a:defRPr>
+            </a:lvl3pPr>
+            <a:lvl4pPr marL="1620253" indent="-231465">
+              <a:defRPr>
+                <a:solidFill>
+                  <a:schemeClr val="tx1"/>
+                </a:solidFill>
+                <a:latin typeface="Arial" pitchFamily="34" charset="0"/>
+              </a:defRPr>
+            </a:lvl4pPr>
+            <a:lvl5pPr marL="2083181" indent="-231465">
+              <a:defRPr>
+                <a:solidFill>
+                  <a:schemeClr val="tx1"/>
+                </a:solidFill>
+                <a:latin typeface="Arial" pitchFamily="34" charset="0"/>
+              </a:defRPr>
+            </a:lvl5pPr>
+            <a:lvl6pPr marL="2546112" indent="-231465" eaLnBrk="0" fontAlgn="base" hangingPunct="0">
+              <a:spcBef>
+                <a:spcPct val="0"/>
+              </a:spcBef>
+              <a:spcAft>
+                <a:spcPct val="0"/>
+              </a:spcAft>
+              <a:defRPr>
+                <a:solidFill>
+                  <a:schemeClr val="tx1"/>
+                </a:solidFill>
+                <a:latin typeface="Arial" pitchFamily="34" charset="0"/>
+              </a:defRPr>
+            </a:lvl6pPr>
+            <a:lvl7pPr marL="3009041" indent="-231465" eaLnBrk="0" fontAlgn="base" hangingPunct="0">
+              <a:spcBef>
+                <a:spcPct val="0"/>
+              </a:spcBef>
+              <a:spcAft>
+                <a:spcPct val="0"/>
+              </a:spcAft>
+              <a:defRPr>
+                <a:solidFill>
+                  <a:schemeClr val="tx1"/>
+                </a:solidFill>
+                <a:latin typeface="Arial" pitchFamily="34" charset="0"/>
+              </a:defRPr>
+            </a:lvl7pPr>
+            <a:lvl8pPr marL="3471970" indent="-231465" eaLnBrk="0" fontAlgn="base" hangingPunct="0">
+              <a:spcBef>
+                <a:spcPct val="0"/>
+              </a:spcBef>
+              <a:spcAft>
+                <a:spcPct val="0"/>
+              </a:spcAft>
+              <a:defRPr>
+                <a:solidFill>
+                  <a:schemeClr val="tx1"/>
+                </a:solidFill>
+                <a:latin typeface="Arial" pitchFamily="34" charset="0"/>
+              </a:defRPr>
+            </a:lvl8pPr>
+            <a:lvl9pPr marL="3934900" indent="-231465" eaLnBrk="0" fontAlgn="base" hangingPunct="0">
+              <a:spcBef>
+                <a:spcPct val="0"/>
+              </a:spcBef>
+              <a:spcAft>
+                <a:spcPct val="0"/>
+              </a:spcAft>
+              <a:defRPr>
+                <a:solidFill>
+                  <a:schemeClr val="tx1"/>
+                </a:solidFill>
+                <a:latin typeface="Arial" pitchFamily="34" charset="0"/>
+              </a:defRPr>
+            </a:lvl9pPr>
+          </a:lstStyle>
+          <a:p>
+            <a:fld id="{7D442D87-3FDC-464D-86BA-B2B66F9DA685}" type="slidenum">
+              <a:rPr lang="en-US" smtClean="0">
+                <a:solidFill>
+                  <a:prstClr val="black"/>
+                </a:solidFill>
+              </a:rPr>
+              <a:pPr/>
+              <a:t>25</a:t>
+            </a:fld>
+            <a:endParaRPr lang="en-US" dirty="0">
+              <a:solidFill>
+                <a:prstClr val="black"/>
+              </a:solidFill>
+            </a:endParaRPr>
+          </a:p>
+        </p:txBody>
+      </p:sp>
+    </p:spTree>
+    <p:extLst>
+      <p:ext uri="{BB962C8B-B14F-4D97-AF65-F5344CB8AC3E}">
+        <p14:creationId xmlns:p14="http://schemas.microsoft.com/office/powerpoint/2010/main" val="3155856758"/>
       </p:ext>
     </p:extLst>
   </p:cSld>
@@ -10730,39 +12460,10 @@
       </p:grpSpPr>
       <p:sp>
         <p:nvSpPr>
-          <p:cNvPr id="9218" name="Title 1"/>
-          <p:cNvSpPr>
-            <a:spLocks noGrp="1"/>
-          </p:cNvSpPr>
-          <p:nvPr>
-            <p:ph type="title"/>
-          </p:nvPr>
-        </p:nvSpPr>
-        <p:spPr/>
-        <p:txBody>
-          <a:bodyPr anchor="b">
-            <a:noAutofit/>
-          </a:bodyPr>
-          <a:lstStyle/>
-          <a:p>
-            <a:r>
-              <a:rPr lang="en-US" sz="3200" b="1" dirty="0">
-                <a:solidFill>
-                  <a:schemeClr val="accent2"/>
-                </a:solidFill>
-                <a:latin typeface="+mn-lt"/>
-              </a:rPr>
-              <a:t>Title</a:t>
-            </a:r>
-          </a:p>
-        </p:txBody>
-      </p:sp>
-      <p:sp>
-        <p:nvSpPr>
-          <p:cNvPr id="2" name="Content Placeholder 1">
+          <p:cNvPr id="2" name="Title 1">
             <a:extLst>
               <a:ext uri="{FF2B5EF4-FFF2-40B4-BE49-F238E27FC236}">
-                <a16:creationId xmlns:a16="http://schemas.microsoft.com/office/drawing/2014/main" id="{27D0C661-EDC7-964F-9BD3-F8C1B1CD48B7}"/>
+                <a16:creationId xmlns:a16="http://schemas.microsoft.com/office/drawing/2014/main" id="{6C6541FF-A05B-3940-AB9F-9705FBA18B10}"/>
               </a:ext>
             </a:extLst>
           </p:cNvPr>
@@ -10770,121 +12471,54 @@
             <a:spLocks noGrp="1"/>
           </p:cNvSpPr>
           <p:nvPr>
-            <p:ph idx="1"/>
+            <p:ph type="title"/>
           </p:nvPr>
         </p:nvSpPr>
         <p:spPr/>
         <p:txBody>
-          <a:bodyPr>
-            <a:normAutofit/>
-          </a:bodyPr>
+          <a:bodyPr/>
           <a:lstStyle/>
           <a:p>
-            <a:pPr marL="0" indent="0">
-              <a:lnSpc>
-                <a:spcPct val="100000"/>
-              </a:lnSpc>
-              <a:spcBef>
-                <a:spcPts val="0"/>
-              </a:spcBef>
-              <a:spcAft>
-                <a:spcPts val="1200"/>
-              </a:spcAft>
-              <a:buNone/>
-            </a:pPr>
-            <a:r>
-              <a:rPr lang="en-US" sz="2800" dirty="0"/>
-              <a:t>Text</a:t>
-            </a:r>
-          </a:p>
-          <a:p>
-            <a:pPr marL="457200" indent="-222250">
-              <a:lnSpc>
-                <a:spcPct val="100000"/>
-              </a:lnSpc>
-              <a:spcBef>
-                <a:spcPts val="0"/>
-              </a:spcBef>
-              <a:spcAft>
-                <a:spcPts val="1200"/>
-              </a:spcAft>
-              <a:buFont typeface="Arial" panose="020B0604020202020204" pitchFamily="34" charset="0"/>
-              <a:buChar char="•"/>
-            </a:pPr>
-            <a:r>
-              <a:rPr lang="en-US" sz="2800" dirty="0"/>
-              <a:t>Bullet list </a:t>
-            </a:r>
-          </a:p>
-        </p:txBody>
-      </p:sp>
-      <p:sp>
-        <p:nvSpPr>
-          <p:cNvPr id="9" name="TextBox 8"/>
-          <p:cNvSpPr txBox="1"/>
-          <p:nvPr/>
-        </p:nvSpPr>
-        <p:spPr>
-          <a:xfrm>
-            <a:off x="130629" y="6397228"/>
-            <a:ext cx="4911634" cy="338554"/>
-          </a:xfrm>
-          <a:prstGeom prst="rect">
-            <a:avLst/>
-          </a:prstGeom>
-          <a:noFill/>
-        </p:spPr>
-        <p:txBody>
-          <a:bodyPr wrap="square" rtlCol="0">
-            <a:spAutoFit/>
-          </a:bodyPr>
-          <a:lstStyle/>
-          <a:p>
-            <a:r>
-              <a:rPr lang="en-US" sz="1600" i="1" dirty="0">
-                <a:solidFill>
-                  <a:schemeClr val="bg1"/>
-                </a:solidFill>
-              </a:rPr>
-              <a:t>Office of Institutional Research</a:t>
-            </a:r>
-          </a:p>
-        </p:txBody>
-      </p:sp>
-      <p:pic>
-        <p:nvPicPr>
-          <p:cNvPr id="7" name="Picture 6"/>
-          <p:cNvPicPr>
-            <a:picLocks noChangeAspect="1"/>
-          </p:cNvPicPr>
-          <p:nvPr/>
-        </p:nvPicPr>
-        <p:blipFill>
-          <a:blip r:embed="rId3" cstate="screen">
+            <a:r>
+              <a:rPr lang="en-US" i="1" dirty="0"/>
+              <a:t>Git-</a:t>
+            </a:r>
+            <a:r>
+              <a:rPr lang="en-US" dirty="0"/>
+              <a:t>ting started</a:t>
+            </a:r>
+          </a:p>
+        </p:txBody>
+      </p:sp>
+      <p:sp>
+        <p:nvSpPr>
+          <p:cNvPr id="3" name="Text Placeholder 2">
             <a:extLst>
-              <a:ext uri="{28A0092B-C50C-407E-A947-70E740481C1C}">
-                <a14:useLocalDpi xmlns:a14="http://schemas.microsoft.com/office/drawing/2010/main"/>
+              <a:ext uri="{FF2B5EF4-FFF2-40B4-BE49-F238E27FC236}">
+                <a16:creationId xmlns:a16="http://schemas.microsoft.com/office/drawing/2014/main" id="{03A89276-DD8C-9F44-9D95-92467E46B6ED}"/>
               </a:ext>
             </a:extLst>
-          </a:blip>
-          <a:stretch>
-            <a:fillRect/>
-          </a:stretch>
-        </p:blipFill>
-        <p:spPr>
-          <a:xfrm>
-            <a:off x="8582526" y="216624"/>
-            <a:ext cx="3352800" cy="452628"/>
-          </a:xfrm>
-          <a:prstGeom prst="rect">
-            <a:avLst/>
-          </a:prstGeom>
-        </p:spPr>
-      </p:pic>
+          </p:cNvPr>
+          <p:cNvSpPr>
+            <a:spLocks noGrp="1"/>
+          </p:cNvSpPr>
+          <p:nvPr>
+            <p:ph type="body" idx="1"/>
+          </p:nvPr>
+        </p:nvSpPr>
+        <p:spPr/>
+        <p:txBody>
+          <a:bodyPr/>
+          <a:lstStyle/>
+          <a:p>
+            <a:endParaRPr lang="en-US"/>
+          </a:p>
+        </p:txBody>
+      </p:sp>
     </p:spTree>
     <p:extLst>
       <p:ext uri="{BB962C8B-B14F-4D97-AF65-F5344CB8AC3E}">
-        <p14:creationId xmlns:p14="http://schemas.microsoft.com/office/powerpoint/2010/main" val="791000851"/>
+        <p14:creationId xmlns:p14="http://schemas.microsoft.com/office/powerpoint/2010/main" val="2100437007"/>
       </p:ext>
     </p:extLst>
   </p:cSld>
@@ -10935,7 +12569,7 @@
                 </a:solidFill>
                 <a:latin typeface="+mn-lt"/>
               </a:rPr>
-              <a:t>Title</a:t>
+              <a:t>Installing and configuring Git</a:t>
             </a:r>
           </a:p>
         </p:txBody>
@@ -10977,11 +12611,18 @@
             </a:pPr>
             <a:r>
               <a:rPr lang="en-US" sz="2800" dirty="0"/>
-              <a:t>Text</a:t>
-            </a:r>
-          </a:p>
-          <a:p>
-            <a:pPr marL="457200" indent="-222250">
+              <a:t>Create a GitHub account: </a:t>
+            </a:r>
+            <a:r>
+              <a:rPr lang="en-US" sz="2800" dirty="0" err="1">
+                <a:hlinkClick r:id="rId3"/>
+              </a:rPr>
+              <a:t>github.com</a:t>
+            </a:r>
+            <a:endParaRPr lang="en-US" sz="2800" dirty="0"/>
+          </a:p>
+          <a:p>
+            <a:pPr marL="0" indent="0">
               <a:lnSpc>
                 <a:spcPct val="100000"/>
               </a:lnSpc>
@@ -10991,13 +12632,56 @@
               <a:spcAft>
                 <a:spcPts val="1200"/>
               </a:spcAft>
-              <a:buFont typeface="Arial" panose="020B0604020202020204" pitchFamily="34" charset="0"/>
-              <a:buChar char="•"/>
+              <a:buNone/>
             </a:pPr>
             <a:r>
               <a:rPr lang="en-US" sz="2800" dirty="0"/>
-              <a:t>Bullet list </a:t>
-            </a:r>
+              <a:t>Download Git: </a:t>
+            </a:r>
+            <a:r>
+              <a:rPr lang="en-US" sz="2800" dirty="0">
+                <a:hlinkClick r:id="rId4"/>
+              </a:rPr>
+              <a:t>https://git-</a:t>
+            </a:r>
+            <a:r>
+              <a:rPr lang="en-US" sz="2800" dirty="0" err="1">
+                <a:hlinkClick r:id="rId4"/>
+              </a:rPr>
+              <a:t>scm.com</a:t>
+            </a:r>
+            <a:r>
+              <a:rPr lang="en-US" sz="2800" dirty="0">
+                <a:hlinkClick r:id="rId4"/>
+              </a:rPr>
+              <a:t>/downloads</a:t>
+            </a:r>
+            <a:endParaRPr lang="en-US" sz="2800" dirty="0"/>
+          </a:p>
+          <a:p>
+            <a:pPr marL="0" indent="0">
+              <a:lnSpc>
+                <a:spcPct val="100000"/>
+              </a:lnSpc>
+              <a:spcBef>
+                <a:spcPts val="0"/>
+              </a:spcBef>
+              <a:spcAft>
+                <a:spcPts val="1200"/>
+              </a:spcAft>
+              <a:buNone/>
+            </a:pPr>
+            <a:r>
+              <a:rPr lang="en-US" sz="2800" dirty="0"/>
+              <a:t>Download Meld: </a:t>
+            </a:r>
+            <a:r>
+              <a:rPr lang="en-US" sz="2800" dirty="0">
+                <a:hlinkClick r:id="rId5"/>
+              </a:rPr>
+              <a:t>meldmerge.org</a:t>
+            </a:r>
+            <a:endParaRPr lang="en-US" sz="2800" dirty="0"/>
           </a:p>
         </p:txBody>
       </p:sp>
@@ -11043,7 +12727,7 @@
           <p:nvPr/>
         </p:nvPicPr>
         <p:blipFill>
-          <a:blip r:embed="rId3" cstate="screen">
+          <a:blip r:embed="rId6" cstate="screen">
             <a:extLst>
               <a:ext uri="{28A0092B-C50C-407E-A947-70E740481C1C}">
                 <a14:useLocalDpi xmlns:a14="http://schemas.microsoft.com/office/drawing/2010/main"/>
@@ -11067,7 +12751,7 @@
     </p:spTree>
     <p:extLst>
       <p:ext uri="{BB962C8B-B14F-4D97-AF65-F5344CB8AC3E}">
-        <p14:creationId xmlns:p14="http://schemas.microsoft.com/office/powerpoint/2010/main" val="785060902"/>
+        <p14:creationId xmlns:p14="http://schemas.microsoft.com/office/powerpoint/2010/main" val="791000851"/>
       </p:ext>
     </p:extLst>
   </p:cSld>
@@ -11118,7 +12802,7 @@
                 </a:solidFill>
                 <a:latin typeface="+mn-lt"/>
               </a:rPr>
-              <a:t>Title</a:t>
+              <a:t>Installing and configuring Git</a:t>
             </a:r>
           </a:p>
         </p:txBody>
@@ -11146,7 +12830,7 @@
           </a:bodyPr>
           <a:lstStyle/>
           <a:p>
-            <a:pPr marL="0" indent="0">
+            <a:pPr marL="0" marR="0">
               <a:lnSpc>
                 <a:spcPct val="100000"/>
               </a:lnSpc>
@@ -11156,15 +12840,16 @@
               <a:spcAft>
                 <a:spcPts val="1200"/>
               </a:spcAft>
-              <a:buNone/>
             </a:pPr>
             <a:r>
-              <a:rPr lang="en-US" sz="2800" dirty="0"/>
-              <a:t>Text</a:t>
-            </a:r>
-          </a:p>
-          <a:p>
-            <a:pPr marL="457200" indent="-222250">
+              <a:rPr lang="en-US" sz="2800" dirty="0">
+                <a:ea typeface="Times New Roman" panose="02020603050405020304" pitchFamily="18" charset="0"/>
+              </a:rPr>
+              <a:t>After installing:</a:t>
+            </a:r>
+          </a:p>
+          <a:p>
+            <a:pPr marL="342900" marR="0" lvl="0" indent="-342900">
               <a:lnSpc>
                 <a:spcPct val="100000"/>
               </a:lnSpc>
@@ -11174,12 +12859,98 @@
               <a:spcAft>
                 <a:spcPts val="1200"/>
               </a:spcAft>
-              <a:buFont typeface="Arial" panose="020B0604020202020204" pitchFamily="34" charset="0"/>
-              <a:buChar char="•"/>
+              <a:buFont typeface="Symbol" pitchFamily="2" charset="2"/>
+              <a:buChar char=""/>
             </a:pPr>
             <a:r>
-              <a:rPr lang="en-US" sz="2800" dirty="0"/>
-              <a:t>Bullet list </a:t>
+              <a:rPr lang="en-US" sz="2800" dirty="0">
+                <a:ea typeface="Times New Roman" panose="02020603050405020304" pitchFamily="18" charset="0"/>
+              </a:rPr>
+              <a:t>On Mac, you’ll work from Terminal</a:t>
+            </a:r>
+          </a:p>
+          <a:p>
+            <a:pPr marL="635508" lvl="1" indent="-342900">
+              <a:lnSpc>
+                <a:spcPct val="100000"/>
+              </a:lnSpc>
+              <a:spcBef>
+                <a:spcPts val="0"/>
+              </a:spcBef>
+              <a:spcAft>
+                <a:spcPts val="1200"/>
+              </a:spcAft>
+              <a:buFont typeface="Symbol" pitchFamily="2" charset="2"/>
+              <a:buChar char=""/>
+            </a:pPr>
+            <a:r>
+              <a:rPr lang="en-US" sz="2800" dirty="0">
+                <a:ea typeface="Times New Roman" panose="02020603050405020304" pitchFamily="18" charset="0"/>
+              </a:rPr>
+              <a:t>Type “Terminal” into Spotlight</a:t>
+            </a:r>
+          </a:p>
+          <a:p>
+            <a:pPr marL="342900" marR="0" lvl="0" indent="-342900">
+              <a:lnSpc>
+                <a:spcPct val="100000"/>
+              </a:lnSpc>
+              <a:spcBef>
+                <a:spcPts val="0"/>
+              </a:spcBef>
+              <a:spcAft>
+                <a:spcPts val="1200"/>
+              </a:spcAft>
+              <a:buFont typeface="Symbol" pitchFamily="2" charset="2"/>
+              <a:buChar char=""/>
+            </a:pPr>
+            <a:r>
+              <a:rPr lang="en-US" sz="2800" dirty="0">
+                <a:ea typeface="Times New Roman" panose="02020603050405020304" pitchFamily="18" charset="0"/>
+              </a:rPr>
+              <a:t>On Windows, you’ll work from Git Bash </a:t>
+            </a:r>
+          </a:p>
+          <a:p>
+            <a:pPr marL="635508" lvl="1" indent="-342900">
+              <a:lnSpc>
+                <a:spcPct val="100000"/>
+              </a:lnSpc>
+              <a:spcBef>
+                <a:spcPts val="0"/>
+              </a:spcBef>
+              <a:spcAft>
+                <a:spcPts val="1200"/>
+              </a:spcAft>
+              <a:buFont typeface="Symbol" pitchFamily="2" charset="2"/>
+              <a:buChar char=""/>
+            </a:pPr>
+            <a:r>
+              <a:rPr lang="en-US" sz="2800" dirty="0">
+                <a:ea typeface="Times New Roman" panose="02020603050405020304" pitchFamily="18" charset="0"/>
+              </a:rPr>
+              <a:t>Click the start button then search for “Git Bash”</a:t>
+            </a:r>
+          </a:p>
+          <a:p>
+            <a:pPr marL="342900" marR="0" lvl="0" indent="-342900">
+              <a:lnSpc>
+                <a:spcPct val="100000"/>
+              </a:lnSpc>
+              <a:spcBef>
+                <a:spcPts val="0"/>
+              </a:spcBef>
+              <a:spcAft>
+                <a:spcPts val="1200"/>
+              </a:spcAft>
+              <a:buFont typeface="Symbol" pitchFamily="2" charset="2"/>
+              <a:buChar char=""/>
+            </a:pPr>
+            <a:r>
+              <a:rPr lang="en-US" sz="2800" dirty="0">
+                <a:ea typeface="Times New Roman" panose="02020603050405020304" pitchFamily="18" charset="0"/>
+              </a:rPr>
+              <a:t>I will refer to both as Bash</a:t>
             </a:r>
           </a:p>
         </p:txBody>
@@ -11250,7 +13021,901 @@
     </p:spTree>
     <p:extLst>
       <p:ext uri="{BB962C8B-B14F-4D97-AF65-F5344CB8AC3E}">
-        <p14:creationId xmlns:p14="http://schemas.microsoft.com/office/powerpoint/2010/main" val="3186026219"/>
+        <p14:creationId xmlns:p14="http://schemas.microsoft.com/office/powerpoint/2010/main" val="785060902"/>
+      </p:ext>
+    </p:extLst>
+  </p:cSld>
+  <p:clrMapOvr>
+    <a:masterClrMapping/>
+  </p:clrMapOvr>
+</p:sld>
+</file>
+
+<file path=ppt/slides/slide18.xml><?xml version="1.0" encoding="utf-8"?>
+<p:sld xmlns:a="http://schemas.openxmlformats.org/drawingml/2006/main" xmlns:r="http://schemas.openxmlformats.org/officeDocument/2006/relationships" xmlns:p="http://schemas.openxmlformats.org/presentationml/2006/main">
+  <p:cSld>
+    <p:spTree>
+      <p:nvGrpSpPr>
+        <p:cNvPr id="1" name=""/>
+        <p:cNvGrpSpPr/>
+        <p:nvPr/>
+      </p:nvGrpSpPr>
+      <p:grpSpPr>
+        <a:xfrm>
+          <a:off x="0" y="0"/>
+          <a:ext cx="0" cy="0"/>
+          <a:chOff x="0" y="0"/>
+          <a:chExt cx="0" cy="0"/>
+        </a:xfrm>
+      </p:grpSpPr>
+      <p:sp>
+        <p:nvSpPr>
+          <p:cNvPr id="9218" name="Title 1"/>
+          <p:cNvSpPr>
+            <a:spLocks noGrp="1"/>
+          </p:cNvSpPr>
+          <p:nvPr>
+            <p:ph type="title"/>
+          </p:nvPr>
+        </p:nvSpPr>
+        <p:spPr/>
+        <p:txBody>
+          <a:bodyPr anchor="b">
+            <a:noAutofit/>
+          </a:bodyPr>
+          <a:lstStyle/>
+          <a:p>
+            <a:r>
+              <a:rPr lang="en-US" sz="3200" b="1" dirty="0">
+                <a:solidFill>
+                  <a:schemeClr val="accent2"/>
+                </a:solidFill>
+                <a:latin typeface="+mn-lt"/>
+              </a:rPr>
+              <a:t>Installing and configuring Git</a:t>
+            </a:r>
+          </a:p>
+        </p:txBody>
+      </p:sp>
+      <p:sp>
+        <p:nvSpPr>
+          <p:cNvPr id="2" name="Content Placeholder 1">
+            <a:extLst>
+              <a:ext uri="{FF2B5EF4-FFF2-40B4-BE49-F238E27FC236}">
+                <a16:creationId xmlns:a16="http://schemas.microsoft.com/office/drawing/2014/main" id="{27D0C661-EDC7-964F-9BD3-F8C1B1CD48B7}"/>
+              </a:ext>
+            </a:extLst>
+          </p:cNvPr>
+          <p:cNvSpPr>
+            <a:spLocks noGrp="1"/>
+          </p:cNvSpPr>
+          <p:nvPr>
+            <p:ph idx="1"/>
+          </p:nvPr>
+        </p:nvSpPr>
+        <p:spPr/>
+        <p:txBody>
+          <a:bodyPr>
+            <a:normAutofit/>
+          </a:bodyPr>
+          <a:lstStyle/>
+          <a:p>
+            <a:pPr marL="0" marR="0" indent="0">
+              <a:spcBef>
+                <a:spcPts val="0"/>
+              </a:spcBef>
+              <a:spcAft>
+                <a:spcPts val="0"/>
+              </a:spcAft>
+            </a:pPr>
+            <a:r>
+              <a:rPr lang="en-US" sz="2800" dirty="0">
+                <a:ea typeface="Times New Roman" panose="02020603050405020304" pitchFamily="18" charset="0"/>
+              </a:rPr>
+              <a:t>Confirm Git is installed: </a:t>
+            </a:r>
+            <a:r>
+              <a:rPr lang="en-US" sz="2400" dirty="0">
+                <a:solidFill>
+                  <a:srgbClr val="000000"/>
+                </a:solidFill>
+                <a:highlight>
+                  <a:srgbClr val="C0C0C0"/>
+                </a:highlight>
+                <a:uFill>
+                  <a:solidFill>
+                    <a:srgbClr val="ED7D31"/>
+                  </a:solidFill>
+                </a:uFill>
+                <a:latin typeface="Consolas" panose="020B0609020204030204" pitchFamily="49" charset="0"/>
+                <a:ea typeface="Times New Roman" panose="02020603050405020304" pitchFamily="18" charset="0"/>
+                <a:cs typeface="Times New Roman" panose="02020603050405020304" pitchFamily="18" charset="0"/>
+              </a:rPr>
+              <a:t>$git --version</a:t>
+            </a:r>
+          </a:p>
+          <a:p>
+            <a:pPr marL="0" marR="0" indent="0">
+              <a:spcBef>
+                <a:spcPts val="0"/>
+              </a:spcBef>
+              <a:spcAft>
+                <a:spcPts val="0"/>
+              </a:spcAft>
+            </a:pPr>
+            <a:endParaRPr lang="en-US" sz="2800" dirty="0">
+              <a:highlight>
+                <a:srgbClr val="C0C0C0"/>
+              </a:highlight>
+              <a:ea typeface="Times New Roman" panose="02020603050405020304" pitchFamily="18" charset="0"/>
+            </a:endParaRPr>
+          </a:p>
+          <a:p>
+            <a:pPr marL="0" marR="0" indent="0">
+              <a:spcBef>
+                <a:spcPts val="0"/>
+              </a:spcBef>
+              <a:spcAft>
+                <a:spcPts val="0"/>
+              </a:spcAft>
+            </a:pPr>
+            <a:r>
+              <a:rPr lang="en-US" sz="2800" dirty="0">
+                <a:ea typeface="Times New Roman" panose="02020603050405020304" pitchFamily="18" charset="0"/>
+              </a:rPr>
+              <a:t>Tell Git who you are:</a:t>
+            </a:r>
+          </a:p>
+          <a:p>
+            <a:pPr marL="292608" lvl="1" indent="0">
+              <a:spcBef>
+                <a:spcPts val="0"/>
+              </a:spcBef>
+              <a:spcAft>
+                <a:spcPts val="0"/>
+              </a:spcAft>
+              <a:buNone/>
+            </a:pPr>
+            <a:r>
+              <a:rPr lang="en-US" sz="2200" dirty="0">
+                <a:highlight>
+                  <a:srgbClr val="C0C0C0"/>
+                </a:highlight>
+                <a:latin typeface="Consolas" panose="020B0609020204030204" pitchFamily="49" charset="0"/>
+                <a:ea typeface="Times New Roman" panose="02020603050405020304" pitchFamily="18" charset="0"/>
+                <a:cs typeface="Consolas" panose="020B0609020204030204" pitchFamily="49" charset="0"/>
+              </a:rPr>
+              <a:t>$git config --global </a:t>
+            </a:r>
+            <a:r>
+              <a:rPr lang="en-US" sz="2200" dirty="0" err="1">
+                <a:highlight>
+                  <a:srgbClr val="C0C0C0"/>
+                </a:highlight>
+                <a:latin typeface="Consolas" panose="020B0609020204030204" pitchFamily="49" charset="0"/>
+                <a:ea typeface="Times New Roman" panose="02020603050405020304" pitchFamily="18" charset="0"/>
+                <a:cs typeface="Consolas" panose="020B0609020204030204" pitchFamily="49" charset="0"/>
+              </a:rPr>
+              <a:t>user.email</a:t>
+            </a:r>
+            <a:r>
+              <a:rPr lang="en-US" sz="2200" dirty="0">
+                <a:highlight>
+                  <a:srgbClr val="C0C0C0"/>
+                </a:highlight>
+                <a:latin typeface="Consolas" panose="020B0609020204030204" pitchFamily="49" charset="0"/>
+                <a:ea typeface="Times New Roman" panose="02020603050405020304" pitchFamily="18" charset="0"/>
+                <a:cs typeface="Consolas" panose="020B0609020204030204" pitchFamily="49" charset="0"/>
+              </a:rPr>
+              <a:t> "</a:t>
+            </a:r>
+            <a:r>
+              <a:rPr lang="en-US" sz="2200" dirty="0" err="1">
+                <a:highlight>
+                  <a:srgbClr val="C0C0C0"/>
+                </a:highlight>
+                <a:latin typeface="Consolas" panose="020B0609020204030204" pitchFamily="49" charset="0"/>
+                <a:ea typeface="Times New Roman" panose="02020603050405020304" pitchFamily="18" charset="0"/>
+                <a:cs typeface="Consolas" panose="020B0609020204030204" pitchFamily="49" charset="0"/>
+              </a:rPr>
+              <a:t>yourGitHub@email.com</a:t>
+            </a:r>
+            <a:r>
+              <a:rPr lang="en-US" sz="2200" dirty="0">
+                <a:highlight>
+                  <a:srgbClr val="C0C0C0"/>
+                </a:highlight>
+                <a:latin typeface="Consolas" panose="020B0609020204030204" pitchFamily="49" charset="0"/>
+                <a:ea typeface="Times New Roman" panose="02020603050405020304" pitchFamily="18" charset="0"/>
+                <a:cs typeface="Consolas" panose="020B0609020204030204" pitchFamily="49" charset="0"/>
+              </a:rPr>
+              <a:t>"</a:t>
+            </a:r>
+          </a:p>
+          <a:p>
+            <a:pPr marL="0" marR="0" indent="0">
+              <a:spcBef>
+                <a:spcPts val="0"/>
+              </a:spcBef>
+              <a:spcAft>
+                <a:spcPts val="0"/>
+              </a:spcAft>
+              <a:buNone/>
+            </a:pPr>
+            <a:endParaRPr lang="en-US" sz="2400" dirty="0">
+              <a:highlight>
+                <a:srgbClr val="C0C0C0"/>
+              </a:highlight>
+              <a:latin typeface="Consolas" panose="020B0609020204030204" pitchFamily="49" charset="0"/>
+              <a:ea typeface="Times New Roman" panose="02020603050405020304" pitchFamily="18" charset="0"/>
+              <a:cs typeface="Consolas" panose="020B0609020204030204" pitchFamily="49" charset="0"/>
+            </a:endParaRPr>
+          </a:p>
+          <a:p>
+            <a:pPr marL="292608" lvl="1" indent="0">
+              <a:spcBef>
+                <a:spcPts val="0"/>
+              </a:spcBef>
+              <a:spcAft>
+                <a:spcPts val="0"/>
+              </a:spcAft>
+              <a:buNone/>
+            </a:pPr>
+            <a:r>
+              <a:rPr lang="en-US" sz="2200" dirty="0">
+                <a:highlight>
+                  <a:srgbClr val="C0C0C0"/>
+                </a:highlight>
+                <a:latin typeface="Consolas" panose="020B0609020204030204" pitchFamily="49" charset="0"/>
+                <a:ea typeface="Times New Roman" panose="02020603050405020304" pitchFamily="18" charset="0"/>
+                <a:cs typeface="Consolas" panose="020B0609020204030204" pitchFamily="49" charset="0"/>
+              </a:rPr>
+              <a:t>$git config --global </a:t>
+            </a:r>
+            <a:r>
+              <a:rPr lang="en-US" sz="2200" dirty="0" err="1">
+                <a:highlight>
+                  <a:srgbClr val="C0C0C0"/>
+                </a:highlight>
+                <a:latin typeface="Consolas" panose="020B0609020204030204" pitchFamily="49" charset="0"/>
+                <a:ea typeface="Times New Roman" panose="02020603050405020304" pitchFamily="18" charset="0"/>
+                <a:cs typeface="Consolas" panose="020B0609020204030204" pitchFamily="49" charset="0"/>
+              </a:rPr>
+              <a:t>user.name</a:t>
+            </a:r>
+            <a:r>
+              <a:rPr lang="en-US" sz="2200" dirty="0">
+                <a:highlight>
+                  <a:srgbClr val="C0C0C0"/>
+                </a:highlight>
+                <a:latin typeface="Consolas" panose="020B0609020204030204" pitchFamily="49" charset="0"/>
+                <a:ea typeface="Times New Roman" panose="02020603050405020304" pitchFamily="18" charset="0"/>
+                <a:cs typeface="Consolas" panose="020B0609020204030204" pitchFamily="49" charset="0"/>
+              </a:rPr>
+              <a:t> "</a:t>
+            </a:r>
+            <a:r>
+              <a:rPr lang="en-US" sz="2200" dirty="0" err="1">
+                <a:highlight>
+                  <a:srgbClr val="C0C0C0"/>
+                </a:highlight>
+                <a:latin typeface="Consolas" panose="020B0609020204030204" pitchFamily="49" charset="0"/>
+                <a:ea typeface="Times New Roman" panose="02020603050405020304" pitchFamily="18" charset="0"/>
+                <a:cs typeface="Consolas" panose="020B0609020204030204" pitchFamily="49" charset="0"/>
+              </a:rPr>
+              <a:t>yourGitHubusername</a:t>
+            </a:r>
+            <a:r>
+              <a:rPr lang="en-US" sz="2200" dirty="0">
+                <a:highlight>
+                  <a:srgbClr val="C0C0C0"/>
+                </a:highlight>
+                <a:latin typeface="Consolas" panose="020B0609020204030204" pitchFamily="49" charset="0"/>
+                <a:ea typeface="Times New Roman" panose="02020603050405020304" pitchFamily="18" charset="0"/>
+                <a:cs typeface="Consolas" panose="020B0609020204030204" pitchFamily="49" charset="0"/>
+              </a:rPr>
+              <a:t>"</a:t>
+            </a:r>
+          </a:p>
+          <a:p>
+            <a:pPr marL="0" marR="0" indent="0">
+              <a:spcBef>
+                <a:spcPts val="0"/>
+              </a:spcBef>
+              <a:spcAft>
+                <a:spcPts val="0"/>
+              </a:spcAft>
+            </a:pPr>
+            <a:endParaRPr lang="en-US" sz="2800" dirty="0">
+              <a:highlight>
+                <a:srgbClr val="C0C0C0"/>
+              </a:highlight>
+              <a:ea typeface="Times New Roman" panose="02020603050405020304" pitchFamily="18" charset="0"/>
+            </a:endParaRPr>
+          </a:p>
+          <a:p>
+            <a:pPr marL="0" marR="0" indent="0">
+              <a:spcBef>
+                <a:spcPts val="0"/>
+              </a:spcBef>
+              <a:spcAft>
+                <a:spcPts val="0"/>
+              </a:spcAft>
+            </a:pPr>
+            <a:endParaRPr lang="en-US" sz="2800" dirty="0">
+              <a:highlight>
+                <a:srgbClr val="C0C0C0"/>
+              </a:highlight>
+              <a:ea typeface="Times New Roman" panose="02020603050405020304" pitchFamily="18" charset="0"/>
+            </a:endParaRPr>
+          </a:p>
+        </p:txBody>
+      </p:sp>
+      <p:sp>
+        <p:nvSpPr>
+          <p:cNvPr id="9" name="TextBox 8"/>
+          <p:cNvSpPr txBox="1"/>
+          <p:nvPr/>
+        </p:nvSpPr>
+        <p:spPr>
+          <a:xfrm>
+            <a:off x="130629" y="6397228"/>
+            <a:ext cx="4911634" cy="338554"/>
+          </a:xfrm>
+          <a:prstGeom prst="rect">
+            <a:avLst/>
+          </a:prstGeom>
+          <a:noFill/>
+        </p:spPr>
+        <p:txBody>
+          <a:bodyPr wrap="square" rtlCol="0">
+            <a:spAutoFit/>
+          </a:bodyPr>
+          <a:lstStyle/>
+          <a:p>
+            <a:r>
+              <a:rPr lang="en-US" sz="1600" i="1" dirty="0">
+                <a:solidFill>
+                  <a:schemeClr val="bg1"/>
+                </a:solidFill>
+              </a:rPr>
+              <a:t>Office of Institutional Research</a:t>
+            </a:r>
+          </a:p>
+        </p:txBody>
+      </p:sp>
+      <p:pic>
+        <p:nvPicPr>
+          <p:cNvPr id="7" name="Picture 6"/>
+          <p:cNvPicPr>
+            <a:picLocks noChangeAspect="1"/>
+          </p:cNvPicPr>
+          <p:nvPr/>
+        </p:nvPicPr>
+        <p:blipFill>
+          <a:blip r:embed="rId3" cstate="screen">
+            <a:extLst>
+              <a:ext uri="{28A0092B-C50C-407E-A947-70E740481C1C}">
+                <a14:useLocalDpi xmlns:a14="http://schemas.microsoft.com/office/drawing/2010/main"/>
+              </a:ext>
+            </a:extLst>
+          </a:blip>
+          <a:stretch>
+            <a:fillRect/>
+          </a:stretch>
+        </p:blipFill>
+        <p:spPr>
+          <a:xfrm>
+            <a:off x="8582526" y="216624"/>
+            <a:ext cx="3352800" cy="452628"/>
+          </a:xfrm>
+          <a:prstGeom prst="rect">
+            <a:avLst/>
+          </a:prstGeom>
+        </p:spPr>
+      </p:pic>
+    </p:spTree>
+    <p:extLst>
+      <p:ext uri="{BB962C8B-B14F-4D97-AF65-F5344CB8AC3E}">
+        <p14:creationId xmlns:p14="http://schemas.microsoft.com/office/powerpoint/2010/main" val="2286334193"/>
+      </p:ext>
+    </p:extLst>
+  </p:cSld>
+  <p:clrMapOvr>
+    <a:masterClrMapping/>
+  </p:clrMapOvr>
+</p:sld>
+</file>
+
+<file path=ppt/slides/slide19.xml><?xml version="1.0" encoding="utf-8"?>
+<p:sld xmlns:a="http://schemas.openxmlformats.org/drawingml/2006/main" xmlns:r="http://schemas.openxmlformats.org/officeDocument/2006/relationships" xmlns:p="http://schemas.openxmlformats.org/presentationml/2006/main">
+  <p:cSld>
+    <p:spTree>
+      <p:nvGrpSpPr>
+        <p:cNvPr id="1" name=""/>
+        <p:cNvGrpSpPr/>
+        <p:nvPr/>
+      </p:nvGrpSpPr>
+      <p:grpSpPr>
+        <a:xfrm>
+          <a:off x="0" y="0"/>
+          <a:ext cx="0" cy="0"/>
+          <a:chOff x="0" y="0"/>
+          <a:chExt cx="0" cy="0"/>
+        </a:xfrm>
+      </p:grpSpPr>
+      <p:sp>
+        <p:nvSpPr>
+          <p:cNvPr id="9218" name="Title 1"/>
+          <p:cNvSpPr>
+            <a:spLocks noGrp="1"/>
+          </p:cNvSpPr>
+          <p:nvPr>
+            <p:ph type="title"/>
+          </p:nvPr>
+        </p:nvSpPr>
+        <p:spPr/>
+        <p:txBody>
+          <a:bodyPr anchor="b">
+            <a:noAutofit/>
+          </a:bodyPr>
+          <a:lstStyle/>
+          <a:p>
+            <a:r>
+              <a:rPr lang="en-US" sz="3200" b="1" dirty="0">
+                <a:solidFill>
+                  <a:schemeClr val="accent2"/>
+                </a:solidFill>
+                <a:latin typeface="+mn-lt"/>
+              </a:rPr>
+              <a:t>Installing and configuring Git</a:t>
+            </a:r>
+          </a:p>
+        </p:txBody>
+      </p:sp>
+      <p:sp>
+        <p:nvSpPr>
+          <p:cNvPr id="2" name="Content Placeholder 1">
+            <a:extLst>
+              <a:ext uri="{FF2B5EF4-FFF2-40B4-BE49-F238E27FC236}">
+                <a16:creationId xmlns:a16="http://schemas.microsoft.com/office/drawing/2014/main" id="{27D0C661-EDC7-964F-9BD3-F8C1B1CD48B7}"/>
+              </a:ext>
+            </a:extLst>
+          </p:cNvPr>
+          <p:cNvSpPr>
+            <a:spLocks noGrp="1"/>
+          </p:cNvSpPr>
+          <p:nvPr>
+            <p:ph idx="1"/>
+          </p:nvPr>
+        </p:nvSpPr>
+        <p:spPr/>
+        <p:txBody>
+          <a:bodyPr>
+            <a:normAutofit/>
+          </a:bodyPr>
+          <a:lstStyle/>
+          <a:p>
+            <a:pPr marL="0" marR="0" indent="0">
+              <a:spcBef>
+                <a:spcPts val="0"/>
+              </a:spcBef>
+              <a:spcAft>
+                <a:spcPts val="0"/>
+              </a:spcAft>
+              <a:buNone/>
+            </a:pPr>
+            <a:r>
+              <a:rPr lang="en-US" sz="2800" dirty="0">
+                <a:ea typeface="Times New Roman" panose="02020603050405020304" pitchFamily="18" charset="0"/>
+              </a:rPr>
+              <a:t>Configure Meld:</a:t>
+            </a:r>
+            <a:endParaRPr lang="en-US" sz="2800" dirty="0">
+              <a:highlight>
+                <a:srgbClr val="C0C0C0"/>
+              </a:highlight>
+              <a:ea typeface="Times New Roman" panose="02020603050405020304" pitchFamily="18" charset="0"/>
+            </a:endParaRPr>
+          </a:p>
+          <a:p>
+            <a:r>
+              <a:rPr lang="en-US" dirty="0">
+                <a:highlight>
+                  <a:srgbClr val="C0C0C0"/>
+                </a:highlight>
+                <a:latin typeface="Consolas" panose="020B0609020204030204" pitchFamily="49" charset="0"/>
+                <a:cs typeface="Consolas" panose="020B0609020204030204" pitchFamily="49" charset="0"/>
+              </a:rPr>
+              <a:t>$git config --global </a:t>
+            </a:r>
+            <a:r>
+              <a:rPr lang="en-US" dirty="0" err="1">
+                <a:highlight>
+                  <a:srgbClr val="C0C0C0"/>
+                </a:highlight>
+                <a:latin typeface="Consolas" panose="020B0609020204030204" pitchFamily="49" charset="0"/>
+                <a:cs typeface="Consolas" panose="020B0609020204030204" pitchFamily="49" charset="0"/>
+              </a:rPr>
+              <a:t>diff.tool</a:t>
+            </a:r>
+            <a:r>
+              <a:rPr lang="en-US" dirty="0">
+                <a:highlight>
+                  <a:srgbClr val="C0C0C0"/>
+                </a:highlight>
+                <a:latin typeface="Consolas" panose="020B0609020204030204" pitchFamily="49" charset="0"/>
+                <a:cs typeface="Consolas" panose="020B0609020204030204" pitchFamily="49" charset="0"/>
+              </a:rPr>
+              <a:t> meld</a:t>
+            </a:r>
+            <a:r>
+              <a:rPr lang="en-US" dirty="0"/>
+              <a:t> (note the period in </a:t>
+            </a:r>
+            <a:r>
+              <a:rPr lang="en-US" dirty="0" err="1"/>
+              <a:t>diff.tool</a:t>
+            </a:r>
+            <a:r>
+              <a:rPr lang="en-US" dirty="0"/>
+              <a:t>)</a:t>
+            </a:r>
+          </a:p>
+          <a:p>
+            <a:r>
+              <a:rPr lang="en-US" dirty="0"/>
+              <a:t>For Windows only: </a:t>
+            </a:r>
+            <a:r>
+              <a:rPr lang="en-US" dirty="0">
+                <a:highlight>
+                  <a:srgbClr val="C0C0C0"/>
+                </a:highlight>
+                <a:latin typeface="Consolas" panose="020B0609020204030204" pitchFamily="49" charset="0"/>
+                <a:cs typeface="Consolas" panose="020B0609020204030204" pitchFamily="49" charset="0"/>
+              </a:rPr>
+              <a:t>$git config --global </a:t>
+            </a:r>
+            <a:r>
+              <a:rPr lang="en-US" dirty="0" err="1">
+                <a:highlight>
+                  <a:srgbClr val="C0C0C0"/>
+                </a:highlight>
+                <a:latin typeface="Consolas" panose="020B0609020204030204" pitchFamily="49" charset="0"/>
+                <a:cs typeface="Consolas" panose="020B0609020204030204" pitchFamily="49" charset="0"/>
+              </a:rPr>
+              <a:t>difftool.meld.path</a:t>
+            </a:r>
+            <a:r>
+              <a:rPr lang="en-US" dirty="0">
+                <a:highlight>
+                  <a:srgbClr val="C0C0C0"/>
+                </a:highlight>
+                <a:latin typeface="Consolas" panose="020B0609020204030204" pitchFamily="49" charset="0"/>
+                <a:cs typeface="Consolas" panose="020B0609020204030204" pitchFamily="49" charset="0"/>
+              </a:rPr>
+              <a:t> = ‘C:/Program Files (x86)/Meld/meld/</a:t>
+            </a:r>
+            <a:r>
+              <a:rPr lang="en-US" dirty="0" err="1">
+                <a:highlight>
+                  <a:srgbClr val="C0C0C0"/>
+                </a:highlight>
+                <a:latin typeface="Consolas" panose="020B0609020204030204" pitchFamily="49" charset="0"/>
+                <a:cs typeface="Consolas" panose="020B0609020204030204" pitchFamily="49" charset="0"/>
+              </a:rPr>
+              <a:t>Meld.exe</a:t>
+            </a:r>
+            <a:r>
+              <a:rPr lang="en-US" dirty="0">
+                <a:highlight>
+                  <a:srgbClr val="C0C0C0"/>
+                </a:highlight>
+                <a:latin typeface="Consolas" panose="020B0609020204030204" pitchFamily="49" charset="0"/>
+                <a:cs typeface="Consolas" panose="020B0609020204030204" pitchFamily="49" charset="0"/>
+              </a:rPr>
+              <a:t>’</a:t>
+            </a:r>
+            <a:r>
+              <a:rPr lang="en-US" dirty="0"/>
+              <a:t> (no period in </a:t>
+            </a:r>
+            <a:r>
+              <a:rPr lang="en-US" dirty="0" err="1"/>
+              <a:t>difftool</a:t>
+            </a:r>
+            <a:r>
+              <a:rPr lang="en-US" dirty="0"/>
+              <a:t>)</a:t>
+            </a:r>
+          </a:p>
+          <a:p>
+            <a:r>
+              <a:rPr lang="en-US" dirty="0">
+                <a:highlight>
+                  <a:srgbClr val="C0C0C0"/>
+                </a:highlight>
+                <a:latin typeface="Consolas" panose="020B0609020204030204" pitchFamily="49" charset="0"/>
+                <a:cs typeface="Consolas" panose="020B0609020204030204" pitchFamily="49" charset="0"/>
+              </a:rPr>
+              <a:t>$git config --global </a:t>
+            </a:r>
+            <a:r>
+              <a:rPr lang="en-US" dirty="0" err="1">
+                <a:highlight>
+                  <a:srgbClr val="C0C0C0"/>
+                </a:highlight>
+                <a:latin typeface="Consolas" panose="020B0609020204030204" pitchFamily="49" charset="0"/>
+                <a:cs typeface="Consolas" panose="020B0609020204030204" pitchFamily="49" charset="0"/>
+              </a:rPr>
+              <a:t>difftool.prompt</a:t>
+            </a:r>
+            <a:r>
+              <a:rPr lang="en-US" dirty="0">
+                <a:highlight>
+                  <a:srgbClr val="C0C0C0"/>
+                </a:highlight>
+                <a:latin typeface="Consolas" panose="020B0609020204030204" pitchFamily="49" charset="0"/>
+                <a:cs typeface="Consolas" panose="020B0609020204030204" pitchFamily="49" charset="0"/>
+              </a:rPr>
+              <a:t> false</a:t>
+            </a:r>
+            <a:r>
+              <a:rPr lang="en-US" dirty="0">
+                <a:latin typeface="Consolas" panose="020B0609020204030204" pitchFamily="49" charset="0"/>
+                <a:cs typeface="Consolas" panose="020B0609020204030204" pitchFamily="49" charset="0"/>
+              </a:rPr>
+              <a:t> </a:t>
+            </a:r>
+            <a:r>
+              <a:rPr lang="en-US" dirty="0"/>
+              <a:t>(no period in </a:t>
+            </a:r>
+            <a:r>
+              <a:rPr lang="en-US" dirty="0" err="1"/>
+              <a:t>difftool</a:t>
+            </a:r>
+            <a:r>
+              <a:rPr lang="en-US" dirty="0"/>
+              <a:t>)</a:t>
+            </a:r>
+          </a:p>
+          <a:p>
+            <a:r>
+              <a:rPr lang="en-US" dirty="0">
+                <a:highlight>
+                  <a:srgbClr val="C0C0C0"/>
+                </a:highlight>
+                <a:latin typeface="Consolas" panose="020B0609020204030204" pitchFamily="49" charset="0"/>
+                <a:cs typeface="Consolas" panose="020B0609020204030204" pitchFamily="49" charset="0"/>
+              </a:rPr>
+              <a:t>$git config --global </a:t>
+            </a:r>
+            <a:r>
+              <a:rPr lang="en-US" dirty="0" err="1">
+                <a:highlight>
+                  <a:srgbClr val="C0C0C0"/>
+                </a:highlight>
+                <a:latin typeface="Consolas" panose="020B0609020204030204" pitchFamily="49" charset="0"/>
+                <a:cs typeface="Consolas" panose="020B0609020204030204" pitchFamily="49" charset="0"/>
+              </a:rPr>
+              <a:t>merge.tool</a:t>
+            </a:r>
+            <a:r>
+              <a:rPr lang="en-US" dirty="0">
+                <a:highlight>
+                  <a:srgbClr val="C0C0C0"/>
+                </a:highlight>
+                <a:latin typeface="Consolas" panose="020B0609020204030204" pitchFamily="49" charset="0"/>
+                <a:cs typeface="Consolas" panose="020B0609020204030204" pitchFamily="49" charset="0"/>
+              </a:rPr>
+              <a:t> meld</a:t>
+            </a:r>
+            <a:r>
+              <a:rPr lang="en-US" dirty="0"/>
+              <a:t> (note the period in </a:t>
+            </a:r>
+            <a:r>
+              <a:rPr lang="en-US" dirty="0" err="1"/>
+              <a:t>merge.tool</a:t>
+            </a:r>
+            <a:r>
+              <a:rPr lang="en-US" dirty="0"/>
+              <a:t>)</a:t>
+            </a:r>
+          </a:p>
+          <a:p>
+            <a:r>
+              <a:rPr lang="en-US" dirty="0"/>
+              <a:t>For Windows only: </a:t>
+            </a:r>
+            <a:r>
+              <a:rPr lang="en-US" dirty="0">
+                <a:highlight>
+                  <a:srgbClr val="C0C0C0"/>
+                </a:highlight>
+                <a:latin typeface="Consolas" panose="020B0609020204030204" pitchFamily="49" charset="0"/>
+                <a:cs typeface="Consolas" panose="020B0609020204030204" pitchFamily="49" charset="0"/>
+              </a:rPr>
+              <a:t>$git config --global </a:t>
+            </a:r>
+            <a:r>
+              <a:rPr lang="en-US" dirty="0" err="1">
+                <a:highlight>
+                  <a:srgbClr val="C0C0C0"/>
+                </a:highlight>
+                <a:latin typeface="Consolas" panose="020B0609020204030204" pitchFamily="49" charset="0"/>
+                <a:cs typeface="Consolas" panose="020B0609020204030204" pitchFamily="49" charset="0"/>
+              </a:rPr>
+              <a:t>mergetool.meld.path</a:t>
+            </a:r>
+            <a:r>
+              <a:rPr lang="en-US" dirty="0">
+                <a:highlight>
+                  <a:srgbClr val="C0C0C0"/>
+                </a:highlight>
+                <a:latin typeface="Consolas" panose="020B0609020204030204" pitchFamily="49" charset="0"/>
+                <a:cs typeface="Consolas" panose="020B0609020204030204" pitchFamily="49" charset="0"/>
+              </a:rPr>
+              <a:t> = ‘C:/Program Files (x86)/Meld/meld/</a:t>
+            </a:r>
+            <a:r>
+              <a:rPr lang="en-US" dirty="0" err="1">
+                <a:highlight>
+                  <a:srgbClr val="C0C0C0"/>
+                </a:highlight>
+                <a:latin typeface="Consolas" panose="020B0609020204030204" pitchFamily="49" charset="0"/>
+                <a:cs typeface="Consolas" panose="020B0609020204030204" pitchFamily="49" charset="0"/>
+              </a:rPr>
+              <a:t>Meld.exe</a:t>
+            </a:r>
+            <a:r>
+              <a:rPr lang="en-US" dirty="0">
+                <a:highlight>
+                  <a:srgbClr val="C0C0C0"/>
+                </a:highlight>
+                <a:latin typeface="Consolas" panose="020B0609020204030204" pitchFamily="49" charset="0"/>
+                <a:cs typeface="Consolas" panose="020B0609020204030204" pitchFamily="49" charset="0"/>
+              </a:rPr>
+              <a:t>’</a:t>
+            </a:r>
+            <a:r>
+              <a:rPr lang="en-US" dirty="0"/>
+              <a:t> (no period in </a:t>
+            </a:r>
+            <a:r>
+              <a:rPr lang="en-US" dirty="0" err="1"/>
+              <a:t>mergetool</a:t>
+            </a:r>
+            <a:r>
+              <a:rPr lang="en-US" dirty="0"/>
+              <a:t>)</a:t>
+            </a:r>
+          </a:p>
+          <a:p>
+            <a:r>
+              <a:rPr lang="en-US" dirty="0">
+                <a:highlight>
+                  <a:srgbClr val="C0C0C0"/>
+                </a:highlight>
+                <a:latin typeface="Consolas" panose="020B0609020204030204" pitchFamily="49" charset="0"/>
+                <a:cs typeface="Consolas" panose="020B0609020204030204" pitchFamily="49" charset="0"/>
+              </a:rPr>
+              <a:t>$git config --global </a:t>
+            </a:r>
+            <a:r>
+              <a:rPr lang="en-US" dirty="0" err="1">
+                <a:highlight>
+                  <a:srgbClr val="C0C0C0"/>
+                </a:highlight>
+                <a:latin typeface="Consolas" panose="020B0609020204030204" pitchFamily="49" charset="0"/>
+                <a:cs typeface="Consolas" panose="020B0609020204030204" pitchFamily="49" charset="0"/>
+              </a:rPr>
+              <a:t>mergetool.keepBackup</a:t>
+            </a:r>
+            <a:r>
+              <a:rPr lang="en-US" dirty="0">
+                <a:highlight>
+                  <a:srgbClr val="C0C0C0"/>
+                </a:highlight>
+                <a:latin typeface="Consolas" panose="020B0609020204030204" pitchFamily="49" charset="0"/>
+                <a:cs typeface="Consolas" panose="020B0609020204030204" pitchFamily="49" charset="0"/>
+              </a:rPr>
+              <a:t> false</a:t>
+            </a:r>
+            <a:r>
+              <a:rPr lang="en-US" dirty="0"/>
+              <a:t> (no period in </a:t>
+            </a:r>
+            <a:r>
+              <a:rPr lang="en-US" dirty="0" err="1"/>
+              <a:t>mergetool</a:t>
+            </a:r>
+            <a:r>
+              <a:rPr lang="en-US" dirty="0"/>
+              <a:t>)</a:t>
+            </a:r>
+            <a:r>
+              <a:rPr lang="en-US" sz="2800" dirty="0"/>
+              <a:t> </a:t>
+            </a:r>
+            <a:endParaRPr lang="en-US" sz="2800" dirty="0">
+              <a:highlight>
+                <a:srgbClr val="C0C0C0"/>
+              </a:highlight>
+              <a:ea typeface="Times New Roman" panose="02020603050405020304" pitchFamily="18" charset="0"/>
+            </a:endParaRPr>
+          </a:p>
+        </p:txBody>
+      </p:sp>
+      <p:sp>
+        <p:nvSpPr>
+          <p:cNvPr id="9" name="TextBox 8"/>
+          <p:cNvSpPr txBox="1"/>
+          <p:nvPr/>
+        </p:nvSpPr>
+        <p:spPr>
+          <a:xfrm>
+            <a:off x="130629" y="6397228"/>
+            <a:ext cx="4911634" cy="338554"/>
+          </a:xfrm>
+          <a:prstGeom prst="rect">
+            <a:avLst/>
+          </a:prstGeom>
+          <a:noFill/>
+        </p:spPr>
+        <p:txBody>
+          <a:bodyPr wrap="square" rtlCol="0">
+            <a:spAutoFit/>
+          </a:bodyPr>
+          <a:lstStyle/>
+          <a:p>
+            <a:r>
+              <a:rPr lang="en-US" sz="1600" i="1" dirty="0">
+                <a:solidFill>
+                  <a:schemeClr val="bg1"/>
+                </a:solidFill>
+              </a:rPr>
+              <a:t>Office of Institutional Research</a:t>
+            </a:r>
+          </a:p>
+        </p:txBody>
+      </p:sp>
+      <p:pic>
+        <p:nvPicPr>
+          <p:cNvPr id="7" name="Picture 6"/>
+          <p:cNvPicPr>
+            <a:picLocks noChangeAspect="1"/>
+          </p:cNvPicPr>
+          <p:nvPr/>
+        </p:nvPicPr>
+        <p:blipFill>
+          <a:blip r:embed="rId3" cstate="screen">
+            <a:extLst>
+              <a:ext uri="{28A0092B-C50C-407E-A947-70E740481C1C}">
+                <a14:useLocalDpi xmlns:a14="http://schemas.microsoft.com/office/drawing/2010/main"/>
+              </a:ext>
+            </a:extLst>
+          </a:blip>
+          <a:stretch>
+            <a:fillRect/>
+          </a:stretch>
+        </p:blipFill>
+        <p:spPr>
+          <a:xfrm>
+            <a:off x="8582526" y="216624"/>
+            <a:ext cx="3352800" cy="452628"/>
+          </a:xfrm>
+          <a:prstGeom prst="rect">
+            <a:avLst/>
+          </a:prstGeom>
+        </p:spPr>
+      </p:pic>
+    </p:spTree>
+    <p:extLst>
+      <p:ext uri="{BB962C8B-B14F-4D97-AF65-F5344CB8AC3E}">
+        <p14:creationId xmlns:p14="http://schemas.microsoft.com/office/powerpoint/2010/main" val="1581032544"/>
       </p:ext>
     </p:extLst>
   </p:cSld>
@@ -11305,11 +13970,11 @@
               </a:lnSpc>
             </a:pPr>
             <a:r>
-              <a:rPr lang="en-US" sz="4400" dirty="0"/>
+              <a:rPr lang="en-US" sz="4800" dirty="0"/>
               <a:t>Do You Git It Now?</a:t>
             </a:r>
             <a:br>
-              <a:rPr lang="en-US" dirty="0">
+              <a:rPr lang="en-US" sz="8800" dirty="0">
                 <a:solidFill>
                   <a:schemeClr val="tx1"/>
                 </a:solidFill>
@@ -11317,10 +13982,10 @@
               </a:rPr>
             </a:br>
             <a:r>
-              <a:rPr lang="en-US" sz="3200" dirty="0"/>
+              <a:rPr lang="en-US" sz="3600" dirty="0"/>
               <a:t>Version Control &amp; Collaboration with Git &amp; GitHub</a:t>
             </a:r>
-            <a:endParaRPr lang="en-US" sz="3200" dirty="0">
+            <a:endParaRPr lang="en-US" sz="3600" dirty="0">
               <a:solidFill>
                 <a:schemeClr val="tx1"/>
               </a:solidFill>
@@ -11470,6 +14135,1104 @@
     <p:extLst>
       <p:ext uri="{BB962C8B-B14F-4D97-AF65-F5344CB8AC3E}">
         <p14:creationId xmlns:p14="http://schemas.microsoft.com/office/powerpoint/2010/main" val="1376181193"/>
+      </p:ext>
+    </p:extLst>
+  </p:cSld>
+  <p:clrMapOvr>
+    <a:masterClrMapping/>
+  </p:clrMapOvr>
+</p:sld>
+</file>
+
+<file path=ppt/slides/slide20.xml><?xml version="1.0" encoding="utf-8"?>
+<p:sld xmlns:a="http://schemas.openxmlformats.org/drawingml/2006/main" xmlns:r="http://schemas.openxmlformats.org/officeDocument/2006/relationships" xmlns:p="http://schemas.openxmlformats.org/presentationml/2006/main">
+  <p:cSld>
+    <p:spTree>
+      <p:nvGrpSpPr>
+        <p:cNvPr id="1" name=""/>
+        <p:cNvGrpSpPr/>
+        <p:nvPr/>
+      </p:nvGrpSpPr>
+      <p:grpSpPr>
+        <a:xfrm>
+          <a:off x="0" y="0"/>
+          <a:ext cx="0" cy="0"/>
+          <a:chOff x="0" y="0"/>
+          <a:chExt cx="0" cy="0"/>
+        </a:xfrm>
+      </p:grpSpPr>
+      <p:sp>
+        <p:nvSpPr>
+          <p:cNvPr id="9218" name="Title 1"/>
+          <p:cNvSpPr>
+            <a:spLocks noGrp="1"/>
+          </p:cNvSpPr>
+          <p:nvPr>
+            <p:ph type="title"/>
+          </p:nvPr>
+        </p:nvSpPr>
+        <p:spPr/>
+        <p:txBody>
+          <a:bodyPr anchor="b">
+            <a:noAutofit/>
+          </a:bodyPr>
+          <a:lstStyle/>
+          <a:p>
+            <a:r>
+              <a:rPr lang="en-US" sz="3200" b="1" dirty="0">
+                <a:solidFill>
+                  <a:schemeClr val="accent2"/>
+                </a:solidFill>
+                <a:latin typeface="+mn-lt"/>
+              </a:rPr>
+              <a:t>Title</a:t>
+            </a:r>
+          </a:p>
+        </p:txBody>
+      </p:sp>
+      <p:sp>
+        <p:nvSpPr>
+          <p:cNvPr id="2" name="Content Placeholder 1">
+            <a:extLst>
+              <a:ext uri="{FF2B5EF4-FFF2-40B4-BE49-F238E27FC236}">
+                <a16:creationId xmlns:a16="http://schemas.microsoft.com/office/drawing/2014/main" id="{27D0C661-EDC7-964F-9BD3-F8C1B1CD48B7}"/>
+              </a:ext>
+            </a:extLst>
+          </p:cNvPr>
+          <p:cNvSpPr>
+            <a:spLocks noGrp="1"/>
+          </p:cNvSpPr>
+          <p:nvPr>
+            <p:ph idx="1"/>
+          </p:nvPr>
+        </p:nvSpPr>
+        <p:spPr/>
+        <p:txBody>
+          <a:bodyPr>
+            <a:normAutofit/>
+          </a:bodyPr>
+          <a:lstStyle/>
+          <a:p>
+            <a:pPr marL="0" indent="0">
+              <a:lnSpc>
+                <a:spcPct val="100000"/>
+              </a:lnSpc>
+              <a:spcBef>
+                <a:spcPts val="0"/>
+              </a:spcBef>
+              <a:spcAft>
+                <a:spcPts val="1200"/>
+              </a:spcAft>
+              <a:buNone/>
+            </a:pPr>
+            <a:r>
+              <a:rPr lang="en-US" sz="2800" dirty="0"/>
+              <a:t>Text</a:t>
+            </a:r>
+          </a:p>
+          <a:p>
+            <a:pPr marL="457200" indent="-222250">
+              <a:lnSpc>
+                <a:spcPct val="100000"/>
+              </a:lnSpc>
+              <a:spcBef>
+                <a:spcPts val="0"/>
+              </a:spcBef>
+              <a:spcAft>
+                <a:spcPts val="1200"/>
+              </a:spcAft>
+              <a:buFont typeface="Arial" panose="020B0604020202020204" pitchFamily="34" charset="0"/>
+              <a:buChar char="•"/>
+            </a:pPr>
+            <a:r>
+              <a:rPr lang="en-US" sz="2800" dirty="0"/>
+              <a:t>Bullet list </a:t>
+            </a:r>
+          </a:p>
+        </p:txBody>
+      </p:sp>
+      <p:sp>
+        <p:nvSpPr>
+          <p:cNvPr id="9" name="TextBox 8"/>
+          <p:cNvSpPr txBox="1"/>
+          <p:nvPr/>
+        </p:nvSpPr>
+        <p:spPr>
+          <a:xfrm>
+            <a:off x="130629" y="6397228"/>
+            <a:ext cx="4911634" cy="338554"/>
+          </a:xfrm>
+          <a:prstGeom prst="rect">
+            <a:avLst/>
+          </a:prstGeom>
+          <a:noFill/>
+        </p:spPr>
+        <p:txBody>
+          <a:bodyPr wrap="square" rtlCol="0">
+            <a:spAutoFit/>
+          </a:bodyPr>
+          <a:lstStyle/>
+          <a:p>
+            <a:r>
+              <a:rPr lang="en-US" sz="1600" i="1" dirty="0">
+                <a:solidFill>
+                  <a:schemeClr val="bg1"/>
+                </a:solidFill>
+              </a:rPr>
+              <a:t>Office of Institutional Research</a:t>
+            </a:r>
+          </a:p>
+        </p:txBody>
+      </p:sp>
+      <p:pic>
+        <p:nvPicPr>
+          <p:cNvPr id="7" name="Picture 6"/>
+          <p:cNvPicPr>
+            <a:picLocks noChangeAspect="1"/>
+          </p:cNvPicPr>
+          <p:nvPr/>
+        </p:nvPicPr>
+        <p:blipFill>
+          <a:blip r:embed="rId3" cstate="screen">
+            <a:extLst>
+              <a:ext uri="{28A0092B-C50C-407E-A947-70E740481C1C}">
+                <a14:useLocalDpi xmlns:a14="http://schemas.microsoft.com/office/drawing/2010/main"/>
+              </a:ext>
+            </a:extLst>
+          </a:blip>
+          <a:stretch>
+            <a:fillRect/>
+          </a:stretch>
+        </p:blipFill>
+        <p:spPr>
+          <a:xfrm>
+            <a:off x="8582526" y="216624"/>
+            <a:ext cx="3352800" cy="452628"/>
+          </a:xfrm>
+          <a:prstGeom prst="rect">
+            <a:avLst/>
+          </a:prstGeom>
+        </p:spPr>
+      </p:pic>
+    </p:spTree>
+    <p:extLst>
+      <p:ext uri="{BB962C8B-B14F-4D97-AF65-F5344CB8AC3E}">
+        <p14:creationId xmlns:p14="http://schemas.microsoft.com/office/powerpoint/2010/main" val="3186026219"/>
+      </p:ext>
+    </p:extLst>
+  </p:cSld>
+  <p:clrMapOvr>
+    <a:masterClrMapping/>
+  </p:clrMapOvr>
+</p:sld>
+</file>
+
+<file path=ppt/slides/slide21.xml><?xml version="1.0" encoding="utf-8"?>
+<p:sld xmlns:a="http://schemas.openxmlformats.org/drawingml/2006/main" xmlns:r="http://schemas.openxmlformats.org/officeDocument/2006/relationships" xmlns:p="http://schemas.openxmlformats.org/presentationml/2006/main">
+  <p:cSld>
+    <p:spTree>
+      <p:nvGrpSpPr>
+        <p:cNvPr id="1" name=""/>
+        <p:cNvGrpSpPr/>
+        <p:nvPr/>
+      </p:nvGrpSpPr>
+      <p:grpSpPr>
+        <a:xfrm>
+          <a:off x="0" y="0"/>
+          <a:ext cx="0" cy="0"/>
+          <a:chOff x="0" y="0"/>
+          <a:chExt cx="0" cy="0"/>
+        </a:xfrm>
+      </p:grpSpPr>
+      <p:sp>
+        <p:nvSpPr>
+          <p:cNvPr id="9218" name="Title 1"/>
+          <p:cNvSpPr>
+            <a:spLocks noGrp="1"/>
+          </p:cNvSpPr>
+          <p:nvPr>
+            <p:ph type="title"/>
+          </p:nvPr>
+        </p:nvSpPr>
+        <p:spPr/>
+        <p:txBody>
+          <a:bodyPr anchor="b">
+            <a:noAutofit/>
+          </a:bodyPr>
+          <a:lstStyle/>
+          <a:p>
+            <a:r>
+              <a:rPr lang="en-US" sz="3200" b="1" dirty="0">
+                <a:solidFill>
+                  <a:schemeClr val="accent2"/>
+                </a:solidFill>
+                <a:latin typeface="+mn-lt"/>
+              </a:rPr>
+              <a:t>Title</a:t>
+            </a:r>
+          </a:p>
+        </p:txBody>
+      </p:sp>
+      <p:sp>
+        <p:nvSpPr>
+          <p:cNvPr id="2" name="Content Placeholder 1">
+            <a:extLst>
+              <a:ext uri="{FF2B5EF4-FFF2-40B4-BE49-F238E27FC236}">
+                <a16:creationId xmlns:a16="http://schemas.microsoft.com/office/drawing/2014/main" id="{27D0C661-EDC7-964F-9BD3-F8C1B1CD48B7}"/>
+              </a:ext>
+            </a:extLst>
+          </p:cNvPr>
+          <p:cNvSpPr>
+            <a:spLocks noGrp="1"/>
+          </p:cNvSpPr>
+          <p:nvPr>
+            <p:ph idx="1"/>
+          </p:nvPr>
+        </p:nvSpPr>
+        <p:spPr/>
+        <p:txBody>
+          <a:bodyPr>
+            <a:normAutofit/>
+          </a:bodyPr>
+          <a:lstStyle/>
+          <a:p>
+            <a:pPr marL="0" indent="0">
+              <a:lnSpc>
+                <a:spcPct val="100000"/>
+              </a:lnSpc>
+              <a:spcBef>
+                <a:spcPts val="0"/>
+              </a:spcBef>
+              <a:spcAft>
+                <a:spcPts val="1200"/>
+              </a:spcAft>
+              <a:buNone/>
+            </a:pPr>
+            <a:r>
+              <a:rPr lang="en-US" sz="2800" dirty="0"/>
+              <a:t>Text</a:t>
+            </a:r>
+          </a:p>
+          <a:p>
+            <a:pPr marL="457200" indent="-222250">
+              <a:lnSpc>
+                <a:spcPct val="100000"/>
+              </a:lnSpc>
+              <a:spcBef>
+                <a:spcPts val="0"/>
+              </a:spcBef>
+              <a:spcAft>
+                <a:spcPts val="1200"/>
+              </a:spcAft>
+              <a:buFont typeface="Arial" panose="020B0604020202020204" pitchFamily="34" charset="0"/>
+              <a:buChar char="•"/>
+            </a:pPr>
+            <a:r>
+              <a:rPr lang="en-US" sz="2800" dirty="0"/>
+              <a:t>Bullet list </a:t>
+            </a:r>
+          </a:p>
+        </p:txBody>
+      </p:sp>
+      <p:sp>
+        <p:nvSpPr>
+          <p:cNvPr id="9" name="TextBox 8"/>
+          <p:cNvSpPr txBox="1"/>
+          <p:nvPr/>
+        </p:nvSpPr>
+        <p:spPr>
+          <a:xfrm>
+            <a:off x="130629" y="6397228"/>
+            <a:ext cx="4911634" cy="338554"/>
+          </a:xfrm>
+          <a:prstGeom prst="rect">
+            <a:avLst/>
+          </a:prstGeom>
+          <a:noFill/>
+        </p:spPr>
+        <p:txBody>
+          <a:bodyPr wrap="square" rtlCol="0">
+            <a:spAutoFit/>
+          </a:bodyPr>
+          <a:lstStyle/>
+          <a:p>
+            <a:r>
+              <a:rPr lang="en-US" sz="1600" i="1" dirty="0">
+                <a:solidFill>
+                  <a:schemeClr val="bg1"/>
+                </a:solidFill>
+              </a:rPr>
+              <a:t>Office of Institutional Research</a:t>
+            </a:r>
+          </a:p>
+        </p:txBody>
+      </p:sp>
+      <p:pic>
+        <p:nvPicPr>
+          <p:cNvPr id="7" name="Picture 6"/>
+          <p:cNvPicPr>
+            <a:picLocks noChangeAspect="1"/>
+          </p:cNvPicPr>
+          <p:nvPr/>
+        </p:nvPicPr>
+        <p:blipFill>
+          <a:blip r:embed="rId3" cstate="screen">
+            <a:extLst>
+              <a:ext uri="{28A0092B-C50C-407E-A947-70E740481C1C}">
+                <a14:useLocalDpi xmlns:a14="http://schemas.microsoft.com/office/drawing/2010/main"/>
+              </a:ext>
+            </a:extLst>
+          </a:blip>
+          <a:stretch>
+            <a:fillRect/>
+          </a:stretch>
+        </p:blipFill>
+        <p:spPr>
+          <a:xfrm>
+            <a:off x="8582526" y="216624"/>
+            <a:ext cx="3352800" cy="452628"/>
+          </a:xfrm>
+          <a:prstGeom prst="rect">
+            <a:avLst/>
+          </a:prstGeom>
+        </p:spPr>
+      </p:pic>
+    </p:spTree>
+    <p:extLst>
+      <p:ext uri="{BB962C8B-B14F-4D97-AF65-F5344CB8AC3E}">
+        <p14:creationId xmlns:p14="http://schemas.microsoft.com/office/powerpoint/2010/main" val="3061898247"/>
+      </p:ext>
+    </p:extLst>
+  </p:cSld>
+  <p:clrMapOvr>
+    <a:masterClrMapping/>
+  </p:clrMapOvr>
+</p:sld>
+</file>
+
+<file path=ppt/slides/slide22.xml><?xml version="1.0" encoding="utf-8"?>
+<p:sld xmlns:a="http://schemas.openxmlformats.org/drawingml/2006/main" xmlns:r="http://schemas.openxmlformats.org/officeDocument/2006/relationships" xmlns:p="http://schemas.openxmlformats.org/presentationml/2006/main">
+  <p:cSld>
+    <p:spTree>
+      <p:nvGrpSpPr>
+        <p:cNvPr id="1" name=""/>
+        <p:cNvGrpSpPr/>
+        <p:nvPr/>
+      </p:nvGrpSpPr>
+      <p:grpSpPr>
+        <a:xfrm>
+          <a:off x="0" y="0"/>
+          <a:ext cx="0" cy="0"/>
+          <a:chOff x="0" y="0"/>
+          <a:chExt cx="0" cy="0"/>
+        </a:xfrm>
+      </p:grpSpPr>
+      <p:sp>
+        <p:nvSpPr>
+          <p:cNvPr id="9218" name="Title 1"/>
+          <p:cNvSpPr>
+            <a:spLocks noGrp="1"/>
+          </p:cNvSpPr>
+          <p:nvPr>
+            <p:ph type="title"/>
+          </p:nvPr>
+        </p:nvSpPr>
+        <p:spPr/>
+        <p:txBody>
+          <a:bodyPr anchor="b">
+            <a:noAutofit/>
+          </a:bodyPr>
+          <a:lstStyle/>
+          <a:p>
+            <a:r>
+              <a:rPr lang="en-US" sz="3200" b="1" dirty="0">
+                <a:solidFill>
+                  <a:schemeClr val="accent2"/>
+                </a:solidFill>
+                <a:latin typeface="+mn-lt"/>
+              </a:rPr>
+              <a:t>Title</a:t>
+            </a:r>
+          </a:p>
+        </p:txBody>
+      </p:sp>
+      <p:sp>
+        <p:nvSpPr>
+          <p:cNvPr id="2" name="Content Placeholder 1">
+            <a:extLst>
+              <a:ext uri="{FF2B5EF4-FFF2-40B4-BE49-F238E27FC236}">
+                <a16:creationId xmlns:a16="http://schemas.microsoft.com/office/drawing/2014/main" id="{27D0C661-EDC7-964F-9BD3-F8C1B1CD48B7}"/>
+              </a:ext>
+            </a:extLst>
+          </p:cNvPr>
+          <p:cNvSpPr>
+            <a:spLocks noGrp="1"/>
+          </p:cNvSpPr>
+          <p:nvPr>
+            <p:ph idx="1"/>
+          </p:nvPr>
+        </p:nvSpPr>
+        <p:spPr/>
+        <p:txBody>
+          <a:bodyPr>
+            <a:normAutofit/>
+          </a:bodyPr>
+          <a:lstStyle/>
+          <a:p>
+            <a:pPr marL="0" indent="0">
+              <a:lnSpc>
+                <a:spcPct val="100000"/>
+              </a:lnSpc>
+              <a:spcBef>
+                <a:spcPts val="0"/>
+              </a:spcBef>
+              <a:spcAft>
+                <a:spcPts val="1200"/>
+              </a:spcAft>
+              <a:buNone/>
+            </a:pPr>
+            <a:r>
+              <a:rPr lang="en-US" sz="2800" dirty="0"/>
+              <a:t>Text</a:t>
+            </a:r>
+          </a:p>
+          <a:p>
+            <a:pPr marL="457200" indent="-222250">
+              <a:lnSpc>
+                <a:spcPct val="100000"/>
+              </a:lnSpc>
+              <a:spcBef>
+                <a:spcPts val="0"/>
+              </a:spcBef>
+              <a:spcAft>
+                <a:spcPts val="1200"/>
+              </a:spcAft>
+              <a:buFont typeface="Arial" panose="020B0604020202020204" pitchFamily="34" charset="0"/>
+              <a:buChar char="•"/>
+            </a:pPr>
+            <a:r>
+              <a:rPr lang="en-US" sz="2800" dirty="0"/>
+              <a:t>Bullet list </a:t>
+            </a:r>
+          </a:p>
+        </p:txBody>
+      </p:sp>
+      <p:sp>
+        <p:nvSpPr>
+          <p:cNvPr id="9" name="TextBox 8"/>
+          <p:cNvSpPr txBox="1"/>
+          <p:nvPr/>
+        </p:nvSpPr>
+        <p:spPr>
+          <a:xfrm>
+            <a:off x="130629" y="6397228"/>
+            <a:ext cx="4911634" cy="338554"/>
+          </a:xfrm>
+          <a:prstGeom prst="rect">
+            <a:avLst/>
+          </a:prstGeom>
+          <a:noFill/>
+        </p:spPr>
+        <p:txBody>
+          <a:bodyPr wrap="square" rtlCol="0">
+            <a:spAutoFit/>
+          </a:bodyPr>
+          <a:lstStyle/>
+          <a:p>
+            <a:r>
+              <a:rPr lang="en-US" sz="1600" i="1" dirty="0">
+                <a:solidFill>
+                  <a:schemeClr val="bg1"/>
+                </a:solidFill>
+              </a:rPr>
+              <a:t>Office of Institutional Research</a:t>
+            </a:r>
+          </a:p>
+        </p:txBody>
+      </p:sp>
+      <p:pic>
+        <p:nvPicPr>
+          <p:cNvPr id="7" name="Picture 6"/>
+          <p:cNvPicPr>
+            <a:picLocks noChangeAspect="1"/>
+          </p:cNvPicPr>
+          <p:nvPr/>
+        </p:nvPicPr>
+        <p:blipFill>
+          <a:blip r:embed="rId3" cstate="screen">
+            <a:extLst>
+              <a:ext uri="{28A0092B-C50C-407E-A947-70E740481C1C}">
+                <a14:useLocalDpi xmlns:a14="http://schemas.microsoft.com/office/drawing/2010/main"/>
+              </a:ext>
+            </a:extLst>
+          </a:blip>
+          <a:stretch>
+            <a:fillRect/>
+          </a:stretch>
+        </p:blipFill>
+        <p:spPr>
+          <a:xfrm>
+            <a:off x="8582526" y="216624"/>
+            <a:ext cx="3352800" cy="452628"/>
+          </a:xfrm>
+          <a:prstGeom prst="rect">
+            <a:avLst/>
+          </a:prstGeom>
+        </p:spPr>
+      </p:pic>
+    </p:spTree>
+    <p:extLst>
+      <p:ext uri="{BB962C8B-B14F-4D97-AF65-F5344CB8AC3E}">
+        <p14:creationId xmlns:p14="http://schemas.microsoft.com/office/powerpoint/2010/main" val="1787191344"/>
+      </p:ext>
+    </p:extLst>
+  </p:cSld>
+  <p:clrMapOvr>
+    <a:masterClrMapping/>
+  </p:clrMapOvr>
+</p:sld>
+</file>
+
+<file path=ppt/slides/slide23.xml><?xml version="1.0" encoding="utf-8"?>
+<p:sld xmlns:a="http://schemas.openxmlformats.org/drawingml/2006/main" xmlns:r="http://schemas.openxmlformats.org/officeDocument/2006/relationships" xmlns:p="http://schemas.openxmlformats.org/presentationml/2006/main">
+  <p:cSld>
+    <p:spTree>
+      <p:nvGrpSpPr>
+        <p:cNvPr id="1" name=""/>
+        <p:cNvGrpSpPr/>
+        <p:nvPr/>
+      </p:nvGrpSpPr>
+      <p:grpSpPr>
+        <a:xfrm>
+          <a:off x="0" y="0"/>
+          <a:ext cx="0" cy="0"/>
+          <a:chOff x="0" y="0"/>
+          <a:chExt cx="0" cy="0"/>
+        </a:xfrm>
+      </p:grpSpPr>
+      <p:sp>
+        <p:nvSpPr>
+          <p:cNvPr id="9218" name="Title 1"/>
+          <p:cNvSpPr>
+            <a:spLocks noGrp="1"/>
+          </p:cNvSpPr>
+          <p:nvPr>
+            <p:ph type="title"/>
+          </p:nvPr>
+        </p:nvSpPr>
+        <p:spPr/>
+        <p:txBody>
+          <a:bodyPr anchor="b">
+            <a:noAutofit/>
+          </a:bodyPr>
+          <a:lstStyle/>
+          <a:p>
+            <a:r>
+              <a:rPr lang="en-US" sz="3200" b="1" dirty="0">
+                <a:solidFill>
+                  <a:schemeClr val="accent2"/>
+                </a:solidFill>
+                <a:latin typeface="+mn-lt"/>
+              </a:rPr>
+              <a:t>Title</a:t>
+            </a:r>
+          </a:p>
+        </p:txBody>
+      </p:sp>
+      <p:sp>
+        <p:nvSpPr>
+          <p:cNvPr id="2" name="Content Placeholder 1">
+            <a:extLst>
+              <a:ext uri="{FF2B5EF4-FFF2-40B4-BE49-F238E27FC236}">
+                <a16:creationId xmlns:a16="http://schemas.microsoft.com/office/drawing/2014/main" id="{27D0C661-EDC7-964F-9BD3-F8C1B1CD48B7}"/>
+              </a:ext>
+            </a:extLst>
+          </p:cNvPr>
+          <p:cNvSpPr>
+            <a:spLocks noGrp="1"/>
+          </p:cNvSpPr>
+          <p:nvPr>
+            <p:ph idx="1"/>
+          </p:nvPr>
+        </p:nvSpPr>
+        <p:spPr/>
+        <p:txBody>
+          <a:bodyPr>
+            <a:normAutofit/>
+          </a:bodyPr>
+          <a:lstStyle/>
+          <a:p>
+            <a:pPr marL="0" indent="0">
+              <a:lnSpc>
+                <a:spcPct val="100000"/>
+              </a:lnSpc>
+              <a:spcBef>
+                <a:spcPts val="0"/>
+              </a:spcBef>
+              <a:spcAft>
+                <a:spcPts val="1200"/>
+              </a:spcAft>
+              <a:buNone/>
+            </a:pPr>
+            <a:r>
+              <a:rPr lang="en-US" sz="2800" dirty="0"/>
+              <a:t>Text</a:t>
+            </a:r>
+          </a:p>
+          <a:p>
+            <a:pPr marL="457200" indent="-222250">
+              <a:lnSpc>
+                <a:spcPct val="100000"/>
+              </a:lnSpc>
+              <a:spcBef>
+                <a:spcPts val="0"/>
+              </a:spcBef>
+              <a:spcAft>
+                <a:spcPts val="1200"/>
+              </a:spcAft>
+              <a:buFont typeface="Arial" panose="020B0604020202020204" pitchFamily="34" charset="0"/>
+              <a:buChar char="•"/>
+            </a:pPr>
+            <a:r>
+              <a:rPr lang="en-US" sz="2800" dirty="0"/>
+              <a:t>Bullet list </a:t>
+            </a:r>
+          </a:p>
+        </p:txBody>
+      </p:sp>
+      <p:sp>
+        <p:nvSpPr>
+          <p:cNvPr id="9" name="TextBox 8"/>
+          <p:cNvSpPr txBox="1"/>
+          <p:nvPr/>
+        </p:nvSpPr>
+        <p:spPr>
+          <a:xfrm>
+            <a:off x="130629" y="6397228"/>
+            <a:ext cx="4911634" cy="338554"/>
+          </a:xfrm>
+          <a:prstGeom prst="rect">
+            <a:avLst/>
+          </a:prstGeom>
+          <a:noFill/>
+        </p:spPr>
+        <p:txBody>
+          <a:bodyPr wrap="square" rtlCol="0">
+            <a:spAutoFit/>
+          </a:bodyPr>
+          <a:lstStyle/>
+          <a:p>
+            <a:r>
+              <a:rPr lang="en-US" sz="1600" i="1" dirty="0">
+                <a:solidFill>
+                  <a:schemeClr val="bg1"/>
+                </a:solidFill>
+              </a:rPr>
+              <a:t>Office of Institutional Research</a:t>
+            </a:r>
+          </a:p>
+        </p:txBody>
+      </p:sp>
+      <p:pic>
+        <p:nvPicPr>
+          <p:cNvPr id="7" name="Picture 6"/>
+          <p:cNvPicPr>
+            <a:picLocks noChangeAspect="1"/>
+          </p:cNvPicPr>
+          <p:nvPr/>
+        </p:nvPicPr>
+        <p:blipFill>
+          <a:blip r:embed="rId3" cstate="screen">
+            <a:extLst>
+              <a:ext uri="{28A0092B-C50C-407E-A947-70E740481C1C}">
+                <a14:useLocalDpi xmlns:a14="http://schemas.microsoft.com/office/drawing/2010/main"/>
+              </a:ext>
+            </a:extLst>
+          </a:blip>
+          <a:stretch>
+            <a:fillRect/>
+          </a:stretch>
+        </p:blipFill>
+        <p:spPr>
+          <a:xfrm>
+            <a:off x="8582526" y="216624"/>
+            <a:ext cx="3352800" cy="452628"/>
+          </a:xfrm>
+          <a:prstGeom prst="rect">
+            <a:avLst/>
+          </a:prstGeom>
+        </p:spPr>
+      </p:pic>
+    </p:spTree>
+    <p:extLst>
+      <p:ext uri="{BB962C8B-B14F-4D97-AF65-F5344CB8AC3E}">
+        <p14:creationId xmlns:p14="http://schemas.microsoft.com/office/powerpoint/2010/main" val="2899492117"/>
+      </p:ext>
+    </p:extLst>
+  </p:cSld>
+  <p:clrMapOvr>
+    <a:masterClrMapping/>
+  </p:clrMapOvr>
+</p:sld>
+</file>
+
+<file path=ppt/slides/slide24.xml><?xml version="1.0" encoding="utf-8"?>
+<p:sld xmlns:a="http://schemas.openxmlformats.org/drawingml/2006/main" xmlns:r="http://schemas.openxmlformats.org/officeDocument/2006/relationships" xmlns:p="http://schemas.openxmlformats.org/presentationml/2006/main">
+  <p:cSld>
+    <p:spTree>
+      <p:nvGrpSpPr>
+        <p:cNvPr id="1" name=""/>
+        <p:cNvGrpSpPr/>
+        <p:nvPr/>
+      </p:nvGrpSpPr>
+      <p:grpSpPr>
+        <a:xfrm>
+          <a:off x="0" y="0"/>
+          <a:ext cx="0" cy="0"/>
+          <a:chOff x="0" y="0"/>
+          <a:chExt cx="0" cy="0"/>
+        </a:xfrm>
+      </p:grpSpPr>
+      <p:sp>
+        <p:nvSpPr>
+          <p:cNvPr id="9218" name="Title 1"/>
+          <p:cNvSpPr>
+            <a:spLocks noGrp="1"/>
+          </p:cNvSpPr>
+          <p:nvPr>
+            <p:ph type="title"/>
+          </p:nvPr>
+        </p:nvSpPr>
+        <p:spPr/>
+        <p:txBody>
+          <a:bodyPr anchor="b">
+            <a:noAutofit/>
+          </a:bodyPr>
+          <a:lstStyle/>
+          <a:p>
+            <a:r>
+              <a:rPr lang="en-US" sz="3200" b="1" dirty="0">
+                <a:solidFill>
+                  <a:schemeClr val="accent2"/>
+                </a:solidFill>
+                <a:latin typeface="+mn-lt"/>
+              </a:rPr>
+              <a:t>Title</a:t>
+            </a:r>
+          </a:p>
+        </p:txBody>
+      </p:sp>
+      <p:sp>
+        <p:nvSpPr>
+          <p:cNvPr id="2" name="Content Placeholder 1">
+            <a:extLst>
+              <a:ext uri="{FF2B5EF4-FFF2-40B4-BE49-F238E27FC236}">
+                <a16:creationId xmlns:a16="http://schemas.microsoft.com/office/drawing/2014/main" id="{27D0C661-EDC7-964F-9BD3-F8C1B1CD48B7}"/>
+              </a:ext>
+            </a:extLst>
+          </p:cNvPr>
+          <p:cNvSpPr>
+            <a:spLocks noGrp="1"/>
+          </p:cNvSpPr>
+          <p:nvPr>
+            <p:ph idx="1"/>
+          </p:nvPr>
+        </p:nvSpPr>
+        <p:spPr/>
+        <p:txBody>
+          <a:bodyPr>
+            <a:normAutofit/>
+          </a:bodyPr>
+          <a:lstStyle/>
+          <a:p>
+            <a:pPr marL="0" indent="0">
+              <a:lnSpc>
+                <a:spcPct val="100000"/>
+              </a:lnSpc>
+              <a:spcBef>
+                <a:spcPts val="0"/>
+              </a:spcBef>
+              <a:spcAft>
+                <a:spcPts val="1200"/>
+              </a:spcAft>
+              <a:buNone/>
+            </a:pPr>
+            <a:r>
+              <a:rPr lang="en-US" sz="2800" dirty="0"/>
+              <a:t>Text</a:t>
+            </a:r>
+          </a:p>
+          <a:p>
+            <a:pPr marL="457200" indent="-222250">
+              <a:lnSpc>
+                <a:spcPct val="100000"/>
+              </a:lnSpc>
+              <a:spcBef>
+                <a:spcPts val="0"/>
+              </a:spcBef>
+              <a:spcAft>
+                <a:spcPts val="1200"/>
+              </a:spcAft>
+              <a:buFont typeface="Arial" panose="020B0604020202020204" pitchFamily="34" charset="0"/>
+              <a:buChar char="•"/>
+            </a:pPr>
+            <a:r>
+              <a:rPr lang="en-US" sz="2800" dirty="0"/>
+              <a:t>Bullet list </a:t>
+            </a:r>
+          </a:p>
+        </p:txBody>
+      </p:sp>
+      <p:sp>
+        <p:nvSpPr>
+          <p:cNvPr id="9" name="TextBox 8"/>
+          <p:cNvSpPr txBox="1"/>
+          <p:nvPr/>
+        </p:nvSpPr>
+        <p:spPr>
+          <a:xfrm>
+            <a:off x="130629" y="6397228"/>
+            <a:ext cx="4911634" cy="338554"/>
+          </a:xfrm>
+          <a:prstGeom prst="rect">
+            <a:avLst/>
+          </a:prstGeom>
+          <a:noFill/>
+        </p:spPr>
+        <p:txBody>
+          <a:bodyPr wrap="square" rtlCol="0">
+            <a:spAutoFit/>
+          </a:bodyPr>
+          <a:lstStyle/>
+          <a:p>
+            <a:r>
+              <a:rPr lang="en-US" sz="1600" i="1" dirty="0">
+                <a:solidFill>
+                  <a:schemeClr val="bg1"/>
+                </a:solidFill>
+              </a:rPr>
+              <a:t>Office of Institutional Research</a:t>
+            </a:r>
+          </a:p>
+        </p:txBody>
+      </p:sp>
+      <p:pic>
+        <p:nvPicPr>
+          <p:cNvPr id="7" name="Picture 6"/>
+          <p:cNvPicPr>
+            <a:picLocks noChangeAspect="1"/>
+          </p:cNvPicPr>
+          <p:nvPr/>
+        </p:nvPicPr>
+        <p:blipFill>
+          <a:blip r:embed="rId3" cstate="screen">
+            <a:extLst>
+              <a:ext uri="{28A0092B-C50C-407E-A947-70E740481C1C}">
+                <a14:useLocalDpi xmlns:a14="http://schemas.microsoft.com/office/drawing/2010/main"/>
+              </a:ext>
+            </a:extLst>
+          </a:blip>
+          <a:stretch>
+            <a:fillRect/>
+          </a:stretch>
+        </p:blipFill>
+        <p:spPr>
+          <a:xfrm>
+            <a:off x="8582526" y="216624"/>
+            <a:ext cx="3352800" cy="452628"/>
+          </a:xfrm>
+          <a:prstGeom prst="rect">
+            <a:avLst/>
+          </a:prstGeom>
+        </p:spPr>
+      </p:pic>
+    </p:spTree>
+    <p:extLst>
+      <p:ext uri="{BB962C8B-B14F-4D97-AF65-F5344CB8AC3E}">
+        <p14:creationId xmlns:p14="http://schemas.microsoft.com/office/powerpoint/2010/main" val="2179258986"/>
+      </p:ext>
+    </p:extLst>
+  </p:cSld>
+  <p:clrMapOvr>
+    <a:masterClrMapping/>
+  </p:clrMapOvr>
+</p:sld>
+</file>
+
+<file path=ppt/slides/slide25.xml><?xml version="1.0" encoding="utf-8"?>
+<p:sld xmlns:a="http://schemas.openxmlformats.org/drawingml/2006/main" xmlns:r="http://schemas.openxmlformats.org/officeDocument/2006/relationships" xmlns:p="http://schemas.openxmlformats.org/presentationml/2006/main">
+  <p:cSld>
+    <p:spTree>
+      <p:nvGrpSpPr>
+        <p:cNvPr id="1" name=""/>
+        <p:cNvGrpSpPr/>
+        <p:nvPr/>
+      </p:nvGrpSpPr>
+      <p:grpSpPr>
+        <a:xfrm>
+          <a:off x="0" y="0"/>
+          <a:ext cx="0" cy="0"/>
+          <a:chOff x="0" y="0"/>
+          <a:chExt cx="0" cy="0"/>
+        </a:xfrm>
+      </p:grpSpPr>
+      <p:sp>
+        <p:nvSpPr>
+          <p:cNvPr id="9218" name="Title 1"/>
+          <p:cNvSpPr>
+            <a:spLocks noGrp="1"/>
+          </p:cNvSpPr>
+          <p:nvPr>
+            <p:ph type="title"/>
+          </p:nvPr>
+        </p:nvSpPr>
+        <p:spPr/>
+        <p:txBody>
+          <a:bodyPr anchor="b">
+            <a:noAutofit/>
+          </a:bodyPr>
+          <a:lstStyle/>
+          <a:p>
+            <a:r>
+              <a:rPr lang="en-US" sz="3200" b="1" dirty="0">
+                <a:solidFill>
+                  <a:schemeClr val="accent2"/>
+                </a:solidFill>
+                <a:latin typeface="+mn-lt"/>
+              </a:rPr>
+              <a:t>Title</a:t>
+            </a:r>
+          </a:p>
+        </p:txBody>
+      </p:sp>
+      <p:sp>
+        <p:nvSpPr>
+          <p:cNvPr id="2" name="Content Placeholder 1">
+            <a:extLst>
+              <a:ext uri="{FF2B5EF4-FFF2-40B4-BE49-F238E27FC236}">
+                <a16:creationId xmlns:a16="http://schemas.microsoft.com/office/drawing/2014/main" id="{27D0C661-EDC7-964F-9BD3-F8C1B1CD48B7}"/>
+              </a:ext>
+            </a:extLst>
+          </p:cNvPr>
+          <p:cNvSpPr>
+            <a:spLocks noGrp="1"/>
+          </p:cNvSpPr>
+          <p:nvPr>
+            <p:ph idx="1"/>
+          </p:nvPr>
+        </p:nvSpPr>
+        <p:spPr/>
+        <p:txBody>
+          <a:bodyPr>
+            <a:normAutofit/>
+          </a:bodyPr>
+          <a:lstStyle/>
+          <a:p>
+            <a:pPr marL="0" indent="0">
+              <a:lnSpc>
+                <a:spcPct val="100000"/>
+              </a:lnSpc>
+              <a:spcBef>
+                <a:spcPts val="0"/>
+              </a:spcBef>
+              <a:spcAft>
+                <a:spcPts val="1200"/>
+              </a:spcAft>
+              <a:buNone/>
+            </a:pPr>
+            <a:r>
+              <a:rPr lang="en-US" sz="2800" dirty="0"/>
+              <a:t>Text</a:t>
+            </a:r>
+          </a:p>
+          <a:p>
+            <a:pPr marL="457200" indent="-222250">
+              <a:lnSpc>
+                <a:spcPct val="100000"/>
+              </a:lnSpc>
+              <a:spcBef>
+                <a:spcPts val="0"/>
+              </a:spcBef>
+              <a:spcAft>
+                <a:spcPts val="1200"/>
+              </a:spcAft>
+              <a:buFont typeface="Arial" panose="020B0604020202020204" pitchFamily="34" charset="0"/>
+              <a:buChar char="•"/>
+            </a:pPr>
+            <a:r>
+              <a:rPr lang="en-US" sz="2800" dirty="0"/>
+              <a:t>Bullet list </a:t>
+            </a:r>
+          </a:p>
+        </p:txBody>
+      </p:sp>
+      <p:sp>
+        <p:nvSpPr>
+          <p:cNvPr id="9" name="TextBox 8"/>
+          <p:cNvSpPr txBox="1"/>
+          <p:nvPr/>
+        </p:nvSpPr>
+        <p:spPr>
+          <a:xfrm>
+            <a:off x="130629" y="6397228"/>
+            <a:ext cx="4911634" cy="338554"/>
+          </a:xfrm>
+          <a:prstGeom prst="rect">
+            <a:avLst/>
+          </a:prstGeom>
+          <a:noFill/>
+        </p:spPr>
+        <p:txBody>
+          <a:bodyPr wrap="square" rtlCol="0">
+            <a:spAutoFit/>
+          </a:bodyPr>
+          <a:lstStyle/>
+          <a:p>
+            <a:r>
+              <a:rPr lang="en-US" sz="1600" i="1" dirty="0">
+                <a:solidFill>
+                  <a:schemeClr val="bg1"/>
+                </a:solidFill>
+              </a:rPr>
+              <a:t>Office of Institutional Research</a:t>
+            </a:r>
+          </a:p>
+        </p:txBody>
+      </p:sp>
+      <p:pic>
+        <p:nvPicPr>
+          <p:cNvPr id="7" name="Picture 6"/>
+          <p:cNvPicPr>
+            <a:picLocks noChangeAspect="1"/>
+          </p:cNvPicPr>
+          <p:nvPr/>
+        </p:nvPicPr>
+        <p:blipFill>
+          <a:blip r:embed="rId3" cstate="screen">
+            <a:extLst>
+              <a:ext uri="{28A0092B-C50C-407E-A947-70E740481C1C}">
+                <a14:useLocalDpi xmlns:a14="http://schemas.microsoft.com/office/drawing/2010/main"/>
+              </a:ext>
+            </a:extLst>
+          </a:blip>
+          <a:stretch>
+            <a:fillRect/>
+          </a:stretch>
+        </p:blipFill>
+        <p:spPr>
+          <a:xfrm>
+            <a:off x="8582526" y="216624"/>
+            <a:ext cx="3352800" cy="452628"/>
+          </a:xfrm>
+          <a:prstGeom prst="rect">
+            <a:avLst/>
+          </a:prstGeom>
+        </p:spPr>
+      </p:pic>
+    </p:spTree>
+    <p:extLst>
+      <p:ext uri="{BB962C8B-B14F-4D97-AF65-F5344CB8AC3E}">
+        <p14:creationId xmlns:p14="http://schemas.microsoft.com/office/powerpoint/2010/main" val="3388128426"/>
       </p:ext>
     </p:extLst>
   </p:cSld>

</xml_diff>

<commit_message>
add section on undoing commits
</commit_message>
<xml_diff>
--- a/Do You Git It Now.pptx
+++ b/Do You Git It Now.pptx
@@ -5,10 +5,10 @@
     <p:sldMasterId id="2147483930" r:id="rId1"/>
   </p:sldMasterIdLst>
   <p:notesMasterIdLst>
-    <p:notesMasterId r:id="rId36"/>
+    <p:notesMasterId r:id="rId39"/>
   </p:notesMasterIdLst>
   <p:handoutMasterIdLst>
-    <p:handoutMasterId r:id="rId37"/>
+    <p:handoutMasterId r:id="rId40"/>
   </p:handoutMasterIdLst>
   <p:sldIdLst>
     <p:sldId id="608" r:id="rId2"/>
@@ -36,15 +36,18 @@
     <p:sldId id="645" r:id="rId24"/>
     <p:sldId id="646" r:id="rId25"/>
     <p:sldId id="651" r:id="rId26"/>
-    <p:sldId id="647" r:id="rId27"/>
-    <p:sldId id="636" r:id="rId28"/>
-    <p:sldId id="649" r:id="rId29"/>
-    <p:sldId id="648" r:id="rId30"/>
-    <p:sldId id="634" r:id="rId31"/>
-    <p:sldId id="637" r:id="rId32"/>
-    <p:sldId id="638" r:id="rId33"/>
-    <p:sldId id="639" r:id="rId34"/>
-    <p:sldId id="640" r:id="rId35"/>
+    <p:sldId id="652" r:id="rId27"/>
+    <p:sldId id="647" r:id="rId28"/>
+    <p:sldId id="636" r:id="rId29"/>
+    <p:sldId id="649" r:id="rId30"/>
+    <p:sldId id="653" r:id="rId31"/>
+    <p:sldId id="654" r:id="rId32"/>
+    <p:sldId id="648" r:id="rId33"/>
+    <p:sldId id="634" r:id="rId34"/>
+    <p:sldId id="637" r:id="rId35"/>
+    <p:sldId id="638" r:id="rId36"/>
+    <p:sldId id="639" r:id="rId37"/>
+    <p:sldId id="640" r:id="rId38"/>
   </p:sldIdLst>
   <p:sldSz cx="12192000" cy="6858000"/>
   <p:notesSz cx="7023100" cy="9309100"/>
@@ -3197,7 +3200,7 @@
                 </a:solidFill>
               </a:rPr>
               <a:pPr/>
-              <a:t>27</a:t>
+              <a:t>26</a:t>
             </a:fld>
             <a:endParaRPr lang="en-US" dirty="0">
               <a:solidFill>
@@ -3210,7 +3213,7 @@
     </p:spTree>
     <p:extLst>
       <p:ext uri="{BB962C8B-B14F-4D97-AF65-F5344CB8AC3E}">
-        <p14:creationId xmlns:p14="http://schemas.microsoft.com/office/powerpoint/2010/main" val="3888642721"/>
+        <p14:creationId xmlns:p14="http://schemas.microsoft.com/office/powerpoint/2010/main" val="2937502265"/>
       </p:ext>
     </p:extLst>
   </p:cSld>
@@ -3540,7 +3543,7 @@
     </p:spTree>
     <p:extLst>
       <p:ext uri="{BB962C8B-B14F-4D97-AF65-F5344CB8AC3E}">
-        <p14:creationId xmlns:p14="http://schemas.microsoft.com/office/powerpoint/2010/main" val="855328736"/>
+        <p14:creationId xmlns:p14="http://schemas.microsoft.com/office/powerpoint/2010/main" val="3888642721"/>
       </p:ext>
     </p:extLst>
   </p:cSld>
@@ -3773,7 +3776,7 @@
                 </a:solidFill>
               </a:rPr>
               <a:pPr/>
-              <a:t>30</a:t>
+              <a:t>29</a:t>
             </a:fld>
             <a:endParaRPr lang="en-US" dirty="0">
               <a:solidFill>
@@ -3786,7 +3789,7 @@
     </p:spTree>
     <p:extLst>
       <p:ext uri="{BB962C8B-B14F-4D97-AF65-F5344CB8AC3E}">
-        <p14:creationId xmlns:p14="http://schemas.microsoft.com/office/powerpoint/2010/main" val="1748964935"/>
+        <p14:creationId xmlns:p14="http://schemas.microsoft.com/office/powerpoint/2010/main" val="855328736"/>
       </p:ext>
     </p:extLst>
   </p:cSld>
@@ -4019,7 +4022,7 @@
                 </a:solidFill>
               </a:rPr>
               <a:pPr/>
-              <a:t>31</a:t>
+              <a:t>30</a:t>
             </a:fld>
             <a:endParaRPr lang="en-US" dirty="0">
               <a:solidFill>
@@ -4032,7 +4035,7 @@
     </p:spTree>
     <p:extLst>
       <p:ext uri="{BB962C8B-B14F-4D97-AF65-F5344CB8AC3E}">
-        <p14:creationId xmlns:p14="http://schemas.microsoft.com/office/powerpoint/2010/main" val="1347732777"/>
+        <p14:creationId xmlns:p14="http://schemas.microsoft.com/office/powerpoint/2010/main" val="2706726088"/>
       </p:ext>
     </p:extLst>
   </p:cSld>
@@ -4265,7 +4268,7 @@
                 </a:solidFill>
               </a:rPr>
               <a:pPr/>
-              <a:t>32</a:t>
+              <a:t>31</a:t>
             </a:fld>
             <a:endParaRPr lang="en-US" dirty="0">
               <a:solidFill>
@@ -4278,7 +4281,7 @@
     </p:spTree>
     <p:extLst>
       <p:ext uri="{BB962C8B-B14F-4D97-AF65-F5344CB8AC3E}">
-        <p14:creationId xmlns:p14="http://schemas.microsoft.com/office/powerpoint/2010/main" val="3311058406"/>
+        <p14:creationId xmlns:p14="http://schemas.microsoft.com/office/powerpoint/2010/main" val="2643407063"/>
       </p:ext>
     </p:extLst>
   </p:cSld>
@@ -4524,7 +4527,7 @@
     </p:spTree>
     <p:extLst>
       <p:ext uri="{BB962C8B-B14F-4D97-AF65-F5344CB8AC3E}">
-        <p14:creationId xmlns:p14="http://schemas.microsoft.com/office/powerpoint/2010/main" val="252828385"/>
+        <p14:creationId xmlns:p14="http://schemas.microsoft.com/office/powerpoint/2010/main" val="1748964935"/>
       </p:ext>
     </p:extLst>
   </p:cSld>
@@ -4758,6 +4761,744 @@
               </a:rPr>
               <a:pPr/>
               <a:t>34</a:t>
+            </a:fld>
+            <a:endParaRPr lang="en-US" dirty="0">
+              <a:solidFill>
+                <a:prstClr val="black"/>
+              </a:solidFill>
+            </a:endParaRPr>
+          </a:p>
+        </p:txBody>
+      </p:sp>
+    </p:spTree>
+    <p:extLst>
+      <p:ext uri="{BB962C8B-B14F-4D97-AF65-F5344CB8AC3E}">
+        <p14:creationId xmlns:p14="http://schemas.microsoft.com/office/powerpoint/2010/main" val="1347732777"/>
+      </p:ext>
+    </p:extLst>
+  </p:cSld>
+  <p:clrMapOvr>
+    <a:masterClrMapping/>
+  </p:clrMapOvr>
+</p:notes>
+</file>
+
+<file path=ppt/notesSlides/notesSlide26.xml><?xml version="1.0" encoding="utf-8"?>
+<p:notes xmlns:a="http://schemas.openxmlformats.org/drawingml/2006/main" xmlns:r="http://schemas.openxmlformats.org/officeDocument/2006/relationships" xmlns:p="http://schemas.openxmlformats.org/presentationml/2006/main">
+  <p:cSld>
+    <p:spTree>
+      <p:nvGrpSpPr>
+        <p:cNvPr id="1" name=""/>
+        <p:cNvGrpSpPr/>
+        <p:nvPr/>
+      </p:nvGrpSpPr>
+      <p:grpSpPr>
+        <a:xfrm>
+          <a:off x="0" y="0"/>
+          <a:ext cx="0" cy="0"/>
+          <a:chOff x="0" y="0"/>
+          <a:chExt cx="0" cy="0"/>
+        </a:xfrm>
+      </p:grpSpPr>
+      <p:sp>
+        <p:nvSpPr>
+          <p:cNvPr id="41986" name="Slide Image Placeholder 1"/>
+          <p:cNvSpPr>
+            <a:spLocks noGrp="1" noRot="1" noChangeAspect="1" noTextEdit="1"/>
+          </p:cNvSpPr>
+          <p:nvPr>
+            <p:ph type="sldImg"/>
+          </p:nvPr>
+        </p:nvSpPr>
+        <p:spPr>
+          <a:ln/>
+        </p:spPr>
+      </p:sp>
+      <p:sp>
+        <p:nvSpPr>
+          <p:cNvPr id="41987" name="Notes Placeholder 2"/>
+          <p:cNvSpPr>
+            <a:spLocks noGrp="1"/>
+          </p:cNvSpPr>
+          <p:nvPr>
+            <p:ph type="body" idx="1"/>
+          </p:nvPr>
+        </p:nvSpPr>
+        <p:spPr>
+          <a:noFill/>
+          <a:ln/>
+          <a:extLst>
+            <a:ext uri="{909E8E84-426E-40DD-AFC4-6F175D3DCCD1}">
+              <a14:hiddenFill xmlns:a14="http://schemas.microsoft.com/office/drawing/2010/main">
+                <a:solidFill>
+                  <a:srgbClr val="FFFFFF"/>
+                </a:solidFill>
+              </a14:hiddenFill>
+            </a:ext>
+            <a:ext uri="{91240B29-F687-4F45-9708-019B960494DF}">
+              <a14:hiddenLine xmlns:a14="http://schemas.microsoft.com/office/drawing/2010/main" w="9525">
+                <a:solidFill>
+                  <a:srgbClr val="000000"/>
+                </a:solidFill>
+                <a:miter lim="800000"/>
+                <a:headEnd/>
+                <a:tailEnd/>
+              </a14:hiddenLine>
+            </a:ext>
+          </a:extLst>
+        </p:spPr>
+        <p:txBody>
+          <a:bodyPr/>
+          <a:lstStyle/>
+          <a:p>
+            <a:pPr marL="102870" indent="0">
+              <a:spcBef>
+                <a:spcPts val="600"/>
+              </a:spcBef>
+              <a:buFont typeface="Arial" panose="020B0604020202020204" pitchFamily="34" charset="0"/>
+              <a:buNone/>
+            </a:pPr>
+            <a:endParaRPr lang="en-US" dirty="0"/>
+          </a:p>
+          <a:p>
+            <a:endParaRPr lang="en-US" dirty="0"/>
+          </a:p>
+        </p:txBody>
+      </p:sp>
+      <p:sp>
+        <p:nvSpPr>
+          <p:cNvPr id="41988" name="Slide Number Placeholder 3"/>
+          <p:cNvSpPr>
+            <a:spLocks noGrp="1"/>
+          </p:cNvSpPr>
+          <p:nvPr>
+            <p:ph type="sldNum" sz="quarter" idx="5"/>
+          </p:nvPr>
+        </p:nvSpPr>
+        <p:spPr>
+          <a:noFill/>
+          <a:ln/>
+          <a:extLst>
+            <a:ext uri="{909E8E84-426E-40DD-AFC4-6F175D3DCCD1}">
+              <a14:hiddenFill xmlns:a14="http://schemas.microsoft.com/office/drawing/2010/main">
+                <a:solidFill>
+                  <a:srgbClr val="FFFFFF"/>
+                </a:solidFill>
+              </a14:hiddenFill>
+            </a:ext>
+            <a:ext uri="{91240B29-F687-4F45-9708-019B960494DF}">
+              <a14:hiddenLine xmlns:a14="http://schemas.microsoft.com/office/drawing/2010/main" w="9525">
+                <a:solidFill>
+                  <a:srgbClr val="000000"/>
+                </a:solidFill>
+                <a:miter lim="800000"/>
+                <a:headEnd/>
+                <a:tailEnd/>
+              </a14:hiddenLine>
+            </a:ext>
+          </a:extLst>
+        </p:spPr>
+        <p:txBody>
+          <a:bodyPr/>
+          <a:lstStyle>
+            <a:lvl1pPr>
+              <a:defRPr>
+                <a:solidFill>
+                  <a:schemeClr val="tx1"/>
+                </a:solidFill>
+                <a:latin typeface="Arial" pitchFamily="34" charset="0"/>
+              </a:defRPr>
+            </a:lvl1pPr>
+            <a:lvl2pPr marL="752260" indent="-289331">
+              <a:defRPr>
+                <a:solidFill>
+                  <a:schemeClr val="tx1"/>
+                </a:solidFill>
+                <a:latin typeface="Arial" pitchFamily="34" charset="0"/>
+              </a:defRPr>
+            </a:lvl2pPr>
+            <a:lvl3pPr marL="1157324" indent="-231465">
+              <a:defRPr>
+                <a:solidFill>
+                  <a:schemeClr val="tx1"/>
+                </a:solidFill>
+                <a:latin typeface="Arial" pitchFamily="34" charset="0"/>
+              </a:defRPr>
+            </a:lvl3pPr>
+            <a:lvl4pPr marL="1620253" indent="-231465">
+              <a:defRPr>
+                <a:solidFill>
+                  <a:schemeClr val="tx1"/>
+                </a:solidFill>
+                <a:latin typeface="Arial" pitchFamily="34" charset="0"/>
+              </a:defRPr>
+            </a:lvl4pPr>
+            <a:lvl5pPr marL="2083181" indent="-231465">
+              <a:defRPr>
+                <a:solidFill>
+                  <a:schemeClr val="tx1"/>
+                </a:solidFill>
+                <a:latin typeface="Arial" pitchFamily="34" charset="0"/>
+              </a:defRPr>
+            </a:lvl5pPr>
+            <a:lvl6pPr marL="2546112" indent="-231465" eaLnBrk="0" fontAlgn="base" hangingPunct="0">
+              <a:spcBef>
+                <a:spcPct val="0"/>
+              </a:spcBef>
+              <a:spcAft>
+                <a:spcPct val="0"/>
+              </a:spcAft>
+              <a:defRPr>
+                <a:solidFill>
+                  <a:schemeClr val="tx1"/>
+                </a:solidFill>
+                <a:latin typeface="Arial" pitchFamily="34" charset="0"/>
+              </a:defRPr>
+            </a:lvl6pPr>
+            <a:lvl7pPr marL="3009041" indent="-231465" eaLnBrk="0" fontAlgn="base" hangingPunct="0">
+              <a:spcBef>
+                <a:spcPct val="0"/>
+              </a:spcBef>
+              <a:spcAft>
+                <a:spcPct val="0"/>
+              </a:spcAft>
+              <a:defRPr>
+                <a:solidFill>
+                  <a:schemeClr val="tx1"/>
+                </a:solidFill>
+                <a:latin typeface="Arial" pitchFamily="34" charset="0"/>
+              </a:defRPr>
+            </a:lvl7pPr>
+            <a:lvl8pPr marL="3471970" indent="-231465" eaLnBrk="0" fontAlgn="base" hangingPunct="0">
+              <a:spcBef>
+                <a:spcPct val="0"/>
+              </a:spcBef>
+              <a:spcAft>
+                <a:spcPct val="0"/>
+              </a:spcAft>
+              <a:defRPr>
+                <a:solidFill>
+                  <a:schemeClr val="tx1"/>
+                </a:solidFill>
+                <a:latin typeface="Arial" pitchFamily="34" charset="0"/>
+              </a:defRPr>
+            </a:lvl8pPr>
+            <a:lvl9pPr marL="3934900" indent="-231465" eaLnBrk="0" fontAlgn="base" hangingPunct="0">
+              <a:spcBef>
+                <a:spcPct val="0"/>
+              </a:spcBef>
+              <a:spcAft>
+                <a:spcPct val="0"/>
+              </a:spcAft>
+              <a:defRPr>
+                <a:solidFill>
+                  <a:schemeClr val="tx1"/>
+                </a:solidFill>
+                <a:latin typeface="Arial" pitchFamily="34" charset="0"/>
+              </a:defRPr>
+            </a:lvl9pPr>
+          </a:lstStyle>
+          <a:p>
+            <a:fld id="{7D442D87-3FDC-464D-86BA-B2B66F9DA685}" type="slidenum">
+              <a:rPr lang="en-US" smtClean="0">
+                <a:solidFill>
+                  <a:prstClr val="black"/>
+                </a:solidFill>
+              </a:rPr>
+              <a:pPr/>
+              <a:t>35</a:t>
+            </a:fld>
+            <a:endParaRPr lang="en-US" dirty="0">
+              <a:solidFill>
+                <a:prstClr val="black"/>
+              </a:solidFill>
+            </a:endParaRPr>
+          </a:p>
+        </p:txBody>
+      </p:sp>
+    </p:spTree>
+    <p:extLst>
+      <p:ext uri="{BB962C8B-B14F-4D97-AF65-F5344CB8AC3E}">
+        <p14:creationId xmlns:p14="http://schemas.microsoft.com/office/powerpoint/2010/main" val="3311058406"/>
+      </p:ext>
+    </p:extLst>
+  </p:cSld>
+  <p:clrMapOvr>
+    <a:masterClrMapping/>
+  </p:clrMapOvr>
+</p:notes>
+</file>
+
+<file path=ppt/notesSlides/notesSlide27.xml><?xml version="1.0" encoding="utf-8"?>
+<p:notes xmlns:a="http://schemas.openxmlformats.org/drawingml/2006/main" xmlns:r="http://schemas.openxmlformats.org/officeDocument/2006/relationships" xmlns:p="http://schemas.openxmlformats.org/presentationml/2006/main">
+  <p:cSld>
+    <p:spTree>
+      <p:nvGrpSpPr>
+        <p:cNvPr id="1" name=""/>
+        <p:cNvGrpSpPr/>
+        <p:nvPr/>
+      </p:nvGrpSpPr>
+      <p:grpSpPr>
+        <a:xfrm>
+          <a:off x="0" y="0"/>
+          <a:ext cx="0" cy="0"/>
+          <a:chOff x="0" y="0"/>
+          <a:chExt cx="0" cy="0"/>
+        </a:xfrm>
+      </p:grpSpPr>
+      <p:sp>
+        <p:nvSpPr>
+          <p:cNvPr id="41986" name="Slide Image Placeholder 1"/>
+          <p:cNvSpPr>
+            <a:spLocks noGrp="1" noRot="1" noChangeAspect="1" noTextEdit="1"/>
+          </p:cNvSpPr>
+          <p:nvPr>
+            <p:ph type="sldImg"/>
+          </p:nvPr>
+        </p:nvSpPr>
+        <p:spPr>
+          <a:ln/>
+        </p:spPr>
+      </p:sp>
+      <p:sp>
+        <p:nvSpPr>
+          <p:cNvPr id="41987" name="Notes Placeholder 2"/>
+          <p:cNvSpPr>
+            <a:spLocks noGrp="1"/>
+          </p:cNvSpPr>
+          <p:nvPr>
+            <p:ph type="body" idx="1"/>
+          </p:nvPr>
+        </p:nvSpPr>
+        <p:spPr>
+          <a:noFill/>
+          <a:ln/>
+          <a:extLst>
+            <a:ext uri="{909E8E84-426E-40DD-AFC4-6F175D3DCCD1}">
+              <a14:hiddenFill xmlns:a14="http://schemas.microsoft.com/office/drawing/2010/main">
+                <a:solidFill>
+                  <a:srgbClr val="FFFFFF"/>
+                </a:solidFill>
+              </a14:hiddenFill>
+            </a:ext>
+            <a:ext uri="{91240B29-F687-4F45-9708-019B960494DF}">
+              <a14:hiddenLine xmlns:a14="http://schemas.microsoft.com/office/drawing/2010/main" w="9525">
+                <a:solidFill>
+                  <a:srgbClr val="000000"/>
+                </a:solidFill>
+                <a:miter lim="800000"/>
+                <a:headEnd/>
+                <a:tailEnd/>
+              </a14:hiddenLine>
+            </a:ext>
+          </a:extLst>
+        </p:spPr>
+        <p:txBody>
+          <a:bodyPr/>
+          <a:lstStyle/>
+          <a:p>
+            <a:pPr marL="102870" indent="0">
+              <a:spcBef>
+                <a:spcPts val="600"/>
+              </a:spcBef>
+              <a:buFont typeface="Arial" panose="020B0604020202020204" pitchFamily="34" charset="0"/>
+              <a:buNone/>
+            </a:pPr>
+            <a:endParaRPr lang="en-US" dirty="0"/>
+          </a:p>
+          <a:p>
+            <a:endParaRPr lang="en-US" dirty="0"/>
+          </a:p>
+        </p:txBody>
+      </p:sp>
+      <p:sp>
+        <p:nvSpPr>
+          <p:cNvPr id="41988" name="Slide Number Placeholder 3"/>
+          <p:cNvSpPr>
+            <a:spLocks noGrp="1"/>
+          </p:cNvSpPr>
+          <p:nvPr>
+            <p:ph type="sldNum" sz="quarter" idx="5"/>
+          </p:nvPr>
+        </p:nvSpPr>
+        <p:spPr>
+          <a:noFill/>
+          <a:ln/>
+          <a:extLst>
+            <a:ext uri="{909E8E84-426E-40DD-AFC4-6F175D3DCCD1}">
+              <a14:hiddenFill xmlns:a14="http://schemas.microsoft.com/office/drawing/2010/main">
+                <a:solidFill>
+                  <a:srgbClr val="FFFFFF"/>
+                </a:solidFill>
+              </a14:hiddenFill>
+            </a:ext>
+            <a:ext uri="{91240B29-F687-4F45-9708-019B960494DF}">
+              <a14:hiddenLine xmlns:a14="http://schemas.microsoft.com/office/drawing/2010/main" w="9525">
+                <a:solidFill>
+                  <a:srgbClr val="000000"/>
+                </a:solidFill>
+                <a:miter lim="800000"/>
+                <a:headEnd/>
+                <a:tailEnd/>
+              </a14:hiddenLine>
+            </a:ext>
+          </a:extLst>
+        </p:spPr>
+        <p:txBody>
+          <a:bodyPr/>
+          <a:lstStyle>
+            <a:lvl1pPr>
+              <a:defRPr>
+                <a:solidFill>
+                  <a:schemeClr val="tx1"/>
+                </a:solidFill>
+                <a:latin typeface="Arial" pitchFamily="34" charset="0"/>
+              </a:defRPr>
+            </a:lvl1pPr>
+            <a:lvl2pPr marL="752260" indent="-289331">
+              <a:defRPr>
+                <a:solidFill>
+                  <a:schemeClr val="tx1"/>
+                </a:solidFill>
+                <a:latin typeface="Arial" pitchFamily="34" charset="0"/>
+              </a:defRPr>
+            </a:lvl2pPr>
+            <a:lvl3pPr marL="1157324" indent="-231465">
+              <a:defRPr>
+                <a:solidFill>
+                  <a:schemeClr val="tx1"/>
+                </a:solidFill>
+                <a:latin typeface="Arial" pitchFamily="34" charset="0"/>
+              </a:defRPr>
+            </a:lvl3pPr>
+            <a:lvl4pPr marL="1620253" indent="-231465">
+              <a:defRPr>
+                <a:solidFill>
+                  <a:schemeClr val="tx1"/>
+                </a:solidFill>
+                <a:latin typeface="Arial" pitchFamily="34" charset="0"/>
+              </a:defRPr>
+            </a:lvl4pPr>
+            <a:lvl5pPr marL="2083181" indent="-231465">
+              <a:defRPr>
+                <a:solidFill>
+                  <a:schemeClr val="tx1"/>
+                </a:solidFill>
+                <a:latin typeface="Arial" pitchFamily="34" charset="0"/>
+              </a:defRPr>
+            </a:lvl5pPr>
+            <a:lvl6pPr marL="2546112" indent="-231465" eaLnBrk="0" fontAlgn="base" hangingPunct="0">
+              <a:spcBef>
+                <a:spcPct val="0"/>
+              </a:spcBef>
+              <a:spcAft>
+                <a:spcPct val="0"/>
+              </a:spcAft>
+              <a:defRPr>
+                <a:solidFill>
+                  <a:schemeClr val="tx1"/>
+                </a:solidFill>
+                <a:latin typeface="Arial" pitchFamily="34" charset="0"/>
+              </a:defRPr>
+            </a:lvl6pPr>
+            <a:lvl7pPr marL="3009041" indent="-231465" eaLnBrk="0" fontAlgn="base" hangingPunct="0">
+              <a:spcBef>
+                <a:spcPct val="0"/>
+              </a:spcBef>
+              <a:spcAft>
+                <a:spcPct val="0"/>
+              </a:spcAft>
+              <a:defRPr>
+                <a:solidFill>
+                  <a:schemeClr val="tx1"/>
+                </a:solidFill>
+                <a:latin typeface="Arial" pitchFamily="34" charset="0"/>
+              </a:defRPr>
+            </a:lvl7pPr>
+            <a:lvl8pPr marL="3471970" indent="-231465" eaLnBrk="0" fontAlgn="base" hangingPunct="0">
+              <a:spcBef>
+                <a:spcPct val="0"/>
+              </a:spcBef>
+              <a:spcAft>
+                <a:spcPct val="0"/>
+              </a:spcAft>
+              <a:defRPr>
+                <a:solidFill>
+                  <a:schemeClr val="tx1"/>
+                </a:solidFill>
+                <a:latin typeface="Arial" pitchFamily="34" charset="0"/>
+              </a:defRPr>
+            </a:lvl8pPr>
+            <a:lvl9pPr marL="3934900" indent="-231465" eaLnBrk="0" fontAlgn="base" hangingPunct="0">
+              <a:spcBef>
+                <a:spcPct val="0"/>
+              </a:spcBef>
+              <a:spcAft>
+                <a:spcPct val="0"/>
+              </a:spcAft>
+              <a:defRPr>
+                <a:solidFill>
+                  <a:schemeClr val="tx1"/>
+                </a:solidFill>
+                <a:latin typeface="Arial" pitchFamily="34" charset="0"/>
+              </a:defRPr>
+            </a:lvl9pPr>
+          </a:lstStyle>
+          <a:p>
+            <a:fld id="{7D442D87-3FDC-464D-86BA-B2B66F9DA685}" type="slidenum">
+              <a:rPr lang="en-US" smtClean="0">
+                <a:solidFill>
+                  <a:prstClr val="black"/>
+                </a:solidFill>
+              </a:rPr>
+              <a:pPr/>
+              <a:t>36</a:t>
+            </a:fld>
+            <a:endParaRPr lang="en-US" dirty="0">
+              <a:solidFill>
+                <a:prstClr val="black"/>
+              </a:solidFill>
+            </a:endParaRPr>
+          </a:p>
+        </p:txBody>
+      </p:sp>
+    </p:spTree>
+    <p:extLst>
+      <p:ext uri="{BB962C8B-B14F-4D97-AF65-F5344CB8AC3E}">
+        <p14:creationId xmlns:p14="http://schemas.microsoft.com/office/powerpoint/2010/main" val="252828385"/>
+      </p:ext>
+    </p:extLst>
+  </p:cSld>
+  <p:clrMapOvr>
+    <a:masterClrMapping/>
+  </p:clrMapOvr>
+</p:notes>
+</file>
+
+<file path=ppt/notesSlides/notesSlide28.xml><?xml version="1.0" encoding="utf-8"?>
+<p:notes xmlns:a="http://schemas.openxmlformats.org/drawingml/2006/main" xmlns:r="http://schemas.openxmlformats.org/officeDocument/2006/relationships" xmlns:p="http://schemas.openxmlformats.org/presentationml/2006/main">
+  <p:cSld>
+    <p:spTree>
+      <p:nvGrpSpPr>
+        <p:cNvPr id="1" name=""/>
+        <p:cNvGrpSpPr/>
+        <p:nvPr/>
+      </p:nvGrpSpPr>
+      <p:grpSpPr>
+        <a:xfrm>
+          <a:off x="0" y="0"/>
+          <a:ext cx="0" cy="0"/>
+          <a:chOff x="0" y="0"/>
+          <a:chExt cx="0" cy="0"/>
+        </a:xfrm>
+      </p:grpSpPr>
+      <p:sp>
+        <p:nvSpPr>
+          <p:cNvPr id="41986" name="Slide Image Placeholder 1"/>
+          <p:cNvSpPr>
+            <a:spLocks noGrp="1" noRot="1" noChangeAspect="1" noTextEdit="1"/>
+          </p:cNvSpPr>
+          <p:nvPr>
+            <p:ph type="sldImg"/>
+          </p:nvPr>
+        </p:nvSpPr>
+        <p:spPr>
+          <a:ln/>
+        </p:spPr>
+      </p:sp>
+      <p:sp>
+        <p:nvSpPr>
+          <p:cNvPr id="41987" name="Notes Placeholder 2"/>
+          <p:cNvSpPr>
+            <a:spLocks noGrp="1"/>
+          </p:cNvSpPr>
+          <p:nvPr>
+            <p:ph type="body" idx="1"/>
+          </p:nvPr>
+        </p:nvSpPr>
+        <p:spPr>
+          <a:noFill/>
+          <a:ln/>
+          <a:extLst>
+            <a:ext uri="{909E8E84-426E-40DD-AFC4-6F175D3DCCD1}">
+              <a14:hiddenFill xmlns:a14="http://schemas.microsoft.com/office/drawing/2010/main">
+                <a:solidFill>
+                  <a:srgbClr val="FFFFFF"/>
+                </a:solidFill>
+              </a14:hiddenFill>
+            </a:ext>
+            <a:ext uri="{91240B29-F687-4F45-9708-019B960494DF}">
+              <a14:hiddenLine xmlns:a14="http://schemas.microsoft.com/office/drawing/2010/main" w="9525">
+                <a:solidFill>
+                  <a:srgbClr val="000000"/>
+                </a:solidFill>
+                <a:miter lim="800000"/>
+                <a:headEnd/>
+                <a:tailEnd/>
+              </a14:hiddenLine>
+            </a:ext>
+          </a:extLst>
+        </p:spPr>
+        <p:txBody>
+          <a:bodyPr/>
+          <a:lstStyle/>
+          <a:p>
+            <a:pPr marL="102870" indent="0">
+              <a:spcBef>
+                <a:spcPts val="600"/>
+              </a:spcBef>
+              <a:buFont typeface="Arial" panose="020B0604020202020204" pitchFamily="34" charset="0"/>
+              <a:buNone/>
+            </a:pPr>
+            <a:endParaRPr lang="en-US" dirty="0"/>
+          </a:p>
+          <a:p>
+            <a:endParaRPr lang="en-US" dirty="0"/>
+          </a:p>
+        </p:txBody>
+      </p:sp>
+      <p:sp>
+        <p:nvSpPr>
+          <p:cNvPr id="41988" name="Slide Number Placeholder 3"/>
+          <p:cNvSpPr>
+            <a:spLocks noGrp="1"/>
+          </p:cNvSpPr>
+          <p:nvPr>
+            <p:ph type="sldNum" sz="quarter" idx="5"/>
+          </p:nvPr>
+        </p:nvSpPr>
+        <p:spPr>
+          <a:noFill/>
+          <a:ln/>
+          <a:extLst>
+            <a:ext uri="{909E8E84-426E-40DD-AFC4-6F175D3DCCD1}">
+              <a14:hiddenFill xmlns:a14="http://schemas.microsoft.com/office/drawing/2010/main">
+                <a:solidFill>
+                  <a:srgbClr val="FFFFFF"/>
+                </a:solidFill>
+              </a14:hiddenFill>
+            </a:ext>
+            <a:ext uri="{91240B29-F687-4F45-9708-019B960494DF}">
+              <a14:hiddenLine xmlns:a14="http://schemas.microsoft.com/office/drawing/2010/main" w="9525">
+                <a:solidFill>
+                  <a:srgbClr val="000000"/>
+                </a:solidFill>
+                <a:miter lim="800000"/>
+                <a:headEnd/>
+                <a:tailEnd/>
+              </a14:hiddenLine>
+            </a:ext>
+          </a:extLst>
+        </p:spPr>
+        <p:txBody>
+          <a:bodyPr/>
+          <a:lstStyle>
+            <a:lvl1pPr>
+              <a:defRPr>
+                <a:solidFill>
+                  <a:schemeClr val="tx1"/>
+                </a:solidFill>
+                <a:latin typeface="Arial" pitchFamily="34" charset="0"/>
+              </a:defRPr>
+            </a:lvl1pPr>
+            <a:lvl2pPr marL="752260" indent="-289331">
+              <a:defRPr>
+                <a:solidFill>
+                  <a:schemeClr val="tx1"/>
+                </a:solidFill>
+                <a:latin typeface="Arial" pitchFamily="34" charset="0"/>
+              </a:defRPr>
+            </a:lvl2pPr>
+            <a:lvl3pPr marL="1157324" indent="-231465">
+              <a:defRPr>
+                <a:solidFill>
+                  <a:schemeClr val="tx1"/>
+                </a:solidFill>
+                <a:latin typeface="Arial" pitchFamily="34" charset="0"/>
+              </a:defRPr>
+            </a:lvl3pPr>
+            <a:lvl4pPr marL="1620253" indent="-231465">
+              <a:defRPr>
+                <a:solidFill>
+                  <a:schemeClr val="tx1"/>
+                </a:solidFill>
+                <a:latin typeface="Arial" pitchFamily="34" charset="0"/>
+              </a:defRPr>
+            </a:lvl4pPr>
+            <a:lvl5pPr marL="2083181" indent="-231465">
+              <a:defRPr>
+                <a:solidFill>
+                  <a:schemeClr val="tx1"/>
+                </a:solidFill>
+                <a:latin typeface="Arial" pitchFamily="34" charset="0"/>
+              </a:defRPr>
+            </a:lvl5pPr>
+            <a:lvl6pPr marL="2546112" indent="-231465" eaLnBrk="0" fontAlgn="base" hangingPunct="0">
+              <a:spcBef>
+                <a:spcPct val="0"/>
+              </a:spcBef>
+              <a:spcAft>
+                <a:spcPct val="0"/>
+              </a:spcAft>
+              <a:defRPr>
+                <a:solidFill>
+                  <a:schemeClr val="tx1"/>
+                </a:solidFill>
+                <a:latin typeface="Arial" pitchFamily="34" charset="0"/>
+              </a:defRPr>
+            </a:lvl6pPr>
+            <a:lvl7pPr marL="3009041" indent="-231465" eaLnBrk="0" fontAlgn="base" hangingPunct="0">
+              <a:spcBef>
+                <a:spcPct val="0"/>
+              </a:spcBef>
+              <a:spcAft>
+                <a:spcPct val="0"/>
+              </a:spcAft>
+              <a:defRPr>
+                <a:solidFill>
+                  <a:schemeClr val="tx1"/>
+                </a:solidFill>
+                <a:latin typeface="Arial" pitchFamily="34" charset="0"/>
+              </a:defRPr>
+            </a:lvl7pPr>
+            <a:lvl8pPr marL="3471970" indent="-231465" eaLnBrk="0" fontAlgn="base" hangingPunct="0">
+              <a:spcBef>
+                <a:spcPct val="0"/>
+              </a:spcBef>
+              <a:spcAft>
+                <a:spcPct val="0"/>
+              </a:spcAft>
+              <a:defRPr>
+                <a:solidFill>
+                  <a:schemeClr val="tx1"/>
+                </a:solidFill>
+                <a:latin typeface="Arial" pitchFamily="34" charset="0"/>
+              </a:defRPr>
+            </a:lvl8pPr>
+            <a:lvl9pPr marL="3934900" indent="-231465" eaLnBrk="0" fontAlgn="base" hangingPunct="0">
+              <a:spcBef>
+                <a:spcPct val="0"/>
+              </a:spcBef>
+              <a:spcAft>
+                <a:spcPct val="0"/>
+              </a:spcAft>
+              <a:defRPr>
+                <a:solidFill>
+                  <a:schemeClr val="tx1"/>
+                </a:solidFill>
+                <a:latin typeface="Arial" pitchFamily="34" charset="0"/>
+              </a:defRPr>
+            </a:lvl9pPr>
+          </a:lstStyle>
+          <a:p>
+            <a:fld id="{7D442D87-3FDC-464D-86BA-B2B66F9DA685}" type="slidenum">
+              <a:rPr lang="en-US" smtClean="0">
+                <a:solidFill>
+                  <a:prstClr val="black"/>
+                </a:solidFill>
+              </a:rPr>
+              <a:pPr/>
+              <a:t>37</a:t>
             </a:fld>
             <a:endParaRPr lang="en-US" dirty="0">
               <a:solidFill>
@@ -16896,6 +17637,11 @@
               <a:lumMod val="85000"/>
             </a:schemeClr>
           </a:solidFill>
+          <a:ln>
+            <a:solidFill>
+              <a:schemeClr val="tx1"/>
+            </a:solidFill>
+          </a:ln>
         </p:spPr>
         <p:txBody>
           <a:bodyPr wrap="square" rtlCol="0">
@@ -16939,6 +17685,11 @@
               <a:lumMod val="85000"/>
             </a:schemeClr>
           </a:solidFill>
+          <a:ln>
+            <a:solidFill>
+              <a:schemeClr val="tx1"/>
+            </a:solidFill>
+          </a:ln>
         </p:spPr>
         <p:txBody>
           <a:bodyPr wrap="square" rtlCol="0">
@@ -17541,7 +18292,7 @@
         </p:nvSpPr>
         <p:spPr>
           <a:xfrm>
-            <a:off x="5991273" y="1859302"/>
+            <a:off x="5991273" y="1814332"/>
             <a:ext cx="1557703" cy="369332"/>
           </a:xfrm>
           <a:prstGeom prst="rect">
@@ -17552,6 +18303,11 @@
               <a:lumMod val="85000"/>
             </a:schemeClr>
           </a:solidFill>
+          <a:ln>
+            <a:solidFill>
+              <a:schemeClr val="tx1"/>
+            </a:solidFill>
+          </a:ln>
         </p:spPr>
         <p:txBody>
           <a:bodyPr wrap="square" rtlCol="0">
@@ -17595,6 +18351,11 @@
               <a:lumMod val="85000"/>
             </a:schemeClr>
           </a:solidFill>
+          <a:ln>
+            <a:solidFill>
+              <a:schemeClr val="tx1"/>
+            </a:solidFill>
+          </a:ln>
         </p:spPr>
         <p:txBody>
           <a:bodyPr wrap="square" rtlCol="0">
@@ -17691,7 +18452,7 @@
         <p:spPr/>
         <p:txBody>
           <a:bodyPr>
-            <a:normAutofit/>
+            <a:normAutofit lnSpcReduction="10000"/>
           </a:bodyPr>
           <a:lstStyle/>
           <a:p>
@@ -17708,25 +18469,9 @@
               <a:buNone/>
             </a:pPr>
             <a:r>
-              <a:rPr lang="en-US" sz="2800" dirty="0">
-                <a:cs typeface="Consolas" panose="020B0609020204030204" pitchFamily="49" charset="0"/>
-              </a:rPr>
-              <a:t>GitHub &gt;&gt; New repo &gt;&gt; readme and permissions &gt;&gt; copy URL </a:t>
-            </a:r>
-          </a:p>
-          <a:p>
-            <a:pPr marL="0" indent="0">
-              <a:lnSpc>
-                <a:spcPct val="100000"/>
-              </a:lnSpc>
-              <a:spcBef>
-                <a:spcPts val="0"/>
-              </a:spcBef>
-              <a:spcAft>
-                <a:spcPts val="1200"/>
-              </a:spcAft>
-              <a:buNone/>
-            </a:pPr>
+              <a:rPr lang="en-US" sz="2800" dirty="0"/>
+              <a:t>See where things stand: </a:t>
+            </a:r>
             <a:r>
               <a:rPr lang="en-US" sz="2800" dirty="0">
                 <a:highlight>
@@ -17735,12 +18480,64 @@
                 <a:latin typeface="Consolas" panose="020B0609020204030204" pitchFamily="49" charset="0"/>
                 <a:cs typeface="Consolas" panose="020B0609020204030204" pitchFamily="49" charset="0"/>
               </a:rPr>
-              <a:t>$cd &lt;path/to/directory/for/repo&gt;</a:t>
-            </a:r>
-            <a:r>
-              <a:rPr lang="en-US" sz="2800" dirty="0"/>
-              <a:t> </a:t>
-            </a:r>
+              <a:t>$git status</a:t>
+            </a:r>
+          </a:p>
+          <a:p>
+            <a:pPr marL="0" lvl="0" indent="0">
+              <a:lnSpc>
+                <a:spcPct val="100000"/>
+              </a:lnSpc>
+              <a:spcBef>
+                <a:spcPts val="0"/>
+              </a:spcBef>
+              <a:spcAft>
+                <a:spcPts val="1200"/>
+              </a:spcAft>
+              <a:buClr>
+                <a:srgbClr val="64A038"/>
+              </a:buClr>
+              <a:buNone/>
+            </a:pPr>
+            <a:r>
+              <a:rPr lang="en-US" sz="2800" dirty="0">
+                <a:solidFill>
+                  <a:prstClr val="black">
+                    <a:lumMod val="75000"/>
+                    <a:lumOff val="25000"/>
+                  </a:prstClr>
+                </a:solidFill>
+              </a:rPr>
+              <a:t>See what’s happened:  </a:t>
+            </a:r>
+            <a:r>
+              <a:rPr lang="en-US" sz="2800" dirty="0">
+                <a:solidFill>
+                  <a:prstClr val="black">
+                    <a:lumMod val="75000"/>
+                    <a:lumOff val="25000"/>
+                  </a:prstClr>
+                </a:solidFill>
+                <a:highlight>
+                  <a:srgbClr val="C0C0C0"/>
+                </a:highlight>
+                <a:latin typeface="Consolas" panose="020B0609020204030204" pitchFamily="49" charset="0"/>
+                <a:cs typeface="Consolas" panose="020B0609020204030204" pitchFamily="49" charset="0"/>
+              </a:rPr>
+              <a:t>$git log</a:t>
+            </a:r>
+            <a:r>
+              <a:rPr lang="en-US" sz="2800" dirty="0">
+                <a:solidFill>
+                  <a:prstClr val="black">
+                    <a:lumMod val="75000"/>
+                    <a:lumOff val="25000"/>
+                  </a:prstClr>
+                </a:solidFill>
+              </a:rPr>
+              <a:t>   </a:t>
+            </a:r>
+            <a:endParaRPr lang="en-US" sz="2800" dirty="0"/>
           </a:p>
           <a:p>
             <a:pPr marL="0" indent="0">
@@ -17755,6 +18552,10 @@
               </a:spcAft>
               <a:buNone/>
             </a:pPr>
+            <a:r>
+              <a:rPr lang="en-US" sz="2800" dirty="0"/>
+              <a:t>Add file to staging area:  </a:t>
+            </a:r>
             <a:r>
               <a:rPr lang="en-US" sz="2800" dirty="0">
                 <a:highlight>
@@ -17763,12 +18564,166 @@
                 <a:latin typeface="Consolas" panose="020B0609020204030204" pitchFamily="49" charset="0"/>
                 <a:cs typeface="Consolas" panose="020B0609020204030204" pitchFamily="49" charset="0"/>
               </a:rPr>
-              <a:t>$git clone &lt;URL&gt;</a:t>
+              <a:t>$git add &lt;file&gt;</a:t>
             </a:r>
             <a:r>
               <a:rPr lang="en-US" sz="2800" dirty="0"/>
-              <a:t> </a:t>
-            </a:r>
+              <a:t>   </a:t>
+            </a:r>
+          </a:p>
+          <a:p>
+            <a:pPr marL="0" indent="0">
+              <a:lnSpc>
+                <a:spcPct val="100000"/>
+              </a:lnSpc>
+              <a:spcBef>
+                <a:spcPts val="0"/>
+              </a:spcBef>
+              <a:spcAft>
+                <a:spcPts val="1200"/>
+              </a:spcAft>
+              <a:buNone/>
+            </a:pPr>
+            <a:r>
+              <a:rPr lang="en-US" sz="2800" dirty="0"/>
+              <a:t>Add all files to staging area:  </a:t>
+            </a:r>
+            <a:r>
+              <a:rPr lang="en-US" sz="2800" dirty="0">
+                <a:highlight>
+                  <a:srgbClr val="C0C0C0"/>
+                </a:highlight>
+                <a:latin typeface="Consolas" panose="020B0609020204030204" pitchFamily="49" charset="0"/>
+                <a:cs typeface="Consolas" panose="020B0609020204030204" pitchFamily="49" charset="0"/>
+              </a:rPr>
+              <a:t>$git add -A</a:t>
+            </a:r>
+            <a:r>
+              <a:rPr lang="en-US" sz="2800" dirty="0"/>
+              <a:t> or </a:t>
+            </a:r>
+            <a:r>
+              <a:rPr lang="en-US" sz="2800" dirty="0">
+                <a:highlight>
+                  <a:srgbClr val="C0C0C0"/>
+                </a:highlight>
+                <a:latin typeface="Consolas" panose="020B0609020204030204" pitchFamily="49" charset="0"/>
+                <a:cs typeface="Consolas" panose="020B0609020204030204" pitchFamily="49" charset="0"/>
+              </a:rPr>
+              <a:t>$git add --all</a:t>
+            </a:r>
+            <a:endParaRPr lang="en-US" sz="2800" dirty="0"/>
+          </a:p>
+          <a:p>
+            <a:pPr marL="0" indent="0">
+              <a:lnSpc>
+                <a:spcPct val="100000"/>
+              </a:lnSpc>
+              <a:spcBef>
+                <a:spcPts val="0"/>
+              </a:spcBef>
+              <a:spcAft>
+                <a:spcPts val="1200"/>
+              </a:spcAft>
+              <a:buNone/>
+            </a:pPr>
+            <a:r>
+              <a:rPr lang="en-US" sz="2800" dirty="0"/>
+              <a:t>Commit changes:  </a:t>
+            </a:r>
+            <a:r>
+              <a:rPr lang="en-US" sz="2800" dirty="0">
+                <a:highlight>
+                  <a:srgbClr val="C0C0C0"/>
+                </a:highlight>
+                <a:latin typeface="Consolas" panose="020B0609020204030204" pitchFamily="49" charset="0"/>
+                <a:cs typeface="Consolas" panose="020B0609020204030204" pitchFamily="49" charset="0"/>
+              </a:rPr>
+              <a:t>$git commit -m ‘useful message’</a:t>
+            </a:r>
+            <a:r>
+              <a:rPr lang="en-US" sz="2800" dirty="0"/>
+              <a:t>    </a:t>
+            </a:r>
+          </a:p>
+          <a:p>
+            <a:pPr marL="0" indent="0">
+              <a:lnSpc>
+                <a:spcPct val="100000"/>
+              </a:lnSpc>
+              <a:spcBef>
+                <a:spcPts val="0"/>
+              </a:spcBef>
+              <a:spcAft>
+                <a:spcPts val="1200"/>
+              </a:spcAft>
+              <a:buNone/>
+            </a:pPr>
+            <a:r>
+              <a:rPr lang="en-US" sz="2800" dirty="0"/>
+              <a:t>Get changes from GH:  </a:t>
+            </a:r>
+            <a:r>
+              <a:rPr lang="en-US" sz="2800" dirty="0">
+                <a:highlight>
+                  <a:srgbClr val="C0C0C0"/>
+                </a:highlight>
+                <a:latin typeface="Consolas" panose="020B0609020204030204" pitchFamily="49" charset="0"/>
+                <a:cs typeface="Consolas" panose="020B0609020204030204" pitchFamily="49" charset="0"/>
+              </a:rPr>
+              <a:t>$git pull</a:t>
+            </a:r>
+            <a:r>
+              <a:rPr lang="en-US" sz="2800" dirty="0"/>
+              <a:t>   </a:t>
+            </a:r>
+          </a:p>
+          <a:p>
+            <a:pPr marL="0" indent="0">
+              <a:lnSpc>
+                <a:spcPct val="100000"/>
+              </a:lnSpc>
+              <a:spcBef>
+                <a:spcPts val="0"/>
+              </a:spcBef>
+              <a:spcAft>
+                <a:spcPts val="1200"/>
+              </a:spcAft>
+              <a:buNone/>
+            </a:pPr>
+            <a:r>
+              <a:rPr lang="en-US" sz="2800" dirty="0"/>
+              <a:t>Send changes to GH:  </a:t>
+            </a:r>
+            <a:r>
+              <a:rPr lang="en-US" sz="2800" dirty="0">
+                <a:highlight>
+                  <a:srgbClr val="C0C0C0"/>
+                </a:highlight>
+                <a:latin typeface="Consolas" panose="020B0609020204030204" pitchFamily="49" charset="0"/>
+                <a:cs typeface="Consolas" panose="020B0609020204030204" pitchFamily="49" charset="0"/>
+              </a:rPr>
+              <a:t>$git push</a:t>
+            </a:r>
+            <a:r>
+              <a:rPr lang="en-US" sz="2800" dirty="0"/>
+              <a:t>   </a:t>
+            </a:r>
+          </a:p>
+          <a:p>
+            <a:pPr marL="0" indent="0">
+              <a:lnSpc>
+                <a:spcPct val="100000"/>
+              </a:lnSpc>
+              <a:spcBef>
+                <a:spcPts val="0"/>
+              </a:spcBef>
+              <a:spcAft>
+                <a:spcPts val="1200"/>
+              </a:spcAft>
+              <a:buNone/>
+            </a:pPr>
+            <a:endParaRPr lang="en-US" sz="2800" dirty="0"/>
           </a:p>
         </p:txBody>
       </p:sp>
@@ -17867,6 +18822,504 @@
       </p:grpSpPr>
       <p:sp>
         <p:nvSpPr>
+          <p:cNvPr id="9218" name="Title 1"/>
+          <p:cNvSpPr>
+            <a:spLocks noGrp="1"/>
+          </p:cNvSpPr>
+          <p:nvPr>
+            <p:ph type="title"/>
+          </p:nvPr>
+        </p:nvSpPr>
+        <p:spPr/>
+        <p:txBody>
+          <a:bodyPr anchor="b">
+            <a:noAutofit/>
+          </a:bodyPr>
+          <a:lstStyle/>
+          <a:p>
+            <a:r>
+              <a:rPr lang="en-US" sz="3200" b="1" dirty="0">
+                <a:solidFill>
+                  <a:schemeClr val="accent2"/>
+                </a:solidFill>
+                <a:latin typeface="+mn-lt"/>
+              </a:rPr>
+              <a:t>Using your repo</a:t>
+            </a:r>
+          </a:p>
+        </p:txBody>
+      </p:sp>
+      <p:sp>
+        <p:nvSpPr>
+          <p:cNvPr id="2" name="Content Placeholder 1">
+            <a:extLst>
+              <a:ext uri="{FF2B5EF4-FFF2-40B4-BE49-F238E27FC236}">
+                <a16:creationId xmlns:a16="http://schemas.microsoft.com/office/drawing/2014/main" id="{27D0C661-EDC7-964F-9BD3-F8C1B1CD48B7}"/>
+              </a:ext>
+            </a:extLst>
+          </p:cNvPr>
+          <p:cNvSpPr>
+            <a:spLocks noGrp="1"/>
+          </p:cNvSpPr>
+          <p:nvPr>
+            <p:ph idx="1"/>
+          </p:nvPr>
+        </p:nvSpPr>
+        <p:spPr>
+          <a:xfrm>
+            <a:off x="1097280" y="1845734"/>
+            <a:ext cx="11094720" cy="4023360"/>
+          </a:xfrm>
+        </p:spPr>
+        <p:txBody>
+          <a:bodyPr>
+            <a:normAutofit/>
+          </a:bodyPr>
+          <a:lstStyle/>
+          <a:p>
+            <a:pPr marL="0" indent="0">
+              <a:lnSpc>
+                <a:spcPct val="100000"/>
+              </a:lnSpc>
+              <a:spcBef>
+                <a:spcPts val="0"/>
+              </a:spcBef>
+              <a:spcAft>
+                <a:spcPts val="1200"/>
+              </a:spcAft>
+              <a:buClr>
+                <a:srgbClr val="64A038"/>
+              </a:buClr>
+              <a:buNone/>
+            </a:pPr>
+            <a:r>
+              <a:rPr lang="en-US" sz="2400" dirty="0">
+                <a:solidFill>
+                  <a:prstClr val="black">
+                    <a:lumMod val="75000"/>
+                    <a:lumOff val="25000"/>
+                  </a:prstClr>
+                </a:solidFill>
+              </a:rPr>
+              <a:t>See what’s changed since last commit:  </a:t>
+            </a:r>
+            <a:r>
+              <a:rPr lang="en-US" sz="2400" dirty="0">
+                <a:solidFill>
+                  <a:prstClr val="black">
+                    <a:lumMod val="75000"/>
+                    <a:lumOff val="25000"/>
+                  </a:prstClr>
+                </a:solidFill>
+                <a:highlight>
+                  <a:srgbClr val="C0C0C0"/>
+                </a:highlight>
+                <a:latin typeface="Consolas" panose="020B0609020204030204" pitchFamily="49" charset="0"/>
+                <a:cs typeface="Consolas" panose="020B0609020204030204" pitchFamily="49" charset="0"/>
+              </a:rPr>
+              <a:t>$git </a:t>
+            </a:r>
+            <a:r>
+              <a:rPr lang="en-US" sz="2400" dirty="0" err="1">
+                <a:solidFill>
+                  <a:prstClr val="black">
+                    <a:lumMod val="75000"/>
+                    <a:lumOff val="25000"/>
+                  </a:prstClr>
+                </a:solidFill>
+                <a:highlight>
+                  <a:srgbClr val="C0C0C0"/>
+                </a:highlight>
+                <a:latin typeface="Consolas" panose="020B0609020204030204" pitchFamily="49" charset="0"/>
+                <a:cs typeface="Consolas" panose="020B0609020204030204" pitchFamily="49" charset="0"/>
+              </a:rPr>
+              <a:t>difftool</a:t>
+            </a:r>
+            <a:endParaRPr lang="en-US" sz="2400" dirty="0">
+              <a:solidFill>
+                <a:prstClr val="black">
+                  <a:lumMod val="75000"/>
+                  <a:lumOff val="25000"/>
+                </a:prstClr>
+              </a:solidFill>
+            </a:endParaRPr>
+          </a:p>
+          <a:p>
+            <a:pPr marL="0" lvl="0" indent="0">
+              <a:lnSpc>
+                <a:spcPct val="100000"/>
+              </a:lnSpc>
+              <a:spcBef>
+                <a:spcPts val="0"/>
+              </a:spcBef>
+              <a:spcAft>
+                <a:spcPts val="1200"/>
+              </a:spcAft>
+              <a:buClr>
+                <a:srgbClr val="64A038"/>
+              </a:buClr>
+              <a:buNone/>
+            </a:pPr>
+            <a:r>
+              <a:rPr lang="en-US" sz="2400" dirty="0">
+                <a:solidFill>
+                  <a:prstClr val="black">
+                    <a:lumMod val="75000"/>
+                    <a:lumOff val="25000"/>
+                  </a:prstClr>
+                </a:solidFill>
+              </a:rPr>
+              <a:t>See what’s changed since a specific commit:  </a:t>
+            </a:r>
+            <a:r>
+              <a:rPr lang="en-US" sz="2400" dirty="0">
+                <a:solidFill>
+                  <a:prstClr val="black">
+                    <a:lumMod val="75000"/>
+                    <a:lumOff val="25000"/>
+                  </a:prstClr>
+                </a:solidFill>
+                <a:highlight>
+                  <a:srgbClr val="C0C0C0"/>
+                </a:highlight>
+                <a:latin typeface="Consolas" panose="020B0609020204030204" pitchFamily="49" charset="0"/>
+                <a:cs typeface="Consolas" panose="020B0609020204030204" pitchFamily="49" charset="0"/>
+              </a:rPr>
+              <a:t>$git </a:t>
+            </a:r>
+            <a:r>
+              <a:rPr lang="en-US" sz="2400" dirty="0" err="1">
+                <a:solidFill>
+                  <a:prstClr val="black">
+                    <a:lumMod val="75000"/>
+                    <a:lumOff val="25000"/>
+                  </a:prstClr>
+                </a:solidFill>
+                <a:highlight>
+                  <a:srgbClr val="C0C0C0"/>
+                </a:highlight>
+                <a:latin typeface="Consolas" panose="020B0609020204030204" pitchFamily="49" charset="0"/>
+                <a:cs typeface="Consolas" panose="020B0609020204030204" pitchFamily="49" charset="0"/>
+              </a:rPr>
+              <a:t>difftool</a:t>
+            </a:r>
+            <a:r>
+              <a:rPr lang="en-US" sz="2400" dirty="0">
+                <a:solidFill>
+                  <a:prstClr val="black">
+                    <a:lumMod val="75000"/>
+                    <a:lumOff val="25000"/>
+                  </a:prstClr>
+                </a:solidFill>
+                <a:highlight>
+                  <a:srgbClr val="C0C0C0"/>
+                </a:highlight>
+                <a:latin typeface="Consolas" panose="020B0609020204030204" pitchFamily="49" charset="0"/>
+                <a:cs typeface="Consolas" panose="020B0609020204030204" pitchFamily="49" charset="0"/>
+              </a:rPr>
+              <a:t> &lt;commit ID&gt;</a:t>
+            </a:r>
+            <a:r>
+              <a:rPr lang="en-US" sz="2400" dirty="0">
+                <a:solidFill>
+                  <a:prstClr val="black">
+                    <a:lumMod val="75000"/>
+                    <a:lumOff val="25000"/>
+                  </a:prstClr>
+                </a:solidFill>
+              </a:rPr>
+              <a:t>  </a:t>
+            </a:r>
+          </a:p>
+          <a:p>
+            <a:pPr marL="0" indent="0">
+              <a:lnSpc>
+                <a:spcPct val="100000"/>
+              </a:lnSpc>
+              <a:spcBef>
+                <a:spcPts val="0"/>
+              </a:spcBef>
+              <a:spcAft>
+                <a:spcPts val="1200"/>
+              </a:spcAft>
+              <a:buClr>
+                <a:srgbClr val="64A038"/>
+              </a:buClr>
+              <a:buNone/>
+            </a:pPr>
+            <a:r>
+              <a:rPr lang="en-US" sz="2400" dirty="0">
+                <a:solidFill>
+                  <a:prstClr val="black">
+                    <a:lumMod val="75000"/>
+                    <a:lumOff val="25000"/>
+                  </a:prstClr>
+                </a:solidFill>
+              </a:rPr>
+              <a:t>Compare two commits: </a:t>
+            </a:r>
+            <a:r>
+              <a:rPr lang="en-US" sz="2400" dirty="0">
+                <a:solidFill>
+                  <a:prstClr val="black">
+                    <a:lumMod val="75000"/>
+                    <a:lumOff val="25000"/>
+                  </a:prstClr>
+                </a:solidFill>
+                <a:highlight>
+                  <a:srgbClr val="C0C0C0"/>
+                </a:highlight>
+                <a:latin typeface="Consolas" panose="020B0609020204030204" pitchFamily="49" charset="0"/>
+                <a:cs typeface="Consolas" panose="020B0609020204030204" pitchFamily="49" charset="0"/>
+              </a:rPr>
+              <a:t>$git </a:t>
+            </a:r>
+            <a:r>
+              <a:rPr lang="en-US" sz="2400" dirty="0" err="1">
+                <a:solidFill>
+                  <a:prstClr val="black">
+                    <a:lumMod val="75000"/>
+                    <a:lumOff val="25000"/>
+                  </a:prstClr>
+                </a:solidFill>
+                <a:highlight>
+                  <a:srgbClr val="C0C0C0"/>
+                </a:highlight>
+                <a:latin typeface="Consolas" panose="020B0609020204030204" pitchFamily="49" charset="0"/>
+                <a:cs typeface="Consolas" panose="020B0609020204030204" pitchFamily="49" charset="0"/>
+              </a:rPr>
+              <a:t>difftool</a:t>
+            </a:r>
+            <a:r>
+              <a:rPr lang="en-US" sz="2400" dirty="0">
+                <a:solidFill>
+                  <a:prstClr val="black">
+                    <a:lumMod val="75000"/>
+                    <a:lumOff val="25000"/>
+                  </a:prstClr>
+                </a:solidFill>
+                <a:highlight>
+                  <a:srgbClr val="C0C0C0"/>
+                </a:highlight>
+                <a:latin typeface="Consolas" panose="020B0609020204030204" pitchFamily="49" charset="0"/>
+                <a:cs typeface="Consolas" panose="020B0609020204030204" pitchFamily="49" charset="0"/>
+              </a:rPr>
+              <a:t> &lt;old commit ID&gt; &lt;new commit ID&gt;</a:t>
+            </a:r>
+            <a:r>
+              <a:rPr lang="en-US" sz="2400" dirty="0">
+                <a:solidFill>
+                  <a:prstClr val="black">
+                    <a:lumMod val="75000"/>
+                    <a:lumOff val="25000"/>
+                  </a:prstClr>
+                </a:solidFill>
+              </a:rPr>
+              <a:t>  </a:t>
+            </a:r>
+          </a:p>
+          <a:p>
+            <a:pPr marL="0" indent="0">
+              <a:lnSpc>
+                <a:spcPct val="100000"/>
+              </a:lnSpc>
+              <a:spcBef>
+                <a:spcPts val="0"/>
+              </a:spcBef>
+              <a:spcAft>
+                <a:spcPts val="1200"/>
+              </a:spcAft>
+              <a:buClr>
+                <a:srgbClr val="64A038"/>
+              </a:buClr>
+              <a:buNone/>
+            </a:pPr>
+            <a:r>
+              <a:rPr lang="en-US" sz="2400" dirty="0">
+                <a:solidFill>
+                  <a:prstClr val="black">
+                    <a:lumMod val="75000"/>
+                    <a:lumOff val="25000"/>
+                  </a:prstClr>
+                </a:solidFill>
+              </a:rPr>
+              <a:t>Compare GH vs. local files: </a:t>
+            </a:r>
+            <a:r>
+              <a:rPr lang="en-US" sz="2400" dirty="0">
+                <a:solidFill>
+                  <a:prstClr val="black">
+                    <a:lumMod val="75000"/>
+                    <a:lumOff val="25000"/>
+                  </a:prstClr>
+                </a:solidFill>
+                <a:highlight>
+                  <a:srgbClr val="C0C0C0"/>
+                </a:highlight>
+                <a:latin typeface="Consolas" panose="020B0609020204030204" pitchFamily="49" charset="0"/>
+                <a:cs typeface="Consolas" panose="020B0609020204030204" pitchFamily="49" charset="0"/>
+              </a:rPr>
+              <a:t>$git </a:t>
+            </a:r>
+            <a:r>
+              <a:rPr lang="en-US" sz="2400" dirty="0" err="1">
+                <a:solidFill>
+                  <a:prstClr val="black">
+                    <a:lumMod val="75000"/>
+                    <a:lumOff val="25000"/>
+                  </a:prstClr>
+                </a:solidFill>
+                <a:highlight>
+                  <a:srgbClr val="C0C0C0"/>
+                </a:highlight>
+                <a:latin typeface="Consolas" panose="020B0609020204030204" pitchFamily="49" charset="0"/>
+                <a:cs typeface="Consolas" panose="020B0609020204030204" pitchFamily="49" charset="0"/>
+              </a:rPr>
+              <a:t>difftool</a:t>
+            </a:r>
+            <a:r>
+              <a:rPr lang="en-US" sz="2400" dirty="0">
+                <a:solidFill>
+                  <a:prstClr val="black">
+                    <a:lumMod val="75000"/>
+                    <a:lumOff val="25000"/>
+                  </a:prstClr>
+                </a:solidFill>
+                <a:highlight>
+                  <a:srgbClr val="C0C0C0"/>
+                </a:highlight>
+                <a:latin typeface="Consolas" panose="020B0609020204030204" pitchFamily="49" charset="0"/>
+                <a:cs typeface="Consolas" panose="020B0609020204030204" pitchFamily="49" charset="0"/>
+              </a:rPr>
+              <a:t> origin/master</a:t>
+            </a:r>
+            <a:r>
+              <a:rPr lang="en-US" sz="2400" dirty="0">
+                <a:solidFill>
+                  <a:prstClr val="black">
+                    <a:lumMod val="75000"/>
+                    <a:lumOff val="25000"/>
+                  </a:prstClr>
+                </a:solidFill>
+              </a:rPr>
+              <a:t>  </a:t>
+            </a:r>
+          </a:p>
+          <a:p>
+            <a:pPr marL="0" lvl="0" indent="0">
+              <a:lnSpc>
+                <a:spcPct val="100000"/>
+              </a:lnSpc>
+              <a:spcBef>
+                <a:spcPts val="0"/>
+              </a:spcBef>
+              <a:spcAft>
+                <a:spcPts val="1200"/>
+              </a:spcAft>
+              <a:buClr>
+                <a:srgbClr val="64A038"/>
+              </a:buClr>
+              <a:buNone/>
+            </a:pPr>
+            <a:endParaRPr lang="en-US" sz="2400" dirty="0"/>
+          </a:p>
+        </p:txBody>
+      </p:sp>
+      <p:sp>
+        <p:nvSpPr>
+          <p:cNvPr id="9" name="TextBox 8"/>
+          <p:cNvSpPr txBox="1"/>
+          <p:nvPr/>
+        </p:nvSpPr>
+        <p:spPr>
+          <a:xfrm>
+            <a:off x="130629" y="6397228"/>
+            <a:ext cx="4911634" cy="338554"/>
+          </a:xfrm>
+          <a:prstGeom prst="rect">
+            <a:avLst/>
+          </a:prstGeom>
+          <a:noFill/>
+        </p:spPr>
+        <p:txBody>
+          <a:bodyPr wrap="square" rtlCol="0">
+            <a:spAutoFit/>
+          </a:bodyPr>
+          <a:lstStyle/>
+          <a:p>
+            <a:r>
+              <a:rPr lang="en-US" sz="1600" i="1" dirty="0">
+                <a:solidFill>
+                  <a:schemeClr val="bg1"/>
+                </a:solidFill>
+              </a:rPr>
+              <a:t>Office of Institutional Research</a:t>
+            </a:r>
+          </a:p>
+        </p:txBody>
+      </p:sp>
+      <p:pic>
+        <p:nvPicPr>
+          <p:cNvPr id="7" name="Picture 6"/>
+          <p:cNvPicPr>
+            <a:picLocks noChangeAspect="1"/>
+          </p:cNvPicPr>
+          <p:nvPr/>
+        </p:nvPicPr>
+        <p:blipFill>
+          <a:blip r:embed="rId3" cstate="screen">
+            <a:extLst>
+              <a:ext uri="{28A0092B-C50C-407E-A947-70E740481C1C}">
+                <a14:useLocalDpi xmlns:a14="http://schemas.microsoft.com/office/drawing/2010/main"/>
+              </a:ext>
+            </a:extLst>
+          </a:blip>
+          <a:stretch>
+            <a:fillRect/>
+          </a:stretch>
+        </p:blipFill>
+        <p:spPr>
+          <a:xfrm>
+            <a:off x="8582526" y="216624"/>
+            <a:ext cx="3352800" cy="452628"/>
+          </a:xfrm>
+          <a:prstGeom prst="rect">
+            <a:avLst/>
+          </a:prstGeom>
+        </p:spPr>
+      </p:pic>
+    </p:spTree>
+    <p:extLst>
+      <p:ext uri="{BB962C8B-B14F-4D97-AF65-F5344CB8AC3E}">
+        <p14:creationId xmlns:p14="http://schemas.microsoft.com/office/powerpoint/2010/main" val="2992761888"/>
+      </p:ext>
+    </p:extLst>
+  </p:cSld>
+  <p:clrMapOvr>
+    <a:masterClrMapping/>
+  </p:clrMapOvr>
+</p:sld>
+</file>
+
+<file path=ppt/slides/slide27.xml><?xml version="1.0" encoding="utf-8"?>
+<p:sld xmlns:a="http://schemas.openxmlformats.org/drawingml/2006/main" xmlns:r="http://schemas.openxmlformats.org/officeDocument/2006/relationships" xmlns:p="http://schemas.openxmlformats.org/presentationml/2006/main">
+  <p:cSld>
+    <p:spTree>
+      <p:nvGrpSpPr>
+        <p:cNvPr id="1" name=""/>
+        <p:cNvGrpSpPr/>
+        <p:nvPr/>
+      </p:nvGrpSpPr>
+      <p:grpSpPr>
+        <a:xfrm>
+          <a:off x="0" y="0"/>
+          <a:ext cx="0" cy="0"/>
+          <a:chOff x="0" y="0"/>
+          <a:chExt cx="0" cy="0"/>
+        </a:xfrm>
+      </p:grpSpPr>
+      <p:sp>
+        <p:nvSpPr>
           <p:cNvPr id="2" name="Title 1">
             <a:extLst>
               <a:ext uri="{FF2B5EF4-FFF2-40B4-BE49-F238E27FC236}">
@@ -18013,7 +19466,7 @@
 </p:sld>
 </file>
 
-<file path=ppt/slides/slide27.xml><?xml version="1.0" encoding="utf-8"?>
+<file path=ppt/slides/slide28.xml><?xml version="1.0" encoding="utf-8"?>
 <p:sld xmlns:a="http://schemas.openxmlformats.org/drawingml/2006/main" xmlns:r="http://schemas.openxmlformats.org/officeDocument/2006/relationships" xmlns:p="http://schemas.openxmlformats.org/presentationml/2006/main">
   <p:cSld>
     <p:spTree>
@@ -18283,7 +19736,7 @@
 </p:sld>
 </file>
 
-<file path=ppt/slides/slide28.xml><?xml version="1.0" encoding="utf-8"?>
+<file path=ppt/slides/slide29.xml><?xml version="1.0" encoding="utf-8"?>
 <p:sld xmlns:a="http://schemas.openxmlformats.org/drawingml/2006/main" xmlns:r="http://schemas.openxmlformats.org/officeDocument/2006/relationships" xmlns:p="http://schemas.openxmlformats.org/presentationml/2006/main">
   <p:cSld>
     <p:spTree>
@@ -18372,7 +19825,7 @@
                 <a:latin typeface="Consolas" panose="020B0609020204030204" pitchFamily="49" charset="0"/>
                 <a:cs typeface="Consolas" panose="020B0609020204030204" pitchFamily="49" charset="0"/>
               </a:rPr>
-              <a:t>$git checkout -- &lt;path/to/file&gt;</a:t>
+              <a:t>$git revert &lt;commit ID&gt;</a:t>
             </a:r>
             <a:r>
               <a:rPr lang="en-US" sz="2800" dirty="0"/>
@@ -18395,85 +19848,16 @@
             </a:pPr>
             <a:r>
               <a:rPr lang="en-US" sz="2800" dirty="0"/>
-              <a:t>Works where undo won’t/can’t </a:t>
-            </a:r>
-          </a:p>
-          <a:p>
-            <a:pPr marL="234950" indent="0">
-              <a:lnSpc>
-                <a:spcPct val="100000"/>
-              </a:lnSpc>
-              <a:spcBef>
-                <a:spcPts val="0"/>
-              </a:spcBef>
-              <a:spcAft>
-                <a:spcPts val="1200"/>
-              </a:spcAft>
-              <a:buNone/>
-            </a:pPr>
-            <a:endParaRPr lang="en-US" sz="2800" dirty="0"/>
-          </a:p>
-          <a:p>
-            <a:pPr marL="0" indent="0">
-              <a:lnSpc>
-                <a:spcPct val="100000"/>
-              </a:lnSpc>
-              <a:spcBef>
-                <a:spcPts val="0"/>
-              </a:spcBef>
-              <a:spcAft>
-                <a:spcPts val="1200"/>
-              </a:spcAft>
-              <a:buNone/>
-            </a:pPr>
-            <a:r>
-              <a:rPr lang="en-US" sz="2800" dirty="0">
-                <a:highlight>
-                  <a:srgbClr val="C0C0C0"/>
-                </a:highlight>
-                <a:latin typeface="Consolas" panose="020B0609020204030204" pitchFamily="49" charset="0"/>
-                <a:cs typeface="Consolas" panose="020B0609020204030204" pitchFamily="49" charset="0"/>
-              </a:rPr>
-              <a:t>$git checkout -- .</a:t>
+              <a:t>Use the commit ID of </a:t>
+            </a:r>
+            <a:r>
+              <a:rPr lang="en-US" sz="2800" i="1" u="sng" dirty="0"/>
+              <a:t>the commit you want to undo</a:t>
             </a:r>
             <a:r>
               <a:rPr lang="en-US" sz="2800" dirty="0"/>
-              <a:t> </a:t>
-            </a:r>
-          </a:p>
-          <a:p>
-            <a:pPr marL="457200" indent="-222250">
-              <a:lnSpc>
-                <a:spcPct val="100000"/>
-              </a:lnSpc>
-              <a:spcBef>
-                <a:spcPts val="0"/>
-              </a:spcBef>
-              <a:spcAft>
-                <a:spcPts val="1200"/>
-              </a:spcAft>
-              <a:buFont typeface="Arial" panose="020B0604020202020204" pitchFamily="34" charset="0"/>
-              <a:buChar char="•"/>
-            </a:pPr>
-            <a:r>
-              <a:rPr lang="en-US" sz="2800" dirty="0"/>
-              <a:t>Undo ALL changes in the directory since last commit </a:t>
-            </a:r>
-          </a:p>
-          <a:p>
-            <a:pPr marL="234950" indent="0">
-              <a:lnSpc>
-                <a:spcPct val="100000"/>
-              </a:lnSpc>
-              <a:spcBef>
-                <a:spcPts val="0"/>
-              </a:spcBef>
-              <a:spcAft>
-                <a:spcPts val="1200"/>
-              </a:spcAft>
-              <a:buNone/>
-            </a:pPr>
-            <a:endParaRPr lang="en-US" sz="2800" dirty="0"/>
+              <a:t>, not the one you want to go back to </a:t>
+            </a:r>
           </a:p>
         </p:txBody>
       </p:sp>
@@ -18544,164 +19928,6 @@
     <p:extLst>
       <p:ext uri="{BB962C8B-B14F-4D97-AF65-F5344CB8AC3E}">
         <p14:creationId xmlns:p14="http://schemas.microsoft.com/office/powerpoint/2010/main" val="1942144999"/>
-      </p:ext>
-    </p:extLst>
-  </p:cSld>
-  <p:clrMapOvr>
-    <a:masterClrMapping/>
-  </p:clrMapOvr>
-</p:sld>
-</file>
-
-<file path=ppt/slides/slide29.xml><?xml version="1.0" encoding="utf-8"?>
-<p:sld xmlns:a="http://schemas.openxmlformats.org/drawingml/2006/main" xmlns:r="http://schemas.openxmlformats.org/officeDocument/2006/relationships" xmlns:p="http://schemas.openxmlformats.org/presentationml/2006/main">
-  <p:cSld>
-    <p:spTree>
-      <p:nvGrpSpPr>
-        <p:cNvPr id="1" name=""/>
-        <p:cNvGrpSpPr/>
-        <p:nvPr/>
-      </p:nvGrpSpPr>
-      <p:grpSpPr>
-        <a:xfrm>
-          <a:off x="0" y="0"/>
-          <a:ext cx="0" cy="0"/>
-          <a:chOff x="0" y="0"/>
-          <a:chExt cx="0" cy="0"/>
-        </a:xfrm>
-      </p:grpSpPr>
-      <p:sp>
-        <p:nvSpPr>
-          <p:cNvPr id="2" name="Title 1">
-            <a:extLst>
-              <a:ext uri="{FF2B5EF4-FFF2-40B4-BE49-F238E27FC236}">
-                <a16:creationId xmlns:a16="http://schemas.microsoft.com/office/drawing/2014/main" id="{6C6541FF-A05B-3940-AB9F-9705FBA18B10}"/>
-              </a:ext>
-            </a:extLst>
-          </p:cNvPr>
-          <p:cNvSpPr>
-            <a:spLocks noGrp="1"/>
-          </p:cNvSpPr>
-          <p:nvPr>
-            <p:ph type="title"/>
-          </p:nvPr>
-        </p:nvSpPr>
-        <p:spPr/>
-        <p:txBody>
-          <a:bodyPr/>
-          <a:lstStyle/>
-          <a:p>
-            <a:r>
-              <a:rPr lang="en-US" dirty="0"/>
-              <a:t>Branching Out</a:t>
-            </a:r>
-          </a:p>
-        </p:txBody>
-      </p:sp>
-      <p:sp>
-        <p:nvSpPr>
-          <p:cNvPr id="3" name="Text Placeholder 2">
-            <a:extLst>
-              <a:ext uri="{FF2B5EF4-FFF2-40B4-BE49-F238E27FC236}">
-                <a16:creationId xmlns:a16="http://schemas.microsoft.com/office/drawing/2014/main" id="{03A89276-DD8C-9F44-9D95-92467E46B6ED}"/>
-              </a:ext>
-            </a:extLst>
-          </p:cNvPr>
-          <p:cNvSpPr>
-            <a:spLocks noGrp="1"/>
-          </p:cNvSpPr>
-          <p:nvPr>
-            <p:ph type="body" idx="1"/>
-          </p:nvPr>
-        </p:nvSpPr>
-        <p:spPr/>
-        <p:txBody>
-          <a:bodyPr/>
-          <a:lstStyle/>
-          <a:p>
-            <a:endParaRPr lang="en-US"/>
-          </a:p>
-        </p:txBody>
-      </p:sp>
-      <p:sp>
-        <p:nvSpPr>
-          <p:cNvPr id="4" name="TextBox 3">
-            <a:extLst>
-              <a:ext uri="{FF2B5EF4-FFF2-40B4-BE49-F238E27FC236}">
-                <a16:creationId xmlns:a16="http://schemas.microsoft.com/office/drawing/2014/main" id="{D9E05685-B48C-9746-A399-E7D38C78C811}"/>
-              </a:ext>
-            </a:extLst>
-          </p:cNvPr>
-          <p:cNvSpPr txBox="1"/>
-          <p:nvPr/>
-        </p:nvSpPr>
-        <p:spPr>
-          <a:xfrm>
-            <a:off x="130629" y="6397228"/>
-            <a:ext cx="4911634" cy="338554"/>
-          </a:xfrm>
-          <a:prstGeom prst="rect">
-            <a:avLst/>
-          </a:prstGeom>
-          <a:noFill/>
-        </p:spPr>
-        <p:txBody>
-          <a:bodyPr wrap="square" rtlCol="0">
-            <a:spAutoFit/>
-          </a:bodyPr>
-          <a:lstStyle/>
-          <a:p>
-            <a:r>
-              <a:rPr lang="en-US" sz="1600" i="1" dirty="0">
-                <a:solidFill>
-                  <a:schemeClr val="bg1"/>
-                </a:solidFill>
-              </a:rPr>
-              <a:t>Office of Institutional Research</a:t>
-            </a:r>
-          </a:p>
-        </p:txBody>
-      </p:sp>
-      <p:pic>
-        <p:nvPicPr>
-          <p:cNvPr id="5" name="Picture 4">
-            <a:extLst>
-              <a:ext uri="{FF2B5EF4-FFF2-40B4-BE49-F238E27FC236}">
-                <a16:creationId xmlns:a16="http://schemas.microsoft.com/office/drawing/2014/main" id="{78EDDDCC-9F71-1344-8C71-91DA7448AE0C}"/>
-              </a:ext>
-            </a:extLst>
-          </p:cNvPr>
-          <p:cNvPicPr>
-            <a:picLocks noChangeAspect="1"/>
-          </p:cNvPicPr>
-          <p:nvPr/>
-        </p:nvPicPr>
-        <p:blipFill>
-          <a:blip r:embed="rId2" cstate="screen">
-            <a:extLst>
-              <a:ext uri="{28A0092B-C50C-407E-A947-70E740481C1C}">
-                <a14:useLocalDpi xmlns:a14="http://schemas.microsoft.com/office/drawing/2010/main"/>
-              </a:ext>
-            </a:extLst>
-          </a:blip>
-          <a:stretch>
-            <a:fillRect/>
-          </a:stretch>
-        </p:blipFill>
-        <p:spPr>
-          <a:xfrm>
-            <a:off x="8582526" y="216624"/>
-            <a:ext cx="3352800" cy="452628"/>
-          </a:xfrm>
-          <a:prstGeom prst="rect">
-            <a:avLst/>
-          </a:prstGeom>
-        </p:spPr>
-      </p:pic>
-    </p:spTree>
-    <p:extLst>
-      <p:ext uri="{BB962C8B-B14F-4D97-AF65-F5344CB8AC3E}">
-        <p14:creationId xmlns:p14="http://schemas.microsoft.com/office/powerpoint/2010/main" val="4081610546"/>
       </p:ext>
     </p:extLst>
   </p:cSld>
@@ -18935,6 +20161,724 @@
                 </a:solidFill>
                 <a:latin typeface="+mn-lt"/>
               </a:rPr>
+              <a:t>Going back to an old commit</a:t>
+            </a:r>
+          </a:p>
+        </p:txBody>
+      </p:sp>
+      <p:sp>
+        <p:nvSpPr>
+          <p:cNvPr id="2" name="Content Placeholder 1">
+            <a:extLst>
+              <a:ext uri="{FF2B5EF4-FFF2-40B4-BE49-F238E27FC236}">
+                <a16:creationId xmlns:a16="http://schemas.microsoft.com/office/drawing/2014/main" id="{27D0C661-EDC7-964F-9BD3-F8C1B1CD48B7}"/>
+              </a:ext>
+            </a:extLst>
+          </p:cNvPr>
+          <p:cNvSpPr>
+            <a:spLocks noGrp="1"/>
+          </p:cNvSpPr>
+          <p:nvPr>
+            <p:ph idx="1"/>
+          </p:nvPr>
+        </p:nvSpPr>
+        <p:spPr/>
+        <p:txBody>
+          <a:bodyPr>
+            <a:normAutofit/>
+          </a:bodyPr>
+          <a:lstStyle/>
+          <a:p>
+            <a:pPr marL="0" indent="0">
+              <a:lnSpc>
+                <a:spcPct val="100000"/>
+              </a:lnSpc>
+              <a:spcBef>
+                <a:spcPts val="0"/>
+              </a:spcBef>
+              <a:spcAft>
+                <a:spcPts val="1200"/>
+              </a:spcAft>
+              <a:buNone/>
+            </a:pPr>
+            <a:r>
+              <a:rPr lang="en-US" sz="2800" dirty="0">
+                <a:highlight>
+                  <a:srgbClr val="C0C0C0"/>
+                </a:highlight>
+                <a:latin typeface="Consolas" panose="020B0609020204030204" pitchFamily="49" charset="0"/>
+                <a:cs typeface="Consolas" panose="020B0609020204030204" pitchFamily="49" charset="0"/>
+              </a:rPr>
+              <a:t>$git reset --soft &lt;commit ID&gt;</a:t>
+            </a:r>
+            <a:r>
+              <a:rPr lang="en-US" sz="2800" dirty="0"/>
+              <a:t> </a:t>
+            </a:r>
+          </a:p>
+          <a:p>
+            <a:pPr marL="457200" indent="-222250">
+              <a:lnSpc>
+                <a:spcPct val="100000"/>
+              </a:lnSpc>
+              <a:spcBef>
+                <a:spcPts val="0"/>
+              </a:spcBef>
+              <a:spcAft>
+                <a:spcPts val="1200"/>
+              </a:spcAft>
+              <a:buFont typeface="Arial" panose="020B0604020202020204" pitchFamily="34" charset="0"/>
+              <a:buChar char="•"/>
+            </a:pPr>
+            <a:r>
+              <a:rPr lang="en-US" sz="2800" dirty="0"/>
+              <a:t>Uncommit changes but leave them staged</a:t>
+            </a:r>
+          </a:p>
+          <a:p>
+            <a:pPr marL="457200" indent="-222250">
+              <a:lnSpc>
+                <a:spcPct val="100000"/>
+              </a:lnSpc>
+              <a:spcBef>
+                <a:spcPts val="0"/>
+              </a:spcBef>
+              <a:spcAft>
+                <a:spcPts val="1200"/>
+              </a:spcAft>
+              <a:buFont typeface="Arial" panose="020B0604020202020204" pitchFamily="34" charset="0"/>
+              <a:buChar char="•"/>
+            </a:pPr>
+            <a:r>
+              <a:rPr lang="en-US" sz="2800" dirty="0"/>
+              <a:t>Use if a commit is incomplete or typo in commit message </a:t>
+            </a:r>
+          </a:p>
+          <a:p>
+            <a:pPr marL="0" indent="0">
+              <a:lnSpc>
+                <a:spcPct val="100000"/>
+              </a:lnSpc>
+              <a:spcBef>
+                <a:spcPts val="0"/>
+              </a:spcBef>
+              <a:spcAft>
+                <a:spcPts val="1200"/>
+              </a:spcAft>
+              <a:buNone/>
+            </a:pPr>
+            <a:r>
+              <a:rPr lang="en-US" sz="2800" dirty="0">
+                <a:highlight>
+                  <a:srgbClr val="C0C0C0"/>
+                </a:highlight>
+                <a:latin typeface="Consolas" panose="020B0609020204030204" pitchFamily="49" charset="0"/>
+                <a:cs typeface="Consolas" panose="020B0609020204030204" pitchFamily="49" charset="0"/>
+              </a:rPr>
+              <a:t>$git reset --mixed &lt;commit ID&gt;</a:t>
+            </a:r>
+            <a:r>
+              <a:rPr lang="en-US" sz="2800" dirty="0"/>
+              <a:t> </a:t>
+            </a:r>
+          </a:p>
+          <a:p>
+            <a:pPr marL="457200" indent="-222250">
+              <a:lnSpc>
+                <a:spcPct val="100000"/>
+              </a:lnSpc>
+              <a:spcBef>
+                <a:spcPts val="0"/>
+              </a:spcBef>
+              <a:spcAft>
+                <a:spcPts val="1200"/>
+              </a:spcAft>
+              <a:buFont typeface="Arial" panose="020B0604020202020204" pitchFamily="34" charset="0"/>
+              <a:buChar char="•"/>
+            </a:pPr>
+            <a:r>
+              <a:rPr lang="en-US" sz="2800" dirty="0"/>
+              <a:t>Uncommit and </a:t>
+            </a:r>
+            <a:r>
+              <a:rPr lang="en-US" sz="2800" dirty="0" err="1"/>
+              <a:t>unstage</a:t>
+            </a:r>
+            <a:r>
+              <a:rPr lang="en-US" sz="2800" dirty="0"/>
+              <a:t> changes</a:t>
+            </a:r>
+          </a:p>
+          <a:p>
+            <a:pPr marL="457200" indent="-222250">
+              <a:lnSpc>
+                <a:spcPct val="100000"/>
+              </a:lnSpc>
+              <a:spcBef>
+                <a:spcPts val="0"/>
+              </a:spcBef>
+              <a:spcAft>
+                <a:spcPts val="1200"/>
+              </a:spcAft>
+              <a:buFont typeface="Arial" panose="020B0604020202020204" pitchFamily="34" charset="0"/>
+              <a:buChar char="•"/>
+            </a:pPr>
+            <a:r>
+              <a:rPr lang="en-US" sz="2800" dirty="0"/>
+              <a:t>Use if a file was added that shouldn’t have been added</a:t>
+            </a:r>
+          </a:p>
+          <a:p>
+            <a:pPr marL="457200" indent="-222250">
+              <a:lnSpc>
+                <a:spcPct val="100000"/>
+              </a:lnSpc>
+              <a:spcBef>
+                <a:spcPts val="0"/>
+              </a:spcBef>
+              <a:spcAft>
+                <a:spcPts val="1200"/>
+              </a:spcAft>
+              <a:buFont typeface="Arial" panose="020B0604020202020204" pitchFamily="34" charset="0"/>
+              <a:buChar char="•"/>
+            </a:pPr>
+            <a:endParaRPr lang="en-US" sz="2800" dirty="0"/>
+          </a:p>
+        </p:txBody>
+      </p:sp>
+      <p:sp>
+        <p:nvSpPr>
+          <p:cNvPr id="9" name="TextBox 8"/>
+          <p:cNvSpPr txBox="1"/>
+          <p:nvPr/>
+        </p:nvSpPr>
+        <p:spPr>
+          <a:xfrm>
+            <a:off x="130629" y="6397228"/>
+            <a:ext cx="4911634" cy="338554"/>
+          </a:xfrm>
+          <a:prstGeom prst="rect">
+            <a:avLst/>
+          </a:prstGeom>
+          <a:noFill/>
+        </p:spPr>
+        <p:txBody>
+          <a:bodyPr wrap="square" rtlCol="0">
+            <a:spAutoFit/>
+          </a:bodyPr>
+          <a:lstStyle/>
+          <a:p>
+            <a:r>
+              <a:rPr lang="en-US" sz="1600" i="1" dirty="0">
+                <a:solidFill>
+                  <a:schemeClr val="bg1"/>
+                </a:solidFill>
+              </a:rPr>
+              <a:t>Office of Institutional Research</a:t>
+            </a:r>
+          </a:p>
+        </p:txBody>
+      </p:sp>
+      <p:pic>
+        <p:nvPicPr>
+          <p:cNvPr id="7" name="Picture 6"/>
+          <p:cNvPicPr>
+            <a:picLocks noChangeAspect="1"/>
+          </p:cNvPicPr>
+          <p:nvPr/>
+        </p:nvPicPr>
+        <p:blipFill>
+          <a:blip r:embed="rId3" cstate="screen">
+            <a:extLst>
+              <a:ext uri="{28A0092B-C50C-407E-A947-70E740481C1C}">
+                <a14:useLocalDpi xmlns:a14="http://schemas.microsoft.com/office/drawing/2010/main"/>
+              </a:ext>
+            </a:extLst>
+          </a:blip>
+          <a:stretch>
+            <a:fillRect/>
+          </a:stretch>
+        </p:blipFill>
+        <p:spPr>
+          <a:xfrm>
+            <a:off x="8582526" y="216624"/>
+            <a:ext cx="3352800" cy="452628"/>
+          </a:xfrm>
+          <a:prstGeom prst="rect">
+            <a:avLst/>
+          </a:prstGeom>
+        </p:spPr>
+      </p:pic>
+    </p:spTree>
+    <p:extLst>
+      <p:ext uri="{BB962C8B-B14F-4D97-AF65-F5344CB8AC3E}">
+        <p14:creationId xmlns:p14="http://schemas.microsoft.com/office/powerpoint/2010/main" val="3396677117"/>
+      </p:ext>
+    </p:extLst>
+  </p:cSld>
+  <p:clrMapOvr>
+    <a:masterClrMapping/>
+  </p:clrMapOvr>
+</p:sld>
+</file>
+
+<file path=ppt/slides/slide31.xml><?xml version="1.0" encoding="utf-8"?>
+<p:sld xmlns:a="http://schemas.openxmlformats.org/drawingml/2006/main" xmlns:r="http://schemas.openxmlformats.org/officeDocument/2006/relationships" xmlns:p="http://schemas.openxmlformats.org/presentationml/2006/main">
+  <p:cSld>
+    <p:spTree>
+      <p:nvGrpSpPr>
+        <p:cNvPr id="1" name=""/>
+        <p:cNvGrpSpPr/>
+        <p:nvPr/>
+      </p:nvGrpSpPr>
+      <p:grpSpPr>
+        <a:xfrm>
+          <a:off x="0" y="0"/>
+          <a:ext cx="0" cy="0"/>
+          <a:chOff x="0" y="0"/>
+          <a:chExt cx="0" cy="0"/>
+        </a:xfrm>
+      </p:grpSpPr>
+      <p:sp>
+        <p:nvSpPr>
+          <p:cNvPr id="9218" name="Title 1"/>
+          <p:cNvSpPr>
+            <a:spLocks noGrp="1"/>
+          </p:cNvSpPr>
+          <p:nvPr>
+            <p:ph type="title"/>
+          </p:nvPr>
+        </p:nvSpPr>
+        <p:spPr/>
+        <p:txBody>
+          <a:bodyPr anchor="b">
+            <a:noAutofit/>
+          </a:bodyPr>
+          <a:lstStyle/>
+          <a:p>
+            <a:r>
+              <a:rPr lang="en-US" sz="3200" b="1" dirty="0">
+                <a:solidFill>
+                  <a:schemeClr val="accent2"/>
+                </a:solidFill>
+                <a:latin typeface="+mn-lt"/>
+              </a:rPr>
+              <a:t>Going back to an old commit</a:t>
+            </a:r>
+          </a:p>
+        </p:txBody>
+      </p:sp>
+      <p:sp>
+        <p:nvSpPr>
+          <p:cNvPr id="2" name="Content Placeholder 1">
+            <a:extLst>
+              <a:ext uri="{FF2B5EF4-FFF2-40B4-BE49-F238E27FC236}">
+                <a16:creationId xmlns:a16="http://schemas.microsoft.com/office/drawing/2014/main" id="{27D0C661-EDC7-964F-9BD3-F8C1B1CD48B7}"/>
+              </a:ext>
+            </a:extLst>
+          </p:cNvPr>
+          <p:cNvSpPr>
+            <a:spLocks noGrp="1"/>
+          </p:cNvSpPr>
+          <p:nvPr>
+            <p:ph idx="1"/>
+          </p:nvPr>
+        </p:nvSpPr>
+        <p:spPr/>
+        <p:txBody>
+          <a:bodyPr>
+            <a:normAutofit/>
+          </a:bodyPr>
+          <a:lstStyle/>
+          <a:p>
+            <a:pPr marL="0" indent="0">
+              <a:lnSpc>
+                <a:spcPct val="100000"/>
+              </a:lnSpc>
+              <a:spcBef>
+                <a:spcPts val="0"/>
+              </a:spcBef>
+              <a:spcAft>
+                <a:spcPts val="1200"/>
+              </a:spcAft>
+              <a:buNone/>
+            </a:pPr>
+            <a:r>
+              <a:rPr lang="en-US" sz="2800" dirty="0">
+                <a:highlight>
+                  <a:srgbClr val="C0C0C0"/>
+                </a:highlight>
+                <a:latin typeface="Consolas" panose="020B0609020204030204" pitchFamily="49" charset="0"/>
+                <a:cs typeface="Consolas" panose="020B0609020204030204" pitchFamily="49" charset="0"/>
+              </a:rPr>
+              <a:t>$git reset --hard &lt;commit ID&gt;</a:t>
+            </a:r>
+            <a:r>
+              <a:rPr lang="en-US" sz="2800" dirty="0"/>
+              <a:t> </a:t>
+            </a:r>
+          </a:p>
+          <a:p>
+            <a:pPr marL="457200" indent="-222250">
+              <a:lnSpc>
+                <a:spcPct val="100000"/>
+              </a:lnSpc>
+              <a:spcBef>
+                <a:spcPts val="0"/>
+              </a:spcBef>
+              <a:spcAft>
+                <a:spcPts val="1200"/>
+              </a:spcAft>
+              <a:buFont typeface="Arial" panose="020B0604020202020204" pitchFamily="34" charset="0"/>
+              <a:buChar char="•"/>
+            </a:pPr>
+            <a:r>
+              <a:rPr lang="en-US" sz="2800" dirty="0"/>
+              <a:t>Uncommit, </a:t>
+            </a:r>
+            <a:r>
+              <a:rPr lang="en-US" sz="2800" dirty="0" err="1"/>
+              <a:t>unstage</a:t>
+            </a:r>
+            <a:r>
+              <a:rPr lang="en-US" sz="2800" dirty="0"/>
+              <a:t>, and DELETE changes</a:t>
+            </a:r>
+          </a:p>
+          <a:p>
+            <a:pPr marL="457200" indent="-222250">
+              <a:lnSpc>
+                <a:spcPct val="100000"/>
+              </a:lnSpc>
+              <a:spcBef>
+                <a:spcPts val="0"/>
+              </a:spcBef>
+              <a:spcAft>
+                <a:spcPts val="1200"/>
+              </a:spcAft>
+              <a:buFont typeface="Arial" panose="020B0604020202020204" pitchFamily="34" charset="0"/>
+              <a:buChar char="•"/>
+            </a:pPr>
+            <a:r>
+              <a:rPr lang="en-US" sz="2800" dirty="0"/>
+              <a:t>WARNING: this will delete all the commits between your current commit and the one you reset back to </a:t>
+            </a:r>
+          </a:p>
+          <a:p>
+            <a:pPr marL="457200" indent="-222250">
+              <a:lnSpc>
+                <a:spcPct val="100000"/>
+              </a:lnSpc>
+              <a:spcBef>
+                <a:spcPts val="0"/>
+              </a:spcBef>
+              <a:spcAft>
+                <a:spcPts val="1200"/>
+              </a:spcAft>
+              <a:buFont typeface="Arial" panose="020B0604020202020204" pitchFamily="34" charset="0"/>
+              <a:buChar char="•"/>
+            </a:pPr>
+            <a:r>
+              <a:rPr lang="en-US" sz="2800" dirty="0"/>
+              <a:t>WARNING: this will delete all local files that were not in the commit you reset back to</a:t>
+            </a:r>
+          </a:p>
+          <a:p>
+            <a:pPr marL="457200" indent="-222250">
+              <a:lnSpc>
+                <a:spcPct val="100000"/>
+              </a:lnSpc>
+              <a:spcBef>
+                <a:spcPts val="0"/>
+              </a:spcBef>
+              <a:spcAft>
+                <a:spcPts val="1200"/>
+              </a:spcAft>
+              <a:buFont typeface="Arial" panose="020B0604020202020204" pitchFamily="34" charset="0"/>
+              <a:buChar char="•"/>
+            </a:pPr>
+            <a:r>
+              <a:rPr lang="en-US" sz="2800" dirty="0"/>
+              <a:t>Use as a last resort if things have gone horribly wrong</a:t>
+            </a:r>
+          </a:p>
+        </p:txBody>
+      </p:sp>
+      <p:sp>
+        <p:nvSpPr>
+          <p:cNvPr id="9" name="TextBox 8"/>
+          <p:cNvSpPr txBox="1"/>
+          <p:nvPr/>
+        </p:nvSpPr>
+        <p:spPr>
+          <a:xfrm>
+            <a:off x="130629" y="6397228"/>
+            <a:ext cx="4911634" cy="338554"/>
+          </a:xfrm>
+          <a:prstGeom prst="rect">
+            <a:avLst/>
+          </a:prstGeom>
+          <a:noFill/>
+        </p:spPr>
+        <p:txBody>
+          <a:bodyPr wrap="square" rtlCol="0">
+            <a:spAutoFit/>
+          </a:bodyPr>
+          <a:lstStyle/>
+          <a:p>
+            <a:r>
+              <a:rPr lang="en-US" sz="1600" i="1" dirty="0">
+                <a:solidFill>
+                  <a:schemeClr val="bg1"/>
+                </a:solidFill>
+              </a:rPr>
+              <a:t>Office of Institutional Research</a:t>
+            </a:r>
+          </a:p>
+        </p:txBody>
+      </p:sp>
+      <p:pic>
+        <p:nvPicPr>
+          <p:cNvPr id="7" name="Picture 6"/>
+          <p:cNvPicPr>
+            <a:picLocks noChangeAspect="1"/>
+          </p:cNvPicPr>
+          <p:nvPr/>
+        </p:nvPicPr>
+        <p:blipFill>
+          <a:blip r:embed="rId3" cstate="screen">
+            <a:extLst>
+              <a:ext uri="{28A0092B-C50C-407E-A947-70E740481C1C}">
+                <a14:useLocalDpi xmlns:a14="http://schemas.microsoft.com/office/drawing/2010/main"/>
+              </a:ext>
+            </a:extLst>
+          </a:blip>
+          <a:stretch>
+            <a:fillRect/>
+          </a:stretch>
+        </p:blipFill>
+        <p:spPr>
+          <a:xfrm>
+            <a:off x="8582526" y="216624"/>
+            <a:ext cx="3352800" cy="452628"/>
+          </a:xfrm>
+          <a:prstGeom prst="rect">
+            <a:avLst/>
+          </a:prstGeom>
+        </p:spPr>
+      </p:pic>
+    </p:spTree>
+    <p:extLst>
+      <p:ext uri="{BB962C8B-B14F-4D97-AF65-F5344CB8AC3E}">
+        <p14:creationId xmlns:p14="http://schemas.microsoft.com/office/powerpoint/2010/main" val="864842360"/>
+      </p:ext>
+    </p:extLst>
+  </p:cSld>
+  <p:clrMapOvr>
+    <a:masterClrMapping/>
+  </p:clrMapOvr>
+</p:sld>
+</file>
+
+<file path=ppt/slides/slide32.xml><?xml version="1.0" encoding="utf-8"?>
+<p:sld xmlns:a="http://schemas.openxmlformats.org/drawingml/2006/main" xmlns:r="http://schemas.openxmlformats.org/officeDocument/2006/relationships" xmlns:p="http://schemas.openxmlformats.org/presentationml/2006/main">
+  <p:cSld>
+    <p:spTree>
+      <p:nvGrpSpPr>
+        <p:cNvPr id="1" name=""/>
+        <p:cNvGrpSpPr/>
+        <p:nvPr/>
+      </p:nvGrpSpPr>
+      <p:grpSpPr>
+        <a:xfrm>
+          <a:off x="0" y="0"/>
+          <a:ext cx="0" cy="0"/>
+          <a:chOff x="0" y="0"/>
+          <a:chExt cx="0" cy="0"/>
+        </a:xfrm>
+      </p:grpSpPr>
+      <p:sp>
+        <p:nvSpPr>
+          <p:cNvPr id="2" name="Title 1">
+            <a:extLst>
+              <a:ext uri="{FF2B5EF4-FFF2-40B4-BE49-F238E27FC236}">
+                <a16:creationId xmlns:a16="http://schemas.microsoft.com/office/drawing/2014/main" id="{6C6541FF-A05B-3940-AB9F-9705FBA18B10}"/>
+              </a:ext>
+            </a:extLst>
+          </p:cNvPr>
+          <p:cNvSpPr>
+            <a:spLocks noGrp="1"/>
+          </p:cNvSpPr>
+          <p:nvPr>
+            <p:ph type="title"/>
+          </p:nvPr>
+        </p:nvSpPr>
+        <p:spPr/>
+        <p:txBody>
+          <a:bodyPr/>
+          <a:lstStyle/>
+          <a:p>
+            <a:r>
+              <a:rPr lang="en-US" dirty="0"/>
+              <a:t>Branching Out</a:t>
+            </a:r>
+          </a:p>
+        </p:txBody>
+      </p:sp>
+      <p:sp>
+        <p:nvSpPr>
+          <p:cNvPr id="3" name="Text Placeholder 2">
+            <a:extLst>
+              <a:ext uri="{FF2B5EF4-FFF2-40B4-BE49-F238E27FC236}">
+                <a16:creationId xmlns:a16="http://schemas.microsoft.com/office/drawing/2014/main" id="{03A89276-DD8C-9F44-9D95-92467E46B6ED}"/>
+              </a:ext>
+            </a:extLst>
+          </p:cNvPr>
+          <p:cNvSpPr>
+            <a:spLocks noGrp="1"/>
+          </p:cNvSpPr>
+          <p:nvPr>
+            <p:ph type="body" idx="1"/>
+          </p:nvPr>
+        </p:nvSpPr>
+        <p:spPr/>
+        <p:txBody>
+          <a:bodyPr/>
+          <a:lstStyle/>
+          <a:p>
+            <a:endParaRPr lang="en-US"/>
+          </a:p>
+        </p:txBody>
+      </p:sp>
+      <p:sp>
+        <p:nvSpPr>
+          <p:cNvPr id="4" name="TextBox 3">
+            <a:extLst>
+              <a:ext uri="{FF2B5EF4-FFF2-40B4-BE49-F238E27FC236}">
+                <a16:creationId xmlns:a16="http://schemas.microsoft.com/office/drawing/2014/main" id="{D9E05685-B48C-9746-A399-E7D38C78C811}"/>
+              </a:ext>
+            </a:extLst>
+          </p:cNvPr>
+          <p:cNvSpPr txBox="1"/>
+          <p:nvPr/>
+        </p:nvSpPr>
+        <p:spPr>
+          <a:xfrm>
+            <a:off x="130629" y="6397228"/>
+            <a:ext cx="4911634" cy="338554"/>
+          </a:xfrm>
+          <a:prstGeom prst="rect">
+            <a:avLst/>
+          </a:prstGeom>
+          <a:noFill/>
+        </p:spPr>
+        <p:txBody>
+          <a:bodyPr wrap="square" rtlCol="0">
+            <a:spAutoFit/>
+          </a:bodyPr>
+          <a:lstStyle/>
+          <a:p>
+            <a:r>
+              <a:rPr lang="en-US" sz="1600" i="1" dirty="0">
+                <a:solidFill>
+                  <a:schemeClr val="bg1"/>
+                </a:solidFill>
+              </a:rPr>
+              <a:t>Office of Institutional Research</a:t>
+            </a:r>
+          </a:p>
+        </p:txBody>
+      </p:sp>
+      <p:pic>
+        <p:nvPicPr>
+          <p:cNvPr id="5" name="Picture 4">
+            <a:extLst>
+              <a:ext uri="{FF2B5EF4-FFF2-40B4-BE49-F238E27FC236}">
+                <a16:creationId xmlns:a16="http://schemas.microsoft.com/office/drawing/2014/main" id="{78EDDDCC-9F71-1344-8C71-91DA7448AE0C}"/>
+              </a:ext>
+            </a:extLst>
+          </p:cNvPr>
+          <p:cNvPicPr>
+            <a:picLocks noChangeAspect="1"/>
+          </p:cNvPicPr>
+          <p:nvPr/>
+        </p:nvPicPr>
+        <p:blipFill>
+          <a:blip r:embed="rId2" cstate="screen">
+            <a:extLst>
+              <a:ext uri="{28A0092B-C50C-407E-A947-70E740481C1C}">
+                <a14:useLocalDpi xmlns:a14="http://schemas.microsoft.com/office/drawing/2010/main"/>
+              </a:ext>
+            </a:extLst>
+          </a:blip>
+          <a:stretch>
+            <a:fillRect/>
+          </a:stretch>
+        </p:blipFill>
+        <p:spPr>
+          <a:xfrm>
+            <a:off x="8582526" y="216624"/>
+            <a:ext cx="3352800" cy="452628"/>
+          </a:xfrm>
+          <a:prstGeom prst="rect">
+            <a:avLst/>
+          </a:prstGeom>
+        </p:spPr>
+      </p:pic>
+    </p:spTree>
+    <p:extLst>
+      <p:ext uri="{BB962C8B-B14F-4D97-AF65-F5344CB8AC3E}">
+        <p14:creationId xmlns:p14="http://schemas.microsoft.com/office/powerpoint/2010/main" val="4081610546"/>
+      </p:ext>
+    </p:extLst>
+  </p:cSld>
+  <p:clrMapOvr>
+    <a:masterClrMapping/>
+  </p:clrMapOvr>
+</p:sld>
+</file>
+
+<file path=ppt/slides/slide33.xml><?xml version="1.0" encoding="utf-8"?>
+<p:sld xmlns:a="http://schemas.openxmlformats.org/drawingml/2006/main" xmlns:r="http://schemas.openxmlformats.org/officeDocument/2006/relationships" xmlns:p="http://schemas.openxmlformats.org/presentationml/2006/main">
+  <p:cSld>
+    <p:spTree>
+      <p:nvGrpSpPr>
+        <p:cNvPr id="1" name=""/>
+        <p:cNvGrpSpPr/>
+        <p:nvPr/>
+      </p:nvGrpSpPr>
+      <p:grpSpPr>
+        <a:xfrm>
+          <a:off x="0" y="0"/>
+          <a:ext cx="0" cy="0"/>
+          <a:chOff x="0" y="0"/>
+          <a:chExt cx="0" cy="0"/>
+        </a:xfrm>
+      </p:grpSpPr>
+      <p:sp>
+        <p:nvSpPr>
+          <p:cNvPr id="9218" name="Title 1"/>
+          <p:cNvSpPr>
+            <a:spLocks noGrp="1"/>
+          </p:cNvSpPr>
+          <p:nvPr>
+            <p:ph type="title"/>
+          </p:nvPr>
+        </p:nvSpPr>
+        <p:spPr/>
+        <p:txBody>
+          <a:bodyPr anchor="b">
+            <a:noAutofit/>
+          </a:bodyPr>
+          <a:lstStyle/>
+          <a:p>
+            <a:r>
+              <a:rPr lang="en-US" sz="3200" b="1" dirty="0">
+                <a:solidFill>
+                  <a:schemeClr val="accent2"/>
+                </a:solidFill>
+                <a:latin typeface="+mn-lt"/>
+              </a:rPr>
               <a:t>Title</a:t>
             </a:r>
           </a:p>
@@ -19077,7 +21021,7 @@
 </p:sld>
 </file>
 
-<file path=ppt/slides/slide31.xml><?xml version="1.0" encoding="utf-8"?>
+<file path=ppt/slides/slide34.xml><?xml version="1.0" encoding="utf-8"?>
 <p:sld xmlns:a="http://schemas.openxmlformats.org/drawingml/2006/main" xmlns:r="http://schemas.openxmlformats.org/officeDocument/2006/relationships" xmlns:p="http://schemas.openxmlformats.org/presentationml/2006/main">
   <p:cSld>
     <p:spTree>
@@ -19260,7 +21204,7 @@
 </p:sld>
 </file>
 
-<file path=ppt/slides/slide32.xml><?xml version="1.0" encoding="utf-8"?>
+<file path=ppt/slides/slide35.xml><?xml version="1.0" encoding="utf-8"?>
 <p:sld xmlns:a="http://schemas.openxmlformats.org/drawingml/2006/main" xmlns:r="http://schemas.openxmlformats.org/officeDocument/2006/relationships" xmlns:p="http://schemas.openxmlformats.org/presentationml/2006/main">
   <p:cSld>
     <p:spTree>
@@ -19443,7 +21387,7 @@
 </p:sld>
 </file>
 
-<file path=ppt/slides/slide33.xml><?xml version="1.0" encoding="utf-8"?>
+<file path=ppt/slides/slide36.xml><?xml version="1.0" encoding="utf-8"?>
 <p:sld xmlns:a="http://schemas.openxmlformats.org/drawingml/2006/main" xmlns:r="http://schemas.openxmlformats.org/officeDocument/2006/relationships" xmlns:p="http://schemas.openxmlformats.org/presentationml/2006/main">
   <p:cSld>
     <p:spTree>
@@ -19626,7 +21570,7 @@
 </p:sld>
 </file>
 
-<file path=ppt/slides/slide34.xml><?xml version="1.0" encoding="utf-8"?>
+<file path=ppt/slides/slide37.xml><?xml version="1.0" encoding="utf-8"?>
 <p:sld xmlns:a="http://schemas.openxmlformats.org/drawingml/2006/main" xmlns:r="http://schemas.openxmlformats.org/officeDocument/2006/relationships" xmlns:p="http://schemas.openxmlformats.org/presentationml/2006/main">
   <p:cSld>
     <p:spTree>

</xml_diff>